<commit_message>
added 'choose an action' button
</commit_message>
<xml_diff>
--- a/presentations/DevTeach-Intents.pptx
+++ b/presentations/DevTeach-Intents.pptx
@@ -5,31 +5,32 @@
     <p:sldMasterId id="2147483648" r:id="rId1"/>
   </p:sldMasterIdLst>
   <p:notesMasterIdLst>
-    <p:notesMasterId r:id="rId24"/>
+    <p:notesMasterId r:id="rId25"/>
   </p:notesMasterIdLst>
   <p:sldIdLst>
     <p:sldId id="256" r:id="rId2"/>
     <p:sldId id="280" r:id="rId3"/>
     <p:sldId id="257" r:id="rId4"/>
     <p:sldId id="264" r:id="rId5"/>
-    <p:sldId id="265" r:id="rId6"/>
-    <p:sldId id="267" r:id="rId7"/>
-    <p:sldId id="269" r:id="rId8"/>
-    <p:sldId id="270" r:id="rId9"/>
-    <p:sldId id="281" r:id="rId10"/>
-    <p:sldId id="282" r:id="rId11"/>
-    <p:sldId id="283" r:id="rId12"/>
-    <p:sldId id="284" r:id="rId13"/>
-    <p:sldId id="273" r:id="rId14"/>
-    <p:sldId id="274" r:id="rId15"/>
-    <p:sldId id="275" r:id="rId16"/>
-    <p:sldId id="276" r:id="rId17"/>
-    <p:sldId id="277" r:id="rId18"/>
-    <p:sldId id="279" r:id="rId19"/>
-    <p:sldId id="258" r:id="rId20"/>
-    <p:sldId id="266" r:id="rId21"/>
-    <p:sldId id="260" r:id="rId22"/>
-    <p:sldId id="262" r:id="rId23"/>
+    <p:sldId id="285" r:id="rId6"/>
+    <p:sldId id="265" r:id="rId7"/>
+    <p:sldId id="267" r:id="rId8"/>
+    <p:sldId id="269" r:id="rId9"/>
+    <p:sldId id="270" r:id="rId10"/>
+    <p:sldId id="281" r:id="rId11"/>
+    <p:sldId id="282" r:id="rId12"/>
+    <p:sldId id="283" r:id="rId13"/>
+    <p:sldId id="284" r:id="rId14"/>
+    <p:sldId id="273" r:id="rId15"/>
+    <p:sldId id="274" r:id="rId16"/>
+    <p:sldId id="275" r:id="rId17"/>
+    <p:sldId id="276" r:id="rId18"/>
+    <p:sldId id="277" r:id="rId19"/>
+    <p:sldId id="279" r:id="rId20"/>
+    <p:sldId id="258" r:id="rId21"/>
+    <p:sldId id="266" r:id="rId22"/>
+    <p:sldId id="260" r:id="rId23"/>
+    <p:sldId id="262" r:id="rId24"/>
   </p:sldIdLst>
   <p:sldSz cx="9144000" cy="6858000" type="screen4x3"/>
   <p:notesSz cx="6858000" cy="9144000"/>
@@ -261,7 +262,7 @@
               <a:pPr>
                 <a:defRPr/>
               </a:pPr>
-              <a:t>5/14/12</a:t>
+              <a:t>5/19/12</a:t>
             </a:fld>
             <a:endParaRPr lang="en-US"/>
           </a:p>
@@ -839,7 +840,7 @@
             <a:fld id="{F8B21A7F-F9EB-FB41-A62A-5377DB33A5E0}" type="slidenum">
               <a:rPr lang="en-US" sz="1200"/>
               <a:pPr eaLnBrk="1" hangingPunct="1"/>
-              <a:t>7</a:t>
+              <a:t>8</a:t>
             </a:fld>
             <a:endParaRPr lang="en-US" sz="1200"/>
           </a:p>
@@ -1113,7 +1114,7 @@
             <a:fld id="{B8C3BBE3-34AE-BF4A-8E11-8F97B84A86D9}" type="slidenum">
               <a:rPr lang="en-US" sz="1200"/>
               <a:pPr eaLnBrk="1" hangingPunct="1"/>
-              <a:t>9</a:t>
+              <a:t>10</a:t>
             </a:fld>
             <a:endParaRPr lang="en-US" sz="1200"/>
           </a:p>
@@ -1382,7 +1383,7 @@
             <a:fld id="{633A4B88-F865-E34A-B4A7-643265B9DA37}" type="slidenum">
               <a:rPr lang="en-US" sz="1200"/>
               <a:pPr eaLnBrk="1" hangingPunct="1"/>
-              <a:t>12</a:t>
+              <a:t>13</a:t>
             </a:fld>
             <a:endParaRPr lang="en-US" sz="1200"/>
           </a:p>
@@ -3754,7 +3755,7 @@
       </p:grpSpPr>
       <p:sp>
         <p:nvSpPr>
-          <p:cNvPr id="12289" name="Title 1"/>
+          <p:cNvPr id="11265" name="Title 1"/>
           <p:cNvSpPr>
             <a:spLocks noGrp="1"/>
           </p:cNvSpPr>
@@ -3771,165 +3772,355 @@
               <a:rPr lang="en-US">
                 <a:latin typeface="Arial" charset="0"/>
               </a:rPr>
-              <a:t>Getting results: step 1</a:t>
+              <a:t>Pick a Contact</a:t>
             </a:r>
           </a:p>
         </p:txBody>
       </p:sp>
-      <p:sp>
-        <p:nvSpPr>
-          <p:cNvPr id="12290" name="Content Placeholder 2"/>
-          <p:cNvSpPr>
-            <a:spLocks noGrp="1"/>
-          </p:cNvSpPr>
+      <p:graphicFrame>
+        <p:nvGraphicFramePr>
+          <p:cNvPr id="4" name="Table 3"/>
+          <p:cNvGraphicFramePr>
+            <a:graphicFrameLocks noGrp="1"/>
+          </p:cNvGraphicFramePr>
           <p:nvPr>
-            <p:ph idx="1"/>
+            <p:extLst>
+              <p:ext uri="{D42A27DB-BD31-4B8C-83A1-F6EECF244321}">
+                <p14:modId xmlns:p14="http://schemas.microsoft.com/office/powerpoint/2010/main" val="924574131"/>
+              </p:ext>
+            </p:extLst>
           </p:nvPr>
-        </p:nvSpPr>
-        <p:spPr/>
-        <p:txBody>
-          <a:bodyPr/>
-          <a:lstStyle/>
-          <a:p>
-            <a:pPr marL="0" indent="0">
-              <a:buFontTx/>
-              <a:buNone/>
-            </a:pPr>
-            <a:r>
-              <a:rPr lang="en-US" dirty="0">
-                <a:latin typeface="Courier" charset="0"/>
-                <a:cs typeface="Courier" charset="0"/>
-              </a:rPr>
-              <a:t>final Intent </a:t>
-            </a:r>
-            <a:r>
-              <a:rPr lang="en-US" dirty="0" err="1">
-                <a:latin typeface="Courier" charset="0"/>
-                <a:cs typeface="Courier" charset="0"/>
-              </a:rPr>
-              <a:t>pickContactsIntent</a:t>
-            </a:r>
-            <a:r>
-              <a:rPr lang="en-US" dirty="0">
-                <a:latin typeface="Courier" charset="0"/>
-                <a:cs typeface="Courier" charset="0"/>
-              </a:rPr>
-              <a:t> = </a:t>
-            </a:r>
-          </a:p>
-          <a:p>
-            <a:pPr marL="0" indent="0">
-              <a:buFontTx/>
-              <a:buNone/>
-            </a:pPr>
-            <a:r>
-              <a:rPr lang="en-US" dirty="0">
-                <a:latin typeface="Courier" charset="0"/>
-                <a:cs typeface="Courier" charset="0"/>
-              </a:rPr>
-              <a:t> new Intent(</a:t>
-            </a:r>
-            <a:r>
-              <a:rPr lang="en-US" dirty="0" err="1">
-                <a:latin typeface="Courier" charset="0"/>
-                <a:cs typeface="Courier" charset="0"/>
-              </a:rPr>
-              <a:t>Intent.ACTION_PICK</a:t>
-            </a:r>
-            <a:r>
-              <a:rPr lang="en-US" dirty="0">
-                <a:latin typeface="Courier" charset="0"/>
-                <a:cs typeface="Courier" charset="0"/>
-              </a:rPr>
-              <a:t>, </a:t>
-            </a:r>
-          </a:p>
-          <a:p>
-            <a:pPr marL="0" indent="0">
-              <a:buFontTx/>
-              <a:buNone/>
-            </a:pPr>
-            <a:r>
-              <a:rPr lang="en-US" dirty="0">
-                <a:latin typeface="Courier" charset="0"/>
-                <a:cs typeface="Courier" charset="0"/>
-              </a:rPr>
-              <a:t>  </a:t>
-            </a:r>
-            <a:r>
-              <a:rPr lang="en-US" dirty="0" err="1">
-                <a:latin typeface="Courier" charset="0"/>
-                <a:cs typeface="Courier" charset="0"/>
-              </a:rPr>
-              <a:t>ContactsContract.Contacts.CONTENT_URI</a:t>
-            </a:r>
-            <a:r>
-              <a:rPr lang="en-US" dirty="0">
-                <a:latin typeface="Courier" charset="0"/>
-                <a:cs typeface="Courier" charset="0"/>
-              </a:rPr>
-              <a:t>);</a:t>
-            </a:r>
-          </a:p>
-          <a:p>
-            <a:pPr marL="0" indent="0">
-              <a:buFontTx/>
-              <a:buNone/>
-            </a:pPr>
-            <a:r>
-              <a:rPr lang="en-US" dirty="0">
-                <a:latin typeface="Courier" charset="0"/>
-                <a:cs typeface="Courier" charset="0"/>
-              </a:rPr>
-              <a:t>                </a:t>
-            </a:r>
-            <a:r>
-              <a:rPr lang="en-US" dirty="0" err="1">
-                <a:solidFill>
-                  <a:srgbClr val="FFFF00"/>
-                </a:solidFill>
-                <a:latin typeface="Courier" charset="0"/>
-                <a:cs typeface="Courier" charset="0"/>
-              </a:rPr>
-              <a:t>startActivityForResult</a:t>
-            </a:r>
-            <a:r>
-              <a:rPr lang="en-US" dirty="0">
-                <a:latin typeface="Courier" charset="0"/>
-                <a:cs typeface="Courier" charset="0"/>
-              </a:rPr>
-              <a:t>(</a:t>
-            </a:r>
-            <a:r>
-              <a:rPr lang="en-US" dirty="0" err="1">
-                <a:latin typeface="Courier" charset="0"/>
-                <a:cs typeface="Courier" charset="0"/>
-              </a:rPr>
-              <a:t>pickContactsIntent</a:t>
-            </a:r>
-            <a:r>
-              <a:rPr lang="en-US" dirty="0">
-                <a:latin typeface="Courier" charset="0"/>
-                <a:cs typeface="Courier" charset="0"/>
-              </a:rPr>
-              <a:t>, </a:t>
-            </a:r>
-          </a:p>
-          <a:p>
-            <a:pPr marL="0" indent="0">
-              <a:buFontTx/>
-              <a:buNone/>
-            </a:pPr>
-            <a:r>
-              <a:rPr lang="en-US" dirty="0">
-                <a:latin typeface="Courier" charset="0"/>
-                <a:cs typeface="Courier" charset="0"/>
-              </a:rPr>
-              <a:t> PICK_CONTACT_REQUEST_CODE);</a:t>
-            </a:r>
-          </a:p>
-        </p:txBody>
-      </p:sp>
+        </p:nvGraphicFramePr>
+        <p:xfrm>
+          <a:off x="304800" y="1752600"/>
+          <a:ext cx="8458200" cy="4191000"/>
+        </p:xfrm>
+        <a:graphic>
+          <a:graphicData uri="http://schemas.openxmlformats.org/drawingml/2006/table">
+            <a:tbl>
+              <a:tblPr firstRow="1" bandRow="1">
+                <a:tableStyleId>{5940675A-B579-460E-94D1-54222C63F5DA}</a:tableStyleId>
+              </a:tblPr>
+              <a:tblGrid>
+                <a:gridCol w="1900719"/>
+                <a:gridCol w="6557481"/>
+              </a:tblGrid>
+              <a:tr h="1047750">
+                <a:tc>
+                  <a:txBody>
+                    <a:bodyPr/>
+                    <a:lstStyle/>
+                    <a:p>
+                      <a:r>
+                        <a:rPr lang="en-US" sz="2400" dirty="0" smtClean="0"/>
+                        <a:t>Permission</a:t>
+                      </a:r>
+                      <a:endParaRPr lang="en-US" sz="2400" dirty="0"/>
+                    </a:p>
+                  </a:txBody>
+                  <a:tcPr marT="45728" marB="45728" anchor="ctr">
+                    <a:lnL w="57150" cap="flat" cmpd="sng" algn="ctr">
+                      <a:solidFill>
+                        <a:srgbClr val="FFFFFF"/>
+                      </a:solidFill>
+                      <a:prstDash val="solid"/>
+                      <a:round/>
+                      <a:headEnd type="none" w="med" len="med"/>
+                      <a:tailEnd type="none" w="med" len="med"/>
+                    </a:lnL>
+                    <a:lnT w="57150" cap="flat" cmpd="sng" algn="ctr">
+                      <a:solidFill>
+                        <a:srgbClr val="FFFFFF"/>
+                      </a:solidFill>
+                      <a:prstDash val="solid"/>
+                      <a:round/>
+                      <a:headEnd type="none" w="med" len="med"/>
+                      <a:tailEnd type="none" w="med" len="med"/>
+                    </a:lnT>
+                    <a:lnB w="38100" cap="flat" cmpd="sng" algn="ctr">
+                      <a:solidFill>
+                        <a:srgbClr val="FFFFFF"/>
+                      </a:solidFill>
+                      <a:prstDash val="solid"/>
+                      <a:round/>
+                      <a:headEnd type="none" w="med" len="med"/>
+                      <a:tailEnd type="none" w="med" len="med"/>
+                    </a:lnB>
+                  </a:tcPr>
+                </a:tc>
+                <a:tc>
+                  <a:txBody>
+                    <a:bodyPr/>
+                    <a:lstStyle/>
+                    <a:p>
+                      <a:r>
+                        <a:rPr lang="en-US" sz="2400" dirty="0" smtClean="0"/>
+                        <a:t>READ_CONTACTS</a:t>
+                      </a:r>
+                      <a:endParaRPr lang="en-US" sz="2400" dirty="0"/>
+                    </a:p>
+                  </a:txBody>
+                  <a:tcPr marT="45728" marB="45728" anchor="ctr">
+                    <a:lnR w="57150" cap="flat" cmpd="sng" algn="ctr">
+                      <a:solidFill>
+                        <a:srgbClr val="FFFFFF"/>
+                      </a:solidFill>
+                      <a:prstDash val="solid"/>
+                      <a:round/>
+                      <a:headEnd type="none" w="med" len="med"/>
+                      <a:tailEnd type="none" w="med" len="med"/>
+                    </a:lnR>
+                    <a:lnT w="57150" cap="flat" cmpd="sng" algn="ctr">
+                      <a:solidFill>
+                        <a:srgbClr val="FFFFFF"/>
+                      </a:solidFill>
+                      <a:prstDash val="solid"/>
+                      <a:round/>
+                      <a:headEnd type="none" w="med" len="med"/>
+                      <a:tailEnd type="none" w="med" len="med"/>
+                    </a:lnT>
+                    <a:lnB w="38100" cap="flat" cmpd="sng" algn="ctr">
+                      <a:solidFill>
+                        <a:srgbClr val="FFFFFF"/>
+                      </a:solidFill>
+                      <a:prstDash val="solid"/>
+                      <a:round/>
+                      <a:headEnd type="none" w="med" len="med"/>
+                      <a:tailEnd type="none" w="med" len="med"/>
+                    </a:lnB>
+                  </a:tcPr>
+                </a:tc>
+              </a:tr>
+              <a:tr h="1047750">
+                <a:tc>
+                  <a:txBody>
+                    <a:bodyPr/>
+                    <a:lstStyle/>
+                    <a:p>
+                      <a:r>
+                        <a:rPr lang="en-US" sz="2400" dirty="0" smtClean="0"/>
+                        <a:t>Action</a:t>
+                      </a:r>
+                      <a:endParaRPr lang="en-US" sz="2400" dirty="0"/>
+                    </a:p>
+                  </a:txBody>
+                  <a:tcPr marT="45728" marB="45728" anchor="ctr">
+                    <a:lnL w="57150" cap="flat" cmpd="sng" algn="ctr">
+                      <a:solidFill>
+                        <a:srgbClr val="FFFFFF"/>
+                      </a:solidFill>
+                      <a:prstDash val="solid"/>
+                      <a:round/>
+                      <a:headEnd type="none" w="med" len="med"/>
+                      <a:tailEnd type="none" w="med" len="med"/>
+                    </a:lnL>
+                    <a:lnT w="38100" cap="flat" cmpd="sng" algn="ctr">
+                      <a:solidFill>
+                        <a:srgbClr val="FFFFFF"/>
+                      </a:solidFill>
+                      <a:prstDash val="solid"/>
+                      <a:round/>
+                      <a:headEnd type="none" w="med" len="med"/>
+                      <a:tailEnd type="none" w="med" len="med"/>
+                    </a:lnT>
+                  </a:tcPr>
+                </a:tc>
+                <a:tc>
+                  <a:txBody>
+                    <a:bodyPr/>
+                    <a:lstStyle/>
+                    <a:p>
+                      <a:r>
+                        <a:rPr lang="en-US" sz="2400" dirty="0" err="1" smtClean="0"/>
+                        <a:t>Intent.ACTION_PICK</a:t>
+                      </a:r>
+                      <a:endParaRPr lang="en-US" sz="2400" dirty="0"/>
+                    </a:p>
+                  </a:txBody>
+                  <a:tcPr marT="45728" marB="45728" anchor="ctr">
+                    <a:lnR w="57150" cap="flat" cmpd="sng" algn="ctr">
+                      <a:solidFill>
+                        <a:srgbClr val="FFFFFF"/>
+                      </a:solidFill>
+                      <a:prstDash val="solid"/>
+                      <a:round/>
+                      <a:headEnd type="none" w="med" len="med"/>
+                      <a:tailEnd type="none" w="med" len="med"/>
+                    </a:lnR>
+                    <a:lnT w="38100" cap="flat" cmpd="sng" algn="ctr">
+                      <a:solidFill>
+                        <a:srgbClr val="FFFFFF"/>
+                      </a:solidFill>
+                      <a:prstDash val="solid"/>
+                      <a:round/>
+                      <a:headEnd type="none" w="med" len="med"/>
+                      <a:tailEnd type="none" w="med" len="med"/>
+                    </a:lnT>
+                  </a:tcPr>
+                </a:tc>
+              </a:tr>
+              <a:tr h="1047750">
+                <a:tc>
+                  <a:txBody>
+                    <a:bodyPr/>
+                    <a:lstStyle/>
+                    <a:p>
+                      <a:r>
+                        <a:rPr lang="en-US" sz="2400" dirty="0" smtClean="0"/>
+                        <a:t>data</a:t>
+                      </a:r>
+                      <a:endParaRPr lang="en-US" sz="2400" dirty="0"/>
+                    </a:p>
+                  </a:txBody>
+                  <a:tcPr marT="45728" marB="45728" anchor="ctr">
+                    <a:lnL w="57150" cap="flat" cmpd="sng" algn="ctr">
+                      <a:solidFill>
+                        <a:srgbClr val="FFFFFF"/>
+                      </a:solidFill>
+                      <a:prstDash val="solid"/>
+                      <a:round/>
+                      <a:headEnd type="none" w="med" len="med"/>
+                      <a:tailEnd type="none" w="med" len="med"/>
+                    </a:lnL>
+                    <a:lnB w="57150" cap="flat" cmpd="sng" algn="ctr">
+                      <a:solidFill>
+                        <a:srgbClr val="FFFFFF"/>
+                      </a:solidFill>
+                      <a:prstDash val="solid"/>
+                      <a:round/>
+                      <a:headEnd type="none" w="med" len="med"/>
+                      <a:tailEnd type="none" w="med" len="med"/>
+                    </a:lnB>
+                  </a:tcPr>
+                </a:tc>
+                <a:tc>
+                  <a:txBody>
+                    <a:bodyPr/>
+                    <a:lstStyle/>
+                    <a:p>
+                      <a:r>
+                        <a:rPr lang="en-US" sz="2400" dirty="0" err="1" smtClean="0"/>
+                        <a:t>ContactsContract.Contacts.CONTENT_URI</a:t>
+                      </a:r>
+                      <a:endParaRPr lang="en-US" sz="2400" dirty="0"/>
+                    </a:p>
+                  </a:txBody>
+                  <a:tcPr marT="45728" marB="45728" anchor="ctr">
+                    <a:lnR w="57150" cap="flat" cmpd="sng" algn="ctr">
+                      <a:solidFill>
+                        <a:srgbClr val="FFFFFF"/>
+                      </a:solidFill>
+                      <a:prstDash val="solid"/>
+                      <a:round/>
+                      <a:headEnd type="none" w="med" len="med"/>
+                      <a:tailEnd type="none" w="med" len="med"/>
+                    </a:lnR>
+                    <a:lnB w="57150" cap="flat" cmpd="sng" algn="ctr">
+                      <a:solidFill>
+                        <a:srgbClr val="FFFFFF"/>
+                      </a:solidFill>
+                      <a:prstDash val="solid"/>
+                      <a:round/>
+                      <a:headEnd type="none" w="med" len="med"/>
+                      <a:tailEnd type="none" w="med" len="med"/>
+                    </a:lnB>
+                  </a:tcPr>
+                </a:tc>
+              </a:tr>
+              <a:tr h="1047750">
+                <a:tc>
+                  <a:txBody>
+                    <a:bodyPr/>
+                    <a:lstStyle/>
+                    <a:p>
+                      <a:r>
+                        <a:rPr lang="en-US" sz="2400" dirty="0" smtClean="0"/>
+                        <a:t>Result</a:t>
+                      </a:r>
+                      <a:endParaRPr lang="en-US" sz="2400" dirty="0"/>
+                    </a:p>
+                  </a:txBody>
+                  <a:tcPr marT="45728" marB="45728" anchor="ctr">
+                    <a:lnL w="57150" cap="flat" cmpd="sng" algn="ctr">
+                      <a:solidFill>
+                        <a:srgbClr val="FFFFFF"/>
+                      </a:solidFill>
+                      <a:prstDash val="solid"/>
+                      <a:round/>
+                      <a:headEnd type="none" w="med" len="med"/>
+                      <a:tailEnd type="none" w="med" len="med"/>
+                    </a:lnL>
+                    <a:lnT w="57150" cap="flat" cmpd="sng" algn="ctr">
+                      <a:solidFill>
+                        <a:srgbClr val="FFFFFF"/>
+                      </a:solidFill>
+                      <a:prstDash val="solid"/>
+                      <a:round/>
+                      <a:headEnd type="none" w="med" len="med"/>
+                      <a:tailEnd type="none" w="med" len="med"/>
+                    </a:lnT>
+                    <a:lnB w="57150" cap="flat" cmpd="sng" algn="ctr">
+                      <a:solidFill>
+                        <a:srgbClr val="FFFFFF"/>
+                      </a:solidFill>
+                      <a:prstDash val="solid"/>
+                      <a:round/>
+                      <a:headEnd type="none" w="med" len="med"/>
+                      <a:tailEnd type="none" w="med" len="med"/>
+                    </a:lnB>
+                  </a:tcPr>
+                </a:tc>
+                <a:tc>
+                  <a:txBody>
+                    <a:bodyPr/>
+                    <a:lstStyle/>
+                    <a:p>
+                      <a:r>
+                        <a:rPr lang="en-US" sz="2400" dirty="0" smtClean="0"/>
+                        <a:t>URI of chosen</a:t>
+                      </a:r>
+                      <a:r>
+                        <a:rPr lang="en-US" sz="2400" baseline="0" dirty="0" smtClean="0"/>
+                        <a:t> contact.</a:t>
+                      </a:r>
+                      <a:endParaRPr lang="en-US" sz="2400" dirty="0"/>
+                    </a:p>
+                  </a:txBody>
+                  <a:tcPr marT="45728" marB="45728" anchor="ctr">
+                    <a:lnR w="57150" cap="flat" cmpd="sng" algn="ctr">
+                      <a:solidFill>
+                        <a:srgbClr val="FFFFFF"/>
+                      </a:solidFill>
+                      <a:prstDash val="solid"/>
+                      <a:round/>
+                      <a:headEnd type="none" w="med" len="med"/>
+                      <a:tailEnd type="none" w="med" len="med"/>
+                    </a:lnR>
+                    <a:lnT w="57150" cap="flat" cmpd="sng" algn="ctr">
+                      <a:solidFill>
+                        <a:srgbClr val="FFFFFF"/>
+                      </a:solidFill>
+                      <a:prstDash val="solid"/>
+                      <a:round/>
+                      <a:headEnd type="none" w="med" len="med"/>
+                      <a:tailEnd type="none" w="med" len="med"/>
+                    </a:lnT>
+                    <a:lnB w="57150" cap="flat" cmpd="sng" algn="ctr">
+                      <a:solidFill>
+                        <a:srgbClr val="FFFFFF"/>
+                      </a:solidFill>
+                      <a:prstDash val="solid"/>
+                      <a:round/>
+                      <a:headEnd type="none" w="med" len="med"/>
+                      <a:tailEnd type="none" w="med" len="med"/>
+                    </a:lnB>
+                  </a:tcPr>
+                </a:tc>
+              </a:tr>
+            </a:tbl>
+          </a:graphicData>
+        </a:graphic>
+      </p:graphicFrame>
     </p:spTree>
   </p:cSld>
   <p:clrMapOvr>
@@ -3960,6 +4151,212 @@
       </p:grpSpPr>
       <p:sp>
         <p:nvSpPr>
+          <p:cNvPr id="12289" name="Title 1"/>
+          <p:cNvSpPr>
+            <a:spLocks noGrp="1"/>
+          </p:cNvSpPr>
+          <p:nvPr>
+            <p:ph type="title"/>
+          </p:nvPr>
+        </p:nvSpPr>
+        <p:spPr/>
+        <p:txBody>
+          <a:bodyPr/>
+          <a:lstStyle/>
+          <a:p>
+            <a:r>
+              <a:rPr lang="en-US">
+                <a:latin typeface="Arial" charset="0"/>
+              </a:rPr>
+              <a:t>Getting results: step 1</a:t>
+            </a:r>
+          </a:p>
+        </p:txBody>
+      </p:sp>
+      <p:sp>
+        <p:nvSpPr>
+          <p:cNvPr id="12290" name="Content Placeholder 2"/>
+          <p:cNvSpPr>
+            <a:spLocks noGrp="1"/>
+          </p:cNvSpPr>
+          <p:nvPr>
+            <p:ph idx="1"/>
+          </p:nvPr>
+        </p:nvSpPr>
+        <p:spPr/>
+        <p:txBody>
+          <a:bodyPr/>
+          <a:lstStyle/>
+          <a:p>
+            <a:pPr marL="0" indent="0">
+              <a:buFontTx/>
+              <a:buNone/>
+            </a:pPr>
+            <a:r>
+              <a:rPr lang="en-US" dirty="0">
+                <a:latin typeface="Courier" charset="0"/>
+                <a:cs typeface="Courier" charset="0"/>
+              </a:rPr>
+              <a:t>final Intent </a:t>
+            </a:r>
+            <a:r>
+              <a:rPr lang="en-US" dirty="0" err="1">
+                <a:latin typeface="Courier" charset="0"/>
+                <a:cs typeface="Courier" charset="0"/>
+              </a:rPr>
+              <a:t>pickContactsIntent</a:t>
+            </a:r>
+            <a:r>
+              <a:rPr lang="en-US" dirty="0">
+                <a:latin typeface="Courier" charset="0"/>
+                <a:cs typeface="Courier" charset="0"/>
+              </a:rPr>
+              <a:t> = </a:t>
+            </a:r>
+          </a:p>
+          <a:p>
+            <a:pPr marL="0" indent="0">
+              <a:buFontTx/>
+              <a:buNone/>
+            </a:pPr>
+            <a:r>
+              <a:rPr lang="en-US" dirty="0">
+                <a:latin typeface="Courier" charset="0"/>
+                <a:cs typeface="Courier" charset="0"/>
+              </a:rPr>
+              <a:t> new Intent(</a:t>
+            </a:r>
+            <a:r>
+              <a:rPr lang="en-US" dirty="0" err="1">
+                <a:latin typeface="Courier" charset="0"/>
+                <a:cs typeface="Courier" charset="0"/>
+              </a:rPr>
+              <a:t>Intent.ACTION_PICK</a:t>
+            </a:r>
+            <a:r>
+              <a:rPr lang="en-US" dirty="0">
+                <a:latin typeface="Courier" charset="0"/>
+                <a:cs typeface="Courier" charset="0"/>
+              </a:rPr>
+              <a:t>, </a:t>
+            </a:r>
+          </a:p>
+          <a:p>
+            <a:pPr marL="0" indent="0">
+              <a:buFontTx/>
+              <a:buNone/>
+            </a:pPr>
+            <a:r>
+              <a:rPr lang="en-US" dirty="0">
+                <a:latin typeface="Courier" charset="0"/>
+                <a:cs typeface="Courier" charset="0"/>
+              </a:rPr>
+              <a:t>  </a:t>
+            </a:r>
+            <a:r>
+              <a:rPr lang="en-US" dirty="0" err="1">
+                <a:latin typeface="Courier" charset="0"/>
+                <a:cs typeface="Courier" charset="0"/>
+              </a:rPr>
+              <a:t>ContactsContract.Contacts.CONTENT_URI</a:t>
+            </a:r>
+            <a:r>
+              <a:rPr lang="en-US" dirty="0">
+                <a:latin typeface="Courier" charset="0"/>
+                <a:cs typeface="Courier" charset="0"/>
+              </a:rPr>
+              <a:t>);</a:t>
+            </a:r>
+          </a:p>
+          <a:p>
+            <a:pPr marL="0" indent="0">
+              <a:buFontTx/>
+              <a:buNone/>
+            </a:pPr>
+            <a:r>
+              <a:rPr lang="en-US" dirty="0">
+                <a:latin typeface="Courier" charset="0"/>
+                <a:cs typeface="Courier" charset="0"/>
+              </a:rPr>
+              <a:t>                </a:t>
+            </a:r>
+            <a:r>
+              <a:rPr lang="en-US" dirty="0" err="1">
+                <a:solidFill>
+                  <a:srgbClr val="FFFF00"/>
+                </a:solidFill>
+                <a:latin typeface="Courier" charset="0"/>
+                <a:cs typeface="Courier" charset="0"/>
+              </a:rPr>
+              <a:t>startActivityForResult</a:t>
+            </a:r>
+            <a:r>
+              <a:rPr lang="en-US" dirty="0">
+                <a:latin typeface="Courier" charset="0"/>
+                <a:cs typeface="Courier" charset="0"/>
+              </a:rPr>
+              <a:t>(</a:t>
+            </a:r>
+            <a:r>
+              <a:rPr lang="en-US" dirty="0" err="1">
+                <a:latin typeface="Courier" charset="0"/>
+                <a:cs typeface="Courier" charset="0"/>
+              </a:rPr>
+              <a:t>pickContactsIntent</a:t>
+            </a:r>
+            <a:r>
+              <a:rPr lang="en-US" dirty="0">
+                <a:latin typeface="Courier" charset="0"/>
+                <a:cs typeface="Courier" charset="0"/>
+              </a:rPr>
+              <a:t>, </a:t>
+            </a:r>
+          </a:p>
+          <a:p>
+            <a:pPr marL="0" indent="0">
+              <a:buFontTx/>
+              <a:buNone/>
+            </a:pPr>
+            <a:r>
+              <a:rPr lang="en-US" dirty="0">
+                <a:latin typeface="Courier" charset="0"/>
+                <a:cs typeface="Courier" charset="0"/>
+              </a:rPr>
+              <a:t> PICK_CONTACT_REQUEST_CODE);</a:t>
+            </a:r>
+          </a:p>
+        </p:txBody>
+      </p:sp>
+    </p:spTree>
+  </p:cSld>
+  <p:clrMapOvr>
+    <a:masterClrMapping/>
+  </p:clrMapOvr>
+  <p:transition xmlns:p14="http://schemas.microsoft.com/office/powerpoint/2010/main">
+    <p:wipe/>
+  </p:transition>
+</p:sld>
+</file>
+
+<file path=ppt/slides/slide12.xml><?xml version="1.0" encoding="utf-8"?>
+<p:sld xmlns:a="http://schemas.openxmlformats.org/drawingml/2006/main" xmlns:r="http://schemas.openxmlformats.org/officeDocument/2006/relationships" xmlns:p="http://schemas.openxmlformats.org/presentationml/2006/main">
+  <p:cSld>
+    <p:spTree>
+      <p:nvGrpSpPr>
+        <p:cNvPr id="1" name=""/>
+        <p:cNvGrpSpPr/>
+        <p:nvPr/>
+      </p:nvGrpSpPr>
+      <p:grpSpPr>
+        <a:xfrm>
+          <a:off x="0" y="0"/>
+          <a:ext cx="0" cy="0"/>
+          <a:chOff x="0" y="0"/>
+          <a:chExt cx="0" cy="0"/>
+        </a:xfrm>
+      </p:grpSpPr>
+      <p:sp>
+        <p:nvSpPr>
           <p:cNvPr id="13313" name="Title 1"/>
           <p:cNvSpPr>
             <a:spLocks noGrp="1"/>
@@ -4268,7 +4665,7 @@
 </p:sld>
 </file>
 
-<file path=ppt/slides/slide12.xml><?xml version="1.0" encoding="utf-8"?>
+<file path=ppt/slides/slide13.xml><?xml version="1.0" encoding="utf-8"?>
 <p:sld xmlns:a="http://schemas.openxmlformats.org/drawingml/2006/main" xmlns:r="http://schemas.openxmlformats.org/officeDocument/2006/relationships" xmlns:p="http://schemas.openxmlformats.org/presentationml/2006/main">
   <p:cSld>
     <p:spTree>
@@ -4649,7 +5046,7 @@
 </p:sld>
 </file>
 
-<file path=ppt/slides/slide13.xml><?xml version="1.0" encoding="utf-8"?>
+<file path=ppt/slides/slide14.xml><?xml version="1.0" encoding="utf-8"?>
 <p:sld xmlns:a="http://schemas.openxmlformats.org/drawingml/2006/main" xmlns:r="http://schemas.openxmlformats.org/officeDocument/2006/relationships" xmlns:p="http://schemas.openxmlformats.org/presentationml/2006/main">
   <p:cSld>
     <p:spTree>
@@ -4973,7 +5370,7 @@
 </p:sld>
 </file>
 
-<file path=ppt/slides/slide14.xml><?xml version="1.0" encoding="utf-8"?>
+<file path=ppt/slides/slide15.xml><?xml version="1.0" encoding="utf-8"?>
 <p:sld xmlns:a="http://schemas.openxmlformats.org/drawingml/2006/main" xmlns:r="http://schemas.openxmlformats.org/officeDocument/2006/relationships" xmlns:p="http://schemas.openxmlformats.org/presentationml/2006/main">
   <p:cSld>
     <p:spTree>
@@ -5212,7 +5609,7 @@
 </p:sld>
 </file>
 
-<file path=ppt/slides/slide15.xml><?xml version="1.0" encoding="utf-8"?>
+<file path=ppt/slides/slide16.xml><?xml version="1.0" encoding="utf-8"?>
 <p:sld xmlns:a="http://schemas.openxmlformats.org/drawingml/2006/main" xmlns:r="http://schemas.openxmlformats.org/officeDocument/2006/relationships" xmlns:p="http://schemas.openxmlformats.org/presentationml/2006/main">
   <p:cSld>
     <p:spTree>
@@ -5289,92 +5686,6 @@
                 <a:latin typeface="Arial" charset="0"/>
               </a:rPr>
               <a:t>Get Content</a:t>
-            </a:r>
-            <a:endParaRPr lang="en-US" dirty="0">
-              <a:latin typeface="Arial" charset="0"/>
-            </a:endParaRPr>
-          </a:p>
-        </p:txBody>
-      </p:sp>
-    </p:spTree>
-  </p:cSld>
-  <p:clrMapOvr>
-    <a:masterClrMapping/>
-  </p:clrMapOvr>
-  <p:transition xmlns:p14="http://schemas.microsoft.com/office/powerpoint/2010/main">
-    <p:wipe/>
-  </p:transition>
-  <p:timing>
-    <p:tnLst>
-      <p:par>
-        <p:cTn xmlns:p14="http://schemas.microsoft.com/office/powerpoint/2010/main" id="1" dur="indefinite" restart="never" nodeType="tmRoot"/>
-      </p:par>
-    </p:tnLst>
-  </p:timing>
-</p:sld>
-</file>
-
-<file path=ppt/slides/slide16.xml><?xml version="1.0" encoding="utf-8"?>
-<p:sld xmlns:a="http://schemas.openxmlformats.org/drawingml/2006/main" xmlns:r="http://schemas.openxmlformats.org/officeDocument/2006/relationships" xmlns:p="http://schemas.openxmlformats.org/presentationml/2006/main">
-  <p:cSld>
-    <p:spTree>
-      <p:nvGrpSpPr>
-        <p:cNvPr id="1" name=""/>
-        <p:cNvGrpSpPr/>
-        <p:nvPr/>
-      </p:nvGrpSpPr>
-      <p:grpSpPr>
-        <a:xfrm>
-          <a:off x="0" y="0"/>
-          <a:ext cx="0" cy="0"/>
-          <a:chOff x="0" y="0"/>
-          <a:chExt cx="0" cy="0"/>
-        </a:xfrm>
-      </p:grpSpPr>
-      <p:sp>
-        <p:nvSpPr>
-          <p:cNvPr id="18433" name="Title 1"/>
-          <p:cNvSpPr>
-            <a:spLocks noGrp="1"/>
-          </p:cNvSpPr>
-          <p:nvPr>
-            <p:ph type="title"/>
-          </p:nvPr>
-        </p:nvSpPr>
-        <p:spPr/>
-        <p:txBody>
-          <a:bodyPr/>
-          <a:lstStyle/>
-          <a:p>
-            <a:r>
-              <a:rPr lang="en-US">
-                <a:latin typeface="Arial" charset="0"/>
-              </a:rPr>
-              <a:t>How do I find out what's available?</a:t>
-            </a:r>
-          </a:p>
-        </p:txBody>
-      </p:sp>
-      <p:sp>
-        <p:nvSpPr>
-          <p:cNvPr id="18434" name="Content Placeholder 2"/>
-          <p:cNvSpPr>
-            <a:spLocks noGrp="1"/>
-          </p:cNvSpPr>
-          <p:nvPr>
-            <p:ph idx="1"/>
-          </p:nvPr>
-        </p:nvSpPr>
-        <p:spPr/>
-        <p:txBody>
-          <a:bodyPr/>
-          <a:lstStyle/>
-          <a:p>
-            <a:r>
-              <a:rPr lang="en-US" dirty="0" err="1" smtClean="0">
-                <a:latin typeface="Arial" charset="0"/>
-              </a:rPr>
-              <a:t>queryIntentActivityOptions</a:t>
             </a:r>
             <a:endParaRPr lang="en-US" dirty="0">
               <a:latin typeface="Arial" charset="0"/>
@@ -5419,7 +5730,7 @@
       </p:grpSpPr>
       <p:sp>
         <p:nvSpPr>
-          <p:cNvPr id="19457" name="Title 1"/>
+          <p:cNvPr id="18433" name="Title 1"/>
           <p:cNvSpPr>
             <a:spLocks noGrp="1"/>
           </p:cNvSpPr>
@@ -5436,14 +5747,14 @@
               <a:rPr lang="en-US">
                 <a:latin typeface="Arial" charset="0"/>
               </a:rPr>
-              <a:t>Go to the source</a:t>
+              <a:t>How do I find out what's available?</a:t>
             </a:r>
           </a:p>
         </p:txBody>
       </p:sp>
       <p:sp>
         <p:nvSpPr>
-          <p:cNvPr id="19458" name="Content Placeholder 2"/>
+          <p:cNvPr id="18434" name="Content Placeholder 2"/>
           <p:cNvSpPr>
             <a:spLocks noGrp="1"/>
           </p:cNvSpPr>
@@ -5457,90 +5768,10 @@
           <a:lstStyle/>
           <a:p>
             <a:r>
-              <a:rPr lang="en-US" dirty="0" smtClean="0">
-                <a:latin typeface="Arial" charset="0"/>
-              </a:rPr>
-              <a:t>Chrome </a:t>
-            </a:r>
-            <a:r>
-              <a:rPr lang="en-US" dirty="0" smtClean="0">
-                <a:latin typeface="Arial" charset="0"/>
-              </a:rPr>
-              <a:t>extension</a:t>
-            </a:r>
-          </a:p>
-          <a:p>
-            <a:pPr lvl="1"/>
-            <a:r>
-              <a:rPr lang="en-US" dirty="0" smtClean="0">
-                <a:latin typeface="Arial" charset="0"/>
-              </a:rPr>
-              <a:t>Android SDK Reference Search</a:t>
-            </a:r>
-          </a:p>
-          <a:p>
-            <a:pPr lvl="1"/>
-            <a:r>
-              <a:rPr lang="en-US" dirty="0" smtClean="0">
-                <a:latin typeface="Arial" charset="0"/>
-              </a:rPr>
-              <a:t>Adds “view source” link to API </a:t>
-            </a:r>
-            <a:r>
-              <a:rPr lang="en-US" dirty="0" smtClean="0">
-                <a:latin typeface="Arial" charset="0"/>
-              </a:rPr>
-              <a:t>docs</a:t>
-            </a:r>
-            <a:endParaRPr lang="en-US" dirty="0" smtClean="0">
-              <a:latin typeface="Arial" charset="0"/>
-            </a:endParaRPr>
-          </a:p>
-          <a:p>
-            <a:r>
-              <a:rPr lang="en-US" dirty="0" smtClean="0">
-                <a:latin typeface="Arial" charset="0"/>
-              </a:rPr>
-              <a:t>Download the source yourself</a:t>
-            </a:r>
-          </a:p>
-          <a:p>
-            <a:pPr lvl="1"/>
-            <a:r>
               <a:rPr lang="en-US" dirty="0" err="1" smtClean="0">
                 <a:latin typeface="Arial" charset="0"/>
               </a:rPr>
-              <a:t>source.android.com</a:t>
-            </a:r>
-            <a:r>
-              <a:rPr lang="en-US" dirty="0">
-                <a:latin typeface="Arial" charset="0"/>
-              </a:rPr>
-              <a:t>/source/</a:t>
-            </a:r>
-            <a:r>
-              <a:rPr lang="en-US" dirty="0" err="1" smtClean="0">
-                <a:latin typeface="Arial" charset="0"/>
-              </a:rPr>
-              <a:t>downloading.html</a:t>
-            </a:r>
-            <a:endParaRPr lang="en-US" dirty="0" smtClean="0">
-              <a:latin typeface="Arial" charset="0"/>
-            </a:endParaRPr>
-          </a:p>
-          <a:p>
-            <a:pPr lvl="1"/>
-            <a:r>
-              <a:rPr lang="en-US" dirty="0">
-                <a:latin typeface="Arial" charset="0"/>
-              </a:rPr>
-              <a:t>“The initial sync operation will take an hour or more to complete</a:t>
-            </a:r>
-            <a:r>
-              <a:rPr lang="en-US" dirty="0" smtClean="0">
-                <a:latin typeface="Arial" charset="0"/>
-              </a:rPr>
-              <a:t>.”</a:t>
+              <a:t>queryIntentActivityOptions</a:t>
             </a:r>
             <a:endParaRPr lang="en-US" dirty="0">
               <a:latin typeface="Arial" charset="0"/>
@@ -5585,7 +5816,7 @@
       </p:grpSpPr>
       <p:sp>
         <p:nvSpPr>
-          <p:cNvPr id="21505" name="Title 1"/>
+          <p:cNvPr id="19457" name="Title 1"/>
           <p:cNvSpPr>
             <a:spLocks noGrp="1"/>
           </p:cNvSpPr>
@@ -5602,14 +5833,14 @@
               <a:rPr lang="en-US">
                 <a:latin typeface="Arial" charset="0"/>
               </a:rPr>
-              <a:t>Community Resources</a:t>
+              <a:t>Go to the source</a:t>
             </a:r>
           </a:p>
         </p:txBody>
       </p:sp>
       <p:sp>
         <p:nvSpPr>
-          <p:cNvPr id="21506" name="Content Placeholder 2"/>
+          <p:cNvPr id="19458" name="Content Placeholder 2"/>
           <p:cNvSpPr>
             <a:spLocks noGrp="1"/>
           </p:cNvSpPr>
@@ -5623,32 +5854,75 @@
           <a:lstStyle/>
           <a:p>
             <a:r>
+              <a:rPr lang="en-US" dirty="0" smtClean="0">
+                <a:latin typeface="Arial" charset="0"/>
+              </a:rPr>
+              <a:t>Chrome extension</a:t>
+            </a:r>
+          </a:p>
+          <a:p>
+            <a:pPr lvl="1"/>
+            <a:r>
+              <a:rPr lang="en-US" dirty="0" smtClean="0">
+                <a:latin typeface="Arial" charset="0"/>
+              </a:rPr>
+              <a:t>Android SDK Reference Search</a:t>
+            </a:r>
+          </a:p>
+          <a:p>
+            <a:pPr lvl="1"/>
+            <a:r>
+              <a:rPr lang="en-US" dirty="0" smtClean="0">
+                <a:latin typeface="Arial" charset="0"/>
+              </a:rPr>
+              <a:t>Adds “view source” link to API docs</a:t>
+            </a:r>
+          </a:p>
+          <a:p>
+            <a:r>
+              <a:rPr lang="en-US" dirty="0" smtClean="0">
+                <a:latin typeface="Arial" charset="0"/>
+              </a:rPr>
+              <a:t>Download the source yourself</a:t>
+            </a:r>
+          </a:p>
+          <a:p>
+            <a:pPr lvl="1"/>
+            <a:r>
               <a:rPr lang="en-US" dirty="0" err="1" smtClean="0">
                 <a:latin typeface="Arial" charset="0"/>
               </a:rPr>
-              <a:t>Developer.android.com</a:t>
+              <a:t>source.android.com</a:t>
+            </a:r>
+            <a:r>
+              <a:rPr lang="en-US" dirty="0">
+                <a:latin typeface="Arial" charset="0"/>
+              </a:rPr>
+              <a:t>/source/</a:t>
+            </a:r>
+            <a:r>
+              <a:rPr lang="en-US" dirty="0" err="1" smtClean="0">
+                <a:latin typeface="Arial" charset="0"/>
+              </a:rPr>
+              <a:t>downloading.html</a:t>
             </a:r>
             <a:endParaRPr lang="en-US" dirty="0" smtClean="0">
               <a:latin typeface="Arial" charset="0"/>
             </a:endParaRPr>
           </a:p>
           <a:p>
-            <a:r>
-              <a:rPr lang="en-US" dirty="0" err="1" smtClean="0">
+            <a:pPr lvl="1"/>
+            <a:r>
+              <a:rPr lang="en-US" dirty="0">
                 <a:latin typeface="Arial" charset="0"/>
               </a:rPr>
-              <a:t>StackOverflow</a:t>
-            </a:r>
-            <a:endParaRPr lang="en-US" dirty="0" smtClean="0">
-              <a:latin typeface="Arial" charset="0"/>
-            </a:endParaRPr>
-          </a:p>
-          <a:p>
-            <a:r>
-              <a:rPr lang="en-US" smtClean="0">
+              <a:t>“The initial sync operation will take an hour or more to complete</a:t>
+            </a:r>
+            <a:r>
+              <a:rPr lang="en-US" dirty="0" smtClean="0">
                 <a:latin typeface="Arial" charset="0"/>
               </a:rPr>
-              <a:t>Openintents.org</a:t>
+              <a:t>.”</a:t>
             </a:r>
             <a:endParaRPr lang="en-US" dirty="0">
               <a:latin typeface="Arial" charset="0"/>
@@ -5693,109 +5967,9 @@
       </p:grpSpPr>
       <p:sp>
         <p:nvSpPr>
-          <p:cNvPr id="22529" name="Rectangle 2"/>
+          <p:cNvPr id="21505" name="Title 1"/>
           <p:cNvSpPr>
-            <a:spLocks noGrp="1" noChangeArrowheads="1"/>
-          </p:cNvSpPr>
-          <p:nvPr>
-            <p:ph type="body" idx="1"/>
-          </p:nvPr>
-        </p:nvSpPr>
-        <p:spPr/>
-        <p:txBody>
-          <a:bodyPr/>
-          <a:lstStyle/>
-          <a:p>
-            <a:pPr eaLnBrk="1" hangingPunct="1"/>
-            <a:r>
-              <a:rPr lang="en-CA" dirty="0" err="1" smtClean="0">
-                <a:latin typeface="Arial" charset="0"/>
-              </a:rPr>
-              <a:t>MediaPlayer</a:t>
-            </a:r>
-            <a:endParaRPr lang="en-CA" dirty="0" smtClean="0">
-              <a:latin typeface="Arial" charset="0"/>
-            </a:endParaRPr>
-          </a:p>
-          <a:p>
-            <a:pPr eaLnBrk="1" hangingPunct="1"/>
-            <a:r>
-              <a:rPr lang="en-CA" dirty="0" err="1" smtClean="0">
-                <a:latin typeface="Arial" charset="0"/>
-              </a:rPr>
-              <a:t>MediaRecorder</a:t>
-            </a:r>
-            <a:endParaRPr lang="en-CA" dirty="0">
-              <a:latin typeface="Arial" charset="0"/>
-            </a:endParaRPr>
-          </a:p>
-          <a:p>
-            <a:pPr eaLnBrk="1" hangingPunct="1"/>
-            <a:r>
-              <a:rPr lang="en-CA" dirty="0" err="1">
-                <a:latin typeface="Arial" charset="0"/>
-              </a:rPr>
-              <a:t>ContentProviders</a:t>
-            </a:r>
-            <a:endParaRPr lang="en-CA" dirty="0">
-              <a:latin typeface="Arial" charset="0"/>
-            </a:endParaRPr>
-          </a:p>
-          <a:p>
-            <a:pPr lvl="1" eaLnBrk="1" hangingPunct="1"/>
-            <a:r>
-              <a:rPr lang="en-CA" dirty="0" smtClean="0">
-                <a:latin typeface="Arial" charset="0"/>
-              </a:rPr>
-              <a:t>Photos and other media</a:t>
-            </a:r>
-            <a:endParaRPr lang="en-CA" dirty="0">
-              <a:latin typeface="Arial" charset="0"/>
-            </a:endParaRPr>
-          </a:p>
-          <a:p>
-            <a:pPr eaLnBrk="1" hangingPunct="1"/>
-            <a:r>
-              <a:rPr lang="en-CA" dirty="0" err="1">
-                <a:latin typeface="Arial" charset="0"/>
-              </a:rPr>
-              <a:t>SystemServices</a:t>
-            </a:r>
-            <a:endParaRPr lang="en-CA" dirty="0">
-              <a:latin typeface="Arial" charset="0"/>
-            </a:endParaRPr>
-          </a:p>
-          <a:p>
-            <a:pPr lvl="1" eaLnBrk="1" hangingPunct="1"/>
-            <a:r>
-              <a:rPr lang="en-CA" dirty="0" err="1">
-                <a:latin typeface="Arial" charset="0"/>
-              </a:rPr>
-              <a:t>LocationManager</a:t>
-            </a:r>
-            <a:endParaRPr lang="en-CA" dirty="0">
-              <a:latin typeface="Arial" charset="0"/>
-            </a:endParaRPr>
-          </a:p>
-          <a:p>
-            <a:pPr lvl="1" eaLnBrk="1" hangingPunct="1"/>
-            <a:r>
-              <a:rPr lang="en-CA" dirty="0" err="1">
-                <a:latin typeface="Arial" charset="0"/>
-              </a:rPr>
-              <a:t>SMSManager</a:t>
-            </a:r>
-            <a:endParaRPr lang="en-CA" dirty="0">
-              <a:latin typeface="Arial" charset="0"/>
-            </a:endParaRPr>
-          </a:p>
-        </p:txBody>
-      </p:sp>
-      <p:sp>
-        <p:nvSpPr>
-          <p:cNvPr id="22530" name="Rectangle 3"/>
-          <p:cNvSpPr>
-            <a:spLocks noGrp="1" noChangeArrowheads="1"/>
+            <a:spLocks noGrp="1"/>
           </p:cNvSpPr>
           <p:nvPr>
             <p:ph type="title"/>
@@ -5806,70 +5980,61 @@
           <a:bodyPr/>
           <a:lstStyle/>
           <a:p>
-            <a:pPr eaLnBrk="1" hangingPunct="1"/>
-            <a:r>
-              <a:rPr lang="en-CA">
+            <a:r>
+              <a:rPr lang="en-US">
                 <a:latin typeface="Arial" charset="0"/>
               </a:rPr>
-              <a:t>Resources not accessed through intents</a:t>
+              <a:t>Community Resources</a:t>
             </a:r>
           </a:p>
         </p:txBody>
       </p:sp>
       <p:sp>
         <p:nvSpPr>
-          <p:cNvPr id="22531" name="Rectangle 4"/>
+          <p:cNvPr id="21506" name="Content Placeholder 2"/>
           <p:cNvSpPr>
-            <a:spLocks noChangeArrowheads="1"/>
+            <a:spLocks noGrp="1"/>
           </p:cNvSpPr>
-          <p:nvPr/>
+          <p:nvPr>
+            <p:ph idx="1"/>
+          </p:nvPr>
         </p:nvSpPr>
-        <p:spPr bwMode="auto">
-          <a:xfrm>
-            <a:off x="1219200" y="228600"/>
-            <a:ext cx="7772400" cy="457200"/>
-          </a:xfrm>
-          <a:prstGeom prst="rect">
-            <a:avLst/>
-          </a:prstGeom>
-          <a:noFill/>
-          <a:ln>
-            <a:noFill/>
-          </a:ln>
-          <a:extLst>
-            <a:ext uri="{909E8E84-426E-40dd-AFC4-6F175D3DCCD1}">
-              <a14:hiddenFill xmlns:a14="http://schemas.microsoft.com/office/drawing/2010/main">
-                <a:solidFill>
-                  <a:srgbClr val="FFFFFF"/>
-                </a:solidFill>
-              </a14:hiddenFill>
-            </a:ext>
-            <a:ext uri="{91240B29-F687-4f45-9708-019B960494DF}">
-              <a14:hiddenLine xmlns:a14="http://schemas.microsoft.com/office/drawing/2010/main" w="9525">
-                <a:solidFill>
-                  <a:srgbClr val="000000"/>
-                </a:solidFill>
-                <a:miter lim="800000"/>
-                <a:headEnd/>
-                <a:tailEnd/>
-              </a14:hiddenLine>
-            </a:ext>
-          </a:extLst>
-        </p:spPr>
+        <p:spPr/>
         <p:txBody>
-          <a:bodyPr anchor="ctr"/>
+          <a:bodyPr/>
           <a:lstStyle/>
           <a:p>
-            <a:pPr algn="r"/>
-            <a:r>
-              <a:rPr lang="en-CA" sz="2000">
-                <a:solidFill>
-                  <a:srgbClr val="89A8B7"/>
-                </a:solidFill>
+            <a:r>
+              <a:rPr lang="en-US" dirty="0" err="1" smtClean="0">
                 <a:latin typeface="Arial" charset="0"/>
               </a:rPr>
-              <a:t>Presentation title</a:t>
-            </a:r>
+              <a:t>Developer.android.com</a:t>
+            </a:r>
+            <a:endParaRPr lang="en-US" dirty="0" smtClean="0">
+              <a:latin typeface="Arial" charset="0"/>
+            </a:endParaRPr>
+          </a:p>
+          <a:p>
+            <a:r>
+              <a:rPr lang="en-US" dirty="0" err="1" smtClean="0">
+                <a:latin typeface="Arial" charset="0"/>
+              </a:rPr>
+              <a:t>StackOverflow</a:t>
+            </a:r>
+            <a:endParaRPr lang="en-US" dirty="0" smtClean="0">
+              <a:latin typeface="Arial" charset="0"/>
+            </a:endParaRPr>
+          </a:p>
+          <a:p>
+            <a:r>
+              <a:rPr lang="en-US" smtClean="0">
+                <a:latin typeface="Arial" charset="0"/>
+              </a:rPr>
+              <a:t>Openintents.org</a:t>
+            </a:r>
+            <a:endParaRPr lang="en-US" dirty="0">
+              <a:latin typeface="Arial" charset="0"/>
+            </a:endParaRPr>
           </a:p>
         </p:txBody>
       </p:sp>
@@ -5992,9 +6157,109 @@
       </p:grpSpPr>
       <p:sp>
         <p:nvSpPr>
-          <p:cNvPr id="23553" name="Title 1"/>
+          <p:cNvPr id="22529" name="Rectangle 2"/>
           <p:cNvSpPr>
-            <a:spLocks noGrp="1"/>
+            <a:spLocks noGrp="1" noChangeArrowheads="1"/>
+          </p:cNvSpPr>
+          <p:nvPr>
+            <p:ph type="body" idx="1"/>
+          </p:nvPr>
+        </p:nvSpPr>
+        <p:spPr/>
+        <p:txBody>
+          <a:bodyPr/>
+          <a:lstStyle/>
+          <a:p>
+            <a:pPr eaLnBrk="1" hangingPunct="1"/>
+            <a:r>
+              <a:rPr lang="en-CA" dirty="0" err="1" smtClean="0">
+                <a:latin typeface="Arial" charset="0"/>
+              </a:rPr>
+              <a:t>MediaPlayer</a:t>
+            </a:r>
+            <a:endParaRPr lang="en-CA" dirty="0" smtClean="0">
+              <a:latin typeface="Arial" charset="0"/>
+            </a:endParaRPr>
+          </a:p>
+          <a:p>
+            <a:pPr eaLnBrk="1" hangingPunct="1"/>
+            <a:r>
+              <a:rPr lang="en-CA" dirty="0" err="1" smtClean="0">
+                <a:latin typeface="Arial" charset="0"/>
+              </a:rPr>
+              <a:t>MediaRecorder</a:t>
+            </a:r>
+            <a:endParaRPr lang="en-CA" dirty="0">
+              <a:latin typeface="Arial" charset="0"/>
+            </a:endParaRPr>
+          </a:p>
+          <a:p>
+            <a:pPr eaLnBrk="1" hangingPunct="1"/>
+            <a:r>
+              <a:rPr lang="en-CA" dirty="0" err="1">
+                <a:latin typeface="Arial" charset="0"/>
+              </a:rPr>
+              <a:t>ContentProviders</a:t>
+            </a:r>
+            <a:endParaRPr lang="en-CA" dirty="0">
+              <a:latin typeface="Arial" charset="0"/>
+            </a:endParaRPr>
+          </a:p>
+          <a:p>
+            <a:pPr lvl="1" eaLnBrk="1" hangingPunct="1"/>
+            <a:r>
+              <a:rPr lang="en-CA" dirty="0" smtClean="0">
+                <a:latin typeface="Arial" charset="0"/>
+              </a:rPr>
+              <a:t>Photos and other media</a:t>
+            </a:r>
+            <a:endParaRPr lang="en-CA" dirty="0">
+              <a:latin typeface="Arial" charset="0"/>
+            </a:endParaRPr>
+          </a:p>
+          <a:p>
+            <a:pPr eaLnBrk="1" hangingPunct="1"/>
+            <a:r>
+              <a:rPr lang="en-CA" dirty="0" err="1">
+                <a:latin typeface="Arial" charset="0"/>
+              </a:rPr>
+              <a:t>SystemServices</a:t>
+            </a:r>
+            <a:endParaRPr lang="en-CA" dirty="0">
+              <a:latin typeface="Arial" charset="0"/>
+            </a:endParaRPr>
+          </a:p>
+          <a:p>
+            <a:pPr lvl="1" eaLnBrk="1" hangingPunct="1"/>
+            <a:r>
+              <a:rPr lang="en-CA" dirty="0" err="1">
+                <a:latin typeface="Arial" charset="0"/>
+              </a:rPr>
+              <a:t>LocationManager</a:t>
+            </a:r>
+            <a:endParaRPr lang="en-CA" dirty="0">
+              <a:latin typeface="Arial" charset="0"/>
+            </a:endParaRPr>
+          </a:p>
+          <a:p>
+            <a:pPr lvl="1" eaLnBrk="1" hangingPunct="1"/>
+            <a:r>
+              <a:rPr lang="en-CA" dirty="0" err="1">
+                <a:latin typeface="Arial" charset="0"/>
+              </a:rPr>
+              <a:t>SMSManager</a:t>
+            </a:r>
+            <a:endParaRPr lang="en-CA" dirty="0">
+              <a:latin typeface="Arial" charset="0"/>
+            </a:endParaRPr>
+          </a:p>
+        </p:txBody>
+      </p:sp>
+      <p:sp>
+        <p:nvSpPr>
+          <p:cNvPr id="22530" name="Rectangle 3"/>
+          <p:cNvSpPr>
+            <a:spLocks noGrp="1" noChangeArrowheads="1"/>
           </p:cNvSpPr>
           <p:nvPr>
             <p:ph type="title"/>
@@ -6005,81 +6270,70 @@
           <a:bodyPr/>
           <a:lstStyle/>
           <a:p>
-            <a:r>
-              <a:rPr lang="en-US">
+            <a:pPr eaLnBrk="1" hangingPunct="1"/>
+            <a:r>
+              <a:rPr lang="en-CA">
                 <a:latin typeface="Arial" charset="0"/>
               </a:rPr>
-              <a:t>Your own intentions</a:t>
+              <a:t>Resources not accessed through intents</a:t>
             </a:r>
           </a:p>
         </p:txBody>
       </p:sp>
       <p:sp>
         <p:nvSpPr>
-          <p:cNvPr id="23554" name="Content Placeholder 2"/>
+          <p:cNvPr id="22531" name="Rectangle 4"/>
           <p:cNvSpPr>
-            <a:spLocks noGrp="1"/>
+            <a:spLocks noChangeArrowheads="1"/>
           </p:cNvSpPr>
-          <p:nvPr>
-            <p:ph idx="1"/>
-          </p:nvPr>
+          <p:nvPr/>
         </p:nvSpPr>
-        <p:spPr/>
+        <p:spPr bwMode="auto">
+          <a:xfrm>
+            <a:off x="1219200" y="228600"/>
+            <a:ext cx="7772400" cy="457200"/>
+          </a:xfrm>
+          <a:prstGeom prst="rect">
+            <a:avLst/>
+          </a:prstGeom>
+          <a:noFill/>
+          <a:ln>
+            <a:noFill/>
+          </a:ln>
+          <a:extLst>
+            <a:ext uri="{909E8E84-426E-40dd-AFC4-6F175D3DCCD1}">
+              <a14:hiddenFill xmlns:a14="http://schemas.microsoft.com/office/drawing/2010/main">
+                <a:solidFill>
+                  <a:srgbClr val="FFFFFF"/>
+                </a:solidFill>
+              </a14:hiddenFill>
+            </a:ext>
+            <a:ext uri="{91240B29-F687-4f45-9708-019B960494DF}">
+              <a14:hiddenLine xmlns:a14="http://schemas.microsoft.com/office/drawing/2010/main" w="9525">
+                <a:solidFill>
+                  <a:srgbClr val="000000"/>
+                </a:solidFill>
+                <a:miter lim="800000"/>
+                <a:headEnd/>
+                <a:tailEnd/>
+              </a14:hiddenLine>
+            </a:ext>
+          </a:extLst>
+        </p:spPr>
         <p:txBody>
-          <a:bodyPr/>
+          <a:bodyPr anchor="ctr"/>
           <a:lstStyle/>
           <a:p>
-            <a:r>
-              <a:rPr lang="en-US" dirty="0">
+            <a:pPr algn="r"/>
+            <a:r>
+              <a:rPr lang="en-CA" sz="2000">
+                <a:solidFill>
+                  <a:srgbClr val="89A8B7"/>
+                </a:solidFill>
                 <a:latin typeface="Arial" charset="0"/>
               </a:rPr>
-              <a:t>Create your own intents that fire</a:t>
-            </a:r>
-          </a:p>
-          <a:p>
-            <a:pPr lvl="1"/>
-            <a:r>
-              <a:rPr lang="en-US" dirty="0">
-                <a:latin typeface="Arial" charset="0"/>
-              </a:rPr>
-              <a:t>When the device approaches a specific geographic location</a:t>
-            </a:r>
-          </a:p>
-          <a:p>
-            <a:pPr lvl="1"/>
-            <a:r>
-              <a:rPr lang="en-US" dirty="0">
-                <a:latin typeface="Arial" charset="0"/>
-              </a:rPr>
-              <a:t>When the device turns on and off</a:t>
-            </a:r>
-          </a:p>
-          <a:p>
-            <a:pPr lvl="1"/>
-            <a:r>
-              <a:rPr lang="en-US" dirty="0">
-                <a:latin typeface="Arial" charset="0"/>
-              </a:rPr>
-              <a:t>When the battery gets </a:t>
-            </a:r>
-            <a:r>
-              <a:rPr lang="en-US" dirty="0" smtClean="0">
-                <a:latin typeface="Arial" charset="0"/>
-              </a:rPr>
-              <a:t>low</a:t>
-            </a:r>
-          </a:p>
-          <a:p>
-            <a:pPr lvl="1"/>
-            <a:r>
-              <a:rPr lang="en-US" dirty="0" smtClean="0">
-                <a:latin typeface="Arial" charset="0"/>
-              </a:rPr>
-              <a:t>To open a link to your own website</a:t>
-            </a:r>
-            <a:endParaRPr lang="en-US" dirty="0">
-              <a:latin typeface="Arial" charset="0"/>
-            </a:endParaRPr>
+              <a:t>Presentation title</a:t>
+            </a:r>
           </a:p>
         </p:txBody>
       </p:sp>
@@ -6120,7 +6374,7 @@
       </p:grpSpPr>
       <p:sp>
         <p:nvSpPr>
-          <p:cNvPr id="24577" name="Title 1"/>
+          <p:cNvPr id="23553" name="Title 1"/>
           <p:cNvSpPr>
             <a:spLocks noGrp="1"/>
           </p:cNvSpPr>
@@ -6134,20 +6388,17 @@
           <a:lstStyle/>
           <a:p>
             <a:r>
-              <a:rPr lang="en-US" dirty="0" smtClean="0">
+              <a:rPr lang="en-US">
                 <a:latin typeface="Arial" charset="0"/>
               </a:rPr>
-              <a:t>Where to go next</a:t>
-            </a:r>
-            <a:endParaRPr lang="en-US" dirty="0">
-              <a:latin typeface="Arial" charset="0"/>
-            </a:endParaRPr>
+              <a:t>Your own intentions</a:t>
+            </a:r>
           </a:p>
         </p:txBody>
       </p:sp>
       <p:sp>
         <p:nvSpPr>
-          <p:cNvPr id="24578" name="Content Placeholder 2"/>
+          <p:cNvPr id="23554" name="Content Placeholder 2"/>
           <p:cNvSpPr>
             <a:spLocks noGrp="1"/>
           </p:cNvSpPr>
@@ -6160,81 +6411,54 @@
           <a:bodyPr/>
           <a:lstStyle/>
           <a:p>
-            <a:pPr>
-              <a:spcBef>
-                <a:spcPts val="1200"/>
-              </a:spcBef>
-              <a:spcAft>
-                <a:spcPts val="1200"/>
-              </a:spcAft>
-            </a:pPr>
-            <a:r>
-              <a:rPr lang="en-US" sz="3200" dirty="0" smtClean="0">
+            <a:r>
+              <a:rPr lang="en-US" dirty="0">
                 <a:latin typeface="Arial" charset="0"/>
               </a:rPr>
-              <a:t>Transmit sample application:</a:t>
-            </a:r>
-          </a:p>
-          <a:p>
-            <a:pPr lvl="1">
-              <a:spcBef>
-                <a:spcPts val="1200"/>
-              </a:spcBef>
-              <a:spcAft>
-                <a:spcPts val="1200"/>
-              </a:spcAft>
-            </a:pPr>
-            <a:r>
-              <a:rPr lang="en-US" sz="2600" dirty="0" smtClean="0">
+              <a:t>Create your own intents that fire</a:t>
+            </a:r>
+          </a:p>
+          <a:p>
+            <a:pPr lvl="1"/>
+            <a:r>
+              <a:rPr lang="en-US" dirty="0">
                 <a:latin typeface="Arial" charset="0"/>
-                <a:hlinkClick r:id="rId2"/>
-              </a:rPr>
-              <a:t>https://github.com/jessitron/Transmit</a:t>
-            </a:r>
-            <a:endParaRPr lang="en-US" sz="2600" dirty="0" smtClean="0">
-              <a:latin typeface="Arial" charset="0"/>
-            </a:endParaRPr>
-          </a:p>
-          <a:p>
-            <a:pPr lvl="1">
-              <a:spcBef>
-                <a:spcPts val="1200"/>
-              </a:spcBef>
-              <a:spcAft>
-                <a:spcPts val="1200"/>
-              </a:spcAft>
-            </a:pPr>
-            <a:r>
-              <a:rPr lang="en-US" sz="2600" dirty="0" smtClean="0">
+              </a:rPr>
+              <a:t>When the device approaches a specific geographic location</a:t>
+            </a:r>
+          </a:p>
+          <a:p>
+            <a:pPr lvl="1"/>
+            <a:r>
+              <a:rPr lang="en-US" dirty="0">
                 <a:latin typeface="Arial" charset="0"/>
               </a:rPr>
-              <a:t>Download it, install it on your device</a:t>
-            </a:r>
-          </a:p>
-          <a:p>
-            <a:pPr lvl="1">
-              <a:spcBef>
-                <a:spcPts val="1200"/>
-              </a:spcBef>
-              <a:spcAft>
-                <a:spcPts val="1200"/>
-              </a:spcAft>
-            </a:pPr>
-            <a:r>
-              <a:rPr lang="en-US" sz="2600" dirty="0" smtClean="0">
+              <a:t>When the device turns on and off</a:t>
+            </a:r>
+          </a:p>
+          <a:p>
+            <a:pPr lvl="1"/>
+            <a:r>
+              <a:rPr lang="en-US" dirty="0">
                 <a:latin typeface="Arial" charset="0"/>
               </a:rPr>
-              <a:t>Take over the world</a:t>
-            </a:r>
-            <a:endParaRPr lang="en-US" sz="2600" dirty="0">
-              <a:latin typeface="Arial" charset="0"/>
-            </a:endParaRPr>
-          </a:p>
-          <a:p>
-            <a:pPr>
-              <a:buFontTx/>
-              <a:buNone/>
-            </a:pPr>
+              <a:t>When the battery gets </a:t>
+            </a:r>
+            <a:r>
+              <a:rPr lang="en-US" dirty="0" smtClean="0">
+                <a:latin typeface="Arial" charset="0"/>
+              </a:rPr>
+              <a:t>low</a:t>
+            </a:r>
+          </a:p>
+          <a:p>
+            <a:pPr lvl="1"/>
+            <a:r>
+              <a:rPr lang="en-US" dirty="0" smtClean="0">
+                <a:latin typeface="Arial" charset="0"/>
+              </a:rPr>
+              <a:t>To open a link to your own website</a:t>
+            </a:r>
             <a:endParaRPr lang="en-US" dirty="0">
               <a:latin typeface="Arial" charset="0"/>
             </a:endParaRPr>
@@ -6260,6 +6484,164 @@
 </file>
 
 <file path=ppt/slides/slide22.xml><?xml version="1.0" encoding="utf-8"?>
+<p:sld xmlns:a="http://schemas.openxmlformats.org/drawingml/2006/main" xmlns:r="http://schemas.openxmlformats.org/officeDocument/2006/relationships" xmlns:p="http://schemas.openxmlformats.org/presentationml/2006/main">
+  <p:cSld>
+    <p:spTree>
+      <p:nvGrpSpPr>
+        <p:cNvPr id="1" name=""/>
+        <p:cNvGrpSpPr/>
+        <p:nvPr/>
+      </p:nvGrpSpPr>
+      <p:grpSpPr>
+        <a:xfrm>
+          <a:off x="0" y="0"/>
+          <a:ext cx="0" cy="0"/>
+          <a:chOff x="0" y="0"/>
+          <a:chExt cx="0" cy="0"/>
+        </a:xfrm>
+      </p:grpSpPr>
+      <p:sp>
+        <p:nvSpPr>
+          <p:cNvPr id="24577" name="Title 1"/>
+          <p:cNvSpPr>
+            <a:spLocks noGrp="1"/>
+          </p:cNvSpPr>
+          <p:nvPr>
+            <p:ph type="title"/>
+          </p:nvPr>
+        </p:nvSpPr>
+        <p:spPr/>
+        <p:txBody>
+          <a:bodyPr/>
+          <a:lstStyle/>
+          <a:p>
+            <a:r>
+              <a:rPr lang="en-US" dirty="0" smtClean="0">
+                <a:latin typeface="Arial" charset="0"/>
+              </a:rPr>
+              <a:t>Where to go next</a:t>
+            </a:r>
+            <a:endParaRPr lang="en-US" dirty="0">
+              <a:latin typeface="Arial" charset="0"/>
+            </a:endParaRPr>
+          </a:p>
+        </p:txBody>
+      </p:sp>
+      <p:sp>
+        <p:nvSpPr>
+          <p:cNvPr id="24578" name="Content Placeholder 2"/>
+          <p:cNvSpPr>
+            <a:spLocks noGrp="1"/>
+          </p:cNvSpPr>
+          <p:nvPr>
+            <p:ph idx="1"/>
+          </p:nvPr>
+        </p:nvSpPr>
+        <p:spPr/>
+        <p:txBody>
+          <a:bodyPr/>
+          <a:lstStyle/>
+          <a:p>
+            <a:pPr>
+              <a:spcBef>
+                <a:spcPts val="1200"/>
+              </a:spcBef>
+              <a:spcAft>
+                <a:spcPts val="1200"/>
+              </a:spcAft>
+            </a:pPr>
+            <a:r>
+              <a:rPr lang="en-US" sz="3200" dirty="0" smtClean="0">
+                <a:latin typeface="Arial" charset="0"/>
+              </a:rPr>
+              <a:t>Transmit sample application:</a:t>
+            </a:r>
+          </a:p>
+          <a:p>
+            <a:pPr lvl="1">
+              <a:spcBef>
+                <a:spcPts val="1200"/>
+              </a:spcBef>
+              <a:spcAft>
+                <a:spcPts val="1200"/>
+              </a:spcAft>
+            </a:pPr>
+            <a:r>
+              <a:rPr lang="en-US" sz="2600" dirty="0" smtClean="0">
+                <a:latin typeface="Arial" charset="0"/>
+                <a:hlinkClick r:id="rId2"/>
+              </a:rPr>
+              <a:t>https://github.com/jessitron/Transmit</a:t>
+            </a:r>
+            <a:endParaRPr lang="en-US" sz="2600" dirty="0" smtClean="0">
+              <a:latin typeface="Arial" charset="0"/>
+            </a:endParaRPr>
+          </a:p>
+          <a:p>
+            <a:pPr lvl="1">
+              <a:spcBef>
+                <a:spcPts val="1200"/>
+              </a:spcBef>
+              <a:spcAft>
+                <a:spcPts val="1200"/>
+              </a:spcAft>
+            </a:pPr>
+            <a:r>
+              <a:rPr lang="en-US" sz="2600" dirty="0" smtClean="0">
+                <a:latin typeface="Arial" charset="0"/>
+              </a:rPr>
+              <a:t>Download it, install it on your device</a:t>
+            </a:r>
+          </a:p>
+          <a:p>
+            <a:pPr lvl="1">
+              <a:spcBef>
+                <a:spcPts val="1200"/>
+              </a:spcBef>
+              <a:spcAft>
+                <a:spcPts val="1200"/>
+              </a:spcAft>
+            </a:pPr>
+            <a:r>
+              <a:rPr lang="en-US" sz="2600" dirty="0" smtClean="0">
+                <a:latin typeface="Arial" charset="0"/>
+              </a:rPr>
+              <a:t>Take over the world</a:t>
+            </a:r>
+            <a:endParaRPr lang="en-US" sz="2600" dirty="0">
+              <a:latin typeface="Arial" charset="0"/>
+            </a:endParaRPr>
+          </a:p>
+          <a:p>
+            <a:pPr>
+              <a:buFontTx/>
+              <a:buNone/>
+            </a:pPr>
+            <a:endParaRPr lang="en-US" dirty="0">
+              <a:latin typeface="Arial" charset="0"/>
+            </a:endParaRPr>
+          </a:p>
+        </p:txBody>
+      </p:sp>
+    </p:spTree>
+  </p:cSld>
+  <p:clrMapOvr>
+    <a:masterClrMapping/>
+  </p:clrMapOvr>
+  <p:transition xmlns:p14="http://schemas.microsoft.com/office/powerpoint/2010/main">
+    <p:wipe/>
+  </p:transition>
+  <p:timing>
+    <p:tnLst>
+      <p:par>
+        <p:cTn xmlns:p14="http://schemas.microsoft.com/office/powerpoint/2010/main" id="1" dur="indefinite" restart="never" nodeType="tmRoot"/>
+      </p:par>
+    </p:tnLst>
+  </p:timing>
+</p:sld>
+</file>
+
+<file path=ppt/slides/slide23.xml><?xml version="1.0" encoding="utf-8"?>
 <p:sld xmlns:a="http://schemas.openxmlformats.org/drawingml/2006/main" xmlns:r="http://schemas.openxmlformats.org/officeDocument/2006/relationships" xmlns:p="http://schemas.openxmlformats.org/presentationml/2006/main" show="0">
   <p:cSld>
     <p:spTree>
@@ -8055,6 +8437,270 @@
       </p:grpSpPr>
       <p:sp>
         <p:nvSpPr>
+          <p:cNvPr id="2" name="Title 1"/>
+          <p:cNvSpPr>
+            <a:spLocks noGrp="1"/>
+          </p:cNvSpPr>
+          <p:nvPr>
+            <p:ph type="title"/>
+          </p:nvPr>
+        </p:nvSpPr>
+        <p:spPr/>
+        <p:txBody>
+          <a:bodyPr/>
+          <a:lstStyle/>
+          <a:p>
+            <a:r>
+              <a:rPr lang="en-US" dirty="0" smtClean="0"/>
+              <a:t>Tasks and activities</a:t>
+            </a:r>
+            <a:endParaRPr lang="en-US" dirty="0"/>
+          </a:p>
+        </p:txBody>
+      </p:sp>
+      <p:sp>
+        <p:nvSpPr>
+          <p:cNvPr id="4" name="Rounded Rectangle 3"/>
+          <p:cNvSpPr/>
+          <p:nvPr/>
+        </p:nvSpPr>
+        <p:spPr>
+          <a:xfrm>
+            <a:off x="1295400" y="2438400"/>
+            <a:ext cx="2895600" cy="2057400"/>
+          </a:xfrm>
+          <a:prstGeom prst="roundRect">
+            <a:avLst/>
+          </a:prstGeom>
+        </p:spPr>
+        <p:style>
+          <a:lnRef idx="1">
+            <a:schemeClr val="accent1"/>
+          </a:lnRef>
+          <a:fillRef idx="3">
+            <a:schemeClr val="accent1"/>
+          </a:fillRef>
+          <a:effectRef idx="2">
+            <a:schemeClr val="accent1"/>
+          </a:effectRef>
+          <a:fontRef idx="minor">
+            <a:schemeClr val="lt1"/>
+          </a:fontRef>
+        </p:style>
+        <p:txBody>
+          <a:bodyPr rtlCol="0" anchor="t"/>
+          <a:lstStyle/>
+          <a:p>
+            <a:r>
+              <a:rPr lang="en-US" dirty="0" err="1" smtClean="0"/>
+              <a:t>myapp</a:t>
+            </a:r>
+            <a:endParaRPr lang="en-US" dirty="0"/>
+          </a:p>
+        </p:txBody>
+      </p:sp>
+      <p:sp>
+        <p:nvSpPr>
+          <p:cNvPr id="5" name="Rectangle 4"/>
+          <p:cNvSpPr/>
+          <p:nvPr/>
+        </p:nvSpPr>
+        <p:spPr>
+          <a:xfrm>
+            <a:off x="1676400" y="3124200"/>
+            <a:ext cx="1066800" cy="762000"/>
+          </a:xfrm>
+          <a:prstGeom prst="rect">
+            <a:avLst/>
+          </a:prstGeom>
+        </p:spPr>
+        <p:style>
+          <a:lnRef idx="1">
+            <a:schemeClr val="accent1"/>
+          </a:lnRef>
+          <a:fillRef idx="3">
+            <a:schemeClr val="accent1"/>
+          </a:fillRef>
+          <a:effectRef idx="2">
+            <a:schemeClr val="accent1"/>
+          </a:effectRef>
+          <a:fontRef idx="minor">
+            <a:schemeClr val="lt1"/>
+          </a:fontRef>
+        </p:style>
+        <p:txBody>
+          <a:bodyPr rtlCol="0" anchor="ctr"/>
+          <a:lstStyle/>
+          <a:p>
+            <a:pPr algn="ctr"/>
+            <a:r>
+              <a:rPr lang="en-US" dirty="0" smtClean="0"/>
+              <a:t>MAIN</a:t>
+            </a:r>
+            <a:endParaRPr lang="en-US" dirty="0"/>
+          </a:p>
+        </p:txBody>
+      </p:sp>
+      <p:sp>
+        <p:nvSpPr>
+          <p:cNvPr id="6" name="Rectangle 5"/>
+          <p:cNvSpPr/>
+          <p:nvPr/>
+        </p:nvSpPr>
+        <p:spPr>
+          <a:xfrm>
+            <a:off x="3048000" y="3124200"/>
+            <a:ext cx="822960" cy="822960"/>
+          </a:xfrm>
+          <a:prstGeom prst="rect">
+            <a:avLst/>
+          </a:prstGeom>
+          <a:ln/>
+        </p:spPr>
+        <p:style>
+          <a:lnRef idx="1">
+            <a:schemeClr val="accent1"/>
+          </a:lnRef>
+          <a:fillRef idx="3">
+            <a:schemeClr val="accent1"/>
+          </a:fillRef>
+          <a:effectRef idx="2">
+            <a:schemeClr val="accent1"/>
+          </a:effectRef>
+          <a:fontRef idx="minor">
+            <a:schemeClr val="lt1"/>
+          </a:fontRef>
+        </p:style>
+        <p:txBody>
+          <a:bodyPr/>
+          <a:lstStyle/>
+          <a:p>
+            <a:endParaRPr lang="en-US"/>
+          </a:p>
+        </p:txBody>
+      </p:sp>
+      <p:sp>
+        <p:nvSpPr>
+          <p:cNvPr id="7" name="Rounded Rectangle 6"/>
+          <p:cNvSpPr/>
+          <p:nvPr/>
+        </p:nvSpPr>
+        <p:spPr>
+          <a:xfrm>
+            <a:off x="4735676" y="2438400"/>
+            <a:ext cx="1512724" cy="2057399"/>
+          </a:xfrm>
+          <a:prstGeom prst="roundRect">
+            <a:avLst/>
+          </a:prstGeom>
+          <a:ln/>
+        </p:spPr>
+        <p:style>
+          <a:lnRef idx="1">
+            <a:schemeClr val="accent1"/>
+          </a:lnRef>
+          <a:fillRef idx="3">
+            <a:schemeClr val="accent1"/>
+          </a:fillRef>
+          <a:effectRef idx="2">
+            <a:schemeClr val="accent1"/>
+          </a:effectRef>
+          <a:fontRef idx="minor">
+            <a:schemeClr val="lt1"/>
+          </a:fontRef>
+        </p:style>
+        <p:txBody>
+          <a:bodyPr/>
+          <a:lstStyle/>
+          <a:p>
+            <a:r>
+              <a:rPr lang="en-US" dirty="0" err="1" smtClean="0"/>
+              <a:t>gmail</a:t>
+            </a:r>
+            <a:endParaRPr lang="en-US" dirty="0"/>
+          </a:p>
+        </p:txBody>
+      </p:sp>
+      <p:sp>
+        <p:nvSpPr>
+          <p:cNvPr id="8" name="Rectangle 7"/>
+          <p:cNvSpPr/>
+          <p:nvPr/>
+        </p:nvSpPr>
+        <p:spPr>
+          <a:xfrm>
+            <a:off x="5105400" y="3124200"/>
+            <a:ext cx="822960" cy="822960"/>
+          </a:xfrm>
+          <a:prstGeom prst="rect">
+            <a:avLst/>
+          </a:prstGeom>
+          <a:ln/>
+        </p:spPr>
+        <p:style>
+          <a:lnRef idx="1">
+            <a:schemeClr val="accent1"/>
+          </a:lnRef>
+          <a:fillRef idx="3">
+            <a:schemeClr val="accent1"/>
+          </a:fillRef>
+          <a:effectRef idx="2">
+            <a:schemeClr val="accent1"/>
+          </a:effectRef>
+          <a:fontRef idx="minor">
+            <a:schemeClr val="lt1"/>
+          </a:fontRef>
+        </p:style>
+        <p:txBody>
+          <a:bodyPr/>
+          <a:lstStyle/>
+          <a:p>
+            <a:endParaRPr lang="en-US"/>
+          </a:p>
+        </p:txBody>
+      </p:sp>
+    </p:spTree>
+    <p:extLst>
+      <p:ext uri="{BB962C8B-B14F-4D97-AF65-F5344CB8AC3E}">
+        <p14:creationId xmlns:p14="http://schemas.microsoft.com/office/powerpoint/2010/main" val="3263488802"/>
+      </p:ext>
+    </p:extLst>
+  </p:cSld>
+  <p:clrMapOvr>
+    <a:masterClrMapping/>
+  </p:clrMapOvr>
+  <p:transition xmlns:p14="http://schemas.microsoft.com/office/powerpoint/2010/main">
+    <p:wipe/>
+  </p:transition>
+  <p:timing>
+    <p:tnLst>
+      <p:par>
+        <p:cTn xmlns:p14="http://schemas.microsoft.com/office/powerpoint/2010/main" id="1" dur="indefinite" restart="never" nodeType="tmRoot"/>
+      </p:par>
+    </p:tnLst>
+  </p:timing>
+</p:sld>
+</file>
+
+<file path=ppt/slides/slide6.xml><?xml version="1.0" encoding="utf-8"?>
+<p:sld xmlns:a="http://schemas.openxmlformats.org/drawingml/2006/main" xmlns:r="http://schemas.openxmlformats.org/officeDocument/2006/relationships" xmlns:p="http://schemas.openxmlformats.org/presentationml/2006/main">
+  <p:cSld>
+    <p:spTree>
+      <p:nvGrpSpPr>
+        <p:cNvPr id="1" name=""/>
+        <p:cNvGrpSpPr/>
+        <p:nvPr/>
+      </p:nvGrpSpPr>
+      <p:grpSpPr>
+        <a:xfrm>
+          <a:off x="0" y="0"/>
+          <a:ext cx="0" cy="0"/>
+          <a:chOff x="0" y="0"/>
+          <a:chExt cx="0" cy="0"/>
+        </a:xfrm>
+      </p:grpSpPr>
+      <p:sp>
+        <p:nvSpPr>
           <p:cNvPr id="6145" name="Title 1"/>
           <p:cNvSpPr>
             <a:spLocks noGrp="1"/>
@@ -8163,7 +8809,7 @@
 </p:sld>
 </file>
 
-<file path=ppt/slides/slide6.xml><?xml version="1.0" encoding="utf-8"?>
+<file path=ppt/slides/slide7.xml><?xml version="1.0" encoding="utf-8"?>
 <p:sld xmlns:a="http://schemas.openxmlformats.org/drawingml/2006/main" xmlns:r="http://schemas.openxmlformats.org/officeDocument/2006/relationships" xmlns:p="http://schemas.openxmlformats.org/presentationml/2006/main">
   <p:cSld>
     <p:spTree>
@@ -8350,7 +8996,7 @@
 </p:sld>
 </file>
 
-<file path=ppt/slides/slide7.xml><?xml version="1.0" encoding="utf-8"?>
+<file path=ppt/slides/slide8.xml><?xml version="1.0" encoding="utf-8"?>
 <p:sld xmlns:a="http://schemas.openxmlformats.org/drawingml/2006/main" xmlns:r="http://schemas.openxmlformats.org/officeDocument/2006/relationships" xmlns:p="http://schemas.openxmlformats.org/presentationml/2006/main">
   <p:cSld>
     <p:spTree>
@@ -8655,7 +9301,7 @@
 </p:sld>
 </file>
 
-<file path=ppt/slides/slide8.xml><?xml version="1.0" encoding="utf-8"?>
+<file path=ppt/slides/slide9.xml><?xml version="1.0" encoding="utf-8"?>
 <p:sld xmlns:a="http://schemas.openxmlformats.org/drawingml/2006/main" xmlns:r="http://schemas.openxmlformats.org/officeDocument/2006/relationships" xmlns:p="http://schemas.openxmlformats.org/presentationml/2006/main">
   <p:cSld>
     <p:spTree>
@@ -8717,402 +9363,6 @@
       </p:par>
     </p:tnLst>
   </p:timing>
-</p:sld>
-</file>
-
-<file path=ppt/slides/slide9.xml><?xml version="1.0" encoding="utf-8"?>
-<p:sld xmlns:a="http://schemas.openxmlformats.org/drawingml/2006/main" xmlns:r="http://schemas.openxmlformats.org/officeDocument/2006/relationships" xmlns:p="http://schemas.openxmlformats.org/presentationml/2006/main">
-  <p:cSld>
-    <p:spTree>
-      <p:nvGrpSpPr>
-        <p:cNvPr id="1" name=""/>
-        <p:cNvGrpSpPr/>
-        <p:nvPr/>
-      </p:nvGrpSpPr>
-      <p:grpSpPr>
-        <a:xfrm>
-          <a:off x="0" y="0"/>
-          <a:ext cx="0" cy="0"/>
-          <a:chOff x="0" y="0"/>
-          <a:chExt cx="0" cy="0"/>
-        </a:xfrm>
-      </p:grpSpPr>
-      <p:sp>
-        <p:nvSpPr>
-          <p:cNvPr id="11265" name="Title 1"/>
-          <p:cNvSpPr>
-            <a:spLocks noGrp="1"/>
-          </p:cNvSpPr>
-          <p:nvPr>
-            <p:ph type="title"/>
-          </p:nvPr>
-        </p:nvSpPr>
-        <p:spPr/>
-        <p:txBody>
-          <a:bodyPr/>
-          <a:lstStyle/>
-          <a:p>
-            <a:r>
-              <a:rPr lang="en-US">
-                <a:latin typeface="Arial" charset="0"/>
-              </a:rPr>
-              <a:t>Pick a Contact</a:t>
-            </a:r>
-          </a:p>
-        </p:txBody>
-      </p:sp>
-      <p:graphicFrame>
-        <p:nvGraphicFramePr>
-          <p:cNvPr id="4" name="Table 3"/>
-          <p:cNvGraphicFramePr>
-            <a:graphicFrameLocks noGrp="1"/>
-          </p:cNvGraphicFramePr>
-          <p:nvPr>
-            <p:extLst>
-              <p:ext uri="{D42A27DB-BD31-4B8C-83A1-F6EECF244321}">
-                <p14:modId xmlns:p14="http://schemas.microsoft.com/office/powerpoint/2010/main" val="924574131"/>
-              </p:ext>
-            </p:extLst>
-          </p:nvPr>
-        </p:nvGraphicFramePr>
-        <p:xfrm>
-          <a:off x="304800" y="1752600"/>
-          <a:ext cx="8458200" cy="4191000"/>
-        </p:xfrm>
-        <a:graphic>
-          <a:graphicData uri="http://schemas.openxmlformats.org/drawingml/2006/table">
-            <a:tbl>
-              <a:tblPr firstRow="1" bandRow="1">
-                <a:tableStyleId>{5940675A-B579-460E-94D1-54222C63F5DA}</a:tableStyleId>
-              </a:tblPr>
-              <a:tblGrid>
-                <a:gridCol w="1900719"/>
-                <a:gridCol w="6557481"/>
-              </a:tblGrid>
-              <a:tr h="1047750">
-                <a:tc>
-                  <a:txBody>
-                    <a:bodyPr/>
-                    <a:lstStyle/>
-                    <a:p>
-                      <a:r>
-                        <a:rPr lang="en-US" sz="2400" dirty="0" smtClean="0"/>
-                        <a:t>Permission</a:t>
-                      </a:r>
-                      <a:endParaRPr lang="en-US" sz="2400" dirty="0"/>
-                    </a:p>
-                  </a:txBody>
-                  <a:tcPr marT="45728" marB="45728" anchor="ctr">
-                    <a:lnL w="57150" cap="flat" cmpd="sng" algn="ctr">
-                      <a:solidFill>
-                        <a:srgbClr val="FFFFFF"/>
-                      </a:solidFill>
-                      <a:prstDash val="solid"/>
-                      <a:round/>
-                      <a:headEnd type="none" w="med" len="med"/>
-                      <a:tailEnd type="none" w="med" len="med"/>
-                    </a:lnL>
-                    <a:lnT w="57150" cap="flat" cmpd="sng" algn="ctr">
-                      <a:solidFill>
-                        <a:srgbClr val="FFFFFF"/>
-                      </a:solidFill>
-                      <a:prstDash val="solid"/>
-                      <a:round/>
-                      <a:headEnd type="none" w="med" len="med"/>
-                      <a:tailEnd type="none" w="med" len="med"/>
-                    </a:lnT>
-                    <a:lnB w="38100" cap="flat" cmpd="sng" algn="ctr">
-                      <a:solidFill>
-                        <a:srgbClr val="FFFFFF"/>
-                      </a:solidFill>
-                      <a:prstDash val="solid"/>
-                      <a:round/>
-                      <a:headEnd type="none" w="med" len="med"/>
-                      <a:tailEnd type="none" w="med" len="med"/>
-                    </a:lnB>
-                  </a:tcPr>
-                </a:tc>
-                <a:tc>
-                  <a:txBody>
-                    <a:bodyPr/>
-                    <a:lstStyle/>
-                    <a:p>
-                      <a:r>
-                        <a:rPr lang="en-US" sz="2400" dirty="0" smtClean="0"/>
-                        <a:t>READ_CONTACTS</a:t>
-                      </a:r>
-                      <a:endParaRPr lang="en-US" sz="2400" dirty="0"/>
-                    </a:p>
-                  </a:txBody>
-                  <a:tcPr marT="45728" marB="45728" anchor="ctr">
-                    <a:lnR w="57150" cap="flat" cmpd="sng" algn="ctr">
-                      <a:solidFill>
-                        <a:srgbClr val="FFFFFF"/>
-                      </a:solidFill>
-                      <a:prstDash val="solid"/>
-                      <a:round/>
-                      <a:headEnd type="none" w="med" len="med"/>
-                      <a:tailEnd type="none" w="med" len="med"/>
-                    </a:lnR>
-                    <a:lnT w="57150" cap="flat" cmpd="sng" algn="ctr">
-                      <a:solidFill>
-                        <a:srgbClr val="FFFFFF"/>
-                      </a:solidFill>
-                      <a:prstDash val="solid"/>
-                      <a:round/>
-                      <a:headEnd type="none" w="med" len="med"/>
-                      <a:tailEnd type="none" w="med" len="med"/>
-                    </a:lnT>
-                    <a:lnB w="38100" cap="flat" cmpd="sng" algn="ctr">
-                      <a:solidFill>
-                        <a:srgbClr val="FFFFFF"/>
-                      </a:solidFill>
-                      <a:prstDash val="solid"/>
-                      <a:round/>
-                      <a:headEnd type="none" w="med" len="med"/>
-                      <a:tailEnd type="none" w="med" len="med"/>
-                    </a:lnB>
-                  </a:tcPr>
-                </a:tc>
-              </a:tr>
-              <a:tr h="1047750">
-                <a:tc>
-                  <a:txBody>
-                    <a:bodyPr/>
-                    <a:lstStyle/>
-                    <a:p>
-                      <a:r>
-                        <a:rPr lang="en-US" sz="2400" dirty="0" smtClean="0"/>
-                        <a:t>Action</a:t>
-                      </a:r>
-                      <a:endParaRPr lang="en-US" sz="2400" dirty="0"/>
-                    </a:p>
-                  </a:txBody>
-                  <a:tcPr marT="45728" marB="45728" anchor="ctr">
-                    <a:lnL w="57150" cap="flat" cmpd="sng" algn="ctr">
-                      <a:solidFill>
-                        <a:srgbClr val="FFFFFF"/>
-                      </a:solidFill>
-                      <a:prstDash val="solid"/>
-                      <a:round/>
-                      <a:headEnd type="none" w="med" len="med"/>
-                      <a:tailEnd type="none" w="med" len="med"/>
-                    </a:lnL>
-                    <a:lnT w="38100" cap="flat" cmpd="sng" algn="ctr">
-                      <a:solidFill>
-                        <a:srgbClr val="FFFFFF"/>
-                      </a:solidFill>
-                      <a:prstDash val="solid"/>
-                      <a:round/>
-                      <a:headEnd type="none" w="med" len="med"/>
-                      <a:tailEnd type="none" w="med" len="med"/>
-                    </a:lnT>
-                  </a:tcPr>
-                </a:tc>
-                <a:tc>
-                  <a:txBody>
-                    <a:bodyPr/>
-                    <a:lstStyle/>
-                    <a:p>
-                      <a:r>
-                        <a:rPr lang="en-US" sz="2400" dirty="0" err="1" smtClean="0"/>
-                        <a:t>Intent.ACTION_PICK</a:t>
-                      </a:r>
-                      <a:endParaRPr lang="en-US" sz="2400" dirty="0"/>
-                    </a:p>
-                  </a:txBody>
-                  <a:tcPr marT="45728" marB="45728" anchor="ctr">
-                    <a:lnR w="57150" cap="flat" cmpd="sng" algn="ctr">
-                      <a:solidFill>
-                        <a:srgbClr val="FFFFFF"/>
-                      </a:solidFill>
-                      <a:prstDash val="solid"/>
-                      <a:round/>
-                      <a:headEnd type="none" w="med" len="med"/>
-                      <a:tailEnd type="none" w="med" len="med"/>
-                    </a:lnR>
-                    <a:lnT w="38100" cap="flat" cmpd="sng" algn="ctr">
-                      <a:solidFill>
-                        <a:srgbClr val="FFFFFF"/>
-                      </a:solidFill>
-                      <a:prstDash val="solid"/>
-                      <a:round/>
-                      <a:headEnd type="none" w="med" len="med"/>
-                      <a:tailEnd type="none" w="med" len="med"/>
-                    </a:lnT>
-                  </a:tcPr>
-                </a:tc>
-              </a:tr>
-              <a:tr h="1047750">
-                <a:tc>
-                  <a:txBody>
-                    <a:bodyPr/>
-                    <a:lstStyle/>
-                    <a:p>
-                      <a:r>
-                        <a:rPr lang="en-US" sz="2400" dirty="0" smtClean="0"/>
-                        <a:t>data</a:t>
-                      </a:r>
-                      <a:endParaRPr lang="en-US" sz="2400" dirty="0"/>
-                    </a:p>
-                  </a:txBody>
-                  <a:tcPr marT="45728" marB="45728" anchor="ctr">
-                    <a:lnL w="57150" cap="flat" cmpd="sng" algn="ctr">
-                      <a:solidFill>
-                        <a:srgbClr val="FFFFFF"/>
-                      </a:solidFill>
-                      <a:prstDash val="solid"/>
-                      <a:round/>
-                      <a:headEnd type="none" w="med" len="med"/>
-                      <a:tailEnd type="none" w="med" len="med"/>
-                    </a:lnL>
-                    <a:lnB w="57150" cap="flat" cmpd="sng" algn="ctr">
-                      <a:solidFill>
-                        <a:srgbClr val="FFFFFF"/>
-                      </a:solidFill>
-                      <a:prstDash val="solid"/>
-                      <a:round/>
-                      <a:headEnd type="none" w="med" len="med"/>
-                      <a:tailEnd type="none" w="med" len="med"/>
-                    </a:lnB>
-                  </a:tcPr>
-                </a:tc>
-                <a:tc>
-                  <a:txBody>
-                    <a:bodyPr/>
-                    <a:lstStyle/>
-                    <a:p>
-                      <a:r>
-                        <a:rPr lang="en-US" sz="2400" dirty="0" err="1" smtClean="0"/>
-                        <a:t>ContactsContract.Contacts.CONTENT_URI</a:t>
-                      </a:r>
-                      <a:endParaRPr lang="en-US" sz="2400" dirty="0"/>
-                    </a:p>
-                  </a:txBody>
-                  <a:tcPr marT="45728" marB="45728" anchor="ctr">
-                    <a:lnR w="57150" cap="flat" cmpd="sng" algn="ctr">
-                      <a:solidFill>
-                        <a:srgbClr val="FFFFFF"/>
-                      </a:solidFill>
-                      <a:prstDash val="solid"/>
-                      <a:round/>
-                      <a:headEnd type="none" w="med" len="med"/>
-                      <a:tailEnd type="none" w="med" len="med"/>
-                    </a:lnR>
-                    <a:lnB w="57150" cap="flat" cmpd="sng" algn="ctr">
-                      <a:solidFill>
-                        <a:srgbClr val="FFFFFF"/>
-                      </a:solidFill>
-                      <a:prstDash val="solid"/>
-                      <a:round/>
-                      <a:headEnd type="none" w="med" len="med"/>
-                      <a:tailEnd type="none" w="med" len="med"/>
-                    </a:lnB>
-                  </a:tcPr>
-                </a:tc>
-              </a:tr>
-              <a:tr h="1047750">
-                <a:tc>
-                  <a:txBody>
-                    <a:bodyPr/>
-                    <a:lstStyle/>
-                    <a:p>
-                      <a:r>
-                        <a:rPr lang="en-US" sz="2400" dirty="0" smtClean="0"/>
-                        <a:t>Result</a:t>
-                      </a:r>
-                      <a:endParaRPr lang="en-US" sz="2400" dirty="0"/>
-                    </a:p>
-                  </a:txBody>
-                  <a:tcPr marT="45728" marB="45728" anchor="ctr">
-                    <a:lnL w="57150" cap="flat" cmpd="sng" algn="ctr">
-                      <a:solidFill>
-                        <a:srgbClr val="FFFFFF"/>
-                      </a:solidFill>
-                      <a:prstDash val="solid"/>
-                      <a:round/>
-                      <a:headEnd type="none" w="med" len="med"/>
-                      <a:tailEnd type="none" w="med" len="med"/>
-                    </a:lnL>
-                    <a:lnT w="57150" cap="flat" cmpd="sng" algn="ctr">
-                      <a:solidFill>
-                        <a:srgbClr val="FFFFFF"/>
-                      </a:solidFill>
-                      <a:prstDash val="solid"/>
-                      <a:round/>
-                      <a:headEnd type="none" w="med" len="med"/>
-                      <a:tailEnd type="none" w="med" len="med"/>
-                    </a:lnT>
-                    <a:lnB w="57150" cap="flat" cmpd="sng" algn="ctr">
-                      <a:solidFill>
-                        <a:srgbClr val="FFFFFF"/>
-                      </a:solidFill>
-                      <a:prstDash val="solid"/>
-                      <a:round/>
-                      <a:headEnd type="none" w="med" len="med"/>
-                      <a:tailEnd type="none" w="med" len="med"/>
-                    </a:lnB>
-                  </a:tcPr>
-                </a:tc>
-                <a:tc>
-                  <a:txBody>
-                    <a:bodyPr/>
-                    <a:lstStyle/>
-                    <a:p>
-                      <a:r>
-                        <a:rPr lang="en-US" sz="2400" dirty="0" smtClean="0"/>
-                        <a:t>URI of chosen</a:t>
-                      </a:r>
-                      <a:r>
-                        <a:rPr lang="en-US" sz="2400" baseline="0" dirty="0" smtClean="0"/>
-                        <a:t> contact.</a:t>
-                      </a:r>
-                      <a:endParaRPr lang="en-US" sz="2400" dirty="0"/>
-                    </a:p>
-                  </a:txBody>
-                  <a:tcPr marT="45728" marB="45728" anchor="ctr">
-                    <a:lnR w="57150" cap="flat" cmpd="sng" algn="ctr">
-                      <a:solidFill>
-                        <a:srgbClr val="FFFFFF"/>
-                      </a:solidFill>
-                      <a:prstDash val="solid"/>
-                      <a:round/>
-                      <a:headEnd type="none" w="med" len="med"/>
-                      <a:tailEnd type="none" w="med" len="med"/>
-                    </a:lnR>
-                    <a:lnT w="57150" cap="flat" cmpd="sng" algn="ctr">
-                      <a:solidFill>
-                        <a:srgbClr val="FFFFFF"/>
-                      </a:solidFill>
-                      <a:prstDash val="solid"/>
-                      <a:round/>
-                      <a:headEnd type="none" w="med" len="med"/>
-                      <a:tailEnd type="none" w="med" len="med"/>
-                    </a:lnT>
-                    <a:lnB w="57150" cap="flat" cmpd="sng" algn="ctr">
-                      <a:solidFill>
-                        <a:srgbClr val="FFFFFF"/>
-                      </a:solidFill>
-                      <a:prstDash val="solid"/>
-                      <a:round/>
-                      <a:headEnd type="none" w="med" len="med"/>
-                      <a:tailEnd type="none" w="med" len="med"/>
-                    </a:lnB>
-                  </a:tcPr>
-                </a:tc>
-              </a:tr>
-            </a:tbl>
-          </a:graphicData>
-        </a:graphic>
-      </p:graphicFrame>
-    </p:spTree>
-  </p:cSld>
-  <p:clrMapOvr>
-    <a:masterClrMapping/>
-  </p:clrMapOvr>
-  <p:transition xmlns:p14="http://schemas.microsoft.com/office/powerpoint/2010/main">
-    <p:wipe/>
-  </p:transition>
 </p:sld>
 </file>
 

</xml_diff>

<commit_message>
Added reset menu option
</commit_message>
<xml_diff>
--- a/presentations/DevTeach-Intents.pptx
+++ b/presentations/DevTeach-Intents.pptx
@@ -5,35 +5,36 @@
     <p:sldMasterId id="2147483648" r:id="rId1"/>
   </p:sldMasterIdLst>
   <p:notesMasterIdLst>
-    <p:notesMasterId r:id="rId28"/>
+    <p:notesMasterId r:id="rId29"/>
   </p:notesMasterIdLst>
   <p:sldIdLst>
     <p:sldId id="256" r:id="rId2"/>
     <p:sldId id="280" r:id="rId3"/>
-    <p:sldId id="257" r:id="rId4"/>
-    <p:sldId id="264" r:id="rId5"/>
-    <p:sldId id="285" r:id="rId6"/>
-    <p:sldId id="265" r:id="rId7"/>
-    <p:sldId id="267" r:id="rId8"/>
-    <p:sldId id="269" r:id="rId9"/>
-    <p:sldId id="270" r:id="rId10"/>
-    <p:sldId id="281" r:id="rId11"/>
-    <p:sldId id="282" r:id="rId12"/>
-    <p:sldId id="283" r:id="rId13"/>
-    <p:sldId id="284" r:id="rId14"/>
-    <p:sldId id="286" r:id="rId15"/>
-    <p:sldId id="287" r:id="rId16"/>
-    <p:sldId id="273" r:id="rId17"/>
-    <p:sldId id="274" r:id="rId18"/>
-    <p:sldId id="288" r:id="rId19"/>
-    <p:sldId id="275" r:id="rId20"/>
-    <p:sldId id="276" r:id="rId21"/>
-    <p:sldId id="277" r:id="rId22"/>
-    <p:sldId id="279" r:id="rId23"/>
-    <p:sldId id="258" r:id="rId24"/>
-    <p:sldId id="266" r:id="rId25"/>
-    <p:sldId id="260" r:id="rId26"/>
-    <p:sldId id="262" r:id="rId27"/>
+    <p:sldId id="270" r:id="rId4"/>
+    <p:sldId id="257" r:id="rId5"/>
+    <p:sldId id="264" r:id="rId6"/>
+    <p:sldId id="285" r:id="rId7"/>
+    <p:sldId id="265" r:id="rId8"/>
+    <p:sldId id="267" r:id="rId9"/>
+    <p:sldId id="289" r:id="rId10"/>
+    <p:sldId id="269" r:id="rId11"/>
+    <p:sldId id="281" r:id="rId12"/>
+    <p:sldId id="282" r:id="rId13"/>
+    <p:sldId id="283" r:id="rId14"/>
+    <p:sldId id="284" r:id="rId15"/>
+    <p:sldId id="286" r:id="rId16"/>
+    <p:sldId id="287" r:id="rId17"/>
+    <p:sldId id="273" r:id="rId18"/>
+    <p:sldId id="274" r:id="rId19"/>
+    <p:sldId id="288" r:id="rId20"/>
+    <p:sldId id="275" r:id="rId21"/>
+    <p:sldId id="276" r:id="rId22"/>
+    <p:sldId id="277" r:id="rId23"/>
+    <p:sldId id="279" r:id="rId24"/>
+    <p:sldId id="260" r:id="rId25"/>
+    <p:sldId id="262" r:id="rId26"/>
+    <p:sldId id="258" r:id="rId27"/>
+    <p:sldId id="266" r:id="rId28"/>
   </p:sldIdLst>
   <p:sldSz cx="9144000" cy="6858000" type="screen4x3"/>
   <p:notesSz cx="6858000" cy="9144000"/>
@@ -265,7 +266,7 @@
               <a:pPr>
                 <a:defRPr/>
               </a:pPr>
-              <a:t>5/22/12</a:t>
+              <a:t>5/24/12</a:t>
             </a:fld>
             <a:endParaRPr lang="en-US"/>
           </a:p>
@@ -843,7 +844,7 @@
             <a:fld id="{F8B21A7F-F9EB-FB41-A62A-5377DB33A5E0}" type="slidenum">
               <a:rPr lang="en-US" sz="1200"/>
               <a:pPr eaLnBrk="1" hangingPunct="1"/>
-              <a:t>8</a:t>
+              <a:t>10</a:t>
             </a:fld>
             <a:endParaRPr lang="en-US" sz="1200"/>
           </a:p>
@@ -1117,7 +1118,7 @@
             <a:fld id="{B8C3BBE3-34AE-BF4A-8E11-8F97B84A86D9}" type="slidenum">
               <a:rPr lang="en-US" sz="1200"/>
               <a:pPr eaLnBrk="1" hangingPunct="1"/>
-              <a:t>10</a:t>
+              <a:t>11</a:t>
             </a:fld>
             <a:endParaRPr lang="en-US" sz="1200"/>
           </a:p>
@@ -1235,6 +1236,48 @@
                 <a:latin typeface="Calibri" charset="0"/>
               </a:rPr>
               <a:t>Email</a:t>
+            </a:r>
+          </a:p>
+          <a:p>
+            <a:r>
+              <a:rPr lang="en-US">
+                <a:latin typeface="Calibri" charset="0"/>
+              </a:rPr>
+              <a:t>----- Meeting Notes (5/24/12 20:08) -----</a:t>
+            </a:r>
+          </a:p>
+          <a:p>
+            <a:r>
+              <a:rPr lang="en-US">
+                <a:latin typeface="Calibri" charset="0"/>
+              </a:rPr>
+              <a:t>type!!</a:t>
+            </a:r>
+          </a:p>
+          <a:p>
+            <a:endParaRPr lang="en-US">
+              <a:latin typeface="Calibri" charset="0"/>
+            </a:endParaRPr>
+          </a:p>
+          <a:p>
+            <a:r>
+              <a:rPr lang="en-US">
+                <a:latin typeface="Calibri" charset="0"/>
+              </a:rPr>
+              <a:t>- figure out what DEBUG_LOG_RESOLUTION does</a:t>
+            </a:r>
+          </a:p>
+          <a:p>
+            <a:endParaRPr lang="en-US">
+              <a:latin typeface="Calibri" charset="0"/>
+            </a:endParaRPr>
+          </a:p>
+          <a:p>
+            <a:r>
+              <a:rPr lang="en-US">
+                <a:latin typeface="Calibri" charset="0"/>
+              </a:rPr>
+              <a:t>- can you give other apps permission to access your data?</a:t>
             </a:r>
           </a:p>
         </p:txBody>
@@ -1386,13 +1429,244 @@
             <a:fld id="{633A4B88-F865-E34A-B4A7-643265B9DA37}" type="slidenum">
               <a:rPr lang="en-US" sz="1200"/>
               <a:pPr eaLnBrk="1" hangingPunct="1"/>
-              <a:t>13</a:t>
+              <a:t>14</a:t>
             </a:fld>
             <a:endParaRPr lang="en-US" sz="1200"/>
           </a:p>
         </p:txBody>
       </p:sp>
     </p:spTree>
+  </p:cSld>
+  <p:clrMapOvr>
+    <a:masterClrMapping/>
+  </p:clrMapOvr>
+</p:notes>
+</file>
+
+<file path=ppt/notesSlides/notesSlide4.xml><?xml version="1.0" encoding="utf-8"?>
+<p:notes xmlns:a="http://schemas.openxmlformats.org/drawingml/2006/main" xmlns:r="http://schemas.openxmlformats.org/officeDocument/2006/relationships" xmlns:p="http://schemas.openxmlformats.org/presentationml/2006/main">
+  <p:cSld>
+    <p:spTree>
+      <p:nvGrpSpPr>
+        <p:cNvPr id="1" name=""/>
+        <p:cNvGrpSpPr/>
+        <p:nvPr/>
+      </p:nvGrpSpPr>
+      <p:grpSpPr>
+        <a:xfrm>
+          <a:off x="0" y="0"/>
+          <a:ext cx="0" cy="0"/>
+          <a:chOff x="0" y="0"/>
+          <a:chExt cx="0" cy="0"/>
+        </a:xfrm>
+      </p:grpSpPr>
+      <p:sp>
+        <p:nvSpPr>
+          <p:cNvPr id="2" name="Slide Image Placeholder 1"/>
+          <p:cNvSpPr>
+            <a:spLocks noGrp="1" noRot="1" noChangeAspect="1"/>
+          </p:cNvSpPr>
+          <p:nvPr>
+            <p:ph type="sldImg"/>
+          </p:nvPr>
+        </p:nvSpPr>
+        <p:spPr/>
+      </p:sp>
+      <p:sp>
+        <p:nvSpPr>
+          <p:cNvPr id="3" name="Notes Placeholder 2"/>
+          <p:cNvSpPr>
+            <a:spLocks noGrp="1"/>
+          </p:cNvSpPr>
+          <p:nvPr>
+            <p:ph type="body" idx="1"/>
+          </p:nvPr>
+        </p:nvSpPr>
+        <p:spPr/>
+        <p:txBody>
+          <a:bodyPr/>
+          <a:lstStyle/>
+          <a:p>
+            <a:endParaRPr lang="en-US"/>
+          </a:p>
+          <a:p>
+            <a:r>
+              <a:rPr lang="en-US"/>
+              <a:t>----- Meeting Notes (5/24/12 20:08) -----</a:t>
+            </a:r>
+          </a:p>
+          <a:p>
+            <a:r>
+              <a:rPr lang="en-US"/>
+              <a:t>what comes back in the data here? it is the location, or a small version of the image?</a:t>
+            </a:r>
+          </a:p>
+        </p:txBody>
+      </p:sp>
+      <p:sp>
+        <p:nvSpPr>
+          <p:cNvPr id="4" name="Slide Number Placeholder 3"/>
+          <p:cNvSpPr>
+            <a:spLocks noGrp="1"/>
+          </p:cNvSpPr>
+          <p:nvPr>
+            <p:ph type="sldNum" sz="quarter" idx="10"/>
+          </p:nvPr>
+        </p:nvSpPr>
+        <p:spPr/>
+        <p:txBody>
+          <a:bodyPr/>
+          <a:lstStyle/>
+          <a:p>
+            <a:pPr>
+              <a:defRPr/>
+            </a:pPr>
+            <a:fld id="{CB9BF63C-773E-D442-A2EE-87077B6B8852}" type="slidenum">
+              <a:rPr lang="en-US" smtClean="0"/>
+              <a:pPr>
+                <a:defRPr/>
+              </a:pPr>
+              <a:t>17</a:t>
+            </a:fld>
+            <a:endParaRPr lang="en-US"/>
+          </a:p>
+        </p:txBody>
+      </p:sp>
+    </p:spTree>
+    <p:extLst>
+      <p:ext uri="{BB962C8B-B14F-4D97-AF65-F5344CB8AC3E}">
+        <p14:creationId xmlns:p14="http://schemas.microsoft.com/office/powerpoint/2010/main" val="3758064968"/>
+      </p:ext>
+    </p:extLst>
+  </p:cSld>
+  <p:clrMapOvr>
+    <a:masterClrMapping/>
+  </p:clrMapOvr>
+</p:notes>
+</file>
+
+<file path=ppt/notesSlides/notesSlide5.xml><?xml version="1.0" encoding="utf-8"?>
+<p:notes xmlns:a="http://schemas.openxmlformats.org/drawingml/2006/main" xmlns:r="http://schemas.openxmlformats.org/officeDocument/2006/relationships" xmlns:p="http://schemas.openxmlformats.org/presentationml/2006/main">
+  <p:cSld>
+    <p:spTree>
+      <p:nvGrpSpPr>
+        <p:cNvPr id="1" name=""/>
+        <p:cNvGrpSpPr/>
+        <p:nvPr/>
+      </p:nvGrpSpPr>
+      <p:grpSpPr>
+        <a:xfrm>
+          <a:off x="0" y="0"/>
+          <a:ext cx="0" cy="0"/>
+          <a:chOff x="0" y="0"/>
+          <a:chExt cx="0" cy="0"/>
+        </a:xfrm>
+      </p:grpSpPr>
+      <p:sp>
+        <p:nvSpPr>
+          <p:cNvPr id="2" name="Slide Image Placeholder 1"/>
+          <p:cNvSpPr>
+            <a:spLocks noGrp="1" noRot="1" noChangeAspect="1"/>
+          </p:cNvSpPr>
+          <p:nvPr>
+            <p:ph type="sldImg"/>
+          </p:nvPr>
+        </p:nvSpPr>
+        <p:spPr/>
+      </p:sp>
+      <p:sp>
+        <p:nvSpPr>
+          <p:cNvPr id="3" name="Notes Placeholder 2"/>
+          <p:cNvSpPr>
+            <a:spLocks noGrp="1"/>
+          </p:cNvSpPr>
+          <p:nvPr>
+            <p:ph type="body" idx="1"/>
+          </p:nvPr>
+        </p:nvSpPr>
+        <p:spPr/>
+        <p:txBody>
+          <a:bodyPr/>
+          <a:lstStyle/>
+          <a:p>
+            <a:endParaRPr lang="en-US"/>
+          </a:p>
+          <a:p>
+            <a:r>
+              <a:rPr lang="en-US"/>
+              <a:t>----- Meeting Notes (5/24/12 20:08) -----</a:t>
+            </a:r>
+          </a:p>
+          <a:p>
+            <a:r>
+              <a:rPr lang="en-US"/>
+              <a:t>get a mouse clicker that will go into my usb port next to my phone</a:t>
+            </a:r>
+          </a:p>
+          <a:p>
+            <a:endParaRPr lang="en-US"/>
+          </a:p>
+          <a:p>
+            <a:r>
+              <a:rPr lang="en-US"/>
+              <a:t>make a new repo called Tronsmit</a:t>
+            </a:r>
+          </a:p>
+          <a:p>
+            <a:endParaRPr lang="en-US"/>
+          </a:p>
+          <a:p>
+            <a:r>
+              <a:rPr lang="en-US"/>
+              <a:t>fix the log button</a:t>
+            </a:r>
+          </a:p>
+          <a:p>
+            <a:endParaRPr lang="en-US"/>
+          </a:p>
+          <a:p>
+            <a:r>
+              <a:rPr lang="en-US"/>
+              <a:t>what is the difference between an application and a package?</a:t>
+            </a:r>
+          </a:p>
+        </p:txBody>
+      </p:sp>
+      <p:sp>
+        <p:nvSpPr>
+          <p:cNvPr id="4" name="Slide Number Placeholder 3"/>
+          <p:cNvSpPr>
+            <a:spLocks noGrp="1"/>
+          </p:cNvSpPr>
+          <p:nvPr>
+            <p:ph type="sldNum" sz="quarter" idx="10"/>
+          </p:nvPr>
+        </p:nvSpPr>
+        <p:spPr/>
+        <p:txBody>
+          <a:bodyPr/>
+          <a:lstStyle/>
+          <a:p>
+            <a:pPr>
+              <a:defRPr/>
+            </a:pPr>
+            <a:fld id="{CB9BF63C-773E-D442-A2EE-87077B6B8852}" type="slidenum">
+              <a:rPr lang="en-US" smtClean="0"/>
+              <a:pPr>
+                <a:defRPr/>
+              </a:pPr>
+              <a:t>24</a:t>
+            </a:fld>
+            <a:endParaRPr lang="en-US"/>
+          </a:p>
+        </p:txBody>
+      </p:sp>
+    </p:spTree>
+    <p:extLst>
+      <p:ext uri="{BB962C8B-B14F-4D97-AF65-F5344CB8AC3E}">
+        <p14:creationId xmlns:p14="http://schemas.microsoft.com/office/powerpoint/2010/main" val="3275210142"/>
+      </p:ext>
+    </p:extLst>
   </p:cSld>
   <p:clrMapOvr>
     <a:masterClrMapping/>
@@ -3758,6 +4032,311 @@
       </p:grpSpPr>
       <p:sp>
         <p:nvSpPr>
+          <p:cNvPr id="8193" name="Title 1"/>
+          <p:cNvSpPr>
+            <a:spLocks noGrp="1"/>
+          </p:cNvSpPr>
+          <p:nvPr>
+            <p:ph type="title"/>
+          </p:nvPr>
+        </p:nvSpPr>
+        <p:spPr/>
+        <p:txBody>
+          <a:bodyPr/>
+          <a:lstStyle/>
+          <a:p>
+            <a:r>
+              <a:rPr lang="en-US">
+                <a:latin typeface="Arial" charset="0"/>
+              </a:rPr>
+              <a:t>Intent Filters</a:t>
+            </a:r>
+          </a:p>
+        </p:txBody>
+      </p:sp>
+      <p:sp>
+        <p:nvSpPr>
+          <p:cNvPr id="2" name="Manual Operation 1"/>
+          <p:cNvSpPr/>
+          <p:nvPr/>
+        </p:nvSpPr>
+        <p:spPr>
+          <a:xfrm>
+            <a:off x="1676400" y="1524000"/>
+            <a:ext cx="5486400" cy="612775"/>
+          </a:xfrm>
+          <a:prstGeom prst="flowChartManualOperation">
+            <a:avLst/>
+          </a:prstGeom>
+          <a:solidFill>
+            <a:srgbClr val="FFFFFF"/>
+          </a:solidFill>
+        </p:spPr>
+        <p:style>
+          <a:lnRef idx="1">
+            <a:schemeClr val="accent1"/>
+          </a:lnRef>
+          <a:fillRef idx="3">
+            <a:schemeClr val="accent1"/>
+          </a:fillRef>
+          <a:effectRef idx="2">
+            <a:schemeClr val="accent1"/>
+          </a:effectRef>
+          <a:fontRef idx="minor">
+            <a:schemeClr val="lt1"/>
+          </a:fontRef>
+        </p:style>
+        <p:txBody>
+          <a:bodyPr anchor="ctr"/>
+          <a:lstStyle/>
+          <a:p>
+            <a:pPr algn="ctr">
+              <a:defRPr/>
+            </a:pPr>
+            <a:r>
+              <a:rPr lang="en-US" dirty="0">
+                <a:solidFill>
+                  <a:srgbClr val="000000"/>
+                </a:solidFill>
+              </a:rPr>
+              <a:t>Target type</a:t>
+            </a:r>
+          </a:p>
+        </p:txBody>
+      </p:sp>
+      <p:sp>
+        <p:nvSpPr>
+          <p:cNvPr id="5" name="Manual Operation 4"/>
+          <p:cNvSpPr/>
+          <p:nvPr/>
+        </p:nvSpPr>
+        <p:spPr>
+          <a:xfrm>
+            <a:off x="2209800" y="2514600"/>
+            <a:ext cx="4191000" cy="612775"/>
+          </a:xfrm>
+          <a:prstGeom prst="flowChartManualOperation">
+            <a:avLst/>
+          </a:prstGeom>
+          <a:solidFill>
+            <a:srgbClr val="FFFFFF"/>
+          </a:solidFill>
+        </p:spPr>
+        <p:style>
+          <a:lnRef idx="1">
+            <a:schemeClr val="accent1"/>
+          </a:lnRef>
+          <a:fillRef idx="3">
+            <a:schemeClr val="accent1"/>
+          </a:fillRef>
+          <a:effectRef idx="2">
+            <a:schemeClr val="accent1"/>
+          </a:effectRef>
+          <a:fontRef idx="minor">
+            <a:schemeClr val="lt1"/>
+          </a:fontRef>
+        </p:style>
+        <p:txBody>
+          <a:bodyPr anchor="ctr"/>
+          <a:lstStyle/>
+          <a:p>
+            <a:pPr algn="ctr">
+              <a:defRPr/>
+            </a:pPr>
+            <a:r>
+              <a:rPr lang="en-US" dirty="0">
+                <a:solidFill>
+                  <a:srgbClr val="000000"/>
+                </a:solidFill>
+              </a:rPr>
+              <a:t>Action</a:t>
+            </a:r>
+          </a:p>
+        </p:txBody>
+      </p:sp>
+      <p:sp>
+        <p:nvSpPr>
+          <p:cNvPr id="6" name="Manual Operation 5"/>
+          <p:cNvSpPr/>
+          <p:nvPr/>
+        </p:nvSpPr>
+        <p:spPr>
+          <a:xfrm>
+            <a:off x="2590800" y="3429000"/>
+            <a:ext cx="3200400" cy="612775"/>
+          </a:xfrm>
+          <a:prstGeom prst="flowChartManualOperation">
+            <a:avLst/>
+          </a:prstGeom>
+          <a:solidFill>
+            <a:srgbClr val="FFFFFF"/>
+          </a:solidFill>
+        </p:spPr>
+        <p:style>
+          <a:lnRef idx="1">
+            <a:schemeClr val="accent1"/>
+          </a:lnRef>
+          <a:fillRef idx="3">
+            <a:schemeClr val="accent1"/>
+          </a:fillRef>
+          <a:effectRef idx="2">
+            <a:schemeClr val="accent1"/>
+          </a:effectRef>
+          <a:fontRef idx="minor">
+            <a:schemeClr val="lt1"/>
+          </a:fontRef>
+        </p:style>
+        <p:txBody>
+          <a:bodyPr anchor="ctr"/>
+          <a:lstStyle/>
+          <a:p>
+            <a:pPr algn="ctr">
+              <a:defRPr/>
+            </a:pPr>
+            <a:r>
+              <a:rPr lang="en-US" dirty="0">
+                <a:solidFill>
+                  <a:srgbClr val="000000"/>
+                </a:solidFill>
+              </a:rPr>
+              <a:t>Categories</a:t>
+            </a:r>
+          </a:p>
+        </p:txBody>
+      </p:sp>
+      <p:sp>
+        <p:nvSpPr>
+          <p:cNvPr id="7" name="Manual Operation 6"/>
+          <p:cNvSpPr/>
+          <p:nvPr/>
+        </p:nvSpPr>
+        <p:spPr>
+          <a:xfrm>
+            <a:off x="3429000" y="4419600"/>
+            <a:ext cx="1600200" cy="612775"/>
+          </a:xfrm>
+          <a:prstGeom prst="flowChartManualOperation">
+            <a:avLst/>
+          </a:prstGeom>
+          <a:solidFill>
+            <a:srgbClr val="FFFFFF"/>
+          </a:solidFill>
+        </p:spPr>
+        <p:style>
+          <a:lnRef idx="1">
+            <a:schemeClr val="accent1"/>
+          </a:lnRef>
+          <a:fillRef idx="3">
+            <a:schemeClr val="accent1"/>
+          </a:fillRef>
+          <a:effectRef idx="2">
+            <a:schemeClr val="accent1"/>
+          </a:effectRef>
+          <a:fontRef idx="minor">
+            <a:schemeClr val="lt1"/>
+          </a:fontRef>
+        </p:style>
+        <p:txBody>
+          <a:bodyPr anchor="ctr"/>
+          <a:lstStyle/>
+          <a:p>
+            <a:pPr algn="ctr">
+              <a:defRPr/>
+            </a:pPr>
+            <a:r>
+              <a:rPr lang="en-US" dirty="0">
+                <a:solidFill>
+                  <a:srgbClr val="000000"/>
+                </a:solidFill>
+              </a:rPr>
+              <a:t>Data</a:t>
+            </a:r>
+          </a:p>
+        </p:txBody>
+      </p:sp>
+      <p:sp>
+        <p:nvSpPr>
+          <p:cNvPr id="4" name="Cloud 3"/>
+          <p:cNvSpPr/>
+          <p:nvPr/>
+        </p:nvSpPr>
+        <p:spPr>
+          <a:xfrm>
+            <a:off x="2514600" y="5410200"/>
+            <a:ext cx="3276600" cy="381000"/>
+          </a:xfrm>
+          <a:prstGeom prst="cloud">
+            <a:avLst/>
+          </a:prstGeom>
+          <a:solidFill>
+            <a:schemeClr val="accent6">
+              <a:lumMod val="60000"/>
+              <a:lumOff val="40000"/>
+            </a:schemeClr>
+          </a:solidFill>
+        </p:spPr>
+        <p:style>
+          <a:lnRef idx="1">
+            <a:schemeClr val="accent1"/>
+          </a:lnRef>
+          <a:fillRef idx="3">
+            <a:schemeClr val="accent1"/>
+          </a:fillRef>
+          <a:effectRef idx="2">
+            <a:schemeClr val="accent1"/>
+          </a:effectRef>
+          <a:fontRef idx="minor">
+            <a:schemeClr val="lt1"/>
+          </a:fontRef>
+        </p:style>
+        <p:txBody>
+          <a:bodyPr anchor="ctr"/>
+          <a:lstStyle/>
+          <a:p>
+            <a:pPr algn="ctr">
+              <a:defRPr/>
+            </a:pPr>
+            <a:endParaRPr lang="en-US"/>
+          </a:p>
+        </p:txBody>
+      </p:sp>
+    </p:spTree>
+  </p:cSld>
+  <p:clrMapOvr>
+    <a:masterClrMapping/>
+  </p:clrMapOvr>
+  <p:transition xmlns:p14="http://schemas.microsoft.com/office/powerpoint/2010/main">
+    <p:wipe/>
+  </p:transition>
+  <p:timing>
+    <p:tnLst>
+      <p:par>
+        <p:cTn xmlns:p14="http://schemas.microsoft.com/office/powerpoint/2010/main" id="1" dur="indefinite" restart="never" nodeType="tmRoot"/>
+      </p:par>
+    </p:tnLst>
+  </p:timing>
+</p:sld>
+</file>
+
+<file path=ppt/slides/slide11.xml><?xml version="1.0" encoding="utf-8"?>
+<p:sld xmlns:a="http://schemas.openxmlformats.org/drawingml/2006/main" xmlns:r="http://schemas.openxmlformats.org/officeDocument/2006/relationships" xmlns:p="http://schemas.openxmlformats.org/presentationml/2006/main">
+  <p:cSld>
+    <p:spTree>
+      <p:nvGrpSpPr>
+        <p:cNvPr id="1" name=""/>
+        <p:cNvGrpSpPr/>
+        <p:nvPr/>
+      </p:nvGrpSpPr>
+      <p:grpSpPr>
+        <a:xfrm>
+          <a:off x="0" y="0"/>
+          <a:ext cx="0" cy="0"/>
+          <a:chOff x="0" y="0"/>
+          <a:chExt cx="0" cy="0"/>
+        </a:xfrm>
+      </p:grpSpPr>
+      <p:sp>
+        <p:nvSpPr>
           <p:cNvPr id="11265" name="Title 1"/>
           <p:cNvSpPr>
             <a:spLocks noGrp="1"/>
@@ -4142,7 +4721,7 @@
 </p:sld>
 </file>
 
-<file path=ppt/slides/slide11.xml><?xml version="1.0" encoding="utf-8"?>
+<file path=ppt/slides/slide12.xml><?xml version="1.0" encoding="utf-8"?>
 <p:sld xmlns:a="http://schemas.openxmlformats.org/drawingml/2006/main" xmlns:r="http://schemas.openxmlformats.org/officeDocument/2006/relationships" xmlns:p="http://schemas.openxmlformats.org/presentationml/2006/main">
   <p:cSld>
     <p:spTree>
@@ -4355,7 +4934,7 @@
 </p:sld>
 </file>
 
-<file path=ppt/slides/slide12.xml><?xml version="1.0" encoding="utf-8"?>
+<file path=ppt/slides/slide13.xml><?xml version="1.0" encoding="utf-8"?>
 <p:sld xmlns:a="http://schemas.openxmlformats.org/drawingml/2006/main" xmlns:r="http://schemas.openxmlformats.org/officeDocument/2006/relationships" xmlns:p="http://schemas.openxmlformats.org/presentationml/2006/main">
   <p:cSld>
     <p:spTree>
@@ -4689,7 +5268,7 @@
 </p:sld>
 </file>
 
-<file path=ppt/slides/slide13.xml><?xml version="1.0" encoding="utf-8"?>
+<file path=ppt/slides/slide14.xml><?xml version="1.0" encoding="utf-8"?>
 <p:sld xmlns:a="http://schemas.openxmlformats.org/drawingml/2006/main" xmlns:r="http://schemas.openxmlformats.org/officeDocument/2006/relationships" xmlns:p="http://schemas.openxmlformats.org/presentationml/2006/main">
   <p:cSld>
     <p:spTree>
@@ -5110,7 +5689,7 @@
 </p:sld>
 </file>
 
-<file path=ppt/slides/slide14.xml><?xml version="1.0" encoding="utf-8"?>
+<file path=ppt/slides/slide15.xml><?xml version="1.0" encoding="utf-8"?>
 <p:sld xmlns:a="http://schemas.openxmlformats.org/drawingml/2006/main" xmlns:r="http://schemas.openxmlformats.org/officeDocument/2006/relationships" xmlns:p="http://schemas.openxmlformats.org/presentationml/2006/main">
   <p:cSld>
     <p:spTree>
@@ -5643,7 +6222,7 @@
 </p:sld>
 </file>
 
-<file path=ppt/slides/slide15.xml><?xml version="1.0" encoding="utf-8"?>
+<file path=ppt/slides/slide16.xml><?xml version="1.0" encoding="utf-8"?>
 <p:sld xmlns:a="http://schemas.openxmlformats.org/drawingml/2006/main" xmlns:r="http://schemas.openxmlformats.org/officeDocument/2006/relationships" xmlns:p="http://schemas.openxmlformats.org/presentationml/2006/main">
   <p:cSld>
     <p:spTree>
@@ -5790,7 +6369,7 @@
 </p:sld>
 </file>
 
-<file path=ppt/slides/slide16.xml><?xml version="1.0" encoding="utf-8"?>
+<file path=ppt/slides/slide17.xml><?xml version="1.0" encoding="utf-8"?>
 <p:sld xmlns:a="http://schemas.openxmlformats.org/drawingml/2006/main" xmlns:r="http://schemas.openxmlformats.org/officeDocument/2006/relationships" xmlns:p="http://schemas.openxmlformats.org/presentationml/2006/main">
   <p:cSld>
     <p:spTree>
@@ -6114,7 +6693,7 @@
 </p:sld>
 </file>
 
-<file path=ppt/slides/slide17.xml><?xml version="1.0" encoding="utf-8"?>
+<file path=ppt/slides/slide18.xml><?xml version="1.0" encoding="utf-8"?>
 <p:sld xmlns:a="http://schemas.openxmlformats.org/drawingml/2006/main" xmlns:r="http://schemas.openxmlformats.org/officeDocument/2006/relationships" xmlns:p="http://schemas.openxmlformats.org/presentationml/2006/main">
   <p:cSld>
     <p:spTree>
@@ -6353,7 +6932,7 @@
 </p:sld>
 </file>
 
-<file path=ppt/slides/slide18.xml><?xml version="1.0" encoding="utf-8"?>
+<file path=ppt/slides/slide19.xml><?xml version="1.0" encoding="utf-8"?>
 <p:sld xmlns:a="http://schemas.openxmlformats.org/drawingml/2006/main" xmlns:r="http://schemas.openxmlformats.org/officeDocument/2006/relationships" xmlns:p="http://schemas.openxmlformats.org/presentationml/2006/main">
   <p:cSld>
     <p:spTree>
@@ -6497,117 +7076,6 @@
         <p14:creationId xmlns:p14="http://schemas.microsoft.com/office/powerpoint/2010/main" val="3663758240"/>
       </p:ext>
     </p:extLst>
-  </p:cSld>
-  <p:clrMapOvr>
-    <a:masterClrMapping/>
-  </p:clrMapOvr>
-  <p:transition xmlns:p14="http://schemas.microsoft.com/office/powerpoint/2010/main">
-    <p:wipe/>
-  </p:transition>
-  <p:timing>
-    <p:tnLst>
-      <p:par>
-        <p:cTn xmlns:p14="http://schemas.microsoft.com/office/powerpoint/2010/main" id="1" dur="indefinite" restart="never" nodeType="tmRoot"/>
-      </p:par>
-    </p:tnLst>
-  </p:timing>
-</p:sld>
-</file>
-
-<file path=ppt/slides/slide19.xml><?xml version="1.0" encoding="utf-8"?>
-<p:sld xmlns:a="http://schemas.openxmlformats.org/drawingml/2006/main" xmlns:r="http://schemas.openxmlformats.org/officeDocument/2006/relationships" xmlns:p="http://schemas.openxmlformats.org/presentationml/2006/main">
-  <p:cSld>
-    <p:spTree>
-      <p:nvGrpSpPr>
-        <p:cNvPr id="1" name=""/>
-        <p:cNvGrpSpPr/>
-        <p:nvPr/>
-      </p:nvGrpSpPr>
-      <p:grpSpPr>
-        <a:xfrm>
-          <a:off x="0" y="0"/>
-          <a:ext cx="0" cy="0"/>
-          <a:chOff x="0" y="0"/>
-          <a:chExt cx="0" cy="0"/>
-        </a:xfrm>
-      </p:grpSpPr>
-      <p:sp>
-        <p:nvSpPr>
-          <p:cNvPr id="17409" name="Title 1"/>
-          <p:cNvSpPr>
-            <a:spLocks noGrp="1"/>
-          </p:cNvSpPr>
-          <p:nvPr>
-            <p:ph type="title"/>
-          </p:nvPr>
-        </p:nvSpPr>
-        <p:spPr/>
-        <p:txBody>
-          <a:bodyPr/>
-          <a:lstStyle/>
-          <a:p>
-            <a:r>
-              <a:rPr lang="en-US">
-                <a:latin typeface="Arial" charset="0"/>
-              </a:rPr>
-              <a:t>What else is available?</a:t>
-            </a:r>
-          </a:p>
-        </p:txBody>
-      </p:sp>
-      <p:sp>
-        <p:nvSpPr>
-          <p:cNvPr id="17410" name="Content Placeholder 2"/>
-          <p:cNvSpPr>
-            <a:spLocks noGrp="1"/>
-          </p:cNvSpPr>
-          <p:nvPr>
-            <p:ph idx="1"/>
-          </p:nvPr>
-        </p:nvSpPr>
-        <p:spPr/>
-        <p:txBody>
-          <a:bodyPr/>
-          <a:lstStyle/>
-          <a:p>
-            <a:r>
-              <a:rPr lang="en-US" dirty="0" smtClean="0">
-                <a:latin typeface="Arial" charset="0"/>
-              </a:rPr>
-              <a:t>View</a:t>
-            </a:r>
-          </a:p>
-          <a:p>
-            <a:pPr lvl="1"/>
-            <a:r>
-              <a:rPr lang="en-US" dirty="0" smtClean="0">
-                <a:latin typeface="Arial" charset="0"/>
-              </a:rPr>
-              <a:t>Browser</a:t>
-            </a:r>
-          </a:p>
-          <a:p>
-            <a:r>
-              <a:rPr lang="en-US" dirty="0" smtClean="0">
-                <a:latin typeface="Arial" charset="0"/>
-              </a:rPr>
-              <a:t>Edit</a:t>
-            </a:r>
-          </a:p>
-          <a:p>
-            <a:r>
-              <a:rPr lang="en-US" dirty="0" smtClean="0">
-                <a:latin typeface="Arial" charset="0"/>
-              </a:rPr>
-              <a:t>Get Content</a:t>
-            </a:r>
-            <a:endParaRPr lang="en-US" dirty="0">
-              <a:latin typeface="Arial" charset="0"/>
-            </a:endParaRPr>
-          </a:p>
-        </p:txBody>
-      </p:sp>
-    </p:spTree>
   </p:cSld>
   <p:clrMapOvr>
     <a:masterClrMapping/>
@@ -6733,7 +7201,7 @@
       </p:grpSpPr>
       <p:sp>
         <p:nvSpPr>
-          <p:cNvPr id="18433" name="Title 1"/>
+          <p:cNvPr id="17409" name="Title 1"/>
           <p:cNvSpPr>
             <a:spLocks noGrp="1"/>
           </p:cNvSpPr>
@@ -6750,14 +7218,14 @@
               <a:rPr lang="en-US">
                 <a:latin typeface="Arial" charset="0"/>
               </a:rPr>
-              <a:t>How do I find out what's available?</a:t>
+              <a:t>What else is available?</a:t>
             </a:r>
           </a:p>
         </p:txBody>
       </p:sp>
       <p:sp>
         <p:nvSpPr>
-          <p:cNvPr id="18434" name="Content Placeholder 2"/>
+          <p:cNvPr id="17410" name="Content Placeholder 2"/>
           <p:cNvSpPr>
             <a:spLocks noGrp="1"/>
           </p:cNvSpPr>
@@ -6771,10 +7239,53 @@
           <a:lstStyle/>
           <a:p>
             <a:r>
-              <a:rPr lang="en-US" dirty="0" err="1" smtClean="0">
+              <a:rPr lang="en-US" dirty="0" smtClean="0">
                 <a:latin typeface="Arial" charset="0"/>
               </a:rPr>
-              <a:t>queryIntentActivityOptions</a:t>
+              <a:t>View</a:t>
+            </a:r>
+          </a:p>
+          <a:p>
+            <a:pPr lvl="1"/>
+            <a:r>
+              <a:rPr lang="en-US" dirty="0" smtClean="0">
+                <a:latin typeface="Arial" charset="0"/>
+              </a:rPr>
+              <a:t>Browser</a:t>
+            </a:r>
+          </a:p>
+          <a:p>
+            <a:pPr lvl="1"/>
+            <a:r>
+              <a:rPr lang="en-US" dirty="0" smtClean="0">
+                <a:latin typeface="Arial" charset="0"/>
+              </a:rPr>
+              <a:t>Contact</a:t>
+            </a:r>
+          </a:p>
+          <a:p>
+            <a:pPr lvl="1"/>
+            <a:r>
+              <a:rPr lang="en-US" dirty="0" smtClean="0">
+                <a:latin typeface="Arial" charset="0"/>
+              </a:rPr>
+              <a:t>Image</a:t>
+            </a:r>
+          </a:p>
+          <a:p>
+            <a:r>
+              <a:rPr lang="en-US" dirty="0" smtClean="0">
+                <a:latin typeface="Arial" charset="0"/>
+              </a:rPr>
+              <a:t>Edit</a:t>
+            </a:r>
+          </a:p>
+          <a:p>
+            <a:r>
+              <a:rPr lang="en-US" dirty="0" smtClean="0">
+                <a:latin typeface="Arial" charset="0"/>
+              </a:rPr>
+              <a:t>Flash some lights</a:t>
             </a:r>
             <a:endParaRPr lang="en-US" dirty="0">
               <a:latin typeface="Arial" charset="0"/>
@@ -6782,6 +7293,35 @@
           </a:p>
         </p:txBody>
       </p:sp>
+      <p:pic>
+        <p:nvPicPr>
+          <p:cNvPr id="2" name="Picture 1" descr="Screen Shot 2012-05-24 at 3.49.06 PM.png"/>
+          <p:cNvPicPr>
+            <a:picLocks noChangeAspect="1"/>
+          </p:cNvPicPr>
+          <p:nvPr/>
+        </p:nvPicPr>
+        <p:blipFill rotWithShape="1">
+          <a:blip r:embed="rId2">
+            <a:extLst>
+              <a:ext uri="{28A0092B-C50C-407E-A947-70E740481C1C}">
+                <a14:useLocalDpi xmlns:a14="http://schemas.microsoft.com/office/drawing/2010/main" val="0"/>
+              </a:ext>
+            </a:extLst>
+          </a:blip>
+          <a:srcRect l="3325" t="5696" r="567" b="12187"/>
+          <a:stretch/>
+        </p:blipFill>
+        <p:spPr>
+          <a:xfrm>
+            <a:off x="4924334" y="4411400"/>
+            <a:ext cx="3576271" cy="980311"/>
+          </a:xfrm>
+          <a:prstGeom prst="rect">
+            <a:avLst/>
+          </a:prstGeom>
+        </p:spPr>
+      </p:pic>
     </p:spTree>
   </p:cSld>
   <p:clrMapOvr>
@@ -6819,7 +7359,7 @@
       </p:grpSpPr>
       <p:sp>
         <p:nvSpPr>
-          <p:cNvPr id="19457" name="Title 1"/>
+          <p:cNvPr id="18433" name="Title 1"/>
           <p:cNvSpPr>
             <a:spLocks noGrp="1"/>
           </p:cNvSpPr>
@@ -6833,17 +7373,20 @@
           <a:lstStyle/>
           <a:p>
             <a:r>
-              <a:rPr lang="en-US">
+              <a:rPr lang="en-US" dirty="0" smtClean="0">
                 <a:latin typeface="Arial" charset="0"/>
               </a:rPr>
-              <a:t>Go to the source</a:t>
-            </a:r>
+              <a:t>What is available on my device?</a:t>
+            </a:r>
+            <a:endParaRPr lang="en-US" dirty="0">
+              <a:latin typeface="Arial" charset="0"/>
+            </a:endParaRPr>
           </a:p>
         </p:txBody>
       </p:sp>
       <p:sp>
         <p:nvSpPr>
-          <p:cNvPr id="19458" name="Content Placeholder 2"/>
+          <p:cNvPr id="18434" name="Content Placeholder 2"/>
           <p:cNvSpPr>
             <a:spLocks noGrp="1"/>
           </p:cNvSpPr>
@@ -6857,76 +7400,46 @@
           <a:lstStyle/>
           <a:p>
             <a:r>
-              <a:rPr lang="en-US" dirty="0" smtClean="0">
-                <a:latin typeface="Arial" charset="0"/>
-              </a:rPr>
-              <a:t>Chrome extension</a:t>
-            </a:r>
-          </a:p>
-          <a:p>
-            <a:pPr lvl="1"/>
-            <a:r>
-              <a:rPr lang="en-US" dirty="0" smtClean="0">
-                <a:latin typeface="Arial" charset="0"/>
-              </a:rPr>
-              <a:t>Android SDK Reference Search</a:t>
-            </a:r>
-          </a:p>
-          <a:p>
-            <a:pPr lvl="1"/>
-            <a:r>
-              <a:rPr lang="en-US" dirty="0" smtClean="0">
-                <a:latin typeface="Arial" charset="0"/>
-              </a:rPr>
-              <a:t>Adds “view source” link to API docs</a:t>
-            </a:r>
-          </a:p>
-          <a:p>
-            <a:r>
-              <a:rPr lang="en-US" dirty="0" smtClean="0">
-                <a:latin typeface="Arial" charset="0"/>
-              </a:rPr>
-              <a:t>Download the source yourself</a:t>
-            </a:r>
-          </a:p>
-          <a:p>
-            <a:pPr lvl="1"/>
-            <a:r>
               <a:rPr lang="en-US" dirty="0" err="1" smtClean="0">
                 <a:latin typeface="Arial" charset="0"/>
               </a:rPr>
-              <a:t>source.android.com</a:t>
-            </a:r>
-            <a:r>
-              <a:rPr lang="en-US" dirty="0">
-                <a:latin typeface="Arial" charset="0"/>
-              </a:rPr>
-              <a:t>/source/</a:t>
-            </a:r>
-            <a:r>
-              <a:rPr lang="en-US" dirty="0" err="1" smtClean="0">
-                <a:latin typeface="Arial" charset="0"/>
-              </a:rPr>
-              <a:t>downloading.html</a:t>
+              <a:t>queryIntentActivityOptions</a:t>
             </a:r>
             <a:endParaRPr lang="en-US" dirty="0" smtClean="0">
               <a:latin typeface="Arial" charset="0"/>
             </a:endParaRPr>
           </a:p>
           <a:p>
-            <a:pPr lvl="1"/>
-            <a:r>
-              <a:rPr lang="en-US" dirty="0">
-                <a:latin typeface="Arial" charset="0"/>
-              </a:rPr>
-              <a:t>“The initial sync operation will take an hour or more to complete</a:t>
-            </a:r>
             <a:r>
               <a:rPr lang="en-US" dirty="0" smtClean="0">
                 <a:latin typeface="Arial" charset="0"/>
               </a:rPr>
-              <a:t>.”</a:t>
-            </a:r>
+              <a:t>Package Manager</a:t>
+            </a:r>
+          </a:p>
+          <a:p>
+            <a:pPr lvl="1"/>
+            <a:r>
+              <a:rPr lang="en-US" dirty="0" smtClean="0">
+                <a:latin typeface="Arial" charset="0"/>
+              </a:rPr>
+              <a:t>Application Info</a:t>
+            </a:r>
+            <a:endParaRPr lang="en-US" dirty="0">
+              <a:latin typeface="Arial" charset="0"/>
+            </a:endParaRPr>
+          </a:p>
+          <a:p>
+            <a:pPr lvl="1"/>
+            <a:r>
+              <a:rPr lang="en-US" dirty="0" smtClean="0">
+                <a:latin typeface="Arial" charset="0"/>
+              </a:rPr>
+              <a:t>Package Info</a:t>
+            </a:r>
+          </a:p>
+          <a:p>
+            <a:pPr lvl="1"/>
             <a:endParaRPr lang="en-US" dirty="0">
               <a:latin typeface="Arial" charset="0"/>
             </a:endParaRPr>
@@ -6970,7 +7483,7 @@
       </p:grpSpPr>
       <p:sp>
         <p:nvSpPr>
-          <p:cNvPr id="21505" name="Title 1"/>
+          <p:cNvPr id="19457" name="Title 1"/>
           <p:cNvSpPr>
             <a:spLocks noGrp="1"/>
           </p:cNvSpPr>
@@ -6987,14 +7500,14 @@
               <a:rPr lang="en-US">
                 <a:latin typeface="Arial" charset="0"/>
               </a:rPr>
-              <a:t>Community Resources</a:t>
+              <a:t>Go to the source</a:t>
             </a:r>
           </a:p>
         </p:txBody>
       </p:sp>
       <p:sp>
         <p:nvSpPr>
-          <p:cNvPr id="21506" name="Content Placeholder 2"/>
+          <p:cNvPr id="19458" name="Content Placeholder 2"/>
           <p:cNvSpPr>
             <a:spLocks noGrp="1"/>
           </p:cNvSpPr>
@@ -7008,33 +7521,96 @@
           <a:lstStyle/>
           <a:p>
             <a:r>
+              <a:rPr lang="en-US" dirty="0" smtClean="0">
+                <a:latin typeface="Arial" charset="0"/>
+              </a:rPr>
+              <a:t>Chrome extension</a:t>
+            </a:r>
+          </a:p>
+          <a:p>
+            <a:pPr lvl="1"/>
+            <a:r>
+              <a:rPr lang="en-US" dirty="0" smtClean="0">
+                <a:latin typeface="Arial" charset="0"/>
+              </a:rPr>
+              <a:t>Android SDK Reference Search</a:t>
+            </a:r>
+          </a:p>
+          <a:p>
+            <a:pPr lvl="1"/>
+            <a:r>
+              <a:rPr lang="en-US" dirty="0" smtClean="0">
+                <a:latin typeface="Arial" charset="0"/>
+              </a:rPr>
+              <a:t>Adds “view source” link to API docs</a:t>
+            </a:r>
+          </a:p>
+          <a:p>
+            <a:r>
+              <a:rPr lang="en-US" dirty="0" smtClean="0">
+                <a:latin typeface="Arial" charset="0"/>
+              </a:rPr>
+              <a:t>Download the source yourself</a:t>
+            </a:r>
+          </a:p>
+          <a:p>
+            <a:pPr lvl="1"/>
+            <a:r>
               <a:rPr lang="en-US" dirty="0" err="1" smtClean="0">
                 <a:latin typeface="Arial" charset="0"/>
               </a:rPr>
-              <a:t>Developer.android.com</a:t>
+              <a:t>source.android.com</a:t>
+            </a:r>
+            <a:r>
+              <a:rPr lang="en-US" dirty="0">
+                <a:latin typeface="Arial" charset="0"/>
+              </a:rPr>
+              <a:t>/source/</a:t>
+            </a:r>
+            <a:r>
+              <a:rPr lang="en-US" dirty="0" err="1" smtClean="0">
+                <a:latin typeface="Arial" charset="0"/>
+              </a:rPr>
+              <a:t>downloading.html</a:t>
             </a:r>
             <a:endParaRPr lang="en-US" dirty="0" smtClean="0">
               <a:latin typeface="Arial" charset="0"/>
             </a:endParaRPr>
           </a:p>
           <a:p>
-            <a:r>
-              <a:rPr lang="en-US" dirty="0" err="1" smtClean="0">
+            <a:pPr lvl="1"/>
+            <a:r>
+              <a:rPr lang="en-US" dirty="0">
                 <a:latin typeface="Arial" charset="0"/>
               </a:rPr>
-              <a:t>StackOverflow</a:t>
-            </a:r>
-            <a:endParaRPr lang="en-US" dirty="0" smtClean="0">
+              <a:t>“The initial sync operation will take an hour or more to complete</a:t>
+            </a:r>
+            <a:r>
+              <a:rPr lang="en-US" dirty="0" smtClean="0">
+                <a:latin typeface="Arial" charset="0"/>
+              </a:rPr>
+              <a:t>.”</a:t>
+            </a:r>
+          </a:p>
+          <a:p>
+            <a:pPr lvl="1"/>
+            <a:endParaRPr lang="en-US" dirty="0">
               <a:latin typeface="Arial" charset="0"/>
             </a:endParaRPr>
           </a:p>
           <a:p>
             <a:r>
-              <a:rPr lang="en-US" smtClean="0">
+              <a:rPr lang="en-US" dirty="0" err="1">
                 <a:latin typeface="Arial" charset="0"/>
               </a:rPr>
-              <a:t>Openintents.org</a:t>
-            </a:r>
+              <a:t>AndroidManifest.xml</a:t>
+            </a:r>
+            <a:endParaRPr lang="en-US" dirty="0">
+              <a:latin typeface="Arial" charset="0"/>
+            </a:endParaRPr>
+          </a:p>
+          <a:p>
+            <a:pPr lvl="1"/>
             <a:endParaRPr lang="en-US" dirty="0">
               <a:latin typeface="Arial" charset="0"/>
             </a:endParaRPr>
@@ -7060,6 +7636,393 @@
 </file>
 
 <file path=ppt/slides/slide23.xml><?xml version="1.0" encoding="utf-8"?>
+<p:sld xmlns:a="http://schemas.openxmlformats.org/drawingml/2006/main" xmlns:r="http://schemas.openxmlformats.org/officeDocument/2006/relationships" xmlns:p="http://schemas.openxmlformats.org/presentationml/2006/main">
+  <p:cSld>
+    <p:spTree>
+      <p:nvGrpSpPr>
+        <p:cNvPr id="1" name=""/>
+        <p:cNvGrpSpPr/>
+        <p:nvPr/>
+      </p:nvGrpSpPr>
+      <p:grpSpPr>
+        <a:xfrm>
+          <a:off x="0" y="0"/>
+          <a:ext cx="0" cy="0"/>
+          <a:chOff x="0" y="0"/>
+          <a:chExt cx="0" cy="0"/>
+        </a:xfrm>
+      </p:grpSpPr>
+      <p:sp>
+        <p:nvSpPr>
+          <p:cNvPr id="21505" name="Title 1"/>
+          <p:cNvSpPr>
+            <a:spLocks noGrp="1"/>
+          </p:cNvSpPr>
+          <p:nvPr>
+            <p:ph type="title"/>
+          </p:nvPr>
+        </p:nvSpPr>
+        <p:spPr/>
+        <p:txBody>
+          <a:bodyPr/>
+          <a:lstStyle/>
+          <a:p>
+            <a:r>
+              <a:rPr lang="en-US">
+                <a:latin typeface="Arial" charset="0"/>
+              </a:rPr>
+              <a:t>Community Resources</a:t>
+            </a:r>
+          </a:p>
+        </p:txBody>
+      </p:sp>
+      <p:sp>
+        <p:nvSpPr>
+          <p:cNvPr id="21506" name="Content Placeholder 2"/>
+          <p:cNvSpPr>
+            <a:spLocks noGrp="1"/>
+          </p:cNvSpPr>
+          <p:nvPr>
+            <p:ph idx="1"/>
+          </p:nvPr>
+        </p:nvSpPr>
+        <p:spPr/>
+        <p:txBody>
+          <a:bodyPr/>
+          <a:lstStyle/>
+          <a:p>
+            <a:r>
+              <a:rPr lang="en-US" dirty="0" err="1" smtClean="0">
+                <a:latin typeface="Arial" charset="0"/>
+              </a:rPr>
+              <a:t>Developer.android.com</a:t>
+            </a:r>
+            <a:endParaRPr lang="en-US" dirty="0" smtClean="0">
+              <a:latin typeface="Arial" charset="0"/>
+            </a:endParaRPr>
+          </a:p>
+          <a:p>
+            <a:r>
+              <a:rPr lang="en-US" dirty="0" err="1" smtClean="0">
+                <a:latin typeface="Arial" charset="0"/>
+              </a:rPr>
+              <a:t>StackOverflow</a:t>
+            </a:r>
+            <a:endParaRPr lang="en-US" dirty="0" smtClean="0">
+              <a:latin typeface="Arial" charset="0"/>
+            </a:endParaRPr>
+          </a:p>
+          <a:p>
+            <a:r>
+              <a:rPr lang="en-US" dirty="0" err="1" smtClean="0">
+                <a:latin typeface="Arial" charset="0"/>
+              </a:rPr>
+              <a:t>OpenIntents.org</a:t>
+            </a:r>
+            <a:endParaRPr lang="en-US" dirty="0">
+              <a:latin typeface="Arial" charset="0"/>
+            </a:endParaRPr>
+          </a:p>
+        </p:txBody>
+      </p:sp>
+    </p:spTree>
+  </p:cSld>
+  <p:clrMapOvr>
+    <a:masterClrMapping/>
+  </p:clrMapOvr>
+  <p:transition xmlns:p14="http://schemas.microsoft.com/office/powerpoint/2010/main">
+    <p:wipe/>
+  </p:transition>
+  <p:timing>
+    <p:tnLst>
+      <p:par>
+        <p:cTn xmlns:p14="http://schemas.microsoft.com/office/powerpoint/2010/main" id="1" dur="indefinite" restart="never" nodeType="tmRoot"/>
+      </p:par>
+    </p:tnLst>
+  </p:timing>
+</p:sld>
+</file>
+
+<file path=ppt/slides/slide24.xml><?xml version="1.0" encoding="utf-8"?>
+<p:sld xmlns:a="http://schemas.openxmlformats.org/drawingml/2006/main" xmlns:r="http://schemas.openxmlformats.org/officeDocument/2006/relationships" xmlns:p="http://schemas.openxmlformats.org/presentationml/2006/main">
+  <p:cSld>
+    <p:spTree>
+      <p:nvGrpSpPr>
+        <p:cNvPr id="1" name=""/>
+        <p:cNvGrpSpPr/>
+        <p:nvPr/>
+      </p:nvGrpSpPr>
+      <p:grpSpPr>
+        <a:xfrm>
+          <a:off x="0" y="0"/>
+          <a:ext cx="0" cy="0"/>
+          <a:chOff x="0" y="0"/>
+          <a:chExt cx="0" cy="0"/>
+        </a:xfrm>
+      </p:grpSpPr>
+      <p:sp>
+        <p:nvSpPr>
+          <p:cNvPr id="24577" name="Title 1"/>
+          <p:cNvSpPr>
+            <a:spLocks noGrp="1"/>
+          </p:cNvSpPr>
+          <p:nvPr>
+            <p:ph type="title"/>
+          </p:nvPr>
+        </p:nvSpPr>
+        <p:spPr/>
+        <p:txBody>
+          <a:bodyPr/>
+          <a:lstStyle/>
+          <a:p>
+            <a:r>
+              <a:rPr lang="en-US" dirty="0" smtClean="0">
+                <a:latin typeface="Arial" charset="0"/>
+              </a:rPr>
+              <a:t>Where to go next</a:t>
+            </a:r>
+            <a:endParaRPr lang="en-US" dirty="0">
+              <a:latin typeface="Arial" charset="0"/>
+            </a:endParaRPr>
+          </a:p>
+        </p:txBody>
+      </p:sp>
+      <p:sp>
+        <p:nvSpPr>
+          <p:cNvPr id="24578" name="Content Placeholder 2"/>
+          <p:cNvSpPr>
+            <a:spLocks noGrp="1"/>
+          </p:cNvSpPr>
+          <p:nvPr>
+            <p:ph idx="1"/>
+          </p:nvPr>
+        </p:nvSpPr>
+        <p:spPr/>
+        <p:txBody>
+          <a:bodyPr/>
+          <a:lstStyle/>
+          <a:p>
+            <a:pPr>
+              <a:spcBef>
+                <a:spcPts val="1200"/>
+              </a:spcBef>
+              <a:spcAft>
+                <a:spcPts val="1200"/>
+              </a:spcAft>
+            </a:pPr>
+            <a:r>
+              <a:rPr lang="en-US" sz="3200" dirty="0" smtClean="0">
+                <a:latin typeface="Arial" charset="0"/>
+              </a:rPr>
+              <a:t>Transmit sample application:</a:t>
+            </a:r>
+          </a:p>
+          <a:p>
+            <a:pPr lvl="1">
+              <a:spcBef>
+                <a:spcPts val="1200"/>
+              </a:spcBef>
+              <a:spcAft>
+                <a:spcPts val="1200"/>
+              </a:spcAft>
+            </a:pPr>
+            <a:r>
+              <a:rPr lang="en-US" sz="2600" dirty="0" smtClean="0">
+                <a:latin typeface="Arial" charset="0"/>
+                <a:hlinkClick r:id="rId3"/>
+              </a:rPr>
+              <a:t>https://github.com/jessitron/Transmit</a:t>
+            </a:r>
+            <a:endParaRPr lang="en-US" sz="2600" dirty="0" smtClean="0">
+              <a:latin typeface="Arial" charset="0"/>
+            </a:endParaRPr>
+          </a:p>
+          <a:p>
+            <a:pPr lvl="1">
+              <a:spcBef>
+                <a:spcPts val="1200"/>
+              </a:spcBef>
+              <a:spcAft>
+                <a:spcPts val="1200"/>
+              </a:spcAft>
+            </a:pPr>
+            <a:r>
+              <a:rPr lang="en-US" sz="2600" dirty="0" smtClean="0">
+                <a:latin typeface="Arial" charset="0"/>
+              </a:rPr>
+              <a:t>Download it, install it on your device</a:t>
+            </a:r>
+          </a:p>
+          <a:p>
+            <a:pPr lvl="1">
+              <a:spcBef>
+                <a:spcPts val="1200"/>
+              </a:spcBef>
+              <a:spcAft>
+                <a:spcPts val="1200"/>
+              </a:spcAft>
+            </a:pPr>
+            <a:r>
+              <a:rPr lang="en-US" sz="2600" dirty="0" smtClean="0">
+                <a:latin typeface="Arial" charset="0"/>
+              </a:rPr>
+              <a:t>Take over the world</a:t>
+            </a:r>
+            <a:endParaRPr lang="en-US" sz="2600" dirty="0">
+              <a:latin typeface="Arial" charset="0"/>
+            </a:endParaRPr>
+          </a:p>
+          <a:p>
+            <a:pPr>
+              <a:buFontTx/>
+              <a:buNone/>
+            </a:pPr>
+            <a:endParaRPr lang="en-US" dirty="0">
+              <a:latin typeface="Arial" charset="0"/>
+            </a:endParaRPr>
+          </a:p>
+        </p:txBody>
+      </p:sp>
+    </p:spTree>
+  </p:cSld>
+  <p:clrMapOvr>
+    <a:masterClrMapping/>
+  </p:clrMapOvr>
+  <p:transition xmlns:p14="http://schemas.microsoft.com/office/powerpoint/2010/main">
+    <p:wipe/>
+  </p:transition>
+  <p:timing>
+    <p:tnLst>
+      <p:par>
+        <p:cTn xmlns:p14="http://schemas.microsoft.com/office/powerpoint/2010/main" id="1" dur="indefinite" restart="never" nodeType="tmRoot"/>
+      </p:par>
+    </p:tnLst>
+  </p:timing>
+</p:sld>
+</file>
+
+<file path=ppt/slides/slide25.xml><?xml version="1.0" encoding="utf-8"?>
+<p:sld xmlns:a="http://schemas.openxmlformats.org/drawingml/2006/main" xmlns:r="http://schemas.openxmlformats.org/officeDocument/2006/relationships" xmlns:p="http://schemas.openxmlformats.org/presentationml/2006/main" show="0">
+  <p:cSld>
+    <p:spTree>
+      <p:nvGrpSpPr>
+        <p:cNvPr id="1" name=""/>
+        <p:cNvGrpSpPr/>
+        <p:nvPr/>
+      </p:nvGrpSpPr>
+      <p:grpSpPr>
+        <a:xfrm>
+          <a:off x="0" y="0"/>
+          <a:ext cx="0" cy="0"/>
+          <a:chOff x="0" y="0"/>
+          <a:chExt cx="0" cy="0"/>
+        </a:xfrm>
+      </p:grpSpPr>
+      <p:sp>
+        <p:nvSpPr>
+          <p:cNvPr id="26625" name="Title 1"/>
+          <p:cNvSpPr>
+            <a:spLocks noGrp="1"/>
+          </p:cNvSpPr>
+          <p:nvPr>
+            <p:ph type="title"/>
+          </p:nvPr>
+        </p:nvSpPr>
+        <p:spPr/>
+        <p:txBody>
+          <a:bodyPr/>
+          <a:lstStyle/>
+          <a:p>
+            <a:r>
+              <a:rPr lang="en-US">
+                <a:latin typeface="Arial" charset="0"/>
+              </a:rPr>
+              <a:t>Don't forget</a:t>
+            </a:r>
+          </a:p>
+        </p:txBody>
+      </p:sp>
+      <p:sp>
+        <p:nvSpPr>
+          <p:cNvPr id="26626" name="Content Placeholder 2"/>
+          <p:cNvSpPr>
+            <a:spLocks noGrp="1"/>
+          </p:cNvSpPr>
+          <p:nvPr>
+            <p:ph idx="1"/>
+          </p:nvPr>
+        </p:nvSpPr>
+        <p:spPr/>
+        <p:txBody>
+          <a:bodyPr/>
+          <a:lstStyle/>
+          <a:p>
+            <a:r>
+              <a:rPr lang="en-US" dirty="0">
+                <a:latin typeface="Arial" charset="0"/>
+              </a:rPr>
+              <a:t>Replace "presentation title" with my title wherever it </a:t>
+            </a:r>
+            <a:r>
+              <a:rPr lang="en-US" dirty="0" smtClean="0">
+                <a:latin typeface="Arial" charset="0"/>
+              </a:rPr>
+              <a:t>appears</a:t>
+            </a:r>
+          </a:p>
+          <a:p>
+            <a:r>
+              <a:rPr lang="en-US" dirty="0" smtClean="0">
+                <a:latin typeface="Arial" charset="0"/>
+              </a:rPr>
+              <a:t>App: try to duplicate crash when I hit “pick contact” but then exit, then try to go back.</a:t>
+            </a:r>
+          </a:p>
+          <a:p>
+            <a:r>
+              <a:rPr lang="en-US" dirty="0" smtClean="0">
+                <a:latin typeface="Arial" charset="0"/>
+              </a:rPr>
+              <a:t>What does it mean to set an app as a default? How does that stick, and what else does it affect?</a:t>
+            </a:r>
+          </a:p>
+          <a:p>
+            <a:r>
+              <a:rPr lang="en-US" dirty="0" smtClean="0">
+                <a:latin typeface="Arial" charset="0"/>
+              </a:rPr>
+              <a:t>Use  ACTION_PICK_ACTIVITY to let them choose what the button will do</a:t>
+            </a:r>
+            <a:endParaRPr lang="en-US" dirty="0">
+              <a:latin typeface="Arial" charset="0"/>
+            </a:endParaRPr>
+          </a:p>
+          <a:p>
+            <a:endParaRPr lang="en-US" dirty="0">
+              <a:latin typeface="Arial" charset="0"/>
+            </a:endParaRPr>
+          </a:p>
+        </p:txBody>
+      </p:sp>
+    </p:spTree>
+  </p:cSld>
+  <p:clrMapOvr>
+    <a:masterClrMapping/>
+  </p:clrMapOvr>
+  <p:transition xmlns:p14="http://schemas.microsoft.com/office/powerpoint/2010/main">
+    <p:wipe/>
+  </p:transition>
+  <p:timing>
+    <p:tnLst>
+      <p:par>
+        <p:cTn xmlns:p14="http://schemas.microsoft.com/office/powerpoint/2010/main" id="1" dur="indefinite" restart="never" nodeType="tmRoot"/>
+      </p:par>
+    </p:tnLst>
+  </p:timing>
+</p:sld>
+</file>
+
+<file path=ppt/slides/slide26.xml><?xml version="1.0" encoding="utf-8"?>
 <p:sld xmlns:a="http://schemas.openxmlformats.org/drawingml/2006/main" xmlns:r="http://schemas.openxmlformats.org/officeDocument/2006/relationships" xmlns:p="http://schemas.openxmlformats.org/presentationml/2006/main">
   <p:cSld>
     <p:spTree>
@@ -7276,7 +8239,7 @@
 </p:sld>
 </file>
 
-<file path=ppt/slides/slide24.xml><?xml version="1.0" encoding="utf-8"?>
+<file path=ppt/slides/slide27.xml><?xml version="1.0" encoding="utf-8"?>
 <p:sld xmlns:a="http://schemas.openxmlformats.org/drawingml/2006/main" xmlns:r="http://schemas.openxmlformats.org/officeDocument/2006/relationships" xmlns:p="http://schemas.openxmlformats.org/presentationml/2006/main">
   <p:cSld>
     <p:spTree>
@@ -7336,16 +8299,19 @@
               <a:rPr lang="en-US" dirty="0">
                 <a:latin typeface="Arial" charset="0"/>
               </a:rPr>
-              <a:t>Create your own intents that fire</a:t>
-            </a:r>
-          </a:p>
-          <a:p>
-            <a:pPr lvl="1"/>
+              <a:t>Create your own </a:t>
+            </a:r>
+            <a:r>
+              <a:rPr lang="en-US" dirty="0" smtClean="0">
+                <a:latin typeface="Arial" charset="0"/>
+              </a:rPr>
+              <a:t>activities </a:t>
+            </a:r>
             <a:r>
               <a:rPr lang="en-US" dirty="0">
                 <a:latin typeface="Arial" charset="0"/>
               </a:rPr>
-              <a:t>When the device approaches a specific geographic location</a:t>
+              <a:t>that fire</a:t>
             </a:r>
           </a:p>
           <a:p>
@@ -7354,7 +8320,7 @@
               <a:rPr lang="en-US" dirty="0">
                 <a:latin typeface="Arial" charset="0"/>
               </a:rPr>
-              <a:t>When the device turns on and off</a:t>
+              <a:t>When the device approaches a specific geographic location</a:t>
             </a:r>
           </a:p>
           <a:p>
@@ -7363,6 +8329,15 @@
               <a:rPr lang="en-US" dirty="0">
                 <a:latin typeface="Arial" charset="0"/>
               </a:rPr>
+              <a:t>When the device turns on and off</a:t>
+            </a:r>
+          </a:p>
+          <a:p>
+            <a:pPr lvl="1"/>
+            <a:r>
+              <a:rPr lang="en-US" dirty="0">
+                <a:latin typeface="Arial" charset="0"/>
+              </a:rPr>
               <a:t>When the battery gets </a:t>
             </a:r>
             <a:r>
@@ -7380,285 +8355,6 @@
               </a:rPr>
               <a:t>To open a link to your own website</a:t>
             </a:r>
-            <a:endParaRPr lang="en-US" dirty="0">
-              <a:latin typeface="Arial" charset="0"/>
-            </a:endParaRPr>
-          </a:p>
-        </p:txBody>
-      </p:sp>
-    </p:spTree>
-  </p:cSld>
-  <p:clrMapOvr>
-    <a:masterClrMapping/>
-  </p:clrMapOvr>
-  <p:transition xmlns:p14="http://schemas.microsoft.com/office/powerpoint/2010/main">
-    <p:wipe/>
-  </p:transition>
-  <p:timing>
-    <p:tnLst>
-      <p:par>
-        <p:cTn xmlns:p14="http://schemas.microsoft.com/office/powerpoint/2010/main" id="1" dur="indefinite" restart="never" nodeType="tmRoot"/>
-      </p:par>
-    </p:tnLst>
-  </p:timing>
-</p:sld>
-</file>
-
-<file path=ppt/slides/slide25.xml><?xml version="1.0" encoding="utf-8"?>
-<p:sld xmlns:a="http://schemas.openxmlformats.org/drawingml/2006/main" xmlns:r="http://schemas.openxmlformats.org/officeDocument/2006/relationships" xmlns:p="http://schemas.openxmlformats.org/presentationml/2006/main">
-  <p:cSld>
-    <p:spTree>
-      <p:nvGrpSpPr>
-        <p:cNvPr id="1" name=""/>
-        <p:cNvGrpSpPr/>
-        <p:nvPr/>
-      </p:nvGrpSpPr>
-      <p:grpSpPr>
-        <a:xfrm>
-          <a:off x="0" y="0"/>
-          <a:ext cx="0" cy="0"/>
-          <a:chOff x="0" y="0"/>
-          <a:chExt cx="0" cy="0"/>
-        </a:xfrm>
-      </p:grpSpPr>
-      <p:sp>
-        <p:nvSpPr>
-          <p:cNvPr id="24577" name="Title 1"/>
-          <p:cNvSpPr>
-            <a:spLocks noGrp="1"/>
-          </p:cNvSpPr>
-          <p:nvPr>
-            <p:ph type="title"/>
-          </p:nvPr>
-        </p:nvSpPr>
-        <p:spPr/>
-        <p:txBody>
-          <a:bodyPr/>
-          <a:lstStyle/>
-          <a:p>
-            <a:r>
-              <a:rPr lang="en-US" dirty="0" smtClean="0">
-                <a:latin typeface="Arial" charset="0"/>
-              </a:rPr>
-              <a:t>Where to go next</a:t>
-            </a:r>
-            <a:endParaRPr lang="en-US" dirty="0">
-              <a:latin typeface="Arial" charset="0"/>
-            </a:endParaRPr>
-          </a:p>
-        </p:txBody>
-      </p:sp>
-      <p:sp>
-        <p:nvSpPr>
-          <p:cNvPr id="24578" name="Content Placeholder 2"/>
-          <p:cNvSpPr>
-            <a:spLocks noGrp="1"/>
-          </p:cNvSpPr>
-          <p:nvPr>
-            <p:ph idx="1"/>
-          </p:nvPr>
-        </p:nvSpPr>
-        <p:spPr/>
-        <p:txBody>
-          <a:bodyPr/>
-          <a:lstStyle/>
-          <a:p>
-            <a:pPr>
-              <a:spcBef>
-                <a:spcPts val="1200"/>
-              </a:spcBef>
-              <a:spcAft>
-                <a:spcPts val="1200"/>
-              </a:spcAft>
-            </a:pPr>
-            <a:r>
-              <a:rPr lang="en-US" sz="3200" dirty="0" smtClean="0">
-                <a:latin typeface="Arial" charset="0"/>
-              </a:rPr>
-              <a:t>Transmit sample application:</a:t>
-            </a:r>
-          </a:p>
-          <a:p>
-            <a:pPr lvl="1">
-              <a:spcBef>
-                <a:spcPts val="1200"/>
-              </a:spcBef>
-              <a:spcAft>
-                <a:spcPts val="1200"/>
-              </a:spcAft>
-            </a:pPr>
-            <a:r>
-              <a:rPr lang="en-US" sz="2600" dirty="0" smtClean="0">
-                <a:latin typeface="Arial" charset="0"/>
-                <a:hlinkClick r:id="rId2"/>
-              </a:rPr>
-              <a:t>https://github.com/jessitron/Transmit</a:t>
-            </a:r>
-            <a:endParaRPr lang="en-US" sz="2600" dirty="0" smtClean="0">
-              <a:latin typeface="Arial" charset="0"/>
-            </a:endParaRPr>
-          </a:p>
-          <a:p>
-            <a:pPr lvl="1">
-              <a:spcBef>
-                <a:spcPts val="1200"/>
-              </a:spcBef>
-              <a:spcAft>
-                <a:spcPts val="1200"/>
-              </a:spcAft>
-            </a:pPr>
-            <a:r>
-              <a:rPr lang="en-US" sz="2600" dirty="0" smtClean="0">
-                <a:latin typeface="Arial" charset="0"/>
-              </a:rPr>
-              <a:t>Download it, install it on your device</a:t>
-            </a:r>
-          </a:p>
-          <a:p>
-            <a:pPr lvl="1">
-              <a:spcBef>
-                <a:spcPts val="1200"/>
-              </a:spcBef>
-              <a:spcAft>
-                <a:spcPts val="1200"/>
-              </a:spcAft>
-            </a:pPr>
-            <a:r>
-              <a:rPr lang="en-US" sz="2600" dirty="0" smtClean="0">
-                <a:latin typeface="Arial" charset="0"/>
-              </a:rPr>
-              <a:t>Take over the world</a:t>
-            </a:r>
-            <a:endParaRPr lang="en-US" sz="2600" dirty="0">
-              <a:latin typeface="Arial" charset="0"/>
-            </a:endParaRPr>
-          </a:p>
-          <a:p>
-            <a:pPr>
-              <a:buFontTx/>
-              <a:buNone/>
-            </a:pPr>
-            <a:endParaRPr lang="en-US" dirty="0">
-              <a:latin typeface="Arial" charset="0"/>
-            </a:endParaRPr>
-          </a:p>
-        </p:txBody>
-      </p:sp>
-    </p:spTree>
-  </p:cSld>
-  <p:clrMapOvr>
-    <a:masterClrMapping/>
-  </p:clrMapOvr>
-  <p:transition xmlns:p14="http://schemas.microsoft.com/office/powerpoint/2010/main">
-    <p:wipe/>
-  </p:transition>
-  <p:timing>
-    <p:tnLst>
-      <p:par>
-        <p:cTn xmlns:p14="http://schemas.microsoft.com/office/powerpoint/2010/main" id="1" dur="indefinite" restart="never" nodeType="tmRoot"/>
-      </p:par>
-    </p:tnLst>
-  </p:timing>
-</p:sld>
-</file>
-
-<file path=ppt/slides/slide26.xml><?xml version="1.0" encoding="utf-8"?>
-<p:sld xmlns:a="http://schemas.openxmlformats.org/drawingml/2006/main" xmlns:r="http://schemas.openxmlformats.org/officeDocument/2006/relationships" xmlns:p="http://schemas.openxmlformats.org/presentationml/2006/main" show="0">
-  <p:cSld>
-    <p:spTree>
-      <p:nvGrpSpPr>
-        <p:cNvPr id="1" name=""/>
-        <p:cNvGrpSpPr/>
-        <p:nvPr/>
-      </p:nvGrpSpPr>
-      <p:grpSpPr>
-        <a:xfrm>
-          <a:off x="0" y="0"/>
-          <a:ext cx="0" cy="0"/>
-          <a:chOff x="0" y="0"/>
-          <a:chExt cx="0" cy="0"/>
-        </a:xfrm>
-      </p:grpSpPr>
-      <p:sp>
-        <p:nvSpPr>
-          <p:cNvPr id="26625" name="Title 1"/>
-          <p:cNvSpPr>
-            <a:spLocks noGrp="1"/>
-          </p:cNvSpPr>
-          <p:nvPr>
-            <p:ph type="title"/>
-          </p:nvPr>
-        </p:nvSpPr>
-        <p:spPr/>
-        <p:txBody>
-          <a:bodyPr/>
-          <a:lstStyle/>
-          <a:p>
-            <a:r>
-              <a:rPr lang="en-US">
-                <a:latin typeface="Arial" charset="0"/>
-              </a:rPr>
-              <a:t>Don't forget</a:t>
-            </a:r>
-          </a:p>
-        </p:txBody>
-      </p:sp>
-      <p:sp>
-        <p:nvSpPr>
-          <p:cNvPr id="26626" name="Content Placeholder 2"/>
-          <p:cNvSpPr>
-            <a:spLocks noGrp="1"/>
-          </p:cNvSpPr>
-          <p:nvPr>
-            <p:ph idx="1"/>
-          </p:nvPr>
-        </p:nvSpPr>
-        <p:spPr/>
-        <p:txBody>
-          <a:bodyPr/>
-          <a:lstStyle/>
-          <a:p>
-            <a:r>
-              <a:rPr lang="en-US" dirty="0">
-                <a:latin typeface="Arial" charset="0"/>
-              </a:rPr>
-              <a:t>Replace "presentation title" with my title wherever it </a:t>
-            </a:r>
-            <a:r>
-              <a:rPr lang="en-US" dirty="0" smtClean="0">
-                <a:latin typeface="Arial" charset="0"/>
-              </a:rPr>
-              <a:t>appears</a:t>
-            </a:r>
-          </a:p>
-          <a:p>
-            <a:r>
-              <a:rPr lang="en-US" dirty="0" smtClean="0">
-                <a:latin typeface="Arial" charset="0"/>
-              </a:rPr>
-              <a:t>App: try to duplicate crash when I hit “pick contact” but then exit, then try to go back.</a:t>
-            </a:r>
-          </a:p>
-          <a:p>
-            <a:r>
-              <a:rPr lang="en-US" dirty="0" smtClean="0">
-                <a:latin typeface="Arial" charset="0"/>
-              </a:rPr>
-              <a:t>What does it mean to set an app as a default? How does that stick, and what else does it affect?</a:t>
-            </a:r>
-          </a:p>
-          <a:p>
-            <a:r>
-              <a:rPr lang="en-US" dirty="0" smtClean="0">
-                <a:latin typeface="Arial" charset="0"/>
-              </a:rPr>
-              <a:t>Use  ACTION_PICK_ACTIVITY to let them choose what the button will do</a:t>
-            </a:r>
-            <a:endParaRPr lang="en-US" dirty="0">
-              <a:latin typeface="Arial" charset="0"/>
-            </a:endParaRPr>
-          </a:p>
-          <a:p>
             <a:endParaRPr lang="en-US" dirty="0">
               <a:latin typeface="Arial" charset="0"/>
             </a:endParaRPr>
@@ -7684,6 +8380,71 @@
 </file>
 
 <file path=ppt/slides/slide3.xml><?xml version="1.0" encoding="utf-8"?>
+<p:sld xmlns:a="http://schemas.openxmlformats.org/drawingml/2006/main" xmlns:r="http://schemas.openxmlformats.org/officeDocument/2006/relationships" xmlns:p="http://schemas.openxmlformats.org/presentationml/2006/main">
+  <p:cSld>
+    <p:spTree>
+      <p:nvGrpSpPr>
+        <p:cNvPr id="1" name=""/>
+        <p:cNvGrpSpPr/>
+        <p:nvPr/>
+      </p:nvGrpSpPr>
+      <p:grpSpPr>
+        <a:xfrm>
+          <a:off x="0" y="0"/>
+          <a:ext cx="0" cy="0"/>
+          <a:chOff x="0" y="0"/>
+          <a:chExt cx="0" cy="0"/>
+        </a:xfrm>
+      </p:grpSpPr>
+      <p:pic>
+        <p:nvPicPr>
+          <p:cNvPr id="2" name="Picture 1" descr="2012-05-13_14-30-12.jpg"/>
+          <p:cNvPicPr>
+            <a:picLocks noChangeAspect="1"/>
+          </p:cNvPicPr>
+          <p:nvPr/>
+        </p:nvPicPr>
+        <p:blipFill>
+          <a:blip r:embed="rId2">
+            <a:extLst>
+              <a:ext uri="{28A0092B-C50C-407E-A947-70E740481C1C}">
+                <a14:useLocalDpi xmlns:a14="http://schemas.microsoft.com/office/drawing/2010/main" val="0"/>
+              </a:ext>
+            </a:extLst>
+          </a:blip>
+          <a:stretch>
+            <a:fillRect/>
+          </a:stretch>
+        </p:blipFill>
+        <p:spPr>
+          <a:xfrm>
+            <a:off x="3429000" y="990600"/>
+            <a:ext cx="2837388" cy="5007155"/>
+          </a:xfrm>
+          <a:prstGeom prst="rect">
+            <a:avLst/>
+          </a:prstGeom>
+        </p:spPr>
+      </p:pic>
+    </p:spTree>
+  </p:cSld>
+  <p:clrMapOvr>
+    <a:masterClrMapping/>
+  </p:clrMapOvr>
+  <p:transition xmlns:p14="http://schemas.microsoft.com/office/powerpoint/2010/main">
+    <p:wipe/>
+  </p:transition>
+  <p:timing>
+    <p:tnLst>
+      <p:par>
+        <p:cTn xmlns:p14="http://schemas.microsoft.com/office/powerpoint/2010/main" id="1" dur="indefinite" restart="never" nodeType="tmRoot"/>
+      </p:par>
+    </p:tnLst>
+  </p:timing>
+</p:sld>
+</file>
+
+<file path=ppt/slides/slide4.xml><?xml version="1.0" encoding="utf-8"?>
 <p:sld xmlns:a="http://schemas.openxmlformats.org/drawingml/2006/main" xmlns:r="http://schemas.openxmlformats.org/officeDocument/2006/relationships" xmlns:p="http://schemas.openxmlformats.org/presentationml/2006/main">
   <p:cSld>
     <p:spTree>
@@ -9184,7 +9945,7 @@
 </p:sld>
 </file>
 
-<file path=ppt/slides/slide4.xml><?xml version="1.0" encoding="utf-8"?>
+<file path=ppt/slides/slide5.xml><?xml version="1.0" encoding="utf-8"?>
 <p:sld xmlns:a="http://schemas.openxmlformats.org/drawingml/2006/main" xmlns:r="http://schemas.openxmlformats.org/officeDocument/2006/relationships" xmlns:p="http://schemas.openxmlformats.org/presentationml/2006/main">
   <p:cSld>
     <p:spTree>
@@ -9339,7 +10100,7 @@
 </p:sld>
 </file>
 
-<file path=ppt/slides/slide5.xml><?xml version="1.0" encoding="utf-8"?>
+<file path=ppt/slides/slide6.xml><?xml version="1.0" encoding="utf-8"?>
 <p:sld xmlns:a="http://schemas.openxmlformats.org/drawingml/2006/main" xmlns:r="http://schemas.openxmlformats.org/officeDocument/2006/relationships" xmlns:p="http://schemas.openxmlformats.org/presentationml/2006/main">
   <p:cSld>
     <p:spTree>
@@ -9748,7 +10509,7 @@
 </p:sld>
 </file>
 
-<file path=ppt/slides/slide6.xml><?xml version="1.0" encoding="utf-8"?>
+<file path=ppt/slides/slide7.xml><?xml version="1.0" encoding="utf-8"?>
 <p:sld xmlns:a="http://schemas.openxmlformats.org/drawingml/2006/main" xmlns:r="http://schemas.openxmlformats.org/officeDocument/2006/relationships" xmlns:p="http://schemas.openxmlformats.org/presentationml/2006/main">
   <p:cSld>
     <p:spTree>
@@ -9875,7 +10636,7 @@
 </p:sld>
 </file>
 
-<file path=ppt/slides/slide7.xml><?xml version="1.0" encoding="utf-8"?>
+<file path=ppt/slides/slide8.xml><?xml version="1.0" encoding="utf-8"?>
 <p:sld xmlns:a="http://schemas.openxmlformats.org/drawingml/2006/main" xmlns:r="http://schemas.openxmlformats.org/officeDocument/2006/relationships" xmlns:p="http://schemas.openxmlformats.org/presentationml/2006/main">
   <p:cSld>
     <p:spTree>
@@ -10062,7 +10823,7 @@
 </p:sld>
 </file>
 
-<file path=ppt/slides/slide8.xml><?xml version="1.0" encoding="utf-8"?>
+<file path=ppt/slides/slide9.xml><?xml version="1.0" encoding="utf-8"?>
 <p:sld xmlns:a="http://schemas.openxmlformats.org/drawingml/2006/main" xmlns:r="http://schemas.openxmlformats.org/officeDocument/2006/relationships" xmlns:p="http://schemas.openxmlformats.org/presentationml/2006/main">
   <p:cSld>
     <p:spTree>
@@ -10081,7 +10842,7 @@
       </p:grpSpPr>
       <p:sp>
         <p:nvSpPr>
-          <p:cNvPr id="8193" name="Title 1"/>
+          <p:cNvPr id="2" name="Title 1"/>
           <p:cNvSpPr>
             <a:spLocks noGrp="1"/>
           </p:cNvSpPr>
@@ -10095,326 +10856,79 @@
           <a:lstStyle/>
           <a:p>
             <a:r>
-              <a:rPr lang="en-US">
-                <a:latin typeface="Arial" charset="0"/>
-              </a:rPr>
-              <a:t>Intent Filters</a:t>
-            </a:r>
+              <a:rPr lang="en-US" dirty="0" smtClean="0"/>
+              <a:t>Data</a:t>
+            </a:r>
+            <a:endParaRPr lang="en-US" dirty="0"/>
           </a:p>
         </p:txBody>
       </p:sp>
       <p:sp>
         <p:nvSpPr>
-          <p:cNvPr id="2" name="Manual Operation 1"/>
-          <p:cNvSpPr/>
-          <p:nvPr/>
+          <p:cNvPr id="3" name="Content Placeholder 2"/>
+          <p:cNvSpPr>
+            <a:spLocks noGrp="1"/>
+          </p:cNvSpPr>
+          <p:nvPr>
+            <p:ph idx="1"/>
+          </p:nvPr>
         </p:nvSpPr>
-        <p:spPr>
-          <a:xfrm>
-            <a:off x="1676400" y="1524000"/>
-            <a:ext cx="5486400" cy="612775"/>
-          </a:xfrm>
-          <a:prstGeom prst="flowChartManualOperation">
-            <a:avLst/>
-          </a:prstGeom>
-          <a:solidFill>
-            <a:srgbClr val="FFFFFF"/>
-          </a:solidFill>
-        </p:spPr>
-        <p:style>
-          <a:lnRef idx="1">
-            <a:schemeClr val="accent1"/>
-          </a:lnRef>
-          <a:fillRef idx="3">
-            <a:schemeClr val="accent1"/>
-          </a:fillRef>
-          <a:effectRef idx="2">
-            <a:schemeClr val="accent1"/>
-          </a:effectRef>
-          <a:fontRef idx="minor">
-            <a:schemeClr val="lt1"/>
-          </a:fontRef>
-        </p:style>
+        <p:spPr/>
         <p:txBody>
-          <a:bodyPr anchor="ctr"/>
+          <a:bodyPr/>
           <a:lstStyle/>
           <a:p>
-            <a:pPr algn="ctr">
-              <a:defRPr/>
-            </a:pPr>
-            <a:r>
-              <a:rPr lang="en-US" dirty="0">
-                <a:solidFill>
-                  <a:srgbClr val="000000"/>
-                </a:solidFill>
-              </a:rPr>
-              <a:t>Target type</a:t>
-            </a:r>
-          </a:p>
-        </p:txBody>
-      </p:sp>
-      <p:sp>
-        <p:nvSpPr>
-          <p:cNvPr id="5" name="Manual Operation 4"/>
-          <p:cNvSpPr/>
-          <p:nvPr/>
-        </p:nvSpPr>
-        <p:spPr>
-          <a:xfrm>
-            <a:off x="2209800" y="2514600"/>
-            <a:ext cx="4191000" cy="612775"/>
-          </a:xfrm>
-          <a:prstGeom prst="flowChartManualOperation">
-            <a:avLst/>
-          </a:prstGeom>
-          <a:solidFill>
-            <a:srgbClr val="FFFFFF"/>
-          </a:solidFill>
-        </p:spPr>
-        <p:style>
-          <a:lnRef idx="1">
-            <a:schemeClr val="accent1"/>
-          </a:lnRef>
-          <a:fillRef idx="3">
-            <a:schemeClr val="accent1"/>
-          </a:fillRef>
-          <a:effectRef idx="2">
-            <a:schemeClr val="accent1"/>
-          </a:effectRef>
-          <a:fontRef idx="minor">
-            <a:schemeClr val="lt1"/>
-          </a:fontRef>
-        </p:style>
-        <p:txBody>
-          <a:bodyPr anchor="ctr"/>
-          <a:lstStyle/>
-          <a:p>
-            <a:pPr algn="ctr">
-              <a:defRPr/>
-            </a:pPr>
-            <a:r>
-              <a:rPr lang="en-US" dirty="0">
-                <a:solidFill>
-                  <a:srgbClr val="000000"/>
-                </a:solidFill>
-              </a:rPr>
-              <a:t>Action</a:t>
-            </a:r>
-          </a:p>
-        </p:txBody>
-      </p:sp>
-      <p:sp>
-        <p:nvSpPr>
-          <p:cNvPr id="6" name="Manual Operation 5"/>
-          <p:cNvSpPr/>
-          <p:nvPr/>
-        </p:nvSpPr>
-        <p:spPr>
-          <a:xfrm>
-            <a:off x="2590800" y="3429000"/>
-            <a:ext cx="3200400" cy="612775"/>
-          </a:xfrm>
-          <a:prstGeom prst="flowChartManualOperation">
-            <a:avLst/>
-          </a:prstGeom>
-          <a:solidFill>
-            <a:srgbClr val="FFFFFF"/>
-          </a:solidFill>
-        </p:spPr>
-        <p:style>
-          <a:lnRef idx="1">
-            <a:schemeClr val="accent1"/>
-          </a:lnRef>
-          <a:fillRef idx="3">
-            <a:schemeClr val="accent1"/>
-          </a:fillRef>
-          <a:effectRef idx="2">
-            <a:schemeClr val="accent1"/>
-          </a:effectRef>
-          <a:fontRef idx="minor">
-            <a:schemeClr val="lt1"/>
-          </a:fontRef>
-        </p:style>
-        <p:txBody>
-          <a:bodyPr anchor="ctr"/>
-          <a:lstStyle/>
-          <a:p>
-            <a:pPr algn="ctr">
-              <a:defRPr/>
-            </a:pPr>
-            <a:r>
-              <a:rPr lang="en-US" dirty="0">
-                <a:solidFill>
-                  <a:srgbClr val="000000"/>
-                </a:solidFill>
-              </a:rPr>
-              <a:t>Categories</a:t>
-            </a:r>
-          </a:p>
-        </p:txBody>
-      </p:sp>
-      <p:sp>
-        <p:nvSpPr>
-          <p:cNvPr id="7" name="Manual Operation 6"/>
-          <p:cNvSpPr/>
-          <p:nvPr/>
-        </p:nvSpPr>
-        <p:spPr>
-          <a:xfrm>
-            <a:off x="3429000" y="4419600"/>
-            <a:ext cx="1600200" cy="612775"/>
-          </a:xfrm>
-          <a:prstGeom prst="flowChartManualOperation">
-            <a:avLst/>
-          </a:prstGeom>
-          <a:solidFill>
-            <a:srgbClr val="FFFFFF"/>
-          </a:solidFill>
-        </p:spPr>
-        <p:style>
-          <a:lnRef idx="1">
-            <a:schemeClr val="accent1"/>
-          </a:lnRef>
-          <a:fillRef idx="3">
-            <a:schemeClr val="accent1"/>
-          </a:fillRef>
-          <a:effectRef idx="2">
-            <a:schemeClr val="accent1"/>
-          </a:effectRef>
-          <a:fontRef idx="minor">
-            <a:schemeClr val="lt1"/>
-          </a:fontRef>
-        </p:style>
-        <p:txBody>
-          <a:bodyPr anchor="ctr"/>
-          <a:lstStyle/>
-          <a:p>
-            <a:pPr algn="ctr">
-              <a:defRPr/>
-            </a:pPr>
-            <a:r>
-              <a:rPr lang="en-US" dirty="0">
-                <a:solidFill>
-                  <a:srgbClr val="000000"/>
-                </a:solidFill>
-              </a:rPr>
-              <a:t>Data</a:t>
-            </a:r>
-          </a:p>
-        </p:txBody>
-      </p:sp>
-      <p:sp>
-        <p:nvSpPr>
-          <p:cNvPr id="4" name="Cloud 3"/>
-          <p:cNvSpPr/>
-          <p:nvPr/>
-        </p:nvSpPr>
-        <p:spPr>
-          <a:xfrm>
-            <a:off x="2514600" y="5410200"/>
-            <a:ext cx="3276600" cy="381000"/>
-          </a:xfrm>
-          <a:prstGeom prst="cloud">
-            <a:avLst/>
-          </a:prstGeom>
-          <a:solidFill>
-            <a:schemeClr val="accent6">
-              <a:lumMod val="60000"/>
-              <a:lumOff val="40000"/>
-            </a:schemeClr>
-          </a:solidFill>
-        </p:spPr>
-        <p:style>
-          <a:lnRef idx="1">
-            <a:schemeClr val="accent1"/>
-          </a:lnRef>
-          <a:fillRef idx="3">
-            <a:schemeClr val="accent1"/>
-          </a:fillRef>
-          <a:effectRef idx="2">
-            <a:schemeClr val="accent1"/>
-          </a:effectRef>
-          <a:fontRef idx="minor">
-            <a:schemeClr val="lt1"/>
-          </a:fontRef>
-        </p:style>
-        <p:txBody>
-          <a:bodyPr anchor="ctr"/>
-          <a:lstStyle/>
-          <a:p>
-            <a:pPr algn="ctr">
-              <a:defRPr/>
-            </a:pPr>
-            <a:endParaRPr lang="en-US"/>
+            <a:r>
+              <a:rPr lang="en-US" dirty="0" smtClean="0"/>
+              <a:t>Type</a:t>
+            </a:r>
+          </a:p>
+          <a:p>
+            <a:endParaRPr lang="en-US" dirty="0" smtClean="0"/>
+          </a:p>
+          <a:p>
+            <a:r>
+              <a:rPr lang="en-US" dirty="0" smtClean="0"/>
+              <a:t>Uri:</a:t>
+            </a:r>
+          </a:p>
+          <a:p>
+            <a:pPr lvl="1"/>
+            <a:r>
+              <a:rPr lang="en-US" dirty="0" smtClean="0"/>
+              <a:t>Scheme</a:t>
+            </a:r>
+          </a:p>
+          <a:p>
+            <a:pPr lvl="1"/>
+            <a:r>
+              <a:rPr lang="en-US" dirty="0" smtClean="0"/>
+              <a:t>Host</a:t>
+            </a:r>
+          </a:p>
+          <a:p>
+            <a:pPr lvl="1"/>
+            <a:r>
+              <a:rPr lang="en-US" dirty="0" smtClean="0"/>
+              <a:t>Port</a:t>
+            </a:r>
+          </a:p>
+          <a:p>
+            <a:pPr lvl="1"/>
+            <a:r>
+              <a:rPr lang="en-US" dirty="0" smtClean="0"/>
+              <a:t>Path or Path Pattern</a:t>
+            </a:r>
+            <a:endParaRPr lang="en-US" dirty="0"/>
           </a:p>
         </p:txBody>
       </p:sp>
     </p:spTree>
-  </p:cSld>
-  <p:clrMapOvr>
-    <a:masterClrMapping/>
-  </p:clrMapOvr>
-  <p:transition xmlns:p14="http://schemas.microsoft.com/office/powerpoint/2010/main">
-    <p:wipe/>
-  </p:transition>
-  <p:timing>
-    <p:tnLst>
-      <p:par>
-        <p:cTn xmlns:p14="http://schemas.microsoft.com/office/powerpoint/2010/main" id="1" dur="indefinite" restart="never" nodeType="tmRoot"/>
-      </p:par>
-    </p:tnLst>
-  </p:timing>
-</p:sld>
-</file>
-
-<file path=ppt/slides/slide9.xml><?xml version="1.0" encoding="utf-8"?>
-<p:sld xmlns:a="http://schemas.openxmlformats.org/drawingml/2006/main" xmlns:r="http://schemas.openxmlformats.org/officeDocument/2006/relationships" xmlns:p="http://schemas.openxmlformats.org/presentationml/2006/main">
-  <p:cSld>
-    <p:spTree>
-      <p:nvGrpSpPr>
-        <p:cNvPr id="1" name=""/>
-        <p:cNvGrpSpPr/>
-        <p:nvPr/>
-      </p:nvGrpSpPr>
-      <p:grpSpPr>
-        <a:xfrm>
-          <a:off x="0" y="0"/>
-          <a:ext cx="0" cy="0"/>
-          <a:chOff x="0" y="0"/>
-          <a:chExt cx="0" cy="0"/>
-        </a:xfrm>
-      </p:grpSpPr>
-      <p:pic>
-        <p:nvPicPr>
-          <p:cNvPr id="2" name="Picture 1" descr="2012-05-13_14-30-12.jpg"/>
-          <p:cNvPicPr>
-            <a:picLocks noChangeAspect="1"/>
-          </p:cNvPicPr>
-          <p:nvPr/>
-        </p:nvPicPr>
-        <p:blipFill>
-          <a:blip r:embed="rId2">
-            <a:extLst>
-              <a:ext uri="{28A0092B-C50C-407E-A947-70E740481C1C}">
-                <a14:useLocalDpi xmlns:a14="http://schemas.microsoft.com/office/drawing/2010/main" val="0"/>
-              </a:ext>
-            </a:extLst>
-          </a:blip>
-          <a:stretch>
-            <a:fillRect/>
-          </a:stretch>
-        </p:blipFill>
-        <p:spPr>
-          <a:xfrm>
-            <a:off x="3429000" y="990600"/>
-            <a:ext cx="2837388" cy="5007155"/>
-          </a:xfrm>
-          <a:prstGeom prst="rect">
-            <a:avLst/>
-          </a:prstGeom>
-        </p:spPr>
-      </p:pic>
-    </p:spTree>
+    <p:extLst>
+      <p:ext uri="{BB962C8B-B14F-4D97-AF65-F5344CB8AC3E}">
+        <p14:creationId xmlns:p14="http://schemas.microsoft.com/office/powerpoint/2010/main" val="348255597"/>
+      </p:ext>
+    </p:extLst>
   </p:cSld>
   <p:clrMapOvr>
     <a:masterClrMapping/>

</xml_diff>

<commit_message>
Rename package to tronsmit
</commit_message>
<xml_diff>
--- a/presentations/DevTeach-Intents.pptx
+++ b/presentations/DevTeach-Intents.pptx
@@ -5,7 +5,7 @@
     <p:sldMasterId id="2147483648" r:id="rId1"/>
   </p:sldMasterIdLst>
   <p:notesMasterIdLst>
-    <p:notesMasterId r:id="rId29"/>
+    <p:notesMasterId r:id="rId30"/>
   </p:notesMasterIdLst>
   <p:sldIdLst>
     <p:sldId id="256" r:id="rId2"/>
@@ -27,14 +27,15 @@
     <p:sldId id="273" r:id="rId18"/>
     <p:sldId id="274" r:id="rId19"/>
     <p:sldId id="288" r:id="rId20"/>
-    <p:sldId id="275" r:id="rId21"/>
-    <p:sldId id="276" r:id="rId22"/>
-    <p:sldId id="277" r:id="rId23"/>
-    <p:sldId id="279" r:id="rId24"/>
-    <p:sldId id="260" r:id="rId25"/>
-    <p:sldId id="262" r:id="rId26"/>
-    <p:sldId id="258" r:id="rId27"/>
-    <p:sldId id="266" r:id="rId28"/>
+    <p:sldId id="290" r:id="rId21"/>
+    <p:sldId id="275" r:id="rId22"/>
+    <p:sldId id="276" r:id="rId23"/>
+    <p:sldId id="277" r:id="rId24"/>
+    <p:sldId id="279" r:id="rId25"/>
+    <p:sldId id="260" r:id="rId26"/>
+    <p:sldId id="262" r:id="rId27"/>
+    <p:sldId id="258" r:id="rId28"/>
+    <p:sldId id="266" r:id="rId29"/>
   </p:sldIdLst>
   <p:sldSz cx="9144000" cy="6858000" type="screen4x3"/>
   <p:notesSz cx="6858000" cy="9144000"/>
@@ -266,7 +267,7 @@
               <a:pPr>
                 <a:defRPr/>
               </a:pPr>
-              <a:t>5/24/12</a:t>
+              <a:t>5/26/12</a:t>
             </a:fld>
             <a:endParaRPr lang="en-US"/>
           </a:p>
@@ -601,6 +602,104 @@
       </p:grpSpPr>
       <p:sp>
         <p:nvSpPr>
+          <p:cNvPr id="2" name="Slide Image Placeholder 1"/>
+          <p:cNvSpPr>
+            <a:spLocks noGrp="1" noRot="1" noChangeAspect="1"/>
+          </p:cNvSpPr>
+          <p:nvPr>
+            <p:ph type="sldImg"/>
+          </p:nvPr>
+        </p:nvSpPr>
+        <p:spPr/>
+      </p:sp>
+      <p:sp>
+        <p:nvSpPr>
+          <p:cNvPr id="3" name="Notes Placeholder 2"/>
+          <p:cNvSpPr>
+            <a:spLocks noGrp="1"/>
+          </p:cNvSpPr>
+          <p:nvPr>
+            <p:ph type="body" idx="1"/>
+          </p:nvPr>
+        </p:nvSpPr>
+        <p:spPr/>
+        <p:txBody>
+          <a:bodyPr/>
+          <a:lstStyle/>
+          <a:p>
+            <a:r>
+              <a:rPr lang="en-US" dirty="0" smtClean="0"/>
+              <a:t>Add a screenshot,</a:t>
+            </a:r>
+            <a:r>
+              <a:rPr lang="en-US" baseline="0" dirty="0" smtClean="0"/>
+              <a:t> later.</a:t>
+            </a:r>
+            <a:endParaRPr lang="en-US" dirty="0" smtClean="0"/>
+          </a:p>
+        </p:txBody>
+      </p:sp>
+      <p:sp>
+        <p:nvSpPr>
+          <p:cNvPr id="4" name="Slide Number Placeholder 3"/>
+          <p:cNvSpPr>
+            <a:spLocks noGrp="1"/>
+          </p:cNvSpPr>
+          <p:nvPr>
+            <p:ph type="sldNum" sz="quarter" idx="10"/>
+          </p:nvPr>
+        </p:nvSpPr>
+        <p:spPr/>
+        <p:txBody>
+          <a:bodyPr/>
+          <a:lstStyle/>
+          <a:p>
+            <a:pPr>
+              <a:defRPr/>
+            </a:pPr>
+            <a:fld id="{CB9BF63C-773E-D442-A2EE-87077B6B8852}" type="slidenum">
+              <a:rPr lang="en-US" smtClean="0"/>
+              <a:pPr>
+                <a:defRPr/>
+              </a:pPr>
+              <a:t>3</a:t>
+            </a:fld>
+            <a:endParaRPr lang="en-US"/>
+          </a:p>
+        </p:txBody>
+      </p:sp>
+    </p:spTree>
+    <p:extLst>
+      <p:ext uri="{BB962C8B-B14F-4D97-AF65-F5344CB8AC3E}">
+        <p14:creationId xmlns:p14="http://schemas.microsoft.com/office/powerpoint/2010/main" val="432385330"/>
+      </p:ext>
+    </p:extLst>
+  </p:cSld>
+  <p:clrMapOvr>
+    <a:masterClrMapping/>
+  </p:clrMapOvr>
+</p:notes>
+</file>
+
+<file path=ppt/notesSlides/notesSlide2.xml><?xml version="1.0" encoding="utf-8"?>
+<p:notes xmlns:a="http://schemas.openxmlformats.org/drawingml/2006/main" xmlns:r="http://schemas.openxmlformats.org/officeDocument/2006/relationships" xmlns:p="http://schemas.openxmlformats.org/presentationml/2006/main">
+  <p:cSld>
+    <p:spTree>
+      <p:nvGrpSpPr>
+        <p:cNvPr id="1" name=""/>
+        <p:cNvGrpSpPr/>
+        <p:nvPr/>
+      </p:nvGrpSpPr>
+      <p:grpSpPr>
+        <a:xfrm>
+          <a:off x="0" y="0"/>
+          <a:ext cx="0" cy="0"/>
+          <a:chOff x="0" y="0"/>
+          <a:chExt cx="0" cy="0"/>
+        </a:xfrm>
+      </p:grpSpPr>
+      <p:sp>
+        <p:nvSpPr>
           <p:cNvPr id="9217" name="Slide Image Placeholder 1"/>
           <p:cNvSpPr>
             <a:spLocks noGrp="1" noRot="1" noChangeAspect="1" noTextEdit="1"/>
@@ -858,7 +957,7 @@
 </p:notes>
 </file>
 
-<file path=ppt/notesSlides/notesSlide2.xml><?xml version="1.0" encoding="utf-8"?>
+<file path=ppt/notesSlides/notesSlide3.xml><?xml version="1.0" encoding="utf-8"?>
 <p:notes xmlns:a="http://schemas.openxmlformats.org/drawingml/2006/main" xmlns:r="http://schemas.openxmlformats.org/officeDocument/2006/relationships" xmlns:p="http://schemas.openxmlformats.org/presentationml/2006/main">
   <p:cSld>
     <p:spTree>
@@ -1132,7 +1231,7 @@
 </p:notes>
 </file>
 
-<file path=ppt/notesSlides/notesSlide3.xml><?xml version="1.0" encoding="utf-8"?>
+<file path=ppt/notesSlides/notesSlide4.xml><?xml version="1.0" encoding="utf-8"?>
 <p:notes xmlns:a="http://schemas.openxmlformats.org/drawingml/2006/main" xmlns:r="http://schemas.openxmlformats.org/officeDocument/2006/relationships" xmlns:p="http://schemas.openxmlformats.org/presentationml/2006/main">
   <p:cSld>
     <p:spTree>
@@ -1443,108 +1542,6 @@
 </p:notes>
 </file>
 
-<file path=ppt/notesSlides/notesSlide4.xml><?xml version="1.0" encoding="utf-8"?>
-<p:notes xmlns:a="http://schemas.openxmlformats.org/drawingml/2006/main" xmlns:r="http://schemas.openxmlformats.org/officeDocument/2006/relationships" xmlns:p="http://schemas.openxmlformats.org/presentationml/2006/main">
-  <p:cSld>
-    <p:spTree>
-      <p:nvGrpSpPr>
-        <p:cNvPr id="1" name=""/>
-        <p:cNvGrpSpPr/>
-        <p:nvPr/>
-      </p:nvGrpSpPr>
-      <p:grpSpPr>
-        <a:xfrm>
-          <a:off x="0" y="0"/>
-          <a:ext cx="0" cy="0"/>
-          <a:chOff x="0" y="0"/>
-          <a:chExt cx="0" cy="0"/>
-        </a:xfrm>
-      </p:grpSpPr>
-      <p:sp>
-        <p:nvSpPr>
-          <p:cNvPr id="2" name="Slide Image Placeholder 1"/>
-          <p:cNvSpPr>
-            <a:spLocks noGrp="1" noRot="1" noChangeAspect="1"/>
-          </p:cNvSpPr>
-          <p:nvPr>
-            <p:ph type="sldImg"/>
-          </p:nvPr>
-        </p:nvSpPr>
-        <p:spPr/>
-      </p:sp>
-      <p:sp>
-        <p:nvSpPr>
-          <p:cNvPr id="3" name="Notes Placeholder 2"/>
-          <p:cNvSpPr>
-            <a:spLocks noGrp="1"/>
-          </p:cNvSpPr>
-          <p:nvPr>
-            <p:ph type="body" idx="1"/>
-          </p:nvPr>
-        </p:nvSpPr>
-        <p:spPr/>
-        <p:txBody>
-          <a:bodyPr/>
-          <a:lstStyle/>
-          <a:p>
-            <a:endParaRPr lang="en-US"/>
-          </a:p>
-          <a:p>
-            <a:r>
-              <a:rPr lang="en-US"/>
-              <a:t>----- Meeting Notes (5/24/12 20:08) -----</a:t>
-            </a:r>
-          </a:p>
-          <a:p>
-            <a:r>
-              <a:rPr lang="en-US"/>
-              <a:t>what comes back in the data here? it is the location, or a small version of the image?</a:t>
-            </a:r>
-          </a:p>
-        </p:txBody>
-      </p:sp>
-      <p:sp>
-        <p:nvSpPr>
-          <p:cNvPr id="4" name="Slide Number Placeholder 3"/>
-          <p:cNvSpPr>
-            <a:spLocks noGrp="1"/>
-          </p:cNvSpPr>
-          <p:nvPr>
-            <p:ph type="sldNum" sz="quarter" idx="10"/>
-          </p:nvPr>
-        </p:nvSpPr>
-        <p:spPr/>
-        <p:txBody>
-          <a:bodyPr/>
-          <a:lstStyle/>
-          <a:p>
-            <a:pPr>
-              <a:defRPr/>
-            </a:pPr>
-            <a:fld id="{CB9BF63C-773E-D442-A2EE-87077B6B8852}" type="slidenum">
-              <a:rPr lang="en-US" smtClean="0"/>
-              <a:pPr>
-                <a:defRPr/>
-              </a:pPr>
-              <a:t>17</a:t>
-            </a:fld>
-            <a:endParaRPr lang="en-US"/>
-          </a:p>
-        </p:txBody>
-      </p:sp>
-    </p:spTree>
-    <p:extLst>
-      <p:ext uri="{BB962C8B-B14F-4D97-AF65-F5344CB8AC3E}">
-        <p14:creationId xmlns:p14="http://schemas.microsoft.com/office/powerpoint/2010/main" val="3758064968"/>
-      </p:ext>
-    </p:extLst>
-  </p:cSld>
-  <p:clrMapOvr>
-    <a:masterClrMapping/>
-  </p:clrMapOvr>
-</p:notes>
-</file>
-
 <file path=ppt/notesSlides/notesSlide5.xml><?xml version="1.0" encoding="utf-8"?>
 <p:notes xmlns:a="http://schemas.openxmlformats.org/drawingml/2006/main" xmlns:r="http://schemas.openxmlformats.org/officeDocument/2006/relationships" xmlns:p="http://schemas.openxmlformats.org/presentationml/2006/main">
   <p:cSld>
@@ -1600,34 +1597,7 @@
           <a:p>
             <a:r>
               <a:rPr lang="en-US"/>
-              <a:t>get a mouse clicker that will go into my usb port next to my phone</a:t>
-            </a:r>
-          </a:p>
-          <a:p>
-            <a:endParaRPr lang="en-US"/>
-          </a:p>
-          <a:p>
-            <a:r>
-              <a:rPr lang="en-US"/>
-              <a:t>make a new repo called Tronsmit</a:t>
-            </a:r>
-          </a:p>
-          <a:p>
-            <a:endParaRPr lang="en-US"/>
-          </a:p>
-          <a:p>
-            <a:r>
-              <a:rPr lang="en-US"/>
-              <a:t>fix the log button</a:t>
-            </a:r>
-          </a:p>
-          <a:p>
-            <a:endParaRPr lang="en-US"/>
-          </a:p>
-          <a:p>
-            <a:r>
-              <a:rPr lang="en-US"/>
-              <a:t>what is the difference between an application and a package?</a:t>
+              <a:t>what comes back in the data here? it is the location, or a small version of the image?</a:t>
             </a:r>
           </a:p>
         </p:txBody>
@@ -1655,7 +1625,136 @@
               <a:pPr>
                 <a:defRPr/>
               </a:pPr>
-              <a:t>24</a:t>
+              <a:t>17</a:t>
+            </a:fld>
+            <a:endParaRPr lang="en-US"/>
+          </a:p>
+        </p:txBody>
+      </p:sp>
+    </p:spTree>
+    <p:extLst>
+      <p:ext uri="{BB962C8B-B14F-4D97-AF65-F5344CB8AC3E}">
+        <p14:creationId xmlns:p14="http://schemas.microsoft.com/office/powerpoint/2010/main" val="3758064968"/>
+      </p:ext>
+    </p:extLst>
+  </p:cSld>
+  <p:clrMapOvr>
+    <a:masterClrMapping/>
+  </p:clrMapOvr>
+</p:notes>
+</file>
+
+<file path=ppt/notesSlides/notesSlide6.xml><?xml version="1.0" encoding="utf-8"?>
+<p:notes xmlns:a="http://schemas.openxmlformats.org/drawingml/2006/main" xmlns:r="http://schemas.openxmlformats.org/officeDocument/2006/relationships" xmlns:p="http://schemas.openxmlformats.org/presentationml/2006/main">
+  <p:cSld>
+    <p:spTree>
+      <p:nvGrpSpPr>
+        <p:cNvPr id="1" name=""/>
+        <p:cNvGrpSpPr/>
+        <p:nvPr/>
+      </p:nvGrpSpPr>
+      <p:grpSpPr>
+        <a:xfrm>
+          <a:off x="0" y="0"/>
+          <a:ext cx="0" cy="0"/>
+          <a:chOff x="0" y="0"/>
+          <a:chExt cx="0" cy="0"/>
+        </a:xfrm>
+      </p:grpSpPr>
+      <p:sp>
+        <p:nvSpPr>
+          <p:cNvPr id="2" name="Slide Image Placeholder 1"/>
+          <p:cNvSpPr>
+            <a:spLocks noGrp="1" noRot="1" noChangeAspect="1"/>
+          </p:cNvSpPr>
+          <p:nvPr>
+            <p:ph type="sldImg"/>
+          </p:nvPr>
+        </p:nvSpPr>
+        <p:spPr/>
+      </p:sp>
+      <p:sp>
+        <p:nvSpPr>
+          <p:cNvPr id="3" name="Notes Placeholder 2"/>
+          <p:cNvSpPr>
+            <a:spLocks noGrp="1"/>
+          </p:cNvSpPr>
+          <p:nvPr>
+            <p:ph type="body" idx="1"/>
+          </p:nvPr>
+        </p:nvSpPr>
+        <p:spPr/>
+        <p:txBody>
+          <a:bodyPr/>
+          <a:lstStyle/>
+          <a:p>
+            <a:endParaRPr lang="en-US"/>
+          </a:p>
+          <a:p>
+            <a:r>
+              <a:rPr lang="en-US"/>
+              <a:t>----- Meeting Notes (5/24/12 20:08) -----</a:t>
+            </a:r>
+          </a:p>
+          <a:p>
+            <a:r>
+              <a:rPr lang="en-US"/>
+              <a:t>get a mouse clicker that will go into my usb port next to my phone</a:t>
+            </a:r>
+          </a:p>
+          <a:p>
+            <a:endParaRPr lang="en-US"/>
+          </a:p>
+          <a:p>
+            <a:r>
+              <a:rPr lang="en-US"/>
+              <a:t>make a new repo called Tronsmit</a:t>
+            </a:r>
+          </a:p>
+          <a:p>
+            <a:endParaRPr lang="en-US"/>
+          </a:p>
+          <a:p>
+            <a:r>
+              <a:rPr lang="en-US"/>
+              <a:t>fix the log button</a:t>
+            </a:r>
+          </a:p>
+          <a:p>
+            <a:endParaRPr lang="en-US"/>
+          </a:p>
+          <a:p>
+            <a:r>
+              <a:rPr lang="en-US"/>
+              <a:t>what is the difference between an application and a package?</a:t>
+            </a:r>
+          </a:p>
+        </p:txBody>
+      </p:sp>
+      <p:sp>
+        <p:nvSpPr>
+          <p:cNvPr id="4" name="Slide Number Placeholder 3"/>
+          <p:cNvSpPr>
+            <a:spLocks noGrp="1"/>
+          </p:cNvSpPr>
+          <p:nvPr>
+            <p:ph type="sldNum" sz="quarter" idx="10"/>
+          </p:nvPr>
+        </p:nvSpPr>
+        <p:spPr/>
+        <p:txBody>
+          <a:bodyPr/>
+          <a:lstStyle/>
+          <a:p>
+            <a:pPr>
+              <a:defRPr/>
+            </a:pPr>
+            <a:fld id="{CB9BF63C-773E-D442-A2EE-87077B6B8852}" type="slidenum">
+              <a:rPr lang="en-US" smtClean="0"/>
+              <a:pPr>
+                <a:defRPr/>
+              </a:pPr>
+              <a:t>25</a:t>
             </a:fld>
             <a:endParaRPr lang="en-US"/>
           </a:p>
@@ -7009,11 +7108,7 @@
             <a:pPr lvl="1"/>
             <a:r>
               <a:rPr lang="en-US" dirty="0" smtClean="0"/>
-              <a:t>Don’t have duplicates of this activity in </a:t>
-            </a:r>
-            <a:r>
-              <a:rPr lang="en-US" smtClean="0"/>
-              <a:t>the stack</a:t>
+              <a:t>Don’t have duplicates of this activity in the stack</a:t>
             </a:r>
             <a:endParaRPr lang="en-US" dirty="0"/>
           </a:p>
@@ -7201,6 +7296,415 @@
       </p:grpSpPr>
       <p:sp>
         <p:nvSpPr>
+          <p:cNvPr id="2" name="Title 1"/>
+          <p:cNvSpPr>
+            <a:spLocks noGrp="1"/>
+          </p:cNvSpPr>
+          <p:nvPr>
+            <p:ph type="title"/>
+          </p:nvPr>
+        </p:nvSpPr>
+        <p:spPr/>
+        <p:txBody>
+          <a:bodyPr/>
+          <a:lstStyle/>
+          <a:p>
+            <a:r>
+              <a:rPr lang="en-US" dirty="0" smtClean="0"/>
+              <a:t>Tasks and activities</a:t>
+            </a:r>
+            <a:endParaRPr lang="en-US" dirty="0"/>
+          </a:p>
+        </p:txBody>
+      </p:sp>
+      <p:sp>
+        <p:nvSpPr>
+          <p:cNvPr id="4" name="Rounded Rectangle 3"/>
+          <p:cNvSpPr/>
+          <p:nvPr/>
+        </p:nvSpPr>
+        <p:spPr>
+          <a:xfrm>
+            <a:off x="2438400" y="1524000"/>
+            <a:ext cx="2895600" cy="2057400"/>
+          </a:xfrm>
+          <a:prstGeom prst="roundRect">
+            <a:avLst/>
+          </a:prstGeom>
+        </p:spPr>
+        <p:style>
+          <a:lnRef idx="3">
+            <a:schemeClr val="lt1"/>
+          </a:lnRef>
+          <a:fillRef idx="1">
+            <a:schemeClr val="accent6"/>
+          </a:fillRef>
+          <a:effectRef idx="1">
+            <a:schemeClr val="accent6"/>
+          </a:effectRef>
+          <a:fontRef idx="minor">
+            <a:schemeClr val="lt1"/>
+          </a:fontRef>
+        </p:style>
+        <p:txBody>
+          <a:bodyPr rtlCol="0" anchor="t"/>
+          <a:lstStyle/>
+          <a:p>
+            <a:r>
+              <a:rPr lang="en-US" dirty="0" err="1" smtClean="0"/>
+              <a:t>myapp</a:t>
+            </a:r>
+            <a:endParaRPr lang="en-US" dirty="0"/>
+          </a:p>
+        </p:txBody>
+      </p:sp>
+      <p:sp>
+        <p:nvSpPr>
+          <p:cNvPr id="5" name="Rectangle 4"/>
+          <p:cNvSpPr/>
+          <p:nvPr/>
+        </p:nvSpPr>
+        <p:spPr>
+          <a:xfrm>
+            <a:off x="2819400" y="2209800"/>
+            <a:ext cx="1066800" cy="762000"/>
+          </a:xfrm>
+          <a:prstGeom prst="rect">
+            <a:avLst/>
+          </a:prstGeom>
+        </p:spPr>
+        <p:style>
+          <a:lnRef idx="1">
+            <a:schemeClr val="accent2"/>
+          </a:lnRef>
+          <a:fillRef idx="2">
+            <a:schemeClr val="accent2"/>
+          </a:fillRef>
+          <a:effectRef idx="1">
+            <a:schemeClr val="accent2"/>
+          </a:effectRef>
+          <a:fontRef idx="minor">
+            <a:schemeClr val="dk1"/>
+          </a:fontRef>
+        </p:style>
+        <p:txBody>
+          <a:bodyPr rtlCol="0" anchor="ctr"/>
+          <a:lstStyle/>
+          <a:p>
+            <a:pPr algn="ctr"/>
+            <a:r>
+              <a:rPr lang="en-US" dirty="0" smtClean="0"/>
+              <a:t>MAIN</a:t>
+            </a:r>
+            <a:endParaRPr lang="en-US" dirty="0"/>
+          </a:p>
+        </p:txBody>
+      </p:sp>
+      <p:sp>
+        <p:nvSpPr>
+          <p:cNvPr id="6" name="Rectangle 5"/>
+          <p:cNvSpPr/>
+          <p:nvPr/>
+        </p:nvSpPr>
+        <p:spPr>
+          <a:xfrm>
+            <a:off x="4191000" y="2209800"/>
+            <a:ext cx="822960" cy="762000"/>
+          </a:xfrm>
+          <a:prstGeom prst="rect">
+            <a:avLst/>
+          </a:prstGeom>
+          <a:ln/>
+        </p:spPr>
+        <p:style>
+          <a:lnRef idx="1">
+            <a:schemeClr val="accent2"/>
+          </a:lnRef>
+          <a:fillRef idx="2">
+            <a:schemeClr val="accent2"/>
+          </a:fillRef>
+          <a:effectRef idx="1">
+            <a:schemeClr val="accent2"/>
+          </a:effectRef>
+          <a:fontRef idx="minor">
+            <a:schemeClr val="dk1"/>
+          </a:fontRef>
+        </p:style>
+        <p:txBody>
+          <a:bodyPr/>
+          <a:lstStyle/>
+          <a:p>
+            <a:endParaRPr lang="en-US"/>
+          </a:p>
+        </p:txBody>
+      </p:sp>
+      <p:sp>
+        <p:nvSpPr>
+          <p:cNvPr id="7" name="Rounded Rectangle 6"/>
+          <p:cNvSpPr/>
+          <p:nvPr/>
+        </p:nvSpPr>
+        <p:spPr>
+          <a:xfrm>
+            <a:off x="2514600" y="3886200"/>
+            <a:ext cx="1512724" cy="2057399"/>
+          </a:xfrm>
+          <a:prstGeom prst="roundRect">
+            <a:avLst/>
+          </a:prstGeom>
+          <a:ln/>
+        </p:spPr>
+        <p:style>
+          <a:lnRef idx="3">
+            <a:schemeClr val="lt1"/>
+          </a:lnRef>
+          <a:fillRef idx="1">
+            <a:schemeClr val="accent6"/>
+          </a:fillRef>
+          <a:effectRef idx="1">
+            <a:schemeClr val="accent6"/>
+          </a:effectRef>
+          <a:fontRef idx="minor">
+            <a:schemeClr val="lt1"/>
+          </a:fontRef>
+        </p:style>
+        <p:txBody>
+          <a:bodyPr/>
+          <a:lstStyle/>
+          <a:p>
+            <a:r>
+              <a:rPr lang="en-US" dirty="0" err="1" smtClean="0"/>
+              <a:t>gmail</a:t>
+            </a:r>
+            <a:endParaRPr lang="en-US" dirty="0"/>
+          </a:p>
+        </p:txBody>
+      </p:sp>
+      <p:sp>
+        <p:nvSpPr>
+          <p:cNvPr id="8" name="Rectangle 7"/>
+          <p:cNvSpPr/>
+          <p:nvPr/>
+        </p:nvSpPr>
+        <p:spPr>
+          <a:xfrm>
+            <a:off x="2743200" y="4724400"/>
+            <a:ext cx="822960" cy="822960"/>
+          </a:xfrm>
+          <a:prstGeom prst="rect">
+            <a:avLst/>
+          </a:prstGeom>
+          <a:ln/>
+        </p:spPr>
+        <p:style>
+          <a:lnRef idx="1">
+            <a:schemeClr val="accent2"/>
+          </a:lnRef>
+          <a:fillRef idx="2">
+            <a:schemeClr val="accent2"/>
+          </a:fillRef>
+          <a:effectRef idx="1">
+            <a:schemeClr val="accent2"/>
+          </a:effectRef>
+          <a:fontRef idx="minor">
+            <a:schemeClr val="dk1"/>
+          </a:fontRef>
+        </p:style>
+        <p:txBody>
+          <a:bodyPr/>
+          <a:lstStyle/>
+          <a:p>
+            <a:endParaRPr lang="en-US"/>
+          </a:p>
+        </p:txBody>
+      </p:sp>
+      <p:cxnSp>
+        <p:nvCxnSpPr>
+          <p:cNvPr id="10" name="Straight Arrow Connector 9"/>
+          <p:cNvCxnSpPr>
+            <a:endCxn id="6" idx="1"/>
+          </p:cNvCxnSpPr>
+          <p:nvPr/>
+        </p:nvCxnSpPr>
+        <p:spPr>
+          <a:xfrm>
+            <a:off x="3886200" y="2590800"/>
+            <a:ext cx="304800" cy="0"/>
+          </a:xfrm>
+          <a:prstGeom prst="straightConnector1">
+            <a:avLst/>
+          </a:prstGeom>
+          <a:ln>
+            <a:tailEnd type="arrow"/>
+          </a:ln>
+        </p:spPr>
+        <p:style>
+          <a:lnRef idx="3">
+            <a:schemeClr val="accent2"/>
+          </a:lnRef>
+          <a:fillRef idx="0">
+            <a:schemeClr val="accent2"/>
+          </a:fillRef>
+          <a:effectRef idx="2">
+            <a:schemeClr val="accent2"/>
+          </a:effectRef>
+          <a:fontRef idx="minor">
+            <a:schemeClr val="tx1"/>
+          </a:fontRef>
+        </p:style>
+      </p:cxnSp>
+      <p:cxnSp>
+        <p:nvCxnSpPr>
+          <p:cNvPr id="11" name="Straight Arrow Connector 10"/>
+          <p:cNvCxnSpPr>
+            <a:stCxn id="6" idx="3"/>
+            <a:endCxn id="8" idx="0"/>
+          </p:cNvCxnSpPr>
+          <p:nvPr/>
+        </p:nvCxnSpPr>
+        <p:spPr>
+          <a:xfrm flipH="1">
+            <a:off x="3154680" y="2590800"/>
+            <a:ext cx="1859280" cy="2133600"/>
+          </a:xfrm>
+          <a:prstGeom prst="straightConnector1">
+            <a:avLst/>
+          </a:prstGeom>
+          <a:ln>
+            <a:tailEnd type="arrow"/>
+          </a:ln>
+        </p:spPr>
+        <p:style>
+          <a:lnRef idx="3">
+            <a:schemeClr val="accent2"/>
+          </a:lnRef>
+          <a:fillRef idx="0">
+            <a:schemeClr val="accent2"/>
+          </a:fillRef>
+          <a:effectRef idx="2">
+            <a:schemeClr val="accent2"/>
+          </a:effectRef>
+          <a:fontRef idx="minor">
+            <a:schemeClr val="tx1"/>
+          </a:fontRef>
+        </p:style>
+      </p:cxnSp>
+      <p:sp>
+        <p:nvSpPr>
+          <p:cNvPr id="14" name="Pentagon 13"/>
+          <p:cNvSpPr/>
+          <p:nvPr/>
+        </p:nvSpPr>
+        <p:spPr>
+          <a:xfrm rot="5400000">
+            <a:off x="914400" y="3429000"/>
+            <a:ext cx="822960" cy="822960"/>
+          </a:xfrm>
+          <a:prstGeom prst="homePlate">
+            <a:avLst/>
+          </a:prstGeom>
+          <a:ln/>
+        </p:spPr>
+        <p:style>
+          <a:lnRef idx="1">
+            <a:schemeClr val="dk1"/>
+          </a:lnRef>
+          <a:fillRef idx="3">
+            <a:schemeClr val="dk1"/>
+          </a:fillRef>
+          <a:effectRef idx="2">
+            <a:schemeClr val="dk1"/>
+          </a:effectRef>
+          <a:fontRef idx="minor">
+            <a:schemeClr val="lt1"/>
+          </a:fontRef>
+        </p:style>
+        <p:txBody>
+          <a:bodyPr/>
+          <a:lstStyle/>
+          <a:p>
+            <a:endParaRPr lang="en-US" dirty="0"/>
+          </a:p>
+        </p:txBody>
+      </p:sp>
+      <p:cxnSp>
+        <p:nvCxnSpPr>
+          <p:cNvPr id="15" name="Straight Arrow Connector 14"/>
+          <p:cNvCxnSpPr>
+            <a:stCxn id="14" idx="0"/>
+            <a:endCxn id="5" idx="1"/>
+          </p:cNvCxnSpPr>
+          <p:nvPr/>
+        </p:nvCxnSpPr>
+        <p:spPr>
+          <a:xfrm flipV="1">
+            <a:off x="1737360" y="2590800"/>
+            <a:ext cx="1082040" cy="1043940"/>
+          </a:xfrm>
+          <a:prstGeom prst="straightConnector1">
+            <a:avLst/>
+          </a:prstGeom>
+          <a:ln>
+            <a:tailEnd type="arrow"/>
+          </a:ln>
+        </p:spPr>
+        <p:style>
+          <a:lnRef idx="3">
+            <a:schemeClr val="accent2"/>
+          </a:lnRef>
+          <a:fillRef idx="0">
+            <a:schemeClr val="accent2"/>
+          </a:fillRef>
+          <a:effectRef idx="2">
+            <a:schemeClr val="accent2"/>
+          </a:effectRef>
+          <a:fontRef idx="minor">
+            <a:schemeClr val="tx1"/>
+          </a:fontRef>
+        </p:style>
+      </p:cxnSp>
+    </p:spTree>
+    <p:extLst>
+      <p:ext uri="{BB962C8B-B14F-4D97-AF65-F5344CB8AC3E}">
+        <p14:creationId xmlns:p14="http://schemas.microsoft.com/office/powerpoint/2010/main" val="2532804178"/>
+      </p:ext>
+    </p:extLst>
+  </p:cSld>
+  <p:clrMapOvr>
+    <a:masterClrMapping/>
+  </p:clrMapOvr>
+  <p:transition xmlns:p14="http://schemas.microsoft.com/office/powerpoint/2010/main">
+    <p:wipe/>
+  </p:transition>
+  <p:timing>
+    <p:tnLst>
+      <p:par>
+        <p:cTn xmlns:p14="http://schemas.microsoft.com/office/powerpoint/2010/main" id="1" dur="indefinite" restart="never" nodeType="tmRoot"/>
+      </p:par>
+    </p:tnLst>
+  </p:timing>
+</p:sld>
+</file>
+
+<file path=ppt/slides/slide21.xml><?xml version="1.0" encoding="utf-8"?>
+<p:sld xmlns:a="http://schemas.openxmlformats.org/drawingml/2006/main" xmlns:r="http://schemas.openxmlformats.org/officeDocument/2006/relationships" xmlns:p="http://schemas.openxmlformats.org/presentationml/2006/main">
+  <p:cSld>
+    <p:spTree>
+      <p:nvGrpSpPr>
+        <p:cNvPr id="1" name=""/>
+        <p:cNvGrpSpPr/>
+        <p:nvPr/>
+      </p:nvGrpSpPr>
+      <p:grpSpPr>
+        <a:xfrm>
+          <a:off x="0" y="0"/>
+          <a:ext cx="0" cy="0"/>
+          <a:chOff x="0" y="0"/>
+          <a:chExt cx="0" cy="0"/>
+        </a:xfrm>
+      </p:grpSpPr>
+      <p:sp>
+        <p:nvSpPr>
           <p:cNvPr id="17409" name="Title 1"/>
           <p:cNvSpPr>
             <a:spLocks noGrp="1"/>
@@ -7340,7 +7844,7 @@
 </p:sld>
 </file>
 
-<file path=ppt/slides/slide21.xml><?xml version="1.0" encoding="utf-8"?>
+<file path=ppt/slides/slide22.xml><?xml version="1.0" encoding="utf-8"?>
 <p:sld xmlns:a="http://schemas.openxmlformats.org/drawingml/2006/main" xmlns:r="http://schemas.openxmlformats.org/officeDocument/2006/relationships" xmlns:p="http://schemas.openxmlformats.org/presentationml/2006/main">
   <p:cSld>
     <p:spTree>
@@ -7437,177 +7941,6 @@
               </a:rPr>
               <a:t>Package Info</a:t>
             </a:r>
-          </a:p>
-          <a:p>
-            <a:pPr lvl="1"/>
-            <a:endParaRPr lang="en-US" dirty="0">
-              <a:latin typeface="Arial" charset="0"/>
-            </a:endParaRPr>
-          </a:p>
-        </p:txBody>
-      </p:sp>
-    </p:spTree>
-  </p:cSld>
-  <p:clrMapOvr>
-    <a:masterClrMapping/>
-  </p:clrMapOvr>
-  <p:transition xmlns:p14="http://schemas.microsoft.com/office/powerpoint/2010/main">
-    <p:wipe/>
-  </p:transition>
-  <p:timing>
-    <p:tnLst>
-      <p:par>
-        <p:cTn xmlns:p14="http://schemas.microsoft.com/office/powerpoint/2010/main" id="1" dur="indefinite" restart="never" nodeType="tmRoot"/>
-      </p:par>
-    </p:tnLst>
-  </p:timing>
-</p:sld>
-</file>
-
-<file path=ppt/slides/slide22.xml><?xml version="1.0" encoding="utf-8"?>
-<p:sld xmlns:a="http://schemas.openxmlformats.org/drawingml/2006/main" xmlns:r="http://schemas.openxmlformats.org/officeDocument/2006/relationships" xmlns:p="http://schemas.openxmlformats.org/presentationml/2006/main">
-  <p:cSld>
-    <p:spTree>
-      <p:nvGrpSpPr>
-        <p:cNvPr id="1" name=""/>
-        <p:cNvGrpSpPr/>
-        <p:nvPr/>
-      </p:nvGrpSpPr>
-      <p:grpSpPr>
-        <a:xfrm>
-          <a:off x="0" y="0"/>
-          <a:ext cx="0" cy="0"/>
-          <a:chOff x="0" y="0"/>
-          <a:chExt cx="0" cy="0"/>
-        </a:xfrm>
-      </p:grpSpPr>
-      <p:sp>
-        <p:nvSpPr>
-          <p:cNvPr id="19457" name="Title 1"/>
-          <p:cNvSpPr>
-            <a:spLocks noGrp="1"/>
-          </p:cNvSpPr>
-          <p:nvPr>
-            <p:ph type="title"/>
-          </p:nvPr>
-        </p:nvSpPr>
-        <p:spPr/>
-        <p:txBody>
-          <a:bodyPr/>
-          <a:lstStyle/>
-          <a:p>
-            <a:r>
-              <a:rPr lang="en-US">
-                <a:latin typeface="Arial" charset="0"/>
-              </a:rPr>
-              <a:t>Go to the source</a:t>
-            </a:r>
-          </a:p>
-        </p:txBody>
-      </p:sp>
-      <p:sp>
-        <p:nvSpPr>
-          <p:cNvPr id="19458" name="Content Placeholder 2"/>
-          <p:cNvSpPr>
-            <a:spLocks noGrp="1"/>
-          </p:cNvSpPr>
-          <p:nvPr>
-            <p:ph idx="1"/>
-          </p:nvPr>
-        </p:nvSpPr>
-        <p:spPr/>
-        <p:txBody>
-          <a:bodyPr/>
-          <a:lstStyle/>
-          <a:p>
-            <a:r>
-              <a:rPr lang="en-US" dirty="0" smtClean="0">
-                <a:latin typeface="Arial" charset="0"/>
-              </a:rPr>
-              <a:t>Chrome extension</a:t>
-            </a:r>
-          </a:p>
-          <a:p>
-            <a:pPr lvl="1"/>
-            <a:r>
-              <a:rPr lang="en-US" dirty="0" smtClean="0">
-                <a:latin typeface="Arial" charset="0"/>
-              </a:rPr>
-              <a:t>Android SDK Reference Search</a:t>
-            </a:r>
-          </a:p>
-          <a:p>
-            <a:pPr lvl="1"/>
-            <a:r>
-              <a:rPr lang="en-US" dirty="0" smtClean="0">
-                <a:latin typeface="Arial" charset="0"/>
-              </a:rPr>
-              <a:t>Adds “view source” link to API docs</a:t>
-            </a:r>
-          </a:p>
-          <a:p>
-            <a:r>
-              <a:rPr lang="en-US" dirty="0" smtClean="0">
-                <a:latin typeface="Arial" charset="0"/>
-              </a:rPr>
-              <a:t>Download the source yourself</a:t>
-            </a:r>
-          </a:p>
-          <a:p>
-            <a:pPr lvl="1"/>
-            <a:r>
-              <a:rPr lang="en-US" dirty="0" err="1" smtClean="0">
-                <a:latin typeface="Arial" charset="0"/>
-              </a:rPr>
-              <a:t>source.android.com</a:t>
-            </a:r>
-            <a:r>
-              <a:rPr lang="en-US" dirty="0">
-                <a:latin typeface="Arial" charset="0"/>
-              </a:rPr>
-              <a:t>/source/</a:t>
-            </a:r>
-            <a:r>
-              <a:rPr lang="en-US" dirty="0" err="1" smtClean="0">
-                <a:latin typeface="Arial" charset="0"/>
-              </a:rPr>
-              <a:t>downloading.html</a:t>
-            </a:r>
-            <a:endParaRPr lang="en-US" dirty="0" smtClean="0">
-              <a:latin typeface="Arial" charset="0"/>
-            </a:endParaRPr>
-          </a:p>
-          <a:p>
-            <a:pPr lvl="1"/>
-            <a:r>
-              <a:rPr lang="en-US" dirty="0">
-                <a:latin typeface="Arial" charset="0"/>
-              </a:rPr>
-              <a:t>“The initial sync operation will take an hour or more to complete</a:t>
-            </a:r>
-            <a:r>
-              <a:rPr lang="en-US" dirty="0" smtClean="0">
-                <a:latin typeface="Arial" charset="0"/>
-              </a:rPr>
-              <a:t>.”</a:t>
-            </a:r>
-          </a:p>
-          <a:p>
-            <a:pPr lvl="1"/>
-            <a:endParaRPr lang="en-US" dirty="0">
-              <a:latin typeface="Arial" charset="0"/>
-            </a:endParaRPr>
-          </a:p>
-          <a:p>
-            <a:r>
-              <a:rPr lang="en-US" dirty="0" err="1">
-                <a:latin typeface="Arial" charset="0"/>
-              </a:rPr>
-              <a:t>AndroidManifest.xml</a:t>
-            </a:r>
-            <a:endParaRPr lang="en-US" dirty="0">
-              <a:latin typeface="Arial" charset="0"/>
-            </a:endParaRPr>
           </a:p>
           <a:p>
             <a:pPr lvl="1"/>
@@ -7654,7 +7987,7 @@
       </p:grpSpPr>
       <p:sp>
         <p:nvSpPr>
-          <p:cNvPr id="21505" name="Title 1"/>
+          <p:cNvPr id="19457" name="Title 1"/>
           <p:cNvSpPr>
             <a:spLocks noGrp="1"/>
           </p:cNvSpPr>
@@ -7671,14 +8004,14 @@
               <a:rPr lang="en-US">
                 <a:latin typeface="Arial" charset="0"/>
               </a:rPr>
-              <a:t>Community Resources</a:t>
+              <a:t>Go to the source</a:t>
             </a:r>
           </a:p>
         </p:txBody>
       </p:sp>
       <p:sp>
         <p:nvSpPr>
-          <p:cNvPr id="21506" name="Content Placeholder 2"/>
+          <p:cNvPr id="19458" name="Content Placeholder 2"/>
           <p:cNvSpPr>
             <a:spLocks noGrp="1"/>
           </p:cNvSpPr>
@@ -7692,33 +8025,96 @@
           <a:lstStyle/>
           <a:p>
             <a:r>
+              <a:rPr lang="en-US" dirty="0" smtClean="0">
+                <a:latin typeface="Arial" charset="0"/>
+              </a:rPr>
+              <a:t>Chrome extension</a:t>
+            </a:r>
+          </a:p>
+          <a:p>
+            <a:pPr lvl="1"/>
+            <a:r>
+              <a:rPr lang="en-US" dirty="0" smtClean="0">
+                <a:latin typeface="Arial" charset="0"/>
+              </a:rPr>
+              <a:t>Android SDK Reference Search</a:t>
+            </a:r>
+          </a:p>
+          <a:p>
+            <a:pPr lvl="1"/>
+            <a:r>
+              <a:rPr lang="en-US" dirty="0" smtClean="0">
+                <a:latin typeface="Arial" charset="0"/>
+              </a:rPr>
+              <a:t>Adds “view source” link to API docs</a:t>
+            </a:r>
+          </a:p>
+          <a:p>
+            <a:r>
+              <a:rPr lang="en-US" dirty="0" smtClean="0">
+                <a:latin typeface="Arial" charset="0"/>
+              </a:rPr>
+              <a:t>Download the source yourself</a:t>
+            </a:r>
+          </a:p>
+          <a:p>
+            <a:pPr lvl="1"/>
+            <a:r>
               <a:rPr lang="en-US" dirty="0" err="1" smtClean="0">
                 <a:latin typeface="Arial" charset="0"/>
               </a:rPr>
-              <a:t>Developer.android.com</a:t>
+              <a:t>source.android.com</a:t>
+            </a:r>
+            <a:r>
+              <a:rPr lang="en-US" dirty="0">
+                <a:latin typeface="Arial" charset="0"/>
+              </a:rPr>
+              <a:t>/source/</a:t>
+            </a:r>
+            <a:r>
+              <a:rPr lang="en-US" dirty="0" err="1" smtClean="0">
+                <a:latin typeface="Arial" charset="0"/>
+              </a:rPr>
+              <a:t>downloading.html</a:t>
             </a:r>
             <a:endParaRPr lang="en-US" dirty="0" smtClean="0">
               <a:latin typeface="Arial" charset="0"/>
             </a:endParaRPr>
           </a:p>
           <a:p>
-            <a:r>
-              <a:rPr lang="en-US" dirty="0" err="1" smtClean="0">
+            <a:pPr lvl="1"/>
+            <a:r>
+              <a:rPr lang="en-US" dirty="0">
                 <a:latin typeface="Arial" charset="0"/>
               </a:rPr>
-              <a:t>StackOverflow</a:t>
-            </a:r>
-            <a:endParaRPr lang="en-US" dirty="0" smtClean="0">
+              <a:t>“The initial sync operation will take an hour or more to complete</a:t>
+            </a:r>
+            <a:r>
+              <a:rPr lang="en-US" dirty="0" smtClean="0">
+                <a:latin typeface="Arial" charset="0"/>
+              </a:rPr>
+              <a:t>.”</a:t>
+            </a:r>
+          </a:p>
+          <a:p>
+            <a:pPr lvl="1"/>
+            <a:endParaRPr lang="en-US" dirty="0">
               <a:latin typeface="Arial" charset="0"/>
             </a:endParaRPr>
           </a:p>
           <a:p>
             <a:r>
-              <a:rPr lang="en-US" dirty="0" err="1" smtClean="0">
+              <a:rPr lang="en-US" dirty="0" err="1">
                 <a:latin typeface="Arial" charset="0"/>
               </a:rPr>
-              <a:t>OpenIntents.org</a:t>
-            </a:r>
+              <a:t>AndroidManifest.xml</a:t>
+            </a:r>
+            <a:endParaRPr lang="en-US" dirty="0">
+              <a:latin typeface="Arial" charset="0"/>
+            </a:endParaRPr>
+          </a:p>
+          <a:p>
+            <a:pPr lvl="1"/>
             <a:endParaRPr lang="en-US" dirty="0">
               <a:latin typeface="Arial" charset="0"/>
             </a:endParaRPr>
@@ -7762,7 +8158,7 @@
       </p:grpSpPr>
       <p:sp>
         <p:nvSpPr>
-          <p:cNvPr id="24577" name="Title 1"/>
+          <p:cNvPr id="21505" name="Title 1"/>
           <p:cNvSpPr>
             <a:spLocks noGrp="1"/>
           </p:cNvSpPr>
@@ -7776,20 +8172,17 @@
           <a:lstStyle/>
           <a:p>
             <a:r>
-              <a:rPr lang="en-US" dirty="0" smtClean="0">
+              <a:rPr lang="en-US">
                 <a:latin typeface="Arial" charset="0"/>
               </a:rPr>
-              <a:t>Where to go next</a:t>
-            </a:r>
-            <a:endParaRPr lang="en-US" dirty="0">
-              <a:latin typeface="Arial" charset="0"/>
-            </a:endParaRPr>
+              <a:t>Community Resources</a:t>
+            </a:r>
           </a:p>
         </p:txBody>
       </p:sp>
       <p:sp>
         <p:nvSpPr>
-          <p:cNvPr id="24578" name="Content Placeholder 2"/>
+          <p:cNvPr id="21506" name="Content Placeholder 2"/>
           <p:cNvSpPr>
             <a:spLocks noGrp="1"/>
           </p:cNvSpPr>
@@ -7802,81 +8195,34 @@
           <a:bodyPr/>
           <a:lstStyle/>
           <a:p>
-            <a:pPr>
-              <a:spcBef>
-                <a:spcPts val="1200"/>
-              </a:spcBef>
-              <a:spcAft>
-                <a:spcPts val="1200"/>
-              </a:spcAft>
-            </a:pPr>
-            <a:r>
-              <a:rPr lang="en-US" sz="3200" dirty="0" smtClean="0">
+            <a:r>
+              <a:rPr lang="en-US" dirty="0" err="1" smtClean="0">
                 <a:latin typeface="Arial" charset="0"/>
               </a:rPr>
-              <a:t>Transmit sample application:</a:t>
-            </a:r>
-          </a:p>
-          <a:p>
-            <a:pPr lvl="1">
-              <a:spcBef>
-                <a:spcPts val="1200"/>
-              </a:spcBef>
-              <a:spcAft>
-                <a:spcPts val="1200"/>
-              </a:spcAft>
-            </a:pPr>
-            <a:r>
-              <a:rPr lang="en-US" sz="2600" dirty="0" smtClean="0">
-                <a:latin typeface="Arial" charset="0"/>
-                <a:hlinkClick r:id="rId3"/>
-              </a:rPr>
-              <a:t>https://github.com/jessitron/Transmit</a:t>
-            </a:r>
-            <a:endParaRPr lang="en-US" sz="2600" dirty="0" smtClean="0">
+              <a:t>Developer.android.com</a:t>
+            </a:r>
+            <a:endParaRPr lang="en-US" dirty="0" smtClean="0">
               <a:latin typeface="Arial" charset="0"/>
             </a:endParaRPr>
           </a:p>
           <a:p>
-            <a:pPr lvl="1">
-              <a:spcBef>
-                <a:spcPts val="1200"/>
-              </a:spcBef>
-              <a:spcAft>
-                <a:spcPts val="1200"/>
-              </a:spcAft>
-            </a:pPr>
-            <a:r>
-              <a:rPr lang="en-US" sz="2600" dirty="0" smtClean="0">
+            <a:r>
+              <a:rPr lang="en-US" dirty="0" err="1" smtClean="0">
                 <a:latin typeface="Arial" charset="0"/>
               </a:rPr>
-              <a:t>Download it, install it on your device</a:t>
-            </a:r>
-          </a:p>
-          <a:p>
-            <a:pPr lvl="1">
-              <a:spcBef>
-                <a:spcPts val="1200"/>
-              </a:spcBef>
-              <a:spcAft>
-                <a:spcPts val="1200"/>
-              </a:spcAft>
-            </a:pPr>
-            <a:r>
-              <a:rPr lang="en-US" sz="2600" dirty="0" smtClean="0">
-                <a:latin typeface="Arial" charset="0"/>
-              </a:rPr>
-              <a:t>Take over the world</a:t>
-            </a:r>
-            <a:endParaRPr lang="en-US" sz="2600" dirty="0">
+              <a:t>StackOverflow</a:t>
+            </a:r>
+            <a:endParaRPr lang="en-US" dirty="0" smtClean="0">
               <a:latin typeface="Arial" charset="0"/>
             </a:endParaRPr>
           </a:p>
           <a:p>
-            <a:pPr>
-              <a:buFontTx/>
-              <a:buNone/>
-            </a:pPr>
+            <a:r>
+              <a:rPr lang="en-US" dirty="0" err="1" smtClean="0">
+                <a:latin typeface="Arial" charset="0"/>
+              </a:rPr>
+              <a:t>OpenIntents.org</a:t>
+            </a:r>
             <a:endParaRPr lang="en-US" dirty="0">
               <a:latin typeface="Arial" charset="0"/>
             </a:endParaRPr>
@@ -7902,6 +8248,164 @@
 </file>
 
 <file path=ppt/slides/slide25.xml><?xml version="1.0" encoding="utf-8"?>
+<p:sld xmlns:a="http://schemas.openxmlformats.org/drawingml/2006/main" xmlns:r="http://schemas.openxmlformats.org/officeDocument/2006/relationships" xmlns:p="http://schemas.openxmlformats.org/presentationml/2006/main">
+  <p:cSld>
+    <p:spTree>
+      <p:nvGrpSpPr>
+        <p:cNvPr id="1" name=""/>
+        <p:cNvGrpSpPr/>
+        <p:nvPr/>
+      </p:nvGrpSpPr>
+      <p:grpSpPr>
+        <a:xfrm>
+          <a:off x="0" y="0"/>
+          <a:ext cx="0" cy="0"/>
+          <a:chOff x="0" y="0"/>
+          <a:chExt cx="0" cy="0"/>
+        </a:xfrm>
+      </p:grpSpPr>
+      <p:sp>
+        <p:nvSpPr>
+          <p:cNvPr id="24577" name="Title 1"/>
+          <p:cNvSpPr>
+            <a:spLocks noGrp="1"/>
+          </p:cNvSpPr>
+          <p:nvPr>
+            <p:ph type="title"/>
+          </p:nvPr>
+        </p:nvSpPr>
+        <p:spPr/>
+        <p:txBody>
+          <a:bodyPr/>
+          <a:lstStyle/>
+          <a:p>
+            <a:r>
+              <a:rPr lang="en-US" dirty="0" smtClean="0">
+                <a:latin typeface="Arial" charset="0"/>
+              </a:rPr>
+              <a:t>Where to go next</a:t>
+            </a:r>
+            <a:endParaRPr lang="en-US" dirty="0">
+              <a:latin typeface="Arial" charset="0"/>
+            </a:endParaRPr>
+          </a:p>
+        </p:txBody>
+      </p:sp>
+      <p:sp>
+        <p:nvSpPr>
+          <p:cNvPr id="24578" name="Content Placeholder 2"/>
+          <p:cNvSpPr>
+            <a:spLocks noGrp="1"/>
+          </p:cNvSpPr>
+          <p:nvPr>
+            <p:ph idx="1"/>
+          </p:nvPr>
+        </p:nvSpPr>
+        <p:spPr/>
+        <p:txBody>
+          <a:bodyPr/>
+          <a:lstStyle/>
+          <a:p>
+            <a:pPr>
+              <a:spcBef>
+                <a:spcPts val="1200"/>
+              </a:spcBef>
+              <a:spcAft>
+                <a:spcPts val="1200"/>
+              </a:spcAft>
+            </a:pPr>
+            <a:r>
+              <a:rPr lang="en-US" sz="3200" dirty="0" smtClean="0">
+                <a:latin typeface="Arial" charset="0"/>
+              </a:rPr>
+              <a:t>Transmit sample application:</a:t>
+            </a:r>
+          </a:p>
+          <a:p>
+            <a:pPr lvl="1">
+              <a:spcBef>
+                <a:spcPts val="1200"/>
+              </a:spcBef>
+              <a:spcAft>
+                <a:spcPts val="1200"/>
+              </a:spcAft>
+            </a:pPr>
+            <a:r>
+              <a:rPr lang="en-US" sz="2600" dirty="0" smtClean="0">
+                <a:latin typeface="Arial" charset="0"/>
+                <a:hlinkClick r:id="rId3"/>
+              </a:rPr>
+              <a:t>https://github.com/jessitron/Transmit</a:t>
+            </a:r>
+            <a:endParaRPr lang="en-US" sz="2600" dirty="0" smtClean="0">
+              <a:latin typeface="Arial" charset="0"/>
+            </a:endParaRPr>
+          </a:p>
+          <a:p>
+            <a:pPr lvl="1">
+              <a:spcBef>
+                <a:spcPts val="1200"/>
+              </a:spcBef>
+              <a:spcAft>
+                <a:spcPts val="1200"/>
+              </a:spcAft>
+            </a:pPr>
+            <a:r>
+              <a:rPr lang="en-US" sz="2600" dirty="0" smtClean="0">
+                <a:latin typeface="Arial" charset="0"/>
+              </a:rPr>
+              <a:t>Download it, install it on your device</a:t>
+            </a:r>
+          </a:p>
+          <a:p>
+            <a:pPr lvl="1">
+              <a:spcBef>
+                <a:spcPts val="1200"/>
+              </a:spcBef>
+              <a:spcAft>
+                <a:spcPts val="1200"/>
+              </a:spcAft>
+            </a:pPr>
+            <a:r>
+              <a:rPr lang="en-US" sz="2600" dirty="0" smtClean="0">
+                <a:latin typeface="Arial" charset="0"/>
+              </a:rPr>
+              <a:t>Take over the world</a:t>
+            </a:r>
+            <a:endParaRPr lang="en-US" sz="2600" dirty="0">
+              <a:latin typeface="Arial" charset="0"/>
+            </a:endParaRPr>
+          </a:p>
+          <a:p>
+            <a:pPr>
+              <a:buFontTx/>
+              <a:buNone/>
+            </a:pPr>
+            <a:endParaRPr lang="en-US" dirty="0">
+              <a:latin typeface="Arial" charset="0"/>
+            </a:endParaRPr>
+          </a:p>
+        </p:txBody>
+      </p:sp>
+    </p:spTree>
+  </p:cSld>
+  <p:clrMapOvr>
+    <a:masterClrMapping/>
+  </p:clrMapOvr>
+  <p:transition xmlns:p14="http://schemas.microsoft.com/office/powerpoint/2010/main">
+    <p:wipe/>
+  </p:transition>
+  <p:timing>
+    <p:tnLst>
+      <p:par>
+        <p:cTn xmlns:p14="http://schemas.microsoft.com/office/powerpoint/2010/main" id="1" dur="indefinite" restart="never" nodeType="tmRoot"/>
+      </p:par>
+    </p:tnLst>
+  </p:timing>
+</p:sld>
+</file>
+
+<file path=ppt/slides/slide26.xml><?xml version="1.0" encoding="utf-8"?>
 <p:sld xmlns:a="http://schemas.openxmlformats.org/drawingml/2006/main" xmlns:r="http://schemas.openxmlformats.org/officeDocument/2006/relationships" xmlns:p="http://schemas.openxmlformats.org/presentationml/2006/main" show="0">
   <p:cSld>
     <p:spTree>
@@ -8022,7 +8526,7 @@
 </p:sld>
 </file>
 
-<file path=ppt/slides/slide26.xml><?xml version="1.0" encoding="utf-8"?>
+<file path=ppt/slides/slide27.xml><?xml version="1.0" encoding="utf-8"?>
 <p:sld xmlns:a="http://schemas.openxmlformats.org/drawingml/2006/main" xmlns:r="http://schemas.openxmlformats.org/officeDocument/2006/relationships" xmlns:p="http://schemas.openxmlformats.org/presentationml/2006/main">
   <p:cSld>
     <p:spTree>
@@ -8239,7 +8743,7 @@
 </p:sld>
 </file>
 
-<file path=ppt/slides/slide27.xml><?xml version="1.0" encoding="utf-8"?>
+<file path=ppt/slides/slide28.xml><?xml version="1.0" encoding="utf-8"?>
 <p:sld xmlns:a="http://schemas.openxmlformats.org/drawingml/2006/main" xmlns:r="http://schemas.openxmlformats.org/officeDocument/2006/relationships" xmlns:p="http://schemas.openxmlformats.org/presentationml/2006/main">
   <p:cSld>
     <p:spTree>
@@ -8396,36 +8900,69 @@
           <a:chExt cx="0" cy="0"/>
         </a:xfrm>
       </p:grpSpPr>
-      <p:pic>
-        <p:nvPicPr>
-          <p:cNvPr id="2" name="Picture 1" descr="2012-05-13_14-30-12.jpg"/>
-          <p:cNvPicPr>
-            <a:picLocks noChangeAspect="1"/>
-          </p:cNvPicPr>
+      <p:sp>
+        <p:nvSpPr>
+          <p:cNvPr id="3" name="Rectangle 2"/>
+          <p:cNvSpPr/>
           <p:nvPr/>
-        </p:nvPicPr>
-        <p:blipFill>
-          <a:blip r:embed="rId2">
-            <a:extLst>
-              <a:ext uri="{28A0092B-C50C-407E-A947-70E740481C1C}">
-                <a14:useLocalDpi xmlns:a14="http://schemas.microsoft.com/office/drawing/2010/main" val="0"/>
-              </a:ext>
-            </a:extLst>
-          </a:blip>
-          <a:stretch>
-            <a:fillRect/>
-          </a:stretch>
-        </p:blipFill>
+        </p:nvSpPr>
         <p:spPr>
           <a:xfrm>
-            <a:off x="3429000" y="990600"/>
-            <a:ext cx="2837388" cy="5007155"/>
+            <a:off x="1066800" y="2362200"/>
+            <a:ext cx="7239000" cy="584776"/>
           </a:xfrm>
           <a:prstGeom prst="rect">
             <a:avLst/>
           </a:prstGeom>
         </p:spPr>
-      </p:pic>
+        <p:txBody>
+          <a:bodyPr wrap="square">
+            <a:spAutoFit/>
+          </a:bodyPr>
+          <a:lstStyle/>
+          <a:p>
+            <a:r>
+              <a:rPr lang="en-US" sz="3200" dirty="0">
+                <a:latin typeface="+mj-lt"/>
+              </a:rPr>
+              <a:t>https://</a:t>
+            </a:r>
+            <a:r>
+              <a:rPr lang="en-US" sz="3200" dirty="0" err="1">
+                <a:latin typeface="+mj-lt"/>
+              </a:rPr>
+              <a:t>github.com</a:t>
+            </a:r>
+            <a:r>
+              <a:rPr lang="en-US" sz="3200" dirty="0">
+                <a:latin typeface="+mj-lt"/>
+              </a:rPr>
+              <a:t>/</a:t>
+            </a:r>
+            <a:r>
+              <a:rPr lang="en-US" sz="3200" dirty="0" err="1">
+                <a:latin typeface="+mj-lt"/>
+              </a:rPr>
+              <a:t>jessitron</a:t>
+            </a:r>
+            <a:r>
+              <a:rPr lang="en-US" sz="3200" dirty="0">
+                <a:latin typeface="+mj-lt"/>
+              </a:rPr>
+              <a:t>/</a:t>
+            </a:r>
+            <a:r>
+              <a:rPr lang="en-US" sz="3200" dirty="0" err="1">
+                <a:latin typeface="+mj-lt"/>
+              </a:rPr>
+              <a:t>Tronsmit</a:t>
+            </a:r>
+            <a:endParaRPr lang="en-US" sz="3200" dirty="0">
+              <a:latin typeface="+mj-lt"/>
+            </a:endParaRPr>
+          </a:p>
+        </p:txBody>
+      </p:sp>
     </p:spTree>
   </p:cSld>
   <p:clrMapOvr>

</xml_diff>

<commit_message>
added menu option to choose a picture
</commit_message>
<xml_diff>
--- a/presentations/DevTeach-Intents.pptx
+++ b/presentations/DevTeach-Intents.pptx
@@ -5,7 +5,7 @@
     <p:sldMasterId id="2147483648" r:id="rId1"/>
   </p:sldMasterIdLst>
   <p:notesMasterIdLst>
-    <p:notesMasterId r:id="rId30"/>
+    <p:notesMasterId r:id="rId32"/>
   </p:notesMasterIdLst>
   <p:sldIdLst>
     <p:sldId id="256" r:id="rId2"/>
@@ -14,28 +14,30 @@
     <p:sldId id="257" r:id="rId5"/>
     <p:sldId id="264" r:id="rId6"/>
     <p:sldId id="285" r:id="rId7"/>
-    <p:sldId id="265" r:id="rId8"/>
-    <p:sldId id="267" r:id="rId9"/>
-    <p:sldId id="289" r:id="rId10"/>
-    <p:sldId id="269" r:id="rId11"/>
-    <p:sldId id="281" r:id="rId12"/>
-    <p:sldId id="282" r:id="rId13"/>
-    <p:sldId id="283" r:id="rId14"/>
-    <p:sldId id="284" r:id="rId15"/>
-    <p:sldId id="286" r:id="rId16"/>
-    <p:sldId id="287" r:id="rId17"/>
-    <p:sldId id="273" r:id="rId18"/>
-    <p:sldId id="274" r:id="rId19"/>
-    <p:sldId id="288" r:id="rId20"/>
-    <p:sldId id="290" r:id="rId21"/>
-    <p:sldId id="275" r:id="rId22"/>
-    <p:sldId id="276" r:id="rId23"/>
-    <p:sldId id="277" r:id="rId24"/>
-    <p:sldId id="279" r:id="rId25"/>
-    <p:sldId id="260" r:id="rId26"/>
-    <p:sldId id="262" r:id="rId27"/>
-    <p:sldId id="258" r:id="rId28"/>
-    <p:sldId id="266" r:id="rId29"/>
+    <p:sldId id="267" r:id="rId8"/>
+    <p:sldId id="289" r:id="rId9"/>
+    <p:sldId id="269" r:id="rId10"/>
+    <p:sldId id="281" r:id="rId11"/>
+    <p:sldId id="282" r:id="rId12"/>
+    <p:sldId id="283" r:id="rId13"/>
+    <p:sldId id="284" r:id="rId14"/>
+    <p:sldId id="291" r:id="rId15"/>
+    <p:sldId id="293" r:id="rId16"/>
+    <p:sldId id="286" r:id="rId17"/>
+    <p:sldId id="292" r:id="rId18"/>
+    <p:sldId id="287" r:id="rId19"/>
+    <p:sldId id="273" r:id="rId20"/>
+    <p:sldId id="274" r:id="rId21"/>
+    <p:sldId id="288" r:id="rId22"/>
+    <p:sldId id="290" r:id="rId23"/>
+    <p:sldId id="275" r:id="rId24"/>
+    <p:sldId id="276" r:id="rId25"/>
+    <p:sldId id="277" r:id="rId26"/>
+    <p:sldId id="279" r:id="rId27"/>
+    <p:sldId id="260" r:id="rId28"/>
+    <p:sldId id="262" r:id="rId29"/>
+    <p:sldId id="258" r:id="rId30"/>
+    <p:sldId id="266" r:id="rId31"/>
   </p:sldIdLst>
   <p:sldSz cx="9144000" cy="6858000" type="screen4x3"/>
   <p:notesSz cx="6858000" cy="9144000"/>
@@ -267,7 +269,7 @@
               <a:pPr>
                 <a:defRPr/>
               </a:pPr>
-              <a:t>5/26/12</a:t>
+              <a:t>5/27/12</a:t>
             </a:fld>
             <a:endParaRPr lang="en-US"/>
           </a:p>
@@ -943,7 +945,7 @@
             <a:fld id="{F8B21A7F-F9EB-FB41-A62A-5377DB33A5E0}" type="slidenum">
               <a:rPr lang="en-US" sz="1200"/>
               <a:pPr eaLnBrk="1" hangingPunct="1"/>
-              <a:t>10</a:t>
+              <a:t>9</a:t>
             </a:fld>
             <a:endParaRPr lang="en-US" sz="1200"/>
           </a:p>
@@ -1049,7 +1051,7 @@
           <a:lstStyle/>
           <a:p>
             <a:r>
-              <a:rPr lang="en-US">
+              <a:rPr lang="en-US" dirty="0">
                 <a:latin typeface="Arial" charset="0"/>
               </a:rPr>
               <a:t>Q for me: what else can I pick?</a:t>
@@ -1057,14 +1059,35 @@
           </a:p>
           <a:p>
             <a:r>
-              <a:rPr lang="en-US">
+              <a:rPr lang="en-US" dirty="0" smtClean="0">
                 <a:latin typeface="Arial" charset="0"/>
               </a:rPr>
-              <a:t>Contacts: show code</a:t>
-            </a:r>
-          </a:p>
-          <a:p>
-            <a:endParaRPr lang="en-US">
+              <a:t>Get the filter out of the</a:t>
+            </a:r>
+            <a:r>
+              <a:rPr lang="en-US" baseline="0" dirty="0" smtClean="0">
+                <a:latin typeface="Arial" charset="0"/>
+              </a:rPr>
+              <a:t> </a:t>
+            </a:r>
+            <a:r>
+              <a:rPr lang="en-US" baseline="0" dirty="0" err="1" smtClean="0">
+                <a:latin typeface="Arial" charset="0"/>
+              </a:rPr>
+              <a:t>AndroidManifest</a:t>
+            </a:r>
+            <a:r>
+              <a:rPr lang="en-US" baseline="0" dirty="0" smtClean="0">
+                <a:latin typeface="Arial" charset="0"/>
+              </a:rPr>
+              <a:t> that matches this</a:t>
+            </a:r>
+            <a:endParaRPr lang="en-US" dirty="0">
+              <a:latin typeface="Arial" charset="0"/>
+            </a:endParaRPr>
+          </a:p>
+          <a:p>
+            <a:endParaRPr lang="en-US" dirty="0">
               <a:latin typeface="Calibri" charset="0"/>
             </a:endParaRPr>
           </a:p>
@@ -1217,7 +1240,7 @@
             <a:fld id="{B8C3BBE3-34AE-BF4A-8E11-8F97B84A86D9}" type="slidenum">
               <a:rPr lang="en-US" sz="1200"/>
               <a:pPr eaLnBrk="1" hangingPunct="1"/>
-              <a:t>11</a:t>
+              <a:t>10</a:t>
             </a:fld>
             <a:endParaRPr lang="en-US" sz="1200"/>
           </a:p>
@@ -1323,7 +1346,7 @@
           <a:lstStyle/>
           <a:p>
             <a:r>
-              <a:rPr lang="en-US">
+              <a:rPr lang="en-US" dirty="0">
                 <a:latin typeface="Calibri" charset="0"/>
               </a:rPr>
               <a:t>MMS</a:t>
@@ -1331,7 +1354,7 @@
           </a:p>
           <a:p>
             <a:r>
-              <a:rPr lang="en-US">
+              <a:rPr lang="en-US" dirty="0" smtClean="0">
                 <a:latin typeface="Calibri" charset="0"/>
               </a:rPr>
               <a:t>Email</a:t>
@@ -1339,45 +1362,55 @@
           </a:p>
           <a:p>
             <a:r>
-              <a:rPr lang="en-US">
+              <a:rPr lang="en-US" dirty="0" smtClean="0">
                 <a:latin typeface="Calibri" charset="0"/>
               </a:rPr>
-              <a:t>----- Meeting Notes (5/24/12 20:08) -----</a:t>
-            </a:r>
-          </a:p>
-          <a:p>
-            <a:r>
-              <a:rPr lang="en-US">
+              <a:t>Twitter.</a:t>
+            </a:r>
+            <a:r>
+              <a:rPr lang="en-US" baseline="0" dirty="0" smtClean="0">
                 <a:latin typeface="Calibri" charset="0"/>
               </a:rPr>
-              <a:t>type!!</a:t>
-            </a:r>
-          </a:p>
-          <a:p>
-            <a:endParaRPr lang="en-US">
+              <a:t> Etc.</a:t>
+            </a:r>
+            <a:endParaRPr lang="en-US" dirty="0">
               <a:latin typeface="Calibri" charset="0"/>
             </a:endParaRPr>
           </a:p>
           <a:p>
-            <a:r>
-              <a:rPr lang="en-US">
-                <a:latin typeface="Calibri" charset="0"/>
-              </a:rPr>
-              <a:t>- figure out what DEBUG_LOG_RESOLUTION does</a:t>
-            </a:r>
-          </a:p>
-          <a:p>
-            <a:endParaRPr lang="en-US">
+            <a:endParaRPr lang="en-US" dirty="0">
               <a:latin typeface="Calibri" charset="0"/>
             </a:endParaRPr>
           </a:p>
           <a:p>
             <a:r>
-              <a:rPr lang="en-US">
+              <a:rPr lang="en-US" dirty="0">
                 <a:latin typeface="Calibri" charset="0"/>
               </a:rPr>
-              <a:t>- can you give other apps permission to access your data?</a:t>
-            </a:r>
+              <a:t>- figure out what DEBUG_LOG_RESOLUTION does</a:t>
+            </a:r>
+          </a:p>
+          <a:p>
+            <a:endParaRPr lang="en-US" dirty="0">
+              <a:latin typeface="Calibri" charset="0"/>
+            </a:endParaRPr>
+          </a:p>
+          <a:p>
+            <a:r>
+              <a:rPr lang="en-US" dirty="0">
+                <a:latin typeface="Calibri" charset="0"/>
+              </a:rPr>
+              <a:t>- can you give other apps permission to access your data</a:t>
+            </a:r>
+            <a:r>
+              <a:rPr lang="en-US" dirty="0" smtClean="0">
+                <a:latin typeface="Calibri" charset="0"/>
+              </a:rPr>
+              <a:t>? A: you can make files or databases WORLD_WRITABLE. Or put them on the SD Card, if it has one.</a:t>
+            </a:r>
+            <a:endParaRPr lang="en-US" dirty="0">
+              <a:latin typeface="Calibri" charset="0"/>
+            </a:endParaRPr>
           </a:p>
         </p:txBody>
       </p:sp>
@@ -1528,7 +1561,7 @@
             <a:fld id="{633A4B88-F865-E34A-B4A7-643265B9DA37}" type="slidenum">
               <a:rPr lang="en-US" sz="1200"/>
               <a:pPr eaLnBrk="1" hangingPunct="1"/>
-              <a:t>14</a:t>
+              <a:t>13</a:t>
             </a:fld>
             <a:endParaRPr lang="en-US" sz="1200"/>
           </a:p>
@@ -1586,19 +1619,15 @@
           <a:bodyPr/>
           <a:lstStyle/>
           <a:p>
-            <a:endParaRPr lang="en-US"/>
-          </a:p>
-          <a:p>
-            <a:r>
-              <a:rPr lang="en-US"/>
-              <a:t>----- Meeting Notes (5/24/12 20:08) -----</a:t>
-            </a:r>
-          </a:p>
-          <a:p>
-            <a:r>
-              <a:rPr lang="en-US"/>
-              <a:t>what comes back in the data here? it is the location, or a small version of the image?</a:t>
-            </a:r>
+            <a:r>
+              <a:rPr lang="en-US" dirty="0" smtClean="0"/>
+              <a:t>Would like to add diagram of what this looks like activity/task</a:t>
+            </a:r>
+            <a:r>
+              <a:rPr lang="en-US" baseline="0" dirty="0" smtClean="0"/>
+              <a:t> wise. Want to see on phone what the back stack looks like </a:t>
+            </a:r>
+            <a:endParaRPr lang="en-US" dirty="0"/>
           </a:p>
         </p:txBody>
       </p:sp>
@@ -1625,7 +1654,7 @@
               <a:pPr>
                 <a:defRPr/>
               </a:pPr>
-              <a:t>17</a:t>
+              <a:t>15</a:t>
             </a:fld>
             <a:endParaRPr lang="en-US"/>
           </a:p>
@@ -1634,7 +1663,7 @@
     </p:spTree>
     <p:extLst>
       <p:ext uri="{BB962C8B-B14F-4D97-AF65-F5344CB8AC3E}">
-        <p14:creationId xmlns:p14="http://schemas.microsoft.com/office/powerpoint/2010/main" val="3758064968"/>
+        <p14:creationId xmlns:p14="http://schemas.microsoft.com/office/powerpoint/2010/main" val="48151574"/>
       </p:ext>
     </p:extLst>
   </p:cSld>
@@ -1699,34 +1728,7 @@
           <a:p>
             <a:r>
               <a:rPr lang="en-US"/>
-              <a:t>get a mouse clicker that will go into my usb port next to my phone</a:t>
-            </a:r>
-          </a:p>
-          <a:p>
-            <a:endParaRPr lang="en-US"/>
-          </a:p>
-          <a:p>
-            <a:r>
-              <a:rPr lang="en-US"/>
-              <a:t>make a new repo called Tronsmit</a:t>
-            </a:r>
-          </a:p>
-          <a:p>
-            <a:endParaRPr lang="en-US"/>
-          </a:p>
-          <a:p>
-            <a:r>
-              <a:rPr lang="en-US"/>
-              <a:t>fix the log button</a:t>
-            </a:r>
-          </a:p>
-          <a:p>
-            <a:endParaRPr lang="en-US"/>
-          </a:p>
-          <a:p>
-            <a:r>
-              <a:rPr lang="en-US"/>
-              <a:t>what is the difference between an application and a package?</a:t>
+              <a:t>what comes back in the data here? it is the location, or a small version of the image?</a:t>
             </a:r>
           </a:p>
         </p:txBody>
@@ -1754,7 +1756,136 @@
               <a:pPr>
                 <a:defRPr/>
               </a:pPr>
-              <a:t>25</a:t>
+              <a:t>19</a:t>
+            </a:fld>
+            <a:endParaRPr lang="en-US"/>
+          </a:p>
+        </p:txBody>
+      </p:sp>
+    </p:spTree>
+    <p:extLst>
+      <p:ext uri="{BB962C8B-B14F-4D97-AF65-F5344CB8AC3E}">
+        <p14:creationId xmlns:p14="http://schemas.microsoft.com/office/powerpoint/2010/main" val="3758064968"/>
+      </p:ext>
+    </p:extLst>
+  </p:cSld>
+  <p:clrMapOvr>
+    <a:masterClrMapping/>
+  </p:clrMapOvr>
+</p:notes>
+</file>
+
+<file path=ppt/notesSlides/notesSlide7.xml><?xml version="1.0" encoding="utf-8"?>
+<p:notes xmlns:a="http://schemas.openxmlformats.org/drawingml/2006/main" xmlns:r="http://schemas.openxmlformats.org/officeDocument/2006/relationships" xmlns:p="http://schemas.openxmlformats.org/presentationml/2006/main">
+  <p:cSld>
+    <p:spTree>
+      <p:nvGrpSpPr>
+        <p:cNvPr id="1" name=""/>
+        <p:cNvGrpSpPr/>
+        <p:nvPr/>
+      </p:nvGrpSpPr>
+      <p:grpSpPr>
+        <a:xfrm>
+          <a:off x="0" y="0"/>
+          <a:ext cx="0" cy="0"/>
+          <a:chOff x="0" y="0"/>
+          <a:chExt cx="0" cy="0"/>
+        </a:xfrm>
+      </p:grpSpPr>
+      <p:sp>
+        <p:nvSpPr>
+          <p:cNvPr id="2" name="Slide Image Placeholder 1"/>
+          <p:cNvSpPr>
+            <a:spLocks noGrp="1" noRot="1" noChangeAspect="1"/>
+          </p:cNvSpPr>
+          <p:nvPr>
+            <p:ph type="sldImg"/>
+          </p:nvPr>
+        </p:nvSpPr>
+        <p:spPr/>
+      </p:sp>
+      <p:sp>
+        <p:nvSpPr>
+          <p:cNvPr id="3" name="Notes Placeholder 2"/>
+          <p:cNvSpPr>
+            <a:spLocks noGrp="1"/>
+          </p:cNvSpPr>
+          <p:nvPr>
+            <p:ph type="body" idx="1"/>
+          </p:nvPr>
+        </p:nvSpPr>
+        <p:spPr/>
+        <p:txBody>
+          <a:bodyPr/>
+          <a:lstStyle/>
+          <a:p>
+            <a:endParaRPr lang="en-US"/>
+          </a:p>
+          <a:p>
+            <a:r>
+              <a:rPr lang="en-US"/>
+              <a:t>----- Meeting Notes (5/24/12 20:08) -----</a:t>
+            </a:r>
+          </a:p>
+          <a:p>
+            <a:r>
+              <a:rPr lang="en-US"/>
+              <a:t>get a mouse clicker that will go into my usb port next to my phone</a:t>
+            </a:r>
+          </a:p>
+          <a:p>
+            <a:endParaRPr lang="en-US"/>
+          </a:p>
+          <a:p>
+            <a:r>
+              <a:rPr lang="en-US"/>
+              <a:t>make a new repo called Tronsmit</a:t>
+            </a:r>
+          </a:p>
+          <a:p>
+            <a:endParaRPr lang="en-US"/>
+          </a:p>
+          <a:p>
+            <a:r>
+              <a:rPr lang="en-US"/>
+              <a:t>fix the log button</a:t>
+            </a:r>
+          </a:p>
+          <a:p>
+            <a:endParaRPr lang="en-US"/>
+          </a:p>
+          <a:p>
+            <a:r>
+              <a:rPr lang="en-US"/>
+              <a:t>what is the difference between an application and a package?</a:t>
+            </a:r>
+          </a:p>
+        </p:txBody>
+      </p:sp>
+      <p:sp>
+        <p:nvSpPr>
+          <p:cNvPr id="4" name="Slide Number Placeholder 3"/>
+          <p:cNvSpPr>
+            <a:spLocks noGrp="1"/>
+          </p:cNvSpPr>
+          <p:nvPr>
+            <p:ph type="sldNum" sz="quarter" idx="10"/>
+          </p:nvPr>
+        </p:nvSpPr>
+        <p:spPr/>
+        <p:txBody>
+          <a:bodyPr/>
+          <a:lstStyle/>
+          <a:p>
+            <a:pPr>
+              <a:defRPr/>
+            </a:pPr>
+            <a:fld id="{CB9BF63C-773E-D442-A2EE-87077B6B8852}" type="slidenum">
+              <a:rPr lang="en-US" smtClean="0"/>
+              <a:pPr>
+                <a:defRPr/>
+              </a:pPr>
+              <a:t>27</a:t>
             </a:fld>
             <a:endParaRPr lang="en-US"/>
           </a:p>
@@ -4131,311 +4262,6 @@
       </p:grpSpPr>
       <p:sp>
         <p:nvSpPr>
-          <p:cNvPr id="8193" name="Title 1"/>
-          <p:cNvSpPr>
-            <a:spLocks noGrp="1"/>
-          </p:cNvSpPr>
-          <p:nvPr>
-            <p:ph type="title"/>
-          </p:nvPr>
-        </p:nvSpPr>
-        <p:spPr/>
-        <p:txBody>
-          <a:bodyPr/>
-          <a:lstStyle/>
-          <a:p>
-            <a:r>
-              <a:rPr lang="en-US">
-                <a:latin typeface="Arial" charset="0"/>
-              </a:rPr>
-              <a:t>Intent Filters</a:t>
-            </a:r>
-          </a:p>
-        </p:txBody>
-      </p:sp>
-      <p:sp>
-        <p:nvSpPr>
-          <p:cNvPr id="2" name="Manual Operation 1"/>
-          <p:cNvSpPr/>
-          <p:nvPr/>
-        </p:nvSpPr>
-        <p:spPr>
-          <a:xfrm>
-            <a:off x="1676400" y="1524000"/>
-            <a:ext cx="5486400" cy="612775"/>
-          </a:xfrm>
-          <a:prstGeom prst="flowChartManualOperation">
-            <a:avLst/>
-          </a:prstGeom>
-          <a:solidFill>
-            <a:srgbClr val="FFFFFF"/>
-          </a:solidFill>
-        </p:spPr>
-        <p:style>
-          <a:lnRef idx="1">
-            <a:schemeClr val="accent1"/>
-          </a:lnRef>
-          <a:fillRef idx="3">
-            <a:schemeClr val="accent1"/>
-          </a:fillRef>
-          <a:effectRef idx="2">
-            <a:schemeClr val="accent1"/>
-          </a:effectRef>
-          <a:fontRef idx="minor">
-            <a:schemeClr val="lt1"/>
-          </a:fontRef>
-        </p:style>
-        <p:txBody>
-          <a:bodyPr anchor="ctr"/>
-          <a:lstStyle/>
-          <a:p>
-            <a:pPr algn="ctr">
-              <a:defRPr/>
-            </a:pPr>
-            <a:r>
-              <a:rPr lang="en-US" dirty="0">
-                <a:solidFill>
-                  <a:srgbClr val="000000"/>
-                </a:solidFill>
-              </a:rPr>
-              <a:t>Target type</a:t>
-            </a:r>
-          </a:p>
-        </p:txBody>
-      </p:sp>
-      <p:sp>
-        <p:nvSpPr>
-          <p:cNvPr id="5" name="Manual Operation 4"/>
-          <p:cNvSpPr/>
-          <p:nvPr/>
-        </p:nvSpPr>
-        <p:spPr>
-          <a:xfrm>
-            <a:off x="2209800" y="2514600"/>
-            <a:ext cx="4191000" cy="612775"/>
-          </a:xfrm>
-          <a:prstGeom prst="flowChartManualOperation">
-            <a:avLst/>
-          </a:prstGeom>
-          <a:solidFill>
-            <a:srgbClr val="FFFFFF"/>
-          </a:solidFill>
-        </p:spPr>
-        <p:style>
-          <a:lnRef idx="1">
-            <a:schemeClr val="accent1"/>
-          </a:lnRef>
-          <a:fillRef idx="3">
-            <a:schemeClr val="accent1"/>
-          </a:fillRef>
-          <a:effectRef idx="2">
-            <a:schemeClr val="accent1"/>
-          </a:effectRef>
-          <a:fontRef idx="minor">
-            <a:schemeClr val="lt1"/>
-          </a:fontRef>
-        </p:style>
-        <p:txBody>
-          <a:bodyPr anchor="ctr"/>
-          <a:lstStyle/>
-          <a:p>
-            <a:pPr algn="ctr">
-              <a:defRPr/>
-            </a:pPr>
-            <a:r>
-              <a:rPr lang="en-US" dirty="0">
-                <a:solidFill>
-                  <a:srgbClr val="000000"/>
-                </a:solidFill>
-              </a:rPr>
-              <a:t>Action</a:t>
-            </a:r>
-          </a:p>
-        </p:txBody>
-      </p:sp>
-      <p:sp>
-        <p:nvSpPr>
-          <p:cNvPr id="6" name="Manual Operation 5"/>
-          <p:cNvSpPr/>
-          <p:nvPr/>
-        </p:nvSpPr>
-        <p:spPr>
-          <a:xfrm>
-            <a:off x="2590800" y="3429000"/>
-            <a:ext cx="3200400" cy="612775"/>
-          </a:xfrm>
-          <a:prstGeom prst="flowChartManualOperation">
-            <a:avLst/>
-          </a:prstGeom>
-          <a:solidFill>
-            <a:srgbClr val="FFFFFF"/>
-          </a:solidFill>
-        </p:spPr>
-        <p:style>
-          <a:lnRef idx="1">
-            <a:schemeClr val="accent1"/>
-          </a:lnRef>
-          <a:fillRef idx="3">
-            <a:schemeClr val="accent1"/>
-          </a:fillRef>
-          <a:effectRef idx="2">
-            <a:schemeClr val="accent1"/>
-          </a:effectRef>
-          <a:fontRef idx="minor">
-            <a:schemeClr val="lt1"/>
-          </a:fontRef>
-        </p:style>
-        <p:txBody>
-          <a:bodyPr anchor="ctr"/>
-          <a:lstStyle/>
-          <a:p>
-            <a:pPr algn="ctr">
-              <a:defRPr/>
-            </a:pPr>
-            <a:r>
-              <a:rPr lang="en-US" dirty="0">
-                <a:solidFill>
-                  <a:srgbClr val="000000"/>
-                </a:solidFill>
-              </a:rPr>
-              <a:t>Categories</a:t>
-            </a:r>
-          </a:p>
-        </p:txBody>
-      </p:sp>
-      <p:sp>
-        <p:nvSpPr>
-          <p:cNvPr id="7" name="Manual Operation 6"/>
-          <p:cNvSpPr/>
-          <p:nvPr/>
-        </p:nvSpPr>
-        <p:spPr>
-          <a:xfrm>
-            <a:off x="3429000" y="4419600"/>
-            <a:ext cx="1600200" cy="612775"/>
-          </a:xfrm>
-          <a:prstGeom prst="flowChartManualOperation">
-            <a:avLst/>
-          </a:prstGeom>
-          <a:solidFill>
-            <a:srgbClr val="FFFFFF"/>
-          </a:solidFill>
-        </p:spPr>
-        <p:style>
-          <a:lnRef idx="1">
-            <a:schemeClr val="accent1"/>
-          </a:lnRef>
-          <a:fillRef idx="3">
-            <a:schemeClr val="accent1"/>
-          </a:fillRef>
-          <a:effectRef idx="2">
-            <a:schemeClr val="accent1"/>
-          </a:effectRef>
-          <a:fontRef idx="minor">
-            <a:schemeClr val="lt1"/>
-          </a:fontRef>
-        </p:style>
-        <p:txBody>
-          <a:bodyPr anchor="ctr"/>
-          <a:lstStyle/>
-          <a:p>
-            <a:pPr algn="ctr">
-              <a:defRPr/>
-            </a:pPr>
-            <a:r>
-              <a:rPr lang="en-US" dirty="0">
-                <a:solidFill>
-                  <a:srgbClr val="000000"/>
-                </a:solidFill>
-              </a:rPr>
-              <a:t>Data</a:t>
-            </a:r>
-          </a:p>
-        </p:txBody>
-      </p:sp>
-      <p:sp>
-        <p:nvSpPr>
-          <p:cNvPr id="4" name="Cloud 3"/>
-          <p:cNvSpPr/>
-          <p:nvPr/>
-        </p:nvSpPr>
-        <p:spPr>
-          <a:xfrm>
-            <a:off x="2514600" y="5410200"/>
-            <a:ext cx="3276600" cy="381000"/>
-          </a:xfrm>
-          <a:prstGeom prst="cloud">
-            <a:avLst/>
-          </a:prstGeom>
-          <a:solidFill>
-            <a:schemeClr val="accent6">
-              <a:lumMod val="60000"/>
-              <a:lumOff val="40000"/>
-            </a:schemeClr>
-          </a:solidFill>
-        </p:spPr>
-        <p:style>
-          <a:lnRef idx="1">
-            <a:schemeClr val="accent1"/>
-          </a:lnRef>
-          <a:fillRef idx="3">
-            <a:schemeClr val="accent1"/>
-          </a:fillRef>
-          <a:effectRef idx="2">
-            <a:schemeClr val="accent1"/>
-          </a:effectRef>
-          <a:fontRef idx="minor">
-            <a:schemeClr val="lt1"/>
-          </a:fontRef>
-        </p:style>
-        <p:txBody>
-          <a:bodyPr anchor="ctr"/>
-          <a:lstStyle/>
-          <a:p>
-            <a:pPr algn="ctr">
-              <a:defRPr/>
-            </a:pPr>
-            <a:endParaRPr lang="en-US"/>
-          </a:p>
-        </p:txBody>
-      </p:sp>
-    </p:spTree>
-  </p:cSld>
-  <p:clrMapOvr>
-    <a:masterClrMapping/>
-  </p:clrMapOvr>
-  <p:transition xmlns:p14="http://schemas.microsoft.com/office/powerpoint/2010/main">
-    <p:wipe/>
-  </p:transition>
-  <p:timing>
-    <p:tnLst>
-      <p:par>
-        <p:cTn xmlns:p14="http://schemas.microsoft.com/office/powerpoint/2010/main" id="1" dur="indefinite" restart="never" nodeType="tmRoot"/>
-      </p:par>
-    </p:tnLst>
-  </p:timing>
-</p:sld>
-</file>
-
-<file path=ppt/slides/slide11.xml><?xml version="1.0" encoding="utf-8"?>
-<p:sld xmlns:a="http://schemas.openxmlformats.org/drawingml/2006/main" xmlns:r="http://schemas.openxmlformats.org/officeDocument/2006/relationships" xmlns:p="http://schemas.openxmlformats.org/presentationml/2006/main">
-  <p:cSld>
-    <p:spTree>
-      <p:nvGrpSpPr>
-        <p:cNvPr id="1" name=""/>
-        <p:cNvGrpSpPr/>
-        <p:nvPr/>
-      </p:nvGrpSpPr>
-      <p:grpSpPr>
-        <a:xfrm>
-          <a:off x="0" y="0"/>
-          <a:ext cx="0" cy="0"/>
-          <a:chOff x="0" y="0"/>
-          <a:chExt cx="0" cy="0"/>
-        </a:xfrm>
-      </p:grpSpPr>
-      <p:sp>
-        <p:nvSpPr>
           <p:cNvPr id="11265" name="Title 1"/>
           <p:cNvSpPr>
             <a:spLocks noGrp="1"/>
@@ -4820,7 +4646,7 @@
 </p:sld>
 </file>
 
-<file path=ppt/slides/slide12.xml><?xml version="1.0" encoding="utf-8"?>
+<file path=ppt/slides/slide11.xml><?xml version="1.0" encoding="utf-8"?>
 <p:sld xmlns:a="http://schemas.openxmlformats.org/drawingml/2006/main" xmlns:r="http://schemas.openxmlformats.org/officeDocument/2006/relationships" xmlns:p="http://schemas.openxmlformats.org/presentationml/2006/main">
   <p:cSld>
     <p:spTree>
@@ -5011,6 +4837,340 @@
                 <a:cs typeface="Courier" charset="0"/>
               </a:rPr>
               <a:t> PICK_CONTACT_REQUEST_CODE);</a:t>
+            </a:r>
+          </a:p>
+        </p:txBody>
+      </p:sp>
+    </p:spTree>
+  </p:cSld>
+  <p:clrMapOvr>
+    <a:masterClrMapping/>
+  </p:clrMapOvr>
+  <p:transition xmlns:p14="http://schemas.microsoft.com/office/powerpoint/2010/main">
+    <p:wipe/>
+  </p:transition>
+  <p:timing>
+    <p:tnLst>
+      <p:par>
+        <p:cTn xmlns:p14="http://schemas.microsoft.com/office/powerpoint/2010/main" id="1" dur="indefinite" restart="never" nodeType="tmRoot"/>
+      </p:par>
+    </p:tnLst>
+  </p:timing>
+</p:sld>
+</file>
+
+<file path=ppt/slides/slide12.xml><?xml version="1.0" encoding="utf-8"?>
+<p:sld xmlns:a="http://schemas.openxmlformats.org/drawingml/2006/main" xmlns:r="http://schemas.openxmlformats.org/officeDocument/2006/relationships" xmlns:p="http://schemas.openxmlformats.org/presentationml/2006/main">
+  <p:cSld>
+    <p:spTree>
+      <p:nvGrpSpPr>
+        <p:cNvPr id="1" name=""/>
+        <p:cNvGrpSpPr/>
+        <p:nvPr/>
+      </p:nvGrpSpPr>
+      <p:grpSpPr>
+        <a:xfrm>
+          <a:off x="0" y="0"/>
+          <a:ext cx="0" cy="0"/>
+          <a:chOff x="0" y="0"/>
+          <a:chExt cx="0" cy="0"/>
+        </a:xfrm>
+      </p:grpSpPr>
+      <p:sp>
+        <p:nvSpPr>
+          <p:cNvPr id="13313" name="Title 1"/>
+          <p:cNvSpPr>
+            <a:spLocks noGrp="1"/>
+          </p:cNvSpPr>
+          <p:nvPr>
+            <p:ph type="title"/>
+          </p:nvPr>
+        </p:nvSpPr>
+        <p:spPr/>
+        <p:txBody>
+          <a:bodyPr/>
+          <a:lstStyle/>
+          <a:p>
+            <a:r>
+              <a:rPr lang="en-US">
+                <a:latin typeface="Arial" charset="0"/>
+              </a:rPr>
+              <a:t>Getting results: step 2</a:t>
+            </a:r>
+          </a:p>
+        </p:txBody>
+      </p:sp>
+      <p:sp>
+        <p:nvSpPr>
+          <p:cNvPr id="13314" name="Content Placeholder 2"/>
+          <p:cNvSpPr>
+            <a:spLocks noGrp="1"/>
+          </p:cNvSpPr>
+          <p:nvPr>
+            <p:ph idx="1"/>
+          </p:nvPr>
+        </p:nvSpPr>
+        <p:spPr/>
+        <p:txBody>
+          <a:bodyPr/>
+          <a:lstStyle/>
+          <a:p>
+            <a:pPr marL="0" indent="0">
+              <a:buFontTx/>
+              <a:buNone/>
+            </a:pPr>
+            <a:r>
+              <a:rPr lang="en-US" dirty="0">
+                <a:latin typeface="Courier" charset="0"/>
+                <a:cs typeface="Courier" charset="0"/>
+              </a:rPr>
+              <a:t>@Override</a:t>
+            </a:r>
+          </a:p>
+          <a:p>
+            <a:pPr marL="0" indent="0">
+              <a:buFontTx/>
+              <a:buNone/>
+            </a:pPr>
+            <a:r>
+              <a:rPr lang="en-US" dirty="0">
+                <a:latin typeface="Courier" charset="0"/>
+                <a:cs typeface="Courier" charset="0"/>
+              </a:rPr>
+              <a:t>protected void </a:t>
+            </a:r>
+            <a:r>
+              <a:rPr lang="en-US" dirty="0" err="1">
+                <a:solidFill>
+                  <a:srgbClr val="FFFF00"/>
+                </a:solidFill>
+                <a:latin typeface="Courier" charset="0"/>
+                <a:cs typeface="Courier" charset="0"/>
+              </a:rPr>
+              <a:t>onActivityResult</a:t>
+            </a:r>
+            <a:r>
+              <a:rPr lang="en-US" dirty="0">
+                <a:latin typeface="Courier" charset="0"/>
+                <a:cs typeface="Courier" charset="0"/>
+              </a:rPr>
+              <a:t>(</a:t>
+            </a:r>
+          </a:p>
+          <a:p>
+            <a:pPr marL="0" indent="0">
+              <a:buFontTx/>
+              <a:buNone/>
+            </a:pPr>
+            <a:r>
+              <a:rPr lang="en-US" dirty="0">
+                <a:latin typeface="Courier" charset="0"/>
+                <a:cs typeface="Courier" charset="0"/>
+              </a:rPr>
+              <a:t> </a:t>
+            </a:r>
+            <a:r>
+              <a:rPr lang="en-US" dirty="0" err="1">
+                <a:latin typeface="Courier" charset="0"/>
+                <a:cs typeface="Courier" charset="0"/>
+              </a:rPr>
+              <a:t>int</a:t>
+            </a:r>
+            <a:r>
+              <a:rPr lang="en-US" dirty="0">
+                <a:latin typeface="Courier" charset="0"/>
+                <a:cs typeface="Courier" charset="0"/>
+              </a:rPr>
+              <a:t> </a:t>
+            </a:r>
+            <a:r>
+              <a:rPr lang="en-US" dirty="0" err="1">
+                <a:latin typeface="Courier" charset="0"/>
+                <a:cs typeface="Courier" charset="0"/>
+              </a:rPr>
+              <a:t>requestCode</a:t>
+            </a:r>
+            <a:r>
+              <a:rPr lang="en-US" dirty="0">
+                <a:latin typeface="Courier" charset="0"/>
+                <a:cs typeface="Courier" charset="0"/>
+              </a:rPr>
+              <a:t>, </a:t>
+            </a:r>
+            <a:r>
+              <a:rPr lang="en-US" dirty="0" err="1">
+                <a:latin typeface="Courier" charset="0"/>
+                <a:cs typeface="Courier" charset="0"/>
+              </a:rPr>
+              <a:t>int</a:t>
+            </a:r>
+            <a:r>
+              <a:rPr lang="en-US" dirty="0">
+                <a:latin typeface="Courier" charset="0"/>
+                <a:cs typeface="Courier" charset="0"/>
+              </a:rPr>
+              <a:t> </a:t>
+            </a:r>
+            <a:r>
+              <a:rPr lang="en-US" dirty="0" err="1">
+                <a:latin typeface="Courier" charset="0"/>
+                <a:cs typeface="Courier" charset="0"/>
+              </a:rPr>
+              <a:t>resultCode</a:t>
+            </a:r>
+            <a:r>
+              <a:rPr lang="en-US" dirty="0">
+                <a:latin typeface="Courier" charset="0"/>
+                <a:cs typeface="Courier" charset="0"/>
+              </a:rPr>
+              <a:t>, Intent data) {</a:t>
+            </a:r>
+          </a:p>
+          <a:p>
+            <a:pPr marL="0" indent="0">
+              <a:buFontTx/>
+              <a:buNone/>
+            </a:pPr>
+            <a:r>
+              <a:rPr lang="en-US" dirty="0">
+                <a:latin typeface="Courier" charset="0"/>
+                <a:cs typeface="Courier" charset="0"/>
+              </a:rPr>
+              <a:t>  if (</a:t>
+            </a:r>
+            <a:r>
+              <a:rPr lang="en-US" dirty="0" err="1">
+                <a:latin typeface="Courier" charset="0"/>
+                <a:cs typeface="Courier" charset="0"/>
+              </a:rPr>
+              <a:t>requestCode</a:t>
+            </a:r>
+            <a:r>
+              <a:rPr lang="en-US" dirty="0">
+                <a:latin typeface="Courier" charset="0"/>
+                <a:cs typeface="Courier" charset="0"/>
+              </a:rPr>
+              <a:t> == PICK_CONTACT_REQUEST_CODE</a:t>
+            </a:r>
+          </a:p>
+          <a:p>
+            <a:pPr marL="0" indent="0">
+              <a:buFontTx/>
+              <a:buNone/>
+            </a:pPr>
+            <a:r>
+              <a:rPr lang="en-US" dirty="0">
+                <a:latin typeface="Courier" charset="0"/>
+                <a:cs typeface="Courier" charset="0"/>
+              </a:rPr>
+              <a:t>   &amp;&amp; </a:t>
+            </a:r>
+            <a:r>
+              <a:rPr lang="en-US" dirty="0" err="1">
+                <a:latin typeface="Courier" charset="0"/>
+                <a:cs typeface="Courier" charset="0"/>
+              </a:rPr>
+              <a:t>resultCode</a:t>
+            </a:r>
+            <a:r>
+              <a:rPr lang="en-US" dirty="0">
+                <a:latin typeface="Courier" charset="0"/>
+                <a:cs typeface="Courier" charset="0"/>
+              </a:rPr>
+              <a:t> == RESULT_OK)</a:t>
+            </a:r>
+          </a:p>
+          <a:p>
+            <a:pPr marL="0" indent="0">
+              <a:buFontTx/>
+              <a:buNone/>
+            </a:pPr>
+            <a:r>
+              <a:rPr lang="en-US" dirty="0">
+                <a:latin typeface="Courier" charset="0"/>
+                <a:cs typeface="Courier" charset="0"/>
+              </a:rPr>
+              <a:t>  {</a:t>
+            </a:r>
+          </a:p>
+          <a:p>
+            <a:pPr marL="0" indent="0">
+              <a:buFontTx/>
+              <a:buNone/>
+            </a:pPr>
+            <a:r>
+              <a:rPr lang="en-US" dirty="0">
+                <a:latin typeface="Courier" charset="0"/>
+                <a:cs typeface="Courier" charset="0"/>
+              </a:rPr>
+              <a:t>    </a:t>
+            </a:r>
+            <a:r>
+              <a:rPr lang="en-US" dirty="0" err="1">
+                <a:latin typeface="Courier" charset="0"/>
+                <a:cs typeface="Courier" charset="0"/>
+              </a:rPr>
+              <a:t>gotAContact</a:t>
+            </a:r>
+            <a:r>
+              <a:rPr lang="en-US" dirty="0">
+                <a:latin typeface="Courier" charset="0"/>
+                <a:cs typeface="Courier" charset="0"/>
+              </a:rPr>
+              <a:t>(</a:t>
+            </a:r>
+            <a:r>
+              <a:rPr lang="en-US" dirty="0" err="1">
+                <a:solidFill>
+                  <a:srgbClr val="CCFFCC"/>
+                </a:solidFill>
+                <a:latin typeface="Courier" charset="0"/>
+                <a:cs typeface="Courier" charset="0"/>
+              </a:rPr>
+              <a:t>data.getData</a:t>
+            </a:r>
+            <a:r>
+              <a:rPr lang="en-US" dirty="0">
+                <a:solidFill>
+                  <a:srgbClr val="CCFFCC"/>
+                </a:solidFill>
+                <a:latin typeface="Courier" charset="0"/>
+                <a:cs typeface="Courier" charset="0"/>
+              </a:rPr>
+              <a:t>()</a:t>
+            </a:r>
+            <a:r>
+              <a:rPr lang="en-US" dirty="0">
+                <a:latin typeface="Courier" charset="0"/>
+                <a:cs typeface="Courier" charset="0"/>
+              </a:rPr>
+              <a:t>);</a:t>
+            </a:r>
+          </a:p>
+          <a:p>
+            <a:pPr marL="0" indent="0">
+              <a:buFontTx/>
+              <a:buNone/>
+            </a:pPr>
+            <a:r>
+              <a:rPr lang="en-US" dirty="0">
+                <a:latin typeface="Courier" charset="0"/>
+                <a:cs typeface="Courier" charset="0"/>
+              </a:rPr>
+              <a:t>  }</a:t>
+            </a:r>
+          </a:p>
+          <a:p>
+            <a:pPr marL="0" indent="0">
+              <a:buFontTx/>
+              <a:buNone/>
+            </a:pPr>
+            <a:r>
+              <a:rPr lang="en-US" dirty="0">
+                <a:latin typeface="Courier" charset="0"/>
+                <a:cs typeface="Courier" charset="0"/>
+              </a:rPr>
+              <a:t>}</a:t>
             </a:r>
           </a:p>
         </p:txBody>
@@ -5052,7 +5212,7 @@
       </p:grpSpPr>
       <p:sp>
         <p:nvSpPr>
-          <p:cNvPr id="13313" name="Title 1"/>
+          <p:cNvPr id="14337" name="Title 1"/>
           <p:cNvSpPr>
             <a:spLocks noGrp="1"/>
           </p:cNvSpPr>
@@ -5069,286 +5229,583 @@
               <a:rPr lang="en-US">
                 <a:latin typeface="Arial" charset="0"/>
               </a:rPr>
-              <a:t>Getting results: step 2</a:t>
+              <a:t>Send a Message</a:t>
             </a:r>
           </a:p>
         </p:txBody>
       </p:sp>
-      <p:sp>
-        <p:nvSpPr>
-          <p:cNvPr id="13314" name="Content Placeholder 2"/>
-          <p:cNvSpPr>
-            <a:spLocks noGrp="1"/>
-          </p:cNvSpPr>
+      <p:graphicFrame>
+        <p:nvGraphicFramePr>
+          <p:cNvPr id="4" name="Table 3"/>
+          <p:cNvGraphicFramePr>
+            <a:graphicFrameLocks noGrp="1"/>
+          </p:cNvGraphicFramePr>
           <p:nvPr>
-            <p:ph idx="1"/>
+            <p:extLst>
+              <p:ext uri="{D42A27DB-BD31-4B8C-83A1-F6EECF244321}">
+                <p14:modId xmlns:p14="http://schemas.microsoft.com/office/powerpoint/2010/main" val="1258306520"/>
+              </p:ext>
+            </p:extLst>
           </p:nvPr>
-        </p:nvSpPr>
-        <p:spPr/>
-        <p:txBody>
-          <a:bodyPr/>
-          <a:lstStyle/>
-          <a:p>
-            <a:pPr marL="0" indent="0">
-              <a:buFontTx/>
-              <a:buNone/>
-            </a:pPr>
-            <a:r>
-              <a:rPr lang="en-US" dirty="0">
-                <a:latin typeface="Courier" charset="0"/>
-                <a:cs typeface="Courier" charset="0"/>
-              </a:rPr>
-              <a:t>@Override</a:t>
-            </a:r>
-          </a:p>
-          <a:p>
-            <a:pPr marL="0" indent="0">
-              <a:buFontTx/>
-              <a:buNone/>
-            </a:pPr>
-            <a:r>
-              <a:rPr lang="en-US" dirty="0">
-                <a:latin typeface="Courier" charset="0"/>
-                <a:cs typeface="Courier" charset="0"/>
-              </a:rPr>
-              <a:t>protected void </a:t>
-            </a:r>
-            <a:r>
-              <a:rPr lang="en-US" dirty="0" err="1">
-                <a:solidFill>
-                  <a:srgbClr val="FFFF00"/>
-                </a:solidFill>
-                <a:latin typeface="Courier" charset="0"/>
-                <a:cs typeface="Courier" charset="0"/>
-              </a:rPr>
-              <a:t>onActivityResult</a:t>
-            </a:r>
-            <a:r>
-              <a:rPr lang="en-US" dirty="0">
-                <a:latin typeface="Courier" charset="0"/>
-                <a:cs typeface="Courier" charset="0"/>
-              </a:rPr>
-              <a:t>(</a:t>
-            </a:r>
-          </a:p>
-          <a:p>
-            <a:pPr marL="0" indent="0">
-              <a:buFontTx/>
-              <a:buNone/>
-            </a:pPr>
-            <a:r>
-              <a:rPr lang="en-US" dirty="0">
-                <a:latin typeface="Courier" charset="0"/>
-                <a:cs typeface="Courier" charset="0"/>
-              </a:rPr>
-              <a:t> </a:t>
-            </a:r>
-            <a:r>
-              <a:rPr lang="en-US" dirty="0" err="1">
-                <a:latin typeface="Courier" charset="0"/>
-                <a:cs typeface="Courier" charset="0"/>
-              </a:rPr>
-              <a:t>int</a:t>
-            </a:r>
-            <a:r>
-              <a:rPr lang="en-US" dirty="0">
-                <a:latin typeface="Courier" charset="0"/>
-                <a:cs typeface="Courier" charset="0"/>
-              </a:rPr>
-              <a:t> </a:t>
-            </a:r>
-            <a:r>
-              <a:rPr lang="en-US" dirty="0" err="1">
-                <a:latin typeface="Courier" charset="0"/>
-                <a:cs typeface="Courier" charset="0"/>
-              </a:rPr>
-              <a:t>requestCode</a:t>
-            </a:r>
-            <a:r>
-              <a:rPr lang="en-US" dirty="0">
-                <a:latin typeface="Courier" charset="0"/>
-                <a:cs typeface="Courier" charset="0"/>
-              </a:rPr>
-              <a:t>, </a:t>
-            </a:r>
-            <a:r>
-              <a:rPr lang="en-US" dirty="0" err="1">
-                <a:latin typeface="Courier" charset="0"/>
-                <a:cs typeface="Courier" charset="0"/>
-              </a:rPr>
-              <a:t>int</a:t>
-            </a:r>
-            <a:r>
-              <a:rPr lang="en-US" dirty="0">
-                <a:latin typeface="Courier" charset="0"/>
-                <a:cs typeface="Courier" charset="0"/>
-              </a:rPr>
-              <a:t> </a:t>
-            </a:r>
-            <a:r>
-              <a:rPr lang="en-US" dirty="0" err="1">
-                <a:latin typeface="Courier" charset="0"/>
-                <a:cs typeface="Courier" charset="0"/>
-              </a:rPr>
-              <a:t>resultCode</a:t>
-            </a:r>
-            <a:r>
-              <a:rPr lang="en-US" dirty="0">
-                <a:latin typeface="Courier" charset="0"/>
-                <a:cs typeface="Courier" charset="0"/>
-              </a:rPr>
-              <a:t>, Intent data) {</a:t>
-            </a:r>
-          </a:p>
-          <a:p>
-            <a:pPr marL="0" indent="0">
-              <a:buFontTx/>
-              <a:buNone/>
-            </a:pPr>
-            <a:r>
-              <a:rPr lang="en-US" dirty="0">
-                <a:latin typeface="Courier" charset="0"/>
-                <a:cs typeface="Courier" charset="0"/>
-              </a:rPr>
-              <a:t>  if (</a:t>
-            </a:r>
-            <a:r>
-              <a:rPr lang="en-US" dirty="0" err="1">
-                <a:latin typeface="Courier" charset="0"/>
-                <a:cs typeface="Courier" charset="0"/>
-              </a:rPr>
-              <a:t>requestCode</a:t>
-            </a:r>
-            <a:r>
-              <a:rPr lang="en-US" dirty="0">
-                <a:latin typeface="Courier" charset="0"/>
-                <a:cs typeface="Courier" charset="0"/>
-              </a:rPr>
-              <a:t> == PICK_CONTACT_REQUEST_CODE</a:t>
-            </a:r>
-          </a:p>
-          <a:p>
-            <a:pPr marL="0" indent="0">
-              <a:buFontTx/>
-              <a:buNone/>
-            </a:pPr>
-            <a:r>
-              <a:rPr lang="en-US" dirty="0">
-                <a:latin typeface="Courier" charset="0"/>
-                <a:cs typeface="Courier" charset="0"/>
-              </a:rPr>
-              <a:t>   &amp;&amp; </a:t>
-            </a:r>
-            <a:r>
-              <a:rPr lang="en-US" dirty="0" err="1">
-                <a:latin typeface="Courier" charset="0"/>
-                <a:cs typeface="Courier" charset="0"/>
-              </a:rPr>
-              <a:t>resultCode</a:t>
-            </a:r>
-            <a:r>
-              <a:rPr lang="en-US" dirty="0">
-                <a:latin typeface="Courier" charset="0"/>
-                <a:cs typeface="Courier" charset="0"/>
-              </a:rPr>
-              <a:t> == RESULT_OK)</a:t>
-            </a:r>
-          </a:p>
-          <a:p>
-            <a:pPr marL="0" indent="0">
-              <a:buFontTx/>
-              <a:buNone/>
-            </a:pPr>
-            <a:r>
-              <a:rPr lang="en-US" dirty="0">
-                <a:latin typeface="Courier" charset="0"/>
-                <a:cs typeface="Courier" charset="0"/>
-              </a:rPr>
-              <a:t>  {</a:t>
-            </a:r>
-          </a:p>
-          <a:p>
-            <a:pPr marL="0" indent="0">
-              <a:buFontTx/>
-              <a:buNone/>
-            </a:pPr>
-            <a:r>
-              <a:rPr lang="en-US" dirty="0">
-                <a:latin typeface="Courier" charset="0"/>
-                <a:cs typeface="Courier" charset="0"/>
-              </a:rPr>
-              <a:t>    </a:t>
-            </a:r>
-            <a:r>
-              <a:rPr lang="en-US" dirty="0" err="1">
-                <a:latin typeface="Courier" charset="0"/>
-                <a:cs typeface="Courier" charset="0"/>
-              </a:rPr>
-              <a:t>gotAContact</a:t>
-            </a:r>
-            <a:r>
-              <a:rPr lang="en-US" dirty="0">
-                <a:latin typeface="Courier" charset="0"/>
-                <a:cs typeface="Courier" charset="0"/>
-              </a:rPr>
-              <a:t>(</a:t>
-            </a:r>
-            <a:r>
-              <a:rPr lang="en-US" dirty="0" err="1">
-                <a:solidFill>
-                  <a:srgbClr val="CCFFCC"/>
-                </a:solidFill>
-                <a:latin typeface="Courier" charset="0"/>
-                <a:cs typeface="Courier" charset="0"/>
-              </a:rPr>
-              <a:t>data.getData</a:t>
-            </a:r>
-            <a:r>
-              <a:rPr lang="en-US" dirty="0">
-                <a:solidFill>
-                  <a:srgbClr val="CCFFCC"/>
-                </a:solidFill>
-                <a:latin typeface="Courier" charset="0"/>
-                <a:cs typeface="Courier" charset="0"/>
-              </a:rPr>
-              <a:t>()</a:t>
-            </a:r>
-            <a:r>
-              <a:rPr lang="en-US" dirty="0">
-                <a:latin typeface="Courier" charset="0"/>
-                <a:cs typeface="Courier" charset="0"/>
-              </a:rPr>
-              <a:t>);</a:t>
-            </a:r>
-          </a:p>
-          <a:p>
-            <a:pPr marL="0" indent="0">
-              <a:buFontTx/>
-              <a:buNone/>
-            </a:pPr>
-            <a:r>
-              <a:rPr lang="en-US" dirty="0">
-                <a:latin typeface="Courier" charset="0"/>
-                <a:cs typeface="Courier" charset="0"/>
-              </a:rPr>
-              <a:t>  }</a:t>
-            </a:r>
-          </a:p>
-          <a:p>
-            <a:pPr marL="0" indent="0">
-              <a:buFontTx/>
-              <a:buNone/>
-            </a:pPr>
-            <a:r>
-              <a:rPr lang="en-US" dirty="0">
-                <a:latin typeface="Courier" charset="0"/>
-                <a:cs typeface="Courier" charset="0"/>
-              </a:rPr>
-              <a:t>}</a:t>
-            </a:r>
-          </a:p>
-        </p:txBody>
-      </p:sp>
+        </p:nvGraphicFramePr>
+        <p:xfrm>
+          <a:off x="304800" y="1447800"/>
+          <a:ext cx="8458200" cy="4267200"/>
+        </p:xfrm>
+        <a:graphic>
+          <a:graphicData uri="http://schemas.openxmlformats.org/drawingml/2006/table">
+            <a:tbl>
+              <a:tblPr firstRow="1" bandRow="1">
+                <a:tableStyleId>{5940675A-B579-460E-94D1-54222C63F5DA}</a:tableStyleId>
+              </a:tblPr>
+              <a:tblGrid>
+                <a:gridCol w="4114799"/>
+                <a:gridCol w="4343401"/>
+              </a:tblGrid>
+              <a:tr h="762000">
+                <a:tc>
+                  <a:txBody>
+                    <a:bodyPr/>
+                    <a:lstStyle/>
+                    <a:p>
+                      <a:r>
+                        <a:rPr lang="en-US" sz="2400" dirty="0" smtClean="0"/>
+                        <a:t>Action</a:t>
+                      </a:r>
+                      <a:endParaRPr lang="en-US" sz="2400" dirty="0"/>
+                    </a:p>
+                  </a:txBody>
+                  <a:tcPr marT="45722" marB="45722" anchor="ctr">
+                    <a:lnL w="12700" cap="flat" cmpd="sng" algn="ctr">
+                      <a:solidFill>
+                        <a:srgbClr val="FFFFFF"/>
+                      </a:solidFill>
+                      <a:prstDash val="solid"/>
+                      <a:round/>
+                      <a:headEnd type="none" w="med" len="med"/>
+                      <a:tailEnd type="none" w="med" len="med"/>
+                    </a:lnL>
+                    <a:lnR w="12700" cap="flat" cmpd="sng" algn="ctr">
+                      <a:solidFill>
+                        <a:srgbClr val="FFFFFF"/>
+                      </a:solidFill>
+                      <a:prstDash val="solid"/>
+                      <a:round/>
+                      <a:headEnd type="none" w="med" len="med"/>
+                      <a:tailEnd type="none" w="med" len="med"/>
+                    </a:lnR>
+                    <a:lnT w="12700" cap="flat" cmpd="sng" algn="ctr">
+                      <a:solidFill>
+                        <a:srgbClr val="FFFFFF"/>
+                      </a:solidFill>
+                      <a:prstDash val="solid"/>
+                      <a:round/>
+                      <a:headEnd type="none" w="med" len="med"/>
+                      <a:tailEnd type="none" w="med" len="med"/>
+                    </a:lnT>
+                    <a:lnB w="12700" cap="flat" cmpd="sng" algn="ctr">
+                      <a:solidFill>
+                        <a:srgbClr val="FFFFFF"/>
+                      </a:solidFill>
+                      <a:prstDash val="solid"/>
+                      <a:round/>
+                      <a:headEnd type="none" w="med" len="med"/>
+                      <a:tailEnd type="none" w="med" len="med"/>
+                    </a:lnB>
+                  </a:tcPr>
+                </a:tc>
+                <a:tc>
+                  <a:txBody>
+                    <a:bodyPr/>
+                    <a:lstStyle/>
+                    <a:p>
+                      <a:r>
+                        <a:rPr lang="en-US" sz="2400" dirty="0" err="1" smtClean="0"/>
+                        <a:t>Intent.ACTION_SEND</a:t>
+                      </a:r>
+                      <a:endParaRPr lang="en-US" sz="2400" dirty="0"/>
+                    </a:p>
+                  </a:txBody>
+                  <a:tcPr marT="45722" marB="45722" anchor="ctr">
+                    <a:lnL w="12700" cap="flat" cmpd="sng" algn="ctr">
+                      <a:solidFill>
+                        <a:srgbClr val="FFFFFF"/>
+                      </a:solidFill>
+                      <a:prstDash val="solid"/>
+                      <a:round/>
+                      <a:headEnd type="none" w="med" len="med"/>
+                      <a:tailEnd type="none" w="med" len="med"/>
+                    </a:lnL>
+                    <a:lnR w="12700" cap="flat" cmpd="sng" algn="ctr">
+                      <a:solidFill>
+                        <a:srgbClr val="FFFFFF"/>
+                      </a:solidFill>
+                      <a:prstDash val="solid"/>
+                      <a:round/>
+                      <a:headEnd type="none" w="med" len="med"/>
+                      <a:tailEnd type="none" w="med" len="med"/>
+                    </a:lnR>
+                    <a:lnT w="12700" cap="flat" cmpd="sng" algn="ctr">
+                      <a:solidFill>
+                        <a:srgbClr val="FFFFFF"/>
+                      </a:solidFill>
+                      <a:prstDash val="solid"/>
+                      <a:round/>
+                      <a:headEnd type="none" w="med" len="med"/>
+                      <a:tailEnd type="none" w="med" len="med"/>
+                    </a:lnT>
+                    <a:lnB w="12700" cap="flat" cmpd="sng" algn="ctr">
+                      <a:solidFill>
+                        <a:srgbClr val="FFFFFF"/>
+                      </a:solidFill>
+                      <a:prstDash val="solid"/>
+                      <a:round/>
+                      <a:headEnd type="none" w="med" len="med"/>
+                      <a:tailEnd type="none" w="med" len="med"/>
+                    </a:lnB>
+                  </a:tcPr>
+                </a:tc>
+              </a:tr>
+              <a:tr h="685800">
+                <a:tc>
+                  <a:txBody>
+                    <a:bodyPr/>
+                    <a:lstStyle/>
+                    <a:p>
+                      <a:r>
+                        <a:rPr lang="en-US" sz="2400" dirty="0" smtClean="0"/>
+                        <a:t>Type</a:t>
+                      </a:r>
+                      <a:endParaRPr lang="en-US" sz="2400" dirty="0"/>
+                    </a:p>
+                  </a:txBody>
+                  <a:tcPr marT="45722" marB="45722" anchor="ctr">
+                    <a:lnL w="12700" cap="flat" cmpd="sng" algn="ctr">
+                      <a:solidFill>
+                        <a:srgbClr val="FFFFFF"/>
+                      </a:solidFill>
+                      <a:prstDash val="solid"/>
+                      <a:round/>
+                      <a:headEnd type="none" w="med" len="med"/>
+                      <a:tailEnd type="none" w="med" len="med"/>
+                    </a:lnL>
+                    <a:lnR w="12700" cap="flat" cmpd="sng" algn="ctr">
+                      <a:solidFill>
+                        <a:srgbClr val="FFFFFF"/>
+                      </a:solidFill>
+                      <a:prstDash val="solid"/>
+                      <a:round/>
+                      <a:headEnd type="none" w="med" len="med"/>
+                      <a:tailEnd type="none" w="med" len="med"/>
+                    </a:lnR>
+                    <a:lnT w="12700" cap="flat" cmpd="sng" algn="ctr">
+                      <a:solidFill>
+                        <a:srgbClr val="FFFFFF"/>
+                      </a:solidFill>
+                      <a:prstDash val="solid"/>
+                      <a:round/>
+                      <a:headEnd type="none" w="med" len="med"/>
+                      <a:tailEnd type="none" w="med" len="med"/>
+                    </a:lnT>
+                    <a:lnB w="12700" cap="flat" cmpd="sng" algn="ctr">
+                      <a:solidFill>
+                        <a:srgbClr val="FFFFFF"/>
+                      </a:solidFill>
+                      <a:prstDash val="solid"/>
+                      <a:round/>
+                      <a:headEnd type="none" w="med" len="med"/>
+                      <a:tailEnd type="none" w="med" len="med"/>
+                    </a:lnB>
+                  </a:tcPr>
+                </a:tc>
+                <a:tc>
+                  <a:txBody>
+                    <a:bodyPr/>
+                    <a:lstStyle/>
+                    <a:p>
+                      <a:r>
+                        <a:rPr lang="en-US" sz="2400" dirty="0" smtClean="0"/>
+                        <a:t>Type of image</a:t>
+                      </a:r>
+                      <a:r>
+                        <a:rPr lang="en-US" sz="2400" baseline="0" dirty="0" smtClean="0"/>
+                        <a:t>: </a:t>
+                      </a:r>
+                      <a:r>
+                        <a:rPr lang="en-US" sz="2400" dirty="0" smtClean="0"/>
+                        <a:t>“image/jpg”</a:t>
+                      </a:r>
+                      <a:endParaRPr lang="en-US" sz="2400" dirty="0"/>
+                    </a:p>
+                  </a:txBody>
+                  <a:tcPr marT="45722" marB="45722" anchor="ctr">
+                    <a:lnL w="12700" cap="flat" cmpd="sng" algn="ctr">
+                      <a:solidFill>
+                        <a:srgbClr val="FFFFFF"/>
+                      </a:solidFill>
+                      <a:prstDash val="solid"/>
+                      <a:round/>
+                      <a:headEnd type="none" w="med" len="med"/>
+                      <a:tailEnd type="none" w="med" len="med"/>
+                    </a:lnL>
+                    <a:lnR w="12700" cap="flat" cmpd="sng" algn="ctr">
+                      <a:solidFill>
+                        <a:srgbClr val="FFFFFF"/>
+                      </a:solidFill>
+                      <a:prstDash val="solid"/>
+                      <a:round/>
+                      <a:headEnd type="none" w="med" len="med"/>
+                      <a:tailEnd type="none" w="med" len="med"/>
+                    </a:lnR>
+                    <a:lnT w="12700" cap="flat" cmpd="sng" algn="ctr">
+                      <a:solidFill>
+                        <a:srgbClr val="FFFFFF"/>
+                      </a:solidFill>
+                      <a:prstDash val="solid"/>
+                      <a:round/>
+                      <a:headEnd type="none" w="med" len="med"/>
+                      <a:tailEnd type="none" w="med" len="med"/>
+                    </a:lnT>
+                    <a:lnB w="12700" cap="flat" cmpd="sng" algn="ctr">
+                      <a:solidFill>
+                        <a:srgbClr val="FFFFFF"/>
+                      </a:solidFill>
+                      <a:prstDash val="solid"/>
+                      <a:round/>
+                      <a:headEnd type="none" w="med" len="med"/>
+                      <a:tailEnd type="none" w="med" len="med"/>
+                    </a:lnB>
+                  </a:tcPr>
+                </a:tc>
+              </a:tr>
+              <a:tr h="762000">
+                <a:tc>
+                  <a:txBody>
+                    <a:bodyPr/>
+                    <a:lstStyle/>
+                    <a:p>
+                      <a:r>
+                        <a:rPr lang="en-US" sz="2400" dirty="0" err="1" smtClean="0"/>
+                        <a:t>Intent.EXTRA_STREAM</a:t>
+                      </a:r>
+                      <a:endParaRPr lang="en-US" sz="2400" dirty="0"/>
+                    </a:p>
+                  </a:txBody>
+                  <a:tcPr marT="45722" marB="45722" anchor="ctr">
+                    <a:lnL w="12700" cap="flat" cmpd="sng" algn="ctr">
+                      <a:solidFill>
+                        <a:srgbClr val="FFFFFF"/>
+                      </a:solidFill>
+                      <a:prstDash val="solid"/>
+                      <a:round/>
+                      <a:headEnd type="none" w="med" len="med"/>
+                      <a:tailEnd type="none" w="med" len="med"/>
+                    </a:lnL>
+                    <a:lnR w="12700" cap="flat" cmpd="sng" algn="ctr">
+                      <a:solidFill>
+                        <a:srgbClr val="FFFFFF"/>
+                      </a:solidFill>
+                      <a:prstDash val="solid"/>
+                      <a:round/>
+                      <a:headEnd type="none" w="med" len="med"/>
+                      <a:tailEnd type="none" w="med" len="med"/>
+                    </a:lnR>
+                    <a:lnT w="12700" cap="flat" cmpd="sng" algn="ctr">
+                      <a:solidFill>
+                        <a:srgbClr val="FFFFFF"/>
+                      </a:solidFill>
+                      <a:prstDash val="solid"/>
+                      <a:round/>
+                      <a:headEnd type="none" w="med" len="med"/>
+                      <a:tailEnd type="none" w="med" len="med"/>
+                    </a:lnT>
+                    <a:lnB w="12700" cap="flat" cmpd="sng" algn="ctr">
+                      <a:solidFill>
+                        <a:srgbClr val="FFFFFF"/>
+                      </a:solidFill>
+                      <a:prstDash val="solid"/>
+                      <a:round/>
+                      <a:headEnd type="none" w="med" len="med"/>
+                      <a:tailEnd type="none" w="med" len="med"/>
+                    </a:lnB>
+                  </a:tcPr>
+                </a:tc>
+                <a:tc>
+                  <a:txBody>
+                    <a:bodyPr/>
+                    <a:lstStyle/>
+                    <a:p>
+                      <a:r>
+                        <a:rPr lang="en-US" sz="2400" dirty="0" smtClean="0"/>
+                        <a:t>URI to image</a:t>
+                      </a:r>
+                      <a:endParaRPr lang="en-US" sz="2400" dirty="0"/>
+                    </a:p>
+                  </a:txBody>
+                  <a:tcPr marT="45722" marB="45722" anchor="ctr">
+                    <a:lnL w="12700" cap="flat" cmpd="sng" algn="ctr">
+                      <a:solidFill>
+                        <a:srgbClr val="FFFFFF"/>
+                      </a:solidFill>
+                      <a:prstDash val="solid"/>
+                      <a:round/>
+                      <a:headEnd type="none" w="med" len="med"/>
+                      <a:tailEnd type="none" w="med" len="med"/>
+                    </a:lnL>
+                    <a:lnR w="12700" cap="flat" cmpd="sng" algn="ctr">
+                      <a:solidFill>
+                        <a:srgbClr val="FFFFFF"/>
+                      </a:solidFill>
+                      <a:prstDash val="solid"/>
+                      <a:round/>
+                      <a:headEnd type="none" w="med" len="med"/>
+                      <a:tailEnd type="none" w="med" len="med"/>
+                    </a:lnR>
+                    <a:lnT w="12700" cap="flat" cmpd="sng" algn="ctr">
+                      <a:solidFill>
+                        <a:srgbClr val="FFFFFF"/>
+                      </a:solidFill>
+                      <a:prstDash val="solid"/>
+                      <a:round/>
+                      <a:headEnd type="none" w="med" len="med"/>
+                      <a:tailEnd type="none" w="med" len="med"/>
+                    </a:lnT>
+                    <a:lnB w="12700" cap="flat" cmpd="sng" algn="ctr">
+                      <a:solidFill>
+                        <a:srgbClr val="FFFFFF"/>
+                      </a:solidFill>
+                      <a:prstDash val="solid"/>
+                      <a:round/>
+                      <a:headEnd type="none" w="med" len="med"/>
+                      <a:tailEnd type="none" w="med" len="med"/>
+                    </a:lnB>
+                  </a:tcPr>
+                </a:tc>
+              </a:tr>
+              <a:tr h="990600">
+                <a:tc>
+                  <a:txBody>
+                    <a:bodyPr/>
+                    <a:lstStyle/>
+                    <a:p>
+                      <a:r>
+                        <a:rPr lang="en-US" sz="2400" dirty="0" smtClean="0"/>
+                        <a:t>EXTRA_PHONE_NUMBER or “address”</a:t>
+                      </a:r>
+                      <a:endParaRPr lang="en-US" sz="2400" dirty="0"/>
+                    </a:p>
+                  </a:txBody>
+                  <a:tcPr marT="45722" marB="45722" anchor="ctr">
+                    <a:lnL w="12700" cap="flat" cmpd="sng" algn="ctr">
+                      <a:solidFill>
+                        <a:srgbClr val="FFFFFF"/>
+                      </a:solidFill>
+                      <a:prstDash val="solid"/>
+                      <a:round/>
+                      <a:headEnd type="none" w="med" len="med"/>
+                      <a:tailEnd type="none" w="med" len="med"/>
+                    </a:lnL>
+                    <a:lnR w="12700" cap="flat" cmpd="sng" algn="ctr">
+                      <a:solidFill>
+                        <a:srgbClr val="FFFFFF"/>
+                      </a:solidFill>
+                      <a:prstDash val="solid"/>
+                      <a:round/>
+                      <a:headEnd type="none" w="med" len="med"/>
+                      <a:tailEnd type="none" w="med" len="med"/>
+                    </a:lnR>
+                    <a:lnT w="12700" cap="flat" cmpd="sng" algn="ctr">
+                      <a:solidFill>
+                        <a:srgbClr val="FFFFFF"/>
+                      </a:solidFill>
+                      <a:prstDash val="solid"/>
+                      <a:round/>
+                      <a:headEnd type="none" w="med" len="med"/>
+                      <a:tailEnd type="none" w="med" len="med"/>
+                    </a:lnT>
+                    <a:lnB w="12700" cap="flat" cmpd="sng" algn="ctr">
+                      <a:solidFill>
+                        <a:srgbClr val="FFFFFF"/>
+                      </a:solidFill>
+                      <a:prstDash val="solid"/>
+                      <a:round/>
+                      <a:headEnd type="none" w="med" len="med"/>
+                      <a:tailEnd type="none" w="med" len="med"/>
+                    </a:lnB>
+                  </a:tcPr>
+                </a:tc>
+                <a:tc>
+                  <a:txBody>
+                    <a:bodyPr/>
+                    <a:lstStyle/>
+                    <a:p>
+                      <a:r>
+                        <a:rPr lang="en-US" sz="2400" dirty="0" smtClean="0"/>
+                        <a:t>Destination phone number</a:t>
+                      </a:r>
+                      <a:endParaRPr lang="en-US" sz="2400" dirty="0"/>
+                    </a:p>
+                  </a:txBody>
+                  <a:tcPr marT="45722" marB="45722" anchor="ctr">
+                    <a:lnL w="12700" cap="flat" cmpd="sng" algn="ctr">
+                      <a:solidFill>
+                        <a:srgbClr val="FFFFFF"/>
+                      </a:solidFill>
+                      <a:prstDash val="solid"/>
+                      <a:round/>
+                      <a:headEnd type="none" w="med" len="med"/>
+                      <a:tailEnd type="none" w="med" len="med"/>
+                    </a:lnL>
+                    <a:lnR w="12700" cap="flat" cmpd="sng" algn="ctr">
+                      <a:solidFill>
+                        <a:srgbClr val="FFFFFF"/>
+                      </a:solidFill>
+                      <a:prstDash val="solid"/>
+                      <a:round/>
+                      <a:headEnd type="none" w="med" len="med"/>
+                      <a:tailEnd type="none" w="med" len="med"/>
+                    </a:lnR>
+                    <a:lnT w="12700" cap="flat" cmpd="sng" algn="ctr">
+                      <a:solidFill>
+                        <a:srgbClr val="FFFFFF"/>
+                      </a:solidFill>
+                      <a:prstDash val="solid"/>
+                      <a:round/>
+                      <a:headEnd type="none" w="med" len="med"/>
+                      <a:tailEnd type="none" w="med" len="med"/>
+                    </a:lnT>
+                    <a:lnB w="12700" cap="flat" cmpd="sng" algn="ctr">
+                      <a:solidFill>
+                        <a:srgbClr val="FFFFFF"/>
+                      </a:solidFill>
+                      <a:prstDash val="solid"/>
+                      <a:round/>
+                      <a:headEnd type="none" w="med" len="med"/>
+                      <a:tailEnd type="none" w="med" len="med"/>
+                    </a:lnB>
+                  </a:tcPr>
+                </a:tc>
+              </a:tr>
+              <a:tr h="1066800">
+                <a:tc>
+                  <a:txBody>
+                    <a:bodyPr/>
+                    <a:lstStyle/>
+                    <a:p>
+                      <a:r>
+                        <a:rPr lang="en-US" sz="2400" dirty="0" err="1" smtClean="0"/>
+                        <a:t>Intent.EXTRA_TEXT</a:t>
+                      </a:r>
+                      <a:r>
+                        <a:rPr lang="en-US" sz="2400" dirty="0" smtClean="0"/>
+                        <a:t> or “</a:t>
+                      </a:r>
+                      <a:r>
+                        <a:rPr lang="en-US" sz="2400" dirty="0" err="1" smtClean="0"/>
+                        <a:t>sms_body</a:t>
+                      </a:r>
+                      <a:r>
+                        <a:rPr lang="en-US" sz="2400" dirty="0" smtClean="0"/>
+                        <a:t>”</a:t>
+                      </a:r>
+                      <a:endParaRPr lang="en-US" sz="2400" dirty="0"/>
+                    </a:p>
+                  </a:txBody>
+                  <a:tcPr marT="45722" marB="45722" anchor="ctr">
+                    <a:lnL w="12700" cap="flat" cmpd="sng" algn="ctr">
+                      <a:solidFill>
+                        <a:srgbClr val="FFFFFF"/>
+                      </a:solidFill>
+                      <a:prstDash val="solid"/>
+                      <a:round/>
+                      <a:headEnd type="none" w="med" len="med"/>
+                      <a:tailEnd type="none" w="med" len="med"/>
+                    </a:lnL>
+                    <a:lnR w="12700" cap="flat" cmpd="sng" algn="ctr">
+                      <a:solidFill>
+                        <a:srgbClr val="FFFFFF"/>
+                      </a:solidFill>
+                      <a:prstDash val="solid"/>
+                      <a:round/>
+                      <a:headEnd type="none" w="med" len="med"/>
+                      <a:tailEnd type="none" w="med" len="med"/>
+                    </a:lnR>
+                    <a:lnT w="12700" cap="flat" cmpd="sng" algn="ctr">
+                      <a:solidFill>
+                        <a:srgbClr val="FFFFFF"/>
+                      </a:solidFill>
+                      <a:prstDash val="solid"/>
+                      <a:round/>
+                      <a:headEnd type="none" w="med" len="med"/>
+                      <a:tailEnd type="none" w="med" len="med"/>
+                    </a:lnT>
+                    <a:lnB w="12700" cap="flat" cmpd="sng" algn="ctr">
+                      <a:solidFill>
+                        <a:srgbClr val="FFFFFF"/>
+                      </a:solidFill>
+                      <a:prstDash val="solid"/>
+                      <a:round/>
+                      <a:headEnd type="none" w="med" len="med"/>
+                      <a:tailEnd type="none" w="med" len="med"/>
+                    </a:lnB>
+                  </a:tcPr>
+                </a:tc>
+                <a:tc>
+                  <a:txBody>
+                    <a:bodyPr/>
+                    <a:lstStyle/>
+                    <a:p>
+                      <a:r>
+                        <a:rPr lang="en-US" sz="2400" dirty="0" smtClean="0"/>
+                        <a:t>body</a:t>
+                      </a:r>
+                      <a:endParaRPr lang="en-US" sz="2400" dirty="0"/>
+                    </a:p>
+                  </a:txBody>
+                  <a:tcPr marT="45722" marB="45722" anchor="ctr">
+                    <a:lnL w="12700" cap="flat" cmpd="sng" algn="ctr">
+                      <a:solidFill>
+                        <a:srgbClr val="FFFFFF"/>
+                      </a:solidFill>
+                      <a:prstDash val="solid"/>
+                      <a:round/>
+                      <a:headEnd type="none" w="med" len="med"/>
+                      <a:tailEnd type="none" w="med" len="med"/>
+                    </a:lnL>
+                    <a:lnR w="12700" cap="flat" cmpd="sng" algn="ctr">
+                      <a:solidFill>
+                        <a:srgbClr val="FFFFFF"/>
+                      </a:solidFill>
+                      <a:prstDash val="solid"/>
+                      <a:round/>
+                      <a:headEnd type="none" w="med" len="med"/>
+                      <a:tailEnd type="none" w="med" len="med"/>
+                    </a:lnR>
+                    <a:lnT w="12700" cap="flat" cmpd="sng" algn="ctr">
+                      <a:solidFill>
+                        <a:srgbClr val="FFFFFF"/>
+                      </a:solidFill>
+                      <a:prstDash val="solid"/>
+                      <a:round/>
+                      <a:headEnd type="none" w="med" len="med"/>
+                      <a:tailEnd type="none" w="med" len="med"/>
+                    </a:lnT>
+                    <a:lnB w="12700" cap="flat" cmpd="sng" algn="ctr">
+                      <a:solidFill>
+                        <a:srgbClr val="FFFFFF"/>
+                      </a:solidFill>
+                      <a:prstDash val="solid"/>
+                      <a:round/>
+                      <a:headEnd type="none" w="med" len="med"/>
+                      <a:tailEnd type="none" w="med" len="med"/>
+                    </a:lnB>
+                  </a:tcPr>
+                </a:tc>
+              </a:tr>
+            </a:tbl>
+          </a:graphicData>
+        </a:graphic>
+      </p:graphicFrame>
     </p:spTree>
   </p:cSld>
   <p:clrMapOvr>
@@ -5386,7 +5843,7 @@
       </p:grpSpPr>
       <p:sp>
         <p:nvSpPr>
-          <p:cNvPr id="14337" name="Title 1"/>
+          <p:cNvPr id="2" name="Title 1"/>
           <p:cNvSpPr>
             <a:spLocks noGrp="1"/>
           </p:cNvSpPr>
@@ -5400,377 +5857,49 @@
           <a:lstStyle/>
           <a:p>
             <a:r>
-              <a:rPr lang="en-US">
-                <a:latin typeface="Arial" charset="0"/>
-              </a:rPr>
-              <a:t>Send a Message</a:t>
-            </a:r>
+              <a:rPr lang="en-US" dirty="0" smtClean="0"/>
+              <a:t>Create a SEND intent</a:t>
+            </a:r>
+            <a:endParaRPr lang="en-US" dirty="0"/>
           </a:p>
         </p:txBody>
       </p:sp>
-      <p:graphicFrame>
-        <p:nvGraphicFramePr>
-          <p:cNvPr id="4" name="Table 3"/>
-          <p:cNvGraphicFramePr>
-            <a:graphicFrameLocks noGrp="1"/>
-          </p:cNvGraphicFramePr>
-          <p:nvPr>
-            <p:extLst>
-              <p:ext uri="{D42A27DB-BD31-4B8C-83A1-F6EECF244321}">
-                <p14:modId xmlns:p14="http://schemas.microsoft.com/office/powerpoint/2010/main" val="3042082103"/>
-              </p:ext>
-            </p:extLst>
-          </p:nvPr>
-        </p:nvGraphicFramePr>
-        <p:xfrm>
-          <a:off x="304800" y="1447800"/>
-          <a:ext cx="8458200" cy="4038600"/>
-        </p:xfrm>
-        <a:graphic>
-          <a:graphicData uri="http://schemas.openxmlformats.org/drawingml/2006/table">
-            <a:tbl>
-              <a:tblPr firstRow="1" bandRow="1">
-                <a:tableStyleId>{5940675A-B579-460E-94D1-54222C63F5DA}</a:tableStyleId>
-              </a:tblPr>
-              <a:tblGrid>
-                <a:gridCol w="1900719"/>
-                <a:gridCol w="2214080"/>
-                <a:gridCol w="4343401"/>
-              </a:tblGrid>
-              <a:tr h="914400">
-                <a:tc>
-                  <a:txBody>
-                    <a:bodyPr/>
-                    <a:lstStyle/>
-                    <a:p>
-                      <a:r>
-                        <a:rPr lang="en-US" sz="2400" dirty="0" smtClean="0"/>
-                        <a:t>Action</a:t>
-                      </a:r>
-                      <a:endParaRPr lang="en-US" sz="2400" dirty="0"/>
-                    </a:p>
-                  </a:txBody>
-                  <a:tcPr marT="45722" marB="45722" anchor="ctr">
-                    <a:lnL w="57150" cap="flat" cmpd="sng" algn="ctr">
-                      <a:solidFill>
-                        <a:srgbClr val="FFFFFF"/>
-                      </a:solidFill>
-                      <a:prstDash val="solid"/>
-                      <a:round/>
-                      <a:headEnd type="none" w="med" len="med"/>
-                      <a:tailEnd type="none" w="med" len="med"/>
-                    </a:lnL>
-                    <a:lnT w="57150" cap="flat" cmpd="sng" algn="ctr">
-                      <a:solidFill>
-                        <a:srgbClr val="FFFFFF"/>
-                      </a:solidFill>
-                      <a:prstDash val="solid"/>
-                      <a:round/>
-                      <a:headEnd type="none" w="med" len="med"/>
-                      <a:tailEnd type="none" w="med" len="med"/>
-                    </a:lnT>
-                    <a:lnB w="38100" cap="flat" cmpd="sng" algn="ctr">
-                      <a:solidFill>
-                        <a:srgbClr val="FFFFFF"/>
-                      </a:solidFill>
-                      <a:prstDash val="solid"/>
-                      <a:round/>
-                      <a:headEnd type="none" w="med" len="med"/>
-                      <a:tailEnd type="none" w="med" len="med"/>
-                    </a:lnB>
-                  </a:tcPr>
-                </a:tc>
-                <a:tc gridSpan="2">
-                  <a:txBody>
-                    <a:bodyPr/>
-                    <a:lstStyle/>
-                    <a:p>
-                      <a:r>
-                        <a:rPr lang="en-US" sz="2400" dirty="0" err="1" smtClean="0"/>
-                        <a:t>Intent.ACTION_SEND</a:t>
-                      </a:r>
-                      <a:endParaRPr lang="en-US" sz="2400" dirty="0"/>
-                    </a:p>
-                  </a:txBody>
-                  <a:tcPr marT="45722" marB="45722" anchor="ctr">
-                    <a:lnR w="57150" cap="flat" cmpd="sng" algn="ctr">
-                      <a:solidFill>
-                        <a:srgbClr val="FFFFFF"/>
-                      </a:solidFill>
-                      <a:prstDash val="solid"/>
-                      <a:round/>
-                      <a:headEnd type="none" w="med" len="med"/>
-                      <a:tailEnd type="none" w="med" len="med"/>
-                    </a:lnR>
-                    <a:lnT w="57150" cap="flat" cmpd="sng" algn="ctr">
-                      <a:solidFill>
-                        <a:srgbClr val="FFFFFF"/>
-                      </a:solidFill>
-                      <a:prstDash val="solid"/>
-                      <a:round/>
-                      <a:headEnd type="none" w="med" len="med"/>
-                      <a:tailEnd type="none" w="med" len="med"/>
-                    </a:lnT>
-                    <a:lnB w="38100" cap="flat" cmpd="sng" algn="ctr">
-                      <a:solidFill>
-                        <a:srgbClr val="FFFFFF"/>
-                      </a:solidFill>
-                      <a:prstDash val="solid"/>
-                      <a:round/>
-                      <a:headEnd type="none" w="med" len="med"/>
-                      <a:tailEnd type="none" w="med" len="med"/>
-                    </a:lnB>
-                  </a:tcPr>
-                </a:tc>
-                <a:tc hMerge="1">
-                  <a:txBody>
-                    <a:bodyPr/>
-                    <a:lstStyle/>
-                    <a:p>
-                      <a:endParaRPr lang="en-US"/>
-                    </a:p>
-                  </a:txBody>
-                  <a:tcPr/>
-                </a:tc>
-              </a:tr>
-              <a:tr h="602410">
-                <a:tc gridSpan="3">
-                  <a:txBody>
-                    <a:bodyPr/>
-                    <a:lstStyle/>
-                    <a:p>
-                      <a:r>
-                        <a:rPr lang="en-US" sz="2400" dirty="0" smtClean="0"/>
-                        <a:t>Extras</a:t>
-                      </a:r>
-                      <a:endParaRPr lang="en-US" sz="2400" dirty="0"/>
-                    </a:p>
-                  </a:txBody>
-                  <a:tcPr marT="45722" marB="45722" anchor="ctr">
-                    <a:lnL w="57150" cap="flat" cmpd="sng" algn="ctr">
-                      <a:solidFill>
-                        <a:srgbClr val="FFFFFF"/>
-                      </a:solidFill>
-                      <a:prstDash val="solid"/>
-                      <a:round/>
-                      <a:headEnd type="none" w="med" len="med"/>
-                      <a:tailEnd type="none" w="med" len="med"/>
-                    </a:lnL>
-                    <a:lnR w="57150" cap="flat" cmpd="sng" algn="ctr">
-                      <a:solidFill>
-                        <a:srgbClr val="FFFFFF"/>
-                      </a:solidFill>
-                      <a:prstDash val="solid"/>
-                      <a:round/>
-                      <a:headEnd type="none" w="med" len="med"/>
-                      <a:tailEnd type="none" w="med" len="med"/>
-                    </a:lnR>
-                    <a:lnT w="38100" cap="flat" cmpd="sng" algn="ctr">
-                      <a:solidFill>
-                        <a:srgbClr val="FFFFFF"/>
-                      </a:solidFill>
-                      <a:prstDash val="solid"/>
-                      <a:round/>
-                      <a:headEnd type="none" w="med" len="med"/>
-                      <a:tailEnd type="none" w="med" len="med"/>
-                    </a:lnT>
-                  </a:tcPr>
-                </a:tc>
-                <a:tc hMerge="1">
-                  <a:txBody>
-                    <a:bodyPr/>
-                    <a:lstStyle/>
-                    <a:p>
-                      <a:endParaRPr lang="en-US" dirty="0"/>
-                    </a:p>
-                  </a:txBody>
-                  <a:tcPr anchor="ctr">
-                    <a:lnR w="57150" cap="flat" cmpd="sng" algn="ctr">
-                      <a:solidFill>
-                        <a:srgbClr val="FFFFFF"/>
-                      </a:solidFill>
-                      <a:prstDash val="solid"/>
-                      <a:round/>
-                      <a:headEnd type="none" w="med" len="med"/>
-                      <a:tailEnd type="none" w="med" len="med"/>
-                    </a:lnR>
-                  </a:tcPr>
-                </a:tc>
-                <a:tc hMerge="1">
-                  <a:txBody>
-                    <a:bodyPr/>
-                    <a:lstStyle/>
-                    <a:p>
-                      <a:endParaRPr lang="en-US"/>
-                    </a:p>
-                  </a:txBody>
-                  <a:tcPr/>
-                </a:tc>
-              </a:tr>
-              <a:tr h="1226390">
-                <a:tc gridSpan="2">
-                  <a:txBody>
-                    <a:bodyPr/>
-                    <a:lstStyle/>
-                    <a:p>
-                      <a:r>
-                        <a:rPr lang="en-US" sz="2400" dirty="0" err="1" smtClean="0"/>
-                        <a:t>Intent.EXTRA_STREAM</a:t>
-                      </a:r>
-                      <a:endParaRPr lang="en-US" sz="2400" dirty="0"/>
-                    </a:p>
-                  </a:txBody>
-                  <a:tcPr marT="45722" marB="45722" anchor="ctr">
-                    <a:lnL w="57150" cap="flat" cmpd="sng" algn="ctr">
-                      <a:solidFill>
-                        <a:srgbClr val="FFFFFF"/>
-                      </a:solidFill>
-                      <a:prstDash val="solid"/>
-                      <a:round/>
-                      <a:headEnd type="none" w="med" len="med"/>
-                      <a:tailEnd type="none" w="med" len="med"/>
-                    </a:lnL>
-                  </a:tcPr>
-                </a:tc>
-                <a:tc hMerge="1">
-                  <a:txBody>
-                    <a:bodyPr/>
-                    <a:lstStyle/>
-                    <a:p>
-                      <a:endParaRPr lang="en-US" dirty="0"/>
-                    </a:p>
-                  </a:txBody>
-                  <a:tcPr anchor="ctr">
-                    <a:lnR w="57150" cap="flat" cmpd="sng" algn="ctr">
-                      <a:solidFill>
-                        <a:srgbClr val="FFFFFF"/>
-                      </a:solidFill>
-                      <a:prstDash val="solid"/>
-                      <a:round/>
-                      <a:headEnd type="none" w="med" len="med"/>
-                      <a:tailEnd type="none" w="med" len="med"/>
-                    </a:lnR>
-                    <a:lnB w="57150" cap="flat" cmpd="sng" algn="ctr">
-                      <a:solidFill>
-                        <a:srgbClr val="FFFFFF"/>
-                      </a:solidFill>
-                      <a:prstDash val="solid"/>
-                      <a:round/>
-                      <a:headEnd type="none" w="med" len="med"/>
-                      <a:tailEnd type="none" w="med" len="med"/>
-                    </a:lnB>
-                  </a:tcPr>
-                </a:tc>
-                <a:tc>
-                  <a:txBody>
-                    <a:bodyPr/>
-                    <a:lstStyle/>
-                    <a:p>
-                      <a:r>
-                        <a:rPr lang="en-US" sz="2400" dirty="0" smtClean="0"/>
-                        <a:t>URI to image</a:t>
-                      </a:r>
-                      <a:endParaRPr lang="en-US" sz="2400" dirty="0"/>
-                    </a:p>
-                  </a:txBody>
-                  <a:tcPr marT="45722" marB="45722" anchor="ctr">
-                    <a:lnR w="57150" cap="flat" cmpd="sng" algn="ctr">
-                      <a:solidFill>
-                        <a:srgbClr val="FFFFFF"/>
-                      </a:solidFill>
-                      <a:prstDash val="solid"/>
-                      <a:round/>
-                      <a:headEnd type="none" w="med" len="med"/>
-                      <a:tailEnd type="none" w="med" len="med"/>
-                    </a:lnR>
-                  </a:tcPr>
-                </a:tc>
-              </a:tr>
-              <a:tr h="1295400">
-                <a:tc gridSpan="2">
-                  <a:txBody>
-                    <a:bodyPr/>
-                    <a:lstStyle/>
-                    <a:p>
-                      <a:r>
-                        <a:rPr lang="en-US" sz="2400" dirty="0" smtClean="0"/>
-                        <a:t>Intent.</a:t>
-                      </a:r>
-                    </a:p>
-                    <a:p>
-                      <a:r>
-                        <a:rPr lang="en-US" sz="2400" dirty="0" smtClean="0"/>
-                        <a:t>EXTRA_PHONE_NUMBER</a:t>
-                      </a:r>
-                      <a:endParaRPr lang="en-US" sz="2400" dirty="0"/>
-                    </a:p>
-                  </a:txBody>
-                  <a:tcPr marT="45722" marB="45722" anchor="ctr">
-                    <a:lnL w="57150" cap="flat" cmpd="sng" algn="ctr">
-                      <a:solidFill>
-                        <a:srgbClr val="FFFFFF"/>
-                      </a:solidFill>
-                      <a:prstDash val="solid"/>
-                      <a:round/>
-                      <a:headEnd type="none" w="med" len="med"/>
-                      <a:tailEnd type="none" w="med" len="med"/>
-                    </a:lnL>
-                    <a:lnB w="38100" cap="flat" cmpd="sng" algn="ctr">
-                      <a:solidFill>
-                        <a:srgbClr val="FFFFFF"/>
-                      </a:solidFill>
-                      <a:prstDash val="solid"/>
-                      <a:round/>
-                      <a:headEnd type="none" w="med" len="med"/>
-                      <a:tailEnd type="none" w="med" len="med"/>
-                    </a:lnB>
-                  </a:tcPr>
-                </a:tc>
-                <a:tc hMerge="1">
-                  <a:txBody>
-                    <a:bodyPr/>
-                    <a:lstStyle/>
-                    <a:p>
-                      <a:endParaRPr lang="en-US"/>
-                    </a:p>
-                  </a:txBody>
-                  <a:tcPr/>
-                </a:tc>
-                <a:tc>
-                  <a:txBody>
-                    <a:bodyPr/>
-                    <a:lstStyle/>
-                    <a:p>
-                      <a:endParaRPr lang="en-US" sz="2400" dirty="0"/>
-                    </a:p>
-                  </a:txBody>
-                  <a:tcPr marT="45722" marB="45722" anchor="ctr">
-                    <a:lnR w="57150" cap="flat" cmpd="sng" algn="ctr">
-                      <a:solidFill>
-                        <a:srgbClr val="FFFFFF"/>
-                      </a:solidFill>
-                      <a:prstDash val="solid"/>
-                      <a:round/>
-                      <a:headEnd type="none" w="med" len="med"/>
-                      <a:tailEnd type="none" w="med" len="med"/>
-                    </a:lnR>
-                    <a:lnB w="38100" cap="flat" cmpd="sng" algn="ctr">
-                      <a:solidFill>
-                        <a:srgbClr val="FFFFFF"/>
-                      </a:solidFill>
-                      <a:prstDash val="solid"/>
-                      <a:round/>
-                      <a:headEnd type="none" w="med" len="med"/>
-                      <a:tailEnd type="none" w="med" len="med"/>
-                    </a:lnB>
-                  </a:tcPr>
-                </a:tc>
-              </a:tr>
-            </a:tbl>
-          </a:graphicData>
-        </a:graphic>
-      </p:graphicFrame>
+      <p:pic>
+        <p:nvPicPr>
+          <p:cNvPr id="6" name="Picture 5" descr="Screen Shot 2012-05-27 at 4.03.05 PM.png"/>
+          <p:cNvPicPr>
+            <a:picLocks noChangeAspect="1"/>
+          </p:cNvPicPr>
+          <p:nvPr/>
+        </p:nvPicPr>
+        <p:blipFill>
+          <a:blip r:embed="rId2">
+            <a:extLst>
+              <a:ext uri="{28A0092B-C50C-407E-A947-70E740481C1C}">
+                <a14:useLocalDpi xmlns:a14="http://schemas.microsoft.com/office/drawing/2010/main" val="0"/>
+              </a:ext>
+            </a:extLst>
+          </a:blip>
+          <a:stretch>
+            <a:fillRect/>
+          </a:stretch>
+        </p:blipFill>
+        <p:spPr>
+          <a:xfrm>
+            <a:off x="8006" y="1752600"/>
+            <a:ext cx="9144000" cy="3680318"/>
+          </a:xfrm>
+          <a:prstGeom prst="rect">
+            <a:avLst/>
+          </a:prstGeom>
+        </p:spPr>
+      </p:pic>
     </p:spTree>
+    <p:extLst>
+      <p:ext uri="{BB962C8B-B14F-4D97-AF65-F5344CB8AC3E}">
+        <p14:creationId xmlns:p14="http://schemas.microsoft.com/office/powerpoint/2010/main" val="4293346186"/>
+      </p:ext>
+    </p:extLst>
   </p:cSld>
   <p:clrMapOvr>
     <a:masterClrMapping/>
@@ -5778,17 +5907,96 @@
   <p:transition xmlns:p14="http://schemas.microsoft.com/office/powerpoint/2010/main">
     <p:wipe/>
   </p:transition>
-  <p:timing>
-    <p:tnLst>
-      <p:par>
-        <p:cTn xmlns:p14="http://schemas.microsoft.com/office/powerpoint/2010/main" id="1" dur="indefinite" restart="never" nodeType="tmRoot"/>
-      </p:par>
-    </p:tnLst>
-  </p:timing>
 </p:sld>
 </file>
 
 <file path=ppt/slides/slide15.xml><?xml version="1.0" encoding="utf-8"?>
+<p:sld xmlns:a="http://schemas.openxmlformats.org/drawingml/2006/main" xmlns:r="http://schemas.openxmlformats.org/officeDocument/2006/relationships" xmlns:p="http://schemas.openxmlformats.org/presentationml/2006/main">
+  <p:cSld>
+    <p:spTree>
+      <p:nvGrpSpPr>
+        <p:cNvPr id="1" name=""/>
+        <p:cNvGrpSpPr/>
+        <p:nvPr/>
+      </p:nvGrpSpPr>
+      <p:grpSpPr>
+        <a:xfrm>
+          <a:off x="0" y="0"/>
+          <a:ext cx="0" cy="0"/>
+          <a:chOff x="0" y="0"/>
+          <a:chExt cx="0" cy="0"/>
+        </a:xfrm>
+      </p:grpSpPr>
+      <p:sp>
+        <p:nvSpPr>
+          <p:cNvPr id="2" name="Title 1"/>
+          <p:cNvSpPr>
+            <a:spLocks noGrp="1"/>
+          </p:cNvSpPr>
+          <p:nvPr>
+            <p:ph type="title"/>
+          </p:nvPr>
+        </p:nvSpPr>
+        <p:spPr/>
+        <p:txBody>
+          <a:bodyPr/>
+          <a:lstStyle/>
+          <a:p>
+            <a:r>
+              <a:rPr lang="en-US" dirty="0" smtClean="0"/>
+              <a:t>Throw it out there!</a:t>
+            </a:r>
+            <a:endParaRPr lang="en-US" dirty="0"/>
+          </a:p>
+        </p:txBody>
+      </p:sp>
+      <p:pic>
+        <p:nvPicPr>
+          <p:cNvPr id="4" name="Picture 3" descr="Screen Shot 2012-05-27 at 4.04.37 PM.png"/>
+          <p:cNvPicPr>
+            <a:picLocks noChangeAspect="1"/>
+          </p:cNvPicPr>
+          <p:nvPr/>
+        </p:nvPicPr>
+        <p:blipFill>
+          <a:blip r:embed="rId3">
+            <a:extLst>
+              <a:ext uri="{28A0092B-C50C-407E-A947-70E740481C1C}">
+                <a14:useLocalDpi xmlns:a14="http://schemas.microsoft.com/office/drawing/2010/main" val="0"/>
+              </a:ext>
+            </a:extLst>
+          </a:blip>
+          <a:stretch>
+            <a:fillRect/>
+          </a:stretch>
+        </p:blipFill>
+        <p:spPr>
+          <a:xfrm>
+            <a:off x="533400" y="1828800"/>
+            <a:ext cx="8151194" cy="1776542"/>
+          </a:xfrm>
+          <a:prstGeom prst="rect">
+            <a:avLst/>
+          </a:prstGeom>
+        </p:spPr>
+      </p:pic>
+    </p:spTree>
+    <p:extLst>
+      <p:ext uri="{BB962C8B-B14F-4D97-AF65-F5344CB8AC3E}">
+        <p14:creationId xmlns:p14="http://schemas.microsoft.com/office/powerpoint/2010/main" val="3924518788"/>
+      </p:ext>
+    </p:extLst>
+  </p:cSld>
+  <p:clrMapOvr>
+    <a:masterClrMapping/>
+  </p:clrMapOvr>
+  <p:transition xmlns:p14="http://schemas.microsoft.com/office/powerpoint/2010/main">
+    <p:wipe/>
+  </p:transition>
+</p:sld>
+</file>
+
+<file path=ppt/slides/slide16.xml><?xml version="1.0" encoding="utf-8"?>
 <p:sld xmlns:a="http://schemas.openxmlformats.org/drawingml/2006/main" xmlns:r="http://schemas.openxmlformats.org/officeDocument/2006/relationships" xmlns:p="http://schemas.openxmlformats.org/presentationml/2006/main">
   <p:cSld>
     <p:spTree>
@@ -6321,7 +6529,7 @@
 </p:sld>
 </file>
 
-<file path=ppt/slides/slide16.xml><?xml version="1.0" encoding="utf-8"?>
+<file path=ppt/slides/slide17.xml><?xml version="1.0" encoding="utf-8"?>
 <p:sld xmlns:a="http://schemas.openxmlformats.org/drawingml/2006/main" xmlns:r="http://schemas.openxmlformats.org/officeDocument/2006/relationships" xmlns:p="http://schemas.openxmlformats.org/presentationml/2006/main">
   <p:cSld>
     <p:spTree>
@@ -6355,6 +6563,92 @@
           <a:p>
             <a:r>
               <a:rPr lang="en-US" dirty="0" smtClean="0"/>
+              <a:t>Find out what they picked</a:t>
+            </a:r>
+            <a:endParaRPr lang="en-US" dirty="0"/>
+          </a:p>
+        </p:txBody>
+      </p:sp>
+      <p:pic>
+        <p:nvPicPr>
+          <p:cNvPr id="7" name="Picture 6" descr="Screen Shot 2012-05-27 at 4.09.56 PM.png"/>
+          <p:cNvPicPr>
+            <a:picLocks noChangeAspect="1"/>
+          </p:cNvPicPr>
+          <p:nvPr/>
+        </p:nvPicPr>
+        <p:blipFill>
+          <a:blip r:embed="rId2">
+            <a:extLst>
+              <a:ext uri="{28A0092B-C50C-407E-A947-70E740481C1C}">
+                <a14:useLocalDpi xmlns:a14="http://schemas.microsoft.com/office/drawing/2010/main" val="0"/>
+              </a:ext>
+            </a:extLst>
+          </a:blip>
+          <a:stretch>
+            <a:fillRect/>
+          </a:stretch>
+        </p:blipFill>
+        <p:spPr>
+          <a:xfrm>
+            <a:off x="0" y="2621107"/>
+            <a:ext cx="9144000" cy="1645248"/>
+          </a:xfrm>
+          <a:prstGeom prst="rect">
+            <a:avLst/>
+          </a:prstGeom>
+        </p:spPr>
+      </p:pic>
+    </p:spTree>
+    <p:extLst>
+      <p:ext uri="{BB962C8B-B14F-4D97-AF65-F5344CB8AC3E}">
+        <p14:creationId xmlns:p14="http://schemas.microsoft.com/office/powerpoint/2010/main" val="1698091666"/>
+      </p:ext>
+    </p:extLst>
+  </p:cSld>
+  <p:clrMapOvr>
+    <a:masterClrMapping/>
+  </p:clrMapOvr>
+  <p:transition xmlns:p14="http://schemas.microsoft.com/office/powerpoint/2010/main">
+    <p:wipe/>
+  </p:transition>
+</p:sld>
+</file>
+
+<file path=ppt/slides/slide18.xml><?xml version="1.0" encoding="utf-8"?>
+<p:sld xmlns:a="http://schemas.openxmlformats.org/drawingml/2006/main" xmlns:r="http://schemas.openxmlformats.org/officeDocument/2006/relationships" xmlns:p="http://schemas.openxmlformats.org/presentationml/2006/main">
+  <p:cSld>
+    <p:spTree>
+      <p:nvGrpSpPr>
+        <p:cNvPr id="1" name=""/>
+        <p:cNvGrpSpPr/>
+        <p:nvPr/>
+      </p:nvGrpSpPr>
+      <p:grpSpPr>
+        <a:xfrm>
+          <a:off x="0" y="0"/>
+          <a:ext cx="0" cy="0"/>
+          <a:chOff x="0" y="0"/>
+          <a:chExt cx="0" cy="0"/>
+        </a:xfrm>
+      </p:grpSpPr>
+      <p:sp>
+        <p:nvSpPr>
+          <p:cNvPr id="2" name="Title 1"/>
+          <p:cNvSpPr>
+            <a:spLocks noGrp="1"/>
+          </p:cNvSpPr>
+          <p:nvPr>
+            <p:ph type="title"/>
+          </p:nvPr>
+        </p:nvSpPr>
+        <p:spPr/>
+        <p:txBody>
+          <a:bodyPr/>
+          <a:lstStyle/>
+          <a:p>
+            <a:r>
+              <a:rPr lang="en-US" dirty="0" smtClean="0"/>
               <a:t>Three ways to let the user choose	</a:t>
             </a:r>
             <a:endParaRPr lang="en-US" dirty="0"/>
@@ -6468,7 +6762,7 @@
 </p:sld>
 </file>
 
-<file path=ppt/slides/slide17.xml><?xml version="1.0" encoding="utf-8"?>
+<file path=ppt/slides/slide19.xml><?xml version="1.0" encoding="utf-8"?>
 <p:sld xmlns:a="http://schemas.openxmlformats.org/drawingml/2006/main" xmlns:r="http://schemas.openxmlformats.org/officeDocument/2006/relationships" xmlns:p="http://schemas.openxmlformats.org/presentationml/2006/main">
   <p:cSld>
     <p:spTree>
@@ -6792,7 +7086,96 @@
 </p:sld>
 </file>
 
-<file path=ppt/slides/slide18.xml><?xml version="1.0" encoding="utf-8"?>
+<file path=ppt/slides/slide2.xml><?xml version="1.0" encoding="utf-8"?>
+<p:sld xmlns:a="http://schemas.openxmlformats.org/drawingml/2006/main" xmlns:r="http://schemas.openxmlformats.org/officeDocument/2006/relationships" xmlns:p="http://schemas.openxmlformats.org/presentationml/2006/main">
+  <p:cSld>
+    <p:spTree>
+      <p:nvGrpSpPr>
+        <p:cNvPr id="1" name=""/>
+        <p:cNvGrpSpPr/>
+        <p:nvPr/>
+      </p:nvGrpSpPr>
+      <p:grpSpPr>
+        <a:xfrm>
+          <a:off x="0" y="0"/>
+          <a:ext cx="0" cy="0"/>
+          <a:chOff x="0" y="0"/>
+          <a:chExt cx="0" cy="0"/>
+        </a:xfrm>
+      </p:grpSpPr>
+      <p:pic>
+        <p:nvPicPr>
+          <p:cNvPr id="27649" name="Picture 3" descr="lego_space_station.jpg"/>
+          <p:cNvPicPr>
+            <a:picLocks noChangeAspect="1"/>
+          </p:cNvPicPr>
+          <p:nvPr/>
+        </p:nvPicPr>
+        <p:blipFill>
+          <a:blip r:embed="rId2">
+            <a:extLst>
+              <a:ext uri="{28A0092B-C50C-407E-A947-70E740481C1C}">
+                <a14:useLocalDpi xmlns:a14="http://schemas.microsoft.com/office/drawing/2010/main" val="0"/>
+              </a:ext>
+            </a:extLst>
+          </a:blip>
+          <a:srcRect/>
+          <a:stretch>
+            <a:fillRect/>
+          </a:stretch>
+        </p:blipFill>
+        <p:spPr bwMode="auto">
+          <a:xfrm>
+            <a:off x="1295400" y="857250"/>
+            <a:ext cx="6705600" cy="5029200"/>
+          </a:xfrm>
+          <a:prstGeom prst="rect">
+            <a:avLst/>
+          </a:prstGeom>
+          <a:noFill/>
+          <a:ln>
+            <a:noFill/>
+          </a:ln>
+          <a:extLst>
+            <a:ext uri="{909E8E84-426E-40dd-AFC4-6F175D3DCCD1}">
+              <a14:hiddenFill xmlns:a14="http://schemas.microsoft.com/office/drawing/2010/main">
+                <a:solidFill>
+                  <a:srgbClr val="FFFFFF"/>
+                </a:solidFill>
+              </a14:hiddenFill>
+            </a:ext>
+            <a:ext uri="{91240B29-F687-4f45-9708-019B960494DF}">
+              <a14:hiddenLine xmlns:a14="http://schemas.microsoft.com/office/drawing/2010/main" w="9525">
+                <a:solidFill>
+                  <a:srgbClr val="000000"/>
+                </a:solidFill>
+                <a:miter lim="800000"/>
+                <a:headEnd/>
+                <a:tailEnd/>
+              </a14:hiddenLine>
+            </a:ext>
+          </a:extLst>
+        </p:spPr>
+      </p:pic>
+    </p:spTree>
+  </p:cSld>
+  <p:clrMapOvr>
+    <a:masterClrMapping/>
+  </p:clrMapOvr>
+  <p:transition xmlns:p14="http://schemas.microsoft.com/office/powerpoint/2010/main">
+    <p:wipe/>
+  </p:transition>
+  <p:timing>
+    <p:tnLst>
+      <p:par>
+        <p:cTn xmlns:p14="http://schemas.microsoft.com/office/powerpoint/2010/main" id="1" dur="indefinite" restart="never" nodeType="tmRoot"/>
+      </p:par>
+    </p:tnLst>
+  </p:timing>
+</p:sld>
+</file>
+
+<file path=ppt/slides/slide20.xml><?xml version="1.0" encoding="utf-8"?>
 <p:sld xmlns:a="http://schemas.openxmlformats.org/drawingml/2006/main" xmlns:r="http://schemas.openxmlformats.org/officeDocument/2006/relationships" xmlns:p="http://schemas.openxmlformats.org/presentationml/2006/main">
   <p:cSld>
     <p:spTree>
@@ -7031,7 +7414,7 @@
 </p:sld>
 </file>
 
-<file path=ppt/slides/slide19.xml><?xml version="1.0" encoding="utf-8"?>
+<file path=ppt/slides/slide21.xml><?xml version="1.0" encoding="utf-8"?>
 <p:sld xmlns:a="http://schemas.openxmlformats.org/drawingml/2006/main" xmlns:r="http://schemas.openxmlformats.org/officeDocument/2006/relationships" xmlns:p="http://schemas.openxmlformats.org/presentationml/2006/main">
   <p:cSld>
     <p:spTree>
@@ -7188,96 +7571,7 @@
 </p:sld>
 </file>
 
-<file path=ppt/slides/slide2.xml><?xml version="1.0" encoding="utf-8"?>
-<p:sld xmlns:a="http://schemas.openxmlformats.org/drawingml/2006/main" xmlns:r="http://schemas.openxmlformats.org/officeDocument/2006/relationships" xmlns:p="http://schemas.openxmlformats.org/presentationml/2006/main">
-  <p:cSld>
-    <p:spTree>
-      <p:nvGrpSpPr>
-        <p:cNvPr id="1" name=""/>
-        <p:cNvGrpSpPr/>
-        <p:nvPr/>
-      </p:nvGrpSpPr>
-      <p:grpSpPr>
-        <a:xfrm>
-          <a:off x="0" y="0"/>
-          <a:ext cx="0" cy="0"/>
-          <a:chOff x="0" y="0"/>
-          <a:chExt cx="0" cy="0"/>
-        </a:xfrm>
-      </p:grpSpPr>
-      <p:pic>
-        <p:nvPicPr>
-          <p:cNvPr id="27649" name="Picture 3" descr="lego_space_station.jpg"/>
-          <p:cNvPicPr>
-            <a:picLocks noChangeAspect="1"/>
-          </p:cNvPicPr>
-          <p:nvPr/>
-        </p:nvPicPr>
-        <p:blipFill>
-          <a:blip r:embed="rId2">
-            <a:extLst>
-              <a:ext uri="{28A0092B-C50C-407E-A947-70E740481C1C}">
-                <a14:useLocalDpi xmlns:a14="http://schemas.microsoft.com/office/drawing/2010/main" val="0"/>
-              </a:ext>
-            </a:extLst>
-          </a:blip>
-          <a:srcRect/>
-          <a:stretch>
-            <a:fillRect/>
-          </a:stretch>
-        </p:blipFill>
-        <p:spPr bwMode="auto">
-          <a:xfrm>
-            <a:off x="1295400" y="857250"/>
-            <a:ext cx="6705600" cy="5029200"/>
-          </a:xfrm>
-          <a:prstGeom prst="rect">
-            <a:avLst/>
-          </a:prstGeom>
-          <a:noFill/>
-          <a:ln>
-            <a:noFill/>
-          </a:ln>
-          <a:extLst>
-            <a:ext uri="{909E8E84-426E-40dd-AFC4-6F175D3DCCD1}">
-              <a14:hiddenFill xmlns:a14="http://schemas.microsoft.com/office/drawing/2010/main">
-                <a:solidFill>
-                  <a:srgbClr val="FFFFFF"/>
-                </a:solidFill>
-              </a14:hiddenFill>
-            </a:ext>
-            <a:ext uri="{91240B29-F687-4f45-9708-019B960494DF}">
-              <a14:hiddenLine xmlns:a14="http://schemas.microsoft.com/office/drawing/2010/main" w="9525">
-                <a:solidFill>
-                  <a:srgbClr val="000000"/>
-                </a:solidFill>
-                <a:miter lim="800000"/>
-                <a:headEnd/>
-                <a:tailEnd/>
-              </a14:hiddenLine>
-            </a:ext>
-          </a:extLst>
-        </p:spPr>
-      </p:pic>
-    </p:spTree>
-  </p:cSld>
-  <p:clrMapOvr>
-    <a:masterClrMapping/>
-  </p:clrMapOvr>
-  <p:transition xmlns:p14="http://schemas.microsoft.com/office/powerpoint/2010/main">
-    <p:wipe/>
-  </p:transition>
-  <p:timing>
-    <p:tnLst>
-      <p:par>
-        <p:cTn xmlns:p14="http://schemas.microsoft.com/office/powerpoint/2010/main" id="1" dur="indefinite" restart="never" nodeType="tmRoot"/>
-      </p:par>
-    </p:tnLst>
-  </p:timing>
-</p:sld>
-</file>
-
-<file path=ppt/slides/slide20.xml><?xml version="1.0" encoding="utf-8"?>
+<file path=ppt/slides/slide22.xml><?xml version="1.0" encoding="utf-8"?>
 <p:sld xmlns:a="http://schemas.openxmlformats.org/drawingml/2006/main" xmlns:r="http://schemas.openxmlformats.org/officeDocument/2006/relationships" xmlns:p="http://schemas.openxmlformats.org/presentationml/2006/main">
   <p:cSld>
     <p:spTree>
@@ -7686,7 +7980,7 @@
 </p:sld>
 </file>
 
-<file path=ppt/slides/slide21.xml><?xml version="1.0" encoding="utf-8"?>
+<file path=ppt/slides/slide23.xml><?xml version="1.0" encoding="utf-8"?>
 <p:sld xmlns:a="http://schemas.openxmlformats.org/drawingml/2006/main" xmlns:r="http://schemas.openxmlformats.org/officeDocument/2006/relationships" xmlns:p="http://schemas.openxmlformats.org/presentationml/2006/main">
   <p:cSld>
     <p:spTree>
@@ -7844,7 +8138,7 @@
 </p:sld>
 </file>
 
-<file path=ppt/slides/slide22.xml><?xml version="1.0" encoding="utf-8"?>
+<file path=ppt/slides/slide24.xml><?xml version="1.0" encoding="utf-8"?>
 <p:sld xmlns:a="http://schemas.openxmlformats.org/drawingml/2006/main" xmlns:r="http://schemas.openxmlformats.org/officeDocument/2006/relationships" xmlns:p="http://schemas.openxmlformats.org/presentationml/2006/main">
   <p:cSld>
     <p:spTree>
@@ -7944,285 +8238,6 @@
           </a:p>
           <a:p>
             <a:pPr lvl="1"/>
-            <a:endParaRPr lang="en-US" dirty="0">
-              <a:latin typeface="Arial" charset="0"/>
-            </a:endParaRPr>
-          </a:p>
-        </p:txBody>
-      </p:sp>
-    </p:spTree>
-  </p:cSld>
-  <p:clrMapOvr>
-    <a:masterClrMapping/>
-  </p:clrMapOvr>
-  <p:transition xmlns:p14="http://schemas.microsoft.com/office/powerpoint/2010/main">
-    <p:wipe/>
-  </p:transition>
-  <p:timing>
-    <p:tnLst>
-      <p:par>
-        <p:cTn xmlns:p14="http://schemas.microsoft.com/office/powerpoint/2010/main" id="1" dur="indefinite" restart="never" nodeType="tmRoot"/>
-      </p:par>
-    </p:tnLst>
-  </p:timing>
-</p:sld>
-</file>
-
-<file path=ppt/slides/slide23.xml><?xml version="1.0" encoding="utf-8"?>
-<p:sld xmlns:a="http://schemas.openxmlformats.org/drawingml/2006/main" xmlns:r="http://schemas.openxmlformats.org/officeDocument/2006/relationships" xmlns:p="http://schemas.openxmlformats.org/presentationml/2006/main">
-  <p:cSld>
-    <p:spTree>
-      <p:nvGrpSpPr>
-        <p:cNvPr id="1" name=""/>
-        <p:cNvGrpSpPr/>
-        <p:nvPr/>
-      </p:nvGrpSpPr>
-      <p:grpSpPr>
-        <a:xfrm>
-          <a:off x="0" y="0"/>
-          <a:ext cx="0" cy="0"/>
-          <a:chOff x="0" y="0"/>
-          <a:chExt cx="0" cy="0"/>
-        </a:xfrm>
-      </p:grpSpPr>
-      <p:sp>
-        <p:nvSpPr>
-          <p:cNvPr id="19457" name="Title 1"/>
-          <p:cNvSpPr>
-            <a:spLocks noGrp="1"/>
-          </p:cNvSpPr>
-          <p:nvPr>
-            <p:ph type="title"/>
-          </p:nvPr>
-        </p:nvSpPr>
-        <p:spPr/>
-        <p:txBody>
-          <a:bodyPr/>
-          <a:lstStyle/>
-          <a:p>
-            <a:r>
-              <a:rPr lang="en-US">
-                <a:latin typeface="Arial" charset="0"/>
-              </a:rPr>
-              <a:t>Go to the source</a:t>
-            </a:r>
-          </a:p>
-        </p:txBody>
-      </p:sp>
-      <p:sp>
-        <p:nvSpPr>
-          <p:cNvPr id="19458" name="Content Placeholder 2"/>
-          <p:cNvSpPr>
-            <a:spLocks noGrp="1"/>
-          </p:cNvSpPr>
-          <p:nvPr>
-            <p:ph idx="1"/>
-          </p:nvPr>
-        </p:nvSpPr>
-        <p:spPr/>
-        <p:txBody>
-          <a:bodyPr/>
-          <a:lstStyle/>
-          <a:p>
-            <a:r>
-              <a:rPr lang="en-US" dirty="0" smtClean="0">
-                <a:latin typeface="Arial" charset="0"/>
-              </a:rPr>
-              <a:t>Chrome extension</a:t>
-            </a:r>
-          </a:p>
-          <a:p>
-            <a:pPr lvl="1"/>
-            <a:r>
-              <a:rPr lang="en-US" dirty="0" smtClean="0">
-                <a:latin typeface="Arial" charset="0"/>
-              </a:rPr>
-              <a:t>Android SDK Reference Search</a:t>
-            </a:r>
-          </a:p>
-          <a:p>
-            <a:pPr lvl="1"/>
-            <a:r>
-              <a:rPr lang="en-US" dirty="0" smtClean="0">
-                <a:latin typeface="Arial" charset="0"/>
-              </a:rPr>
-              <a:t>Adds “view source” link to API docs</a:t>
-            </a:r>
-          </a:p>
-          <a:p>
-            <a:r>
-              <a:rPr lang="en-US" dirty="0" smtClean="0">
-                <a:latin typeface="Arial" charset="0"/>
-              </a:rPr>
-              <a:t>Download the source yourself</a:t>
-            </a:r>
-          </a:p>
-          <a:p>
-            <a:pPr lvl="1"/>
-            <a:r>
-              <a:rPr lang="en-US" dirty="0" err="1" smtClean="0">
-                <a:latin typeface="Arial" charset="0"/>
-              </a:rPr>
-              <a:t>source.android.com</a:t>
-            </a:r>
-            <a:r>
-              <a:rPr lang="en-US" dirty="0">
-                <a:latin typeface="Arial" charset="0"/>
-              </a:rPr>
-              <a:t>/source/</a:t>
-            </a:r>
-            <a:r>
-              <a:rPr lang="en-US" dirty="0" err="1" smtClean="0">
-                <a:latin typeface="Arial" charset="0"/>
-              </a:rPr>
-              <a:t>downloading.html</a:t>
-            </a:r>
-            <a:endParaRPr lang="en-US" dirty="0" smtClean="0">
-              <a:latin typeface="Arial" charset="0"/>
-            </a:endParaRPr>
-          </a:p>
-          <a:p>
-            <a:pPr lvl="1"/>
-            <a:r>
-              <a:rPr lang="en-US" dirty="0">
-                <a:latin typeface="Arial" charset="0"/>
-              </a:rPr>
-              <a:t>“The initial sync operation will take an hour or more to complete</a:t>
-            </a:r>
-            <a:r>
-              <a:rPr lang="en-US" dirty="0" smtClean="0">
-                <a:latin typeface="Arial" charset="0"/>
-              </a:rPr>
-              <a:t>.”</a:t>
-            </a:r>
-          </a:p>
-          <a:p>
-            <a:pPr lvl="1"/>
-            <a:endParaRPr lang="en-US" dirty="0">
-              <a:latin typeface="Arial" charset="0"/>
-            </a:endParaRPr>
-          </a:p>
-          <a:p>
-            <a:r>
-              <a:rPr lang="en-US" dirty="0" err="1">
-                <a:latin typeface="Arial" charset="0"/>
-              </a:rPr>
-              <a:t>AndroidManifest.xml</a:t>
-            </a:r>
-            <a:endParaRPr lang="en-US" dirty="0">
-              <a:latin typeface="Arial" charset="0"/>
-            </a:endParaRPr>
-          </a:p>
-          <a:p>
-            <a:pPr lvl="1"/>
-            <a:endParaRPr lang="en-US" dirty="0">
-              <a:latin typeface="Arial" charset="0"/>
-            </a:endParaRPr>
-          </a:p>
-        </p:txBody>
-      </p:sp>
-    </p:spTree>
-  </p:cSld>
-  <p:clrMapOvr>
-    <a:masterClrMapping/>
-  </p:clrMapOvr>
-  <p:transition xmlns:p14="http://schemas.microsoft.com/office/powerpoint/2010/main">
-    <p:wipe/>
-  </p:transition>
-  <p:timing>
-    <p:tnLst>
-      <p:par>
-        <p:cTn xmlns:p14="http://schemas.microsoft.com/office/powerpoint/2010/main" id="1" dur="indefinite" restart="never" nodeType="tmRoot"/>
-      </p:par>
-    </p:tnLst>
-  </p:timing>
-</p:sld>
-</file>
-
-<file path=ppt/slides/slide24.xml><?xml version="1.0" encoding="utf-8"?>
-<p:sld xmlns:a="http://schemas.openxmlformats.org/drawingml/2006/main" xmlns:r="http://schemas.openxmlformats.org/officeDocument/2006/relationships" xmlns:p="http://schemas.openxmlformats.org/presentationml/2006/main">
-  <p:cSld>
-    <p:spTree>
-      <p:nvGrpSpPr>
-        <p:cNvPr id="1" name=""/>
-        <p:cNvGrpSpPr/>
-        <p:nvPr/>
-      </p:nvGrpSpPr>
-      <p:grpSpPr>
-        <a:xfrm>
-          <a:off x="0" y="0"/>
-          <a:ext cx="0" cy="0"/>
-          <a:chOff x="0" y="0"/>
-          <a:chExt cx="0" cy="0"/>
-        </a:xfrm>
-      </p:grpSpPr>
-      <p:sp>
-        <p:nvSpPr>
-          <p:cNvPr id="21505" name="Title 1"/>
-          <p:cNvSpPr>
-            <a:spLocks noGrp="1"/>
-          </p:cNvSpPr>
-          <p:nvPr>
-            <p:ph type="title"/>
-          </p:nvPr>
-        </p:nvSpPr>
-        <p:spPr/>
-        <p:txBody>
-          <a:bodyPr/>
-          <a:lstStyle/>
-          <a:p>
-            <a:r>
-              <a:rPr lang="en-US">
-                <a:latin typeface="Arial" charset="0"/>
-              </a:rPr>
-              <a:t>Community Resources</a:t>
-            </a:r>
-          </a:p>
-        </p:txBody>
-      </p:sp>
-      <p:sp>
-        <p:nvSpPr>
-          <p:cNvPr id="21506" name="Content Placeholder 2"/>
-          <p:cNvSpPr>
-            <a:spLocks noGrp="1"/>
-          </p:cNvSpPr>
-          <p:nvPr>
-            <p:ph idx="1"/>
-          </p:nvPr>
-        </p:nvSpPr>
-        <p:spPr/>
-        <p:txBody>
-          <a:bodyPr/>
-          <a:lstStyle/>
-          <a:p>
-            <a:r>
-              <a:rPr lang="en-US" dirty="0" err="1" smtClean="0">
-                <a:latin typeface="Arial" charset="0"/>
-              </a:rPr>
-              <a:t>Developer.android.com</a:t>
-            </a:r>
-            <a:endParaRPr lang="en-US" dirty="0" smtClean="0">
-              <a:latin typeface="Arial" charset="0"/>
-            </a:endParaRPr>
-          </a:p>
-          <a:p>
-            <a:r>
-              <a:rPr lang="en-US" dirty="0" err="1" smtClean="0">
-                <a:latin typeface="Arial" charset="0"/>
-              </a:rPr>
-              <a:t>StackOverflow</a:t>
-            </a:r>
-            <a:endParaRPr lang="en-US" dirty="0" smtClean="0">
-              <a:latin typeface="Arial" charset="0"/>
-            </a:endParaRPr>
-          </a:p>
-          <a:p>
-            <a:r>
-              <a:rPr lang="en-US" dirty="0" err="1" smtClean="0">
-                <a:latin typeface="Arial" charset="0"/>
-              </a:rPr>
-              <a:t>OpenIntents.org</a:t>
-            </a:r>
             <a:endParaRPr lang="en-US" dirty="0">
               <a:latin typeface="Arial" charset="0"/>
             </a:endParaRPr>
@@ -8266,7 +8281,7 @@
       </p:grpSpPr>
       <p:sp>
         <p:nvSpPr>
-          <p:cNvPr id="24577" name="Title 1"/>
+          <p:cNvPr id="19457" name="Title 1"/>
           <p:cNvSpPr>
             <a:spLocks noGrp="1"/>
           </p:cNvSpPr>
@@ -8280,20 +8295,17 @@
           <a:lstStyle/>
           <a:p>
             <a:r>
-              <a:rPr lang="en-US" dirty="0" smtClean="0">
+              <a:rPr lang="en-US">
                 <a:latin typeface="Arial" charset="0"/>
               </a:rPr>
-              <a:t>Where to go next</a:t>
-            </a:r>
-            <a:endParaRPr lang="en-US" dirty="0">
-              <a:latin typeface="Arial" charset="0"/>
-            </a:endParaRPr>
+              <a:t>Go to the source</a:t>
+            </a:r>
           </a:p>
         </p:txBody>
       </p:sp>
       <p:sp>
         <p:nvSpPr>
-          <p:cNvPr id="24578" name="Content Placeholder 2"/>
+          <p:cNvPr id="19458" name="Content Placeholder 2"/>
           <p:cNvSpPr>
             <a:spLocks noGrp="1"/>
           </p:cNvSpPr>
@@ -8306,81 +8318,97 @@
           <a:bodyPr/>
           <a:lstStyle/>
           <a:p>
-            <a:pPr>
-              <a:spcBef>
-                <a:spcPts val="1200"/>
-              </a:spcBef>
-              <a:spcAft>
-                <a:spcPts val="1200"/>
-              </a:spcAft>
-            </a:pPr>
-            <a:r>
-              <a:rPr lang="en-US" sz="3200" dirty="0" smtClean="0">
+            <a:r>
+              <a:rPr lang="en-US" dirty="0" smtClean="0">
                 <a:latin typeface="Arial" charset="0"/>
               </a:rPr>
-              <a:t>Transmit sample application:</a:t>
-            </a:r>
-          </a:p>
-          <a:p>
-            <a:pPr lvl="1">
-              <a:spcBef>
-                <a:spcPts val="1200"/>
-              </a:spcBef>
-              <a:spcAft>
-                <a:spcPts val="1200"/>
-              </a:spcAft>
-            </a:pPr>
-            <a:r>
-              <a:rPr lang="en-US" sz="2600" dirty="0" smtClean="0">
+              <a:t>Chrome extension</a:t>
+            </a:r>
+          </a:p>
+          <a:p>
+            <a:pPr lvl="1"/>
+            <a:r>
+              <a:rPr lang="en-US" dirty="0" smtClean="0">
                 <a:latin typeface="Arial" charset="0"/>
-                <a:hlinkClick r:id="rId3"/>
-              </a:rPr>
-              <a:t>https://github.com/jessitron/Transmit</a:t>
-            </a:r>
-            <a:endParaRPr lang="en-US" sz="2600" dirty="0" smtClean="0">
+              </a:rPr>
+              <a:t>Android SDK Reference Search</a:t>
+            </a:r>
+          </a:p>
+          <a:p>
+            <a:pPr lvl="1"/>
+            <a:r>
+              <a:rPr lang="en-US" dirty="0" smtClean="0">
+                <a:latin typeface="Arial" charset="0"/>
+              </a:rPr>
+              <a:t>Adds “view source” link to API docs</a:t>
+            </a:r>
+          </a:p>
+          <a:p>
+            <a:r>
+              <a:rPr lang="en-US" dirty="0" smtClean="0">
+                <a:latin typeface="Arial" charset="0"/>
+              </a:rPr>
+              <a:t>Download the source yourself</a:t>
+            </a:r>
+          </a:p>
+          <a:p>
+            <a:pPr lvl="1"/>
+            <a:r>
+              <a:rPr lang="en-US" dirty="0" err="1" smtClean="0">
+                <a:latin typeface="Arial" charset="0"/>
+              </a:rPr>
+              <a:t>source.android.com</a:t>
+            </a:r>
+            <a:r>
+              <a:rPr lang="en-US" dirty="0">
+                <a:latin typeface="Arial" charset="0"/>
+              </a:rPr>
+              <a:t>/source/</a:t>
+            </a:r>
+            <a:r>
+              <a:rPr lang="en-US" dirty="0" err="1" smtClean="0">
+                <a:latin typeface="Arial" charset="0"/>
+              </a:rPr>
+              <a:t>downloading.html</a:t>
+            </a:r>
+            <a:endParaRPr lang="en-US" dirty="0" smtClean="0">
               <a:latin typeface="Arial" charset="0"/>
             </a:endParaRPr>
           </a:p>
           <a:p>
-            <a:pPr lvl="1">
-              <a:spcBef>
-                <a:spcPts val="1200"/>
-              </a:spcBef>
-              <a:spcAft>
-                <a:spcPts val="1200"/>
-              </a:spcAft>
-            </a:pPr>
-            <a:r>
-              <a:rPr lang="en-US" sz="2600" dirty="0" smtClean="0">
+            <a:pPr lvl="1"/>
+            <a:r>
+              <a:rPr lang="en-US" dirty="0">
                 <a:latin typeface="Arial" charset="0"/>
               </a:rPr>
-              <a:t>Download it, install it on your device</a:t>
-            </a:r>
-          </a:p>
-          <a:p>
-            <a:pPr lvl="1">
-              <a:spcBef>
-                <a:spcPts val="1200"/>
-              </a:spcBef>
-              <a:spcAft>
-                <a:spcPts val="1200"/>
-              </a:spcAft>
-            </a:pPr>
-            <a:r>
-              <a:rPr lang="en-US" sz="2600" dirty="0" smtClean="0">
+              <a:t>“The initial sync operation will take an hour or more to complete</a:t>
+            </a:r>
+            <a:r>
+              <a:rPr lang="en-US" dirty="0" smtClean="0">
                 <a:latin typeface="Arial" charset="0"/>
               </a:rPr>
-              <a:t>Take over the world</a:t>
-            </a:r>
-            <a:endParaRPr lang="en-US" sz="2600" dirty="0">
+              <a:t>.”</a:t>
+            </a:r>
+          </a:p>
+          <a:p>
+            <a:pPr lvl="1"/>
+            <a:endParaRPr lang="en-US" dirty="0">
               <a:latin typeface="Arial" charset="0"/>
             </a:endParaRPr>
           </a:p>
           <a:p>
-            <a:pPr>
-              <a:buFontTx/>
-              <a:buNone/>
-            </a:pPr>
+            <a:r>
+              <a:rPr lang="en-US" dirty="0" err="1">
+                <a:latin typeface="Arial" charset="0"/>
+              </a:rPr>
+              <a:t>AndroidManifest.xml</a:t>
+            </a:r>
+            <a:endParaRPr lang="en-US" dirty="0">
+              <a:latin typeface="Arial" charset="0"/>
+            </a:endParaRPr>
+          </a:p>
+          <a:p>
+            <a:pPr lvl="1"/>
             <a:endParaRPr lang="en-US" dirty="0">
               <a:latin typeface="Arial" charset="0"/>
             </a:endParaRPr>
@@ -8406,6 +8434,272 @@
 </file>
 
 <file path=ppt/slides/slide26.xml><?xml version="1.0" encoding="utf-8"?>
+<p:sld xmlns:a="http://schemas.openxmlformats.org/drawingml/2006/main" xmlns:r="http://schemas.openxmlformats.org/officeDocument/2006/relationships" xmlns:p="http://schemas.openxmlformats.org/presentationml/2006/main">
+  <p:cSld>
+    <p:spTree>
+      <p:nvGrpSpPr>
+        <p:cNvPr id="1" name=""/>
+        <p:cNvGrpSpPr/>
+        <p:nvPr/>
+      </p:nvGrpSpPr>
+      <p:grpSpPr>
+        <a:xfrm>
+          <a:off x="0" y="0"/>
+          <a:ext cx="0" cy="0"/>
+          <a:chOff x="0" y="0"/>
+          <a:chExt cx="0" cy="0"/>
+        </a:xfrm>
+      </p:grpSpPr>
+      <p:sp>
+        <p:nvSpPr>
+          <p:cNvPr id="21505" name="Title 1"/>
+          <p:cNvSpPr>
+            <a:spLocks noGrp="1"/>
+          </p:cNvSpPr>
+          <p:nvPr>
+            <p:ph type="title"/>
+          </p:nvPr>
+        </p:nvSpPr>
+        <p:spPr/>
+        <p:txBody>
+          <a:bodyPr/>
+          <a:lstStyle/>
+          <a:p>
+            <a:r>
+              <a:rPr lang="en-US">
+                <a:latin typeface="Arial" charset="0"/>
+              </a:rPr>
+              <a:t>Community Resources</a:t>
+            </a:r>
+          </a:p>
+        </p:txBody>
+      </p:sp>
+      <p:sp>
+        <p:nvSpPr>
+          <p:cNvPr id="21506" name="Content Placeholder 2"/>
+          <p:cNvSpPr>
+            <a:spLocks noGrp="1"/>
+          </p:cNvSpPr>
+          <p:nvPr>
+            <p:ph idx="1"/>
+          </p:nvPr>
+        </p:nvSpPr>
+        <p:spPr/>
+        <p:txBody>
+          <a:bodyPr/>
+          <a:lstStyle/>
+          <a:p>
+            <a:r>
+              <a:rPr lang="en-US" dirty="0" err="1" smtClean="0">
+                <a:latin typeface="Arial" charset="0"/>
+              </a:rPr>
+              <a:t>Developer.android.com</a:t>
+            </a:r>
+            <a:endParaRPr lang="en-US" dirty="0" smtClean="0">
+              <a:latin typeface="Arial" charset="0"/>
+            </a:endParaRPr>
+          </a:p>
+          <a:p>
+            <a:r>
+              <a:rPr lang="en-US" dirty="0" err="1" smtClean="0">
+                <a:latin typeface="Arial" charset="0"/>
+              </a:rPr>
+              <a:t>StackOverflow</a:t>
+            </a:r>
+            <a:endParaRPr lang="en-US" dirty="0" smtClean="0">
+              <a:latin typeface="Arial" charset="0"/>
+            </a:endParaRPr>
+          </a:p>
+          <a:p>
+            <a:r>
+              <a:rPr lang="en-US" dirty="0" err="1" smtClean="0">
+                <a:latin typeface="Arial" charset="0"/>
+              </a:rPr>
+              <a:t>OpenIntents.org</a:t>
+            </a:r>
+            <a:endParaRPr lang="en-US" dirty="0">
+              <a:latin typeface="Arial" charset="0"/>
+            </a:endParaRPr>
+          </a:p>
+        </p:txBody>
+      </p:sp>
+    </p:spTree>
+  </p:cSld>
+  <p:clrMapOvr>
+    <a:masterClrMapping/>
+  </p:clrMapOvr>
+  <p:transition xmlns:p14="http://schemas.microsoft.com/office/powerpoint/2010/main">
+    <p:wipe/>
+  </p:transition>
+  <p:timing>
+    <p:tnLst>
+      <p:par>
+        <p:cTn xmlns:p14="http://schemas.microsoft.com/office/powerpoint/2010/main" id="1" dur="indefinite" restart="never" nodeType="tmRoot"/>
+      </p:par>
+    </p:tnLst>
+  </p:timing>
+</p:sld>
+</file>
+
+<file path=ppt/slides/slide27.xml><?xml version="1.0" encoding="utf-8"?>
+<p:sld xmlns:a="http://schemas.openxmlformats.org/drawingml/2006/main" xmlns:r="http://schemas.openxmlformats.org/officeDocument/2006/relationships" xmlns:p="http://schemas.openxmlformats.org/presentationml/2006/main">
+  <p:cSld>
+    <p:spTree>
+      <p:nvGrpSpPr>
+        <p:cNvPr id="1" name=""/>
+        <p:cNvGrpSpPr/>
+        <p:nvPr/>
+      </p:nvGrpSpPr>
+      <p:grpSpPr>
+        <a:xfrm>
+          <a:off x="0" y="0"/>
+          <a:ext cx="0" cy="0"/>
+          <a:chOff x="0" y="0"/>
+          <a:chExt cx="0" cy="0"/>
+        </a:xfrm>
+      </p:grpSpPr>
+      <p:sp>
+        <p:nvSpPr>
+          <p:cNvPr id="24577" name="Title 1"/>
+          <p:cNvSpPr>
+            <a:spLocks noGrp="1"/>
+          </p:cNvSpPr>
+          <p:nvPr>
+            <p:ph type="title"/>
+          </p:nvPr>
+        </p:nvSpPr>
+        <p:spPr/>
+        <p:txBody>
+          <a:bodyPr/>
+          <a:lstStyle/>
+          <a:p>
+            <a:r>
+              <a:rPr lang="en-US" dirty="0" smtClean="0">
+                <a:latin typeface="Arial" charset="0"/>
+              </a:rPr>
+              <a:t>Where to go next</a:t>
+            </a:r>
+            <a:endParaRPr lang="en-US" dirty="0">
+              <a:latin typeface="Arial" charset="0"/>
+            </a:endParaRPr>
+          </a:p>
+        </p:txBody>
+      </p:sp>
+      <p:sp>
+        <p:nvSpPr>
+          <p:cNvPr id="24578" name="Content Placeholder 2"/>
+          <p:cNvSpPr>
+            <a:spLocks noGrp="1"/>
+          </p:cNvSpPr>
+          <p:nvPr>
+            <p:ph idx="1"/>
+          </p:nvPr>
+        </p:nvSpPr>
+        <p:spPr/>
+        <p:txBody>
+          <a:bodyPr/>
+          <a:lstStyle/>
+          <a:p>
+            <a:pPr>
+              <a:spcBef>
+                <a:spcPts val="1200"/>
+              </a:spcBef>
+              <a:spcAft>
+                <a:spcPts val="1200"/>
+              </a:spcAft>
+            </a:pPr>
+            <a:r>
+              <a:rPr lang="en-US" sz="3200" dirty="0" smtClean="0">
+                <a:latin typeface="Arial" charset="0"/>
+              </a:rPr>
+              <a:t>Transmit sample application:</a:t>
+            </a:r>
+          </a:p>
+          <a:p>
+            <a:pPr lvl="1">
+              <a:spcBef>
+                <a:spcPts val="1200"/>
+              </a:spcBef>
+              <a:spcAft>
+                <a:spcPts val="1200"/>
+              </a:spcAft>
+            </a:pPr>
+            <a:r>
+              <a:rPr lang="en-US" sz="2600" dirty="0" smtClean="0">
+                <a:latin typeface="Arial" charset="0"/>
+                <a:hlinkClick r:id="rId3"/>
+              </a:rPr>
+              <a:t>https://github.com/jessitron/Transmit</a:t>
+            </a:r>
+            <a:endParaRPr lang="en-US" sz="2600" dirty="0" smtClean="0">
+              <a:latin typeface="Arial" charset="0"/>
+            </a:endParaRPr>
+          </a:p>
+          <a:p>
+            <a:pPr lvl="1">
+              <a:spcBef>
+                <a:spcPts val="1200"/>
+              </a:spcBef>
+              <a:spcAft>
+                <a:spcPts val="1200"/>
+              </a:spcAft>
+            </a:pPr>
+            <a:r>
+              <a:rPr lang="en-US" sz="2600" dirty="0" smtClean="0">
+                <a:latin typeface="Arial" charset="0"/>
+              </a:rPr>
+              <a:t>Download it, install it on your device</a:t>
+            </a:r>
+          </a:p>
+          <a:p>
+            <a:pPr lvl="1">
+              <a:spcBef>
+                <a:spcPts val="1200"/>
+              </a:spcBef>
+              <a:spcAft>
+                <a:spcPts val="1200"/>
+              </a:spcAft>
+            </a:pPr>
+            <a:r>
+              <a:rPr lang="en-US" sz="2600" dirty="0" smtClean="0">
+                <a:latin typeface="Arial" charset="0"/>
+              </a:rPr>
+              <a:t>Take over the world</a:t>
+            </a:r>
+            <a:endParaRPr lang="en-US" sz="2600" dirty="0">
+              <a:latin typeface="Arial" charset="0"/>
+            </a:endParaRPr>
+          </a:p>
+          <a:p>
+            <a:pPr>
+              <a:buFontTx/>
+              <a:buNone/>
+            </a:pPr>
+            <a:endParaRPr lang="en-US" dirty="0">
+              <a:latin typeface="Arial" charset="0"/>
+            </a:endParaRPr>
+          </a:p>
+        </p:txBody>
+      </p:sp>
+    </p:spTree>
+  </p:cSld>
+  <p:clrMapOvr>
+    <a:masterClrMapping/>
+  </p:clrMapOvr>
+  <p:transition xmlns:p14="http://schemas.microsoft.com/office/powerpoint/2010/main">
+    <p:wipe/>
+  </p:transition>
+  <p:timing>
+    <p:tnLst>
+      <p:par>
+        <p:cTn xmlns:p14="http://schemas.microsoft.com/office/powerpoint/2010/main" id="1" dur="indefinite" restart="never" nodeType="tmRoot"/>
+      </p:par>
+    </p:tnLst>
+  </p:timing>
+</p:sld>
+</file>
+
+<file path=ppt/slides/slide28.xml><?xml version="1.0" encoding="utf-8"?>
 <p:sld xmlns:a="http://schemas.openxmlformats.org/drawingml/2006/main" xmlns:r="http://schemas.openxmlformats.org/officeDocument/2006/relationships" xmlns:p="http://schemas.openxmlformats.org/presentationml/2006/main" show="0">
   <p:cSld>
     <p:spTree>
@@ -8526,7 +8820,7 @@
 </p:sld>
 </file>
 
-<file path=ppt/slides/slide27.xml><?xml version="1.0" encoding="utf-8"?>
+<file path=ppt/slides/slide29.xml><?xml version="1.0" encoding="utf-8"?>
 <p:sld xmlns:a="http://schemas.openxmlformats.org/drawingml/2006/main" xmlns:r="http://schemas.openxmlformats.org/officeDocument/2006/relationships" xmlns:p="http://schemas.openxmlformats.org/presentationml/2006/main">
   <p:cSld>
     <p:spTree>
@@ -8722,146 +9016,6 @@
               </a:rPr>
               <a:t>Presentation title</a:t>
             </a:r>
-          </a:p>
-        </p:txBody>
-      </p:sp>
-    </p:spTree>
-  </p:cSld>
-  <p:clrMapOvr>
-    <a:masterClrMapping/>
-  </p:clrMapOvr>
-  <p:transition xmlns:p14="http://schemas.microsoft.com/office/powerpoint/2010/main">
-    <p:wipe/>
-  </p:transition>
-  <p:timing>
-    <p:tnLst>
-      <p:par>
-        <p:cTn xmlns:p14="http://schemas.microsoft.com/office/powerpoint/2010/main" id="1" dur="indefinite" restart="never" nodeType="tmRoot"/>
-      </p:par>
-    </p:tnLst>
-  </p:timing>
-</p:sld>
-</file>
-
-<file path=ppt/slides/slide28.xml><?xml version="1.0" encoding="utf-8"?>
-<p:sld xmlns:a="http://schemas.openxmlformats.org/drawingml/2006/main" xmlns:r="http://schemas.openxmlformats.org/officeDocument/2006/relationships" xmlns:p="http://schemas.openxmlformats.org/presentationml/2006/main">
-  <p:cSld>
-    <p:spTree>
-      <p:nvGrpSpPr>
-        <p:cNvPr id="1" name=""/>
-        <p:cNvGrpSpPr/>
-        <p:nvPr/>
-      </p:nvGrpSpPr>
-      <p:grpSpPr>
-        <a:xfrm>
-          <a:off x="0" y="0"/>
-          <a:ext cx="0" cy="0"/>
-          <a:chOff x="0" y="0"/>
-          <a:chExt cx="0" cy="0"/>
-        </a:xfrm>
-      </p:grpSpPr>
-      <p:sp>
-        <p:nvSpPr>
-          <p:cNvPr id="23553" name="Title 1"/>
-          <p:cNvSpPr>
-            <a:spLocks noGrp="1"/>
-          </p:cNvSpPr>
-          <p:nvPr>
-            <p:ph type="title"/>
-          </p:nvPr>
-        </p:nvSpPr>
-        <p:spPr/>
-        <p:txBody>
-          <a:bodyPr/>
-          <a:lstStyle/>
-          <a:p>
-            <a:r>
-              <a:rPr lang="en-US">
-                <a:latin typeface="Arial" charset="0"/>
-              </a:rPr>
-              <a:t>Your own intentions</a:t>
-            </a:r>
-          </a:p>
-        </p:txBody>
-      </p:sp>
-      <p:sp>
-        <p:nvSpPr>
-          <p:cNvPr id="23554" name="Content Placeholder 2"/>
-          <p:cNvSpPr>
-            <a:spLocks noGrp="1"/>
-          </p:cNvSpPr>
-          <p:nvPr>
-            <p:ph idx="1"/>
-          </p:nvPr>
-        </p:nvSpPr>
-        <p:spPr/>
-        <p:txBody>
-          <a:bodyPr/>
-          <a:lstStyle/>
-          <a:p>
-            <a:r>
-              <a:rPr lang="en-US" dirty="0">
-                <a:latin typeface="Arial" charset="0"/>
-              </a:rPr>
-              <a:t>Create your own </a:t>
-            </a:r>
-            <a:r>
-              <a:rPr lang="en-US" dirty="0" smtClean="0">
-                <a:latin typeface="Arial" charset="0"/>
-              </a:rPr>
-              <a:t>activities </a:t>
-            </a:r>
-            <a:r>
-              <a:rPr lang="en-US" dirty="0">
-                <a:latin typeface="Arial" charset="0"/>
-              </a:rPr>
-              <a:t>that fire</a:t>
-            </a:r>
-          </a:p>
-          <a:p>
-            <a:pPr lvl="1"/>
-            <a:r>
-              <a:rPr lang="en-US" dirty="0">
-                <a:latin typeface="Arial" charset="0"/>
-              </a:rPr>
-              <a:t>When the device approaches a specific geographic location</a:t>
-            </a:r>
-          </a:p>
-          <a:p>
-            <a:pPr lvl="1"/>
-            <a:r>
-              <a:rPr lang="en-US" dirty="0">
-                <a:latin typeface="Arial" charset="0"/>
-              </a:rPr>
-              <a:t>When the device turns on and off</a:t>
-            </a:r>
-          </a:p>
-          <a:p>
-            <a:pPr lvl="1"/>
-            <a:r>
-              <a:rPr lang="en-US" dirty="0">
-                <a:latin typeface="Arial" charset="0"/>
-              </a:rPr>
-              <a:t>When the battery gets </a:t>
-            </a:r>
-            <a:r>
-              <a:rPr lang="en-US" dirty="0" smtClean="0">
-                <a:latin typeface="Arial" charset="0"/>
-              </a:rPr>
-              <a:t>low</a:t>
-            </a:r>
-          </a:p>
-          <a:p>
-            <a:pPr lvl="1"/>
-            <a:r>
-              <a:rPr lang="en-US" dirty="0" smtClean="0">
-                <a:latin typeface="Arial" charset="0"/>
-              </a:rPr>
-              <a:t>To open a link to your own website</a:t>
-            </a:r>
-            <a:endParaRPr lang="en-US" dirty="0">
-              <a:latin typeface="Arial" charset="0"/>
-            </a:endParaRPr>
           </a:p>
         </p:txBody>
       </p:sp>
@@ -8959,6 +9113,146 @@
             </a:r>
             <a:endParaRPr lang="en-US" sz="3200" dirty="0">
               <a:latin typeface="+mj-lt"/>
+            </a:endParaRPr>
+          </a:p>
+        </p:txBody>
+      </p:sp>
+    </p:spTree>
+  </p:cSld>
+  <p:clrMapOvr>
+    <a:masterClrMapping/>
+  </p:clrMapOvr>
+  <p:transition xmlns:p14="http://schemas.microsoft.com/office/powerpoint/2010/main">
+    <p:wipe/>
+  </p:transition>
+  <p:timing>
+    <p:tnLst>
+      <p:par>
+        <p:cTn xmlns:p14="http://schemas.microsoft.com/office/powerpoint/2010/main" id="1" dur="indefinite" restart="never" nodeType="tmRoot"/>
+      </p:par>
+    </p:tnLst>
+  </p:timing>
+</p:sld>
+</file>
+
+<file path=ppt/slides/slide30.xml><?xml version="1.0" encoding="utf-8"?>
+<p:sld xmlns:a="http://schemas.openxmlformats.org/drawingml/2006/main" xmlns:r="http://schemas.openxmlformats.org/officeDocument/2006/relationships" xmlns:p="http://schemas.openxmlformats.org/presentationml/2006/main">
+  <p:cSld>
+    <p:spTree>
+      <p:nvGrpSpPr>
+        <p:cNvPr id="1" name=""/>
+        <p:cNvGrpSpPr/>
+        <p:nvPr/>
+      </p:nvGrpSpPr>
+      <p:grpSpPr>
+        <a:xfrm>
+          <a:off x="0" y="0"/>
+          <a:ext cx="0" cy="0"/>
+          <a:chOff x="0" y="0"/>
+          <a:chExt cx="0" cy="0"/>
+        </a:xfrm>
+      </p:grpSpPr>
+      <p:sp>
+        <p:nvSpPr>
+          <p:cNvPr id="23553" name="Title 1"/>
+          <p:cNvSpPr>
+            <a:spLocks noGrp="1"/>
+          </p:cNvSpPr>
+          <p:nvPr>
+            <p:ph type="title"/>
+          </p:nvPr>
+        </p:nvSpPr>
+        <p:spPr/>
+        <p:txBody>
+          <a:bodyPr/>
+          <a:lstStyle/>
+          <a:p>
+            <a:r>
+              <a:rPr lang="en-US">
+                <a:latin typeface="Arial" charset="0"/>
+              </a:rPr>
+              <a:t>Your own intentions</a:t>
+            </a:r>
+          </a:p>
+        </p:txBody>
+      </p:sp>
+      <p:sp>
+        <p:nvSpPr>
+          <p:cNvPr id="23554" name="Content Placeholder 2"/>
+          <p:cNvSpPr>
+            <a:spLocks noGrp="1"/>
+          </p:cNvSpPr>
+          <p:nvPr>
+            <p:ph idx="1"/>
+          </p:nvPr>
+        </p:nvSpPr>
+        <p:spPr/>
+        <p:txBody>
+          <a:bodyPr/>
+          <a:lstStyle/>
+          <a:p>
+            <a:r>
+              <a:rPr lang="en-US" dirty="0">
+                <a:latin typeface="Arial" charset="0"/>
+              </a:rPr>
+              <a:t>Create your own </a:t>
+            </a:r>
+            <a:r>
+              <a:rPr lang="en-US" dirty="0" smtClean="0">
+                <a:latin typeface="Arial" charset="0"/>
+              </a:rPr>
+              <a:t>activities </a:t>
+            </a:r>
+            <a:r>
+              <a:rPr lang="en-US" dirty="0">
+                <a:latin typeface="Arial" charset="0"/>
+              </a:rPr>
+              <a:t>that fire</a:t>
+            </a:r>
+          </a:p>
+          <a:p>
+            <a:pPr lvl="1"/>
+            <a:r>
+              <a:rPr lang="en-US" dirty="0">
+                <a:latin typeface="Arial" charset="0"/>
+              </a:rPr>
+              <a:t>When the device approaches a specific geographic location</a:t>
+            </a:r>
+          </a:p>
+          <a:p>
+            <a:pPr lvl="1"/>
+            <a:r>
+              <a:rPr lang="en-US" dirty="0">
+                <a:latin typeface="Arial" charset="0"/>
+              </a:rPr>
+              <a:t>When the device turns on and off</a:t>
+            </a:r>
+          </a:p>
+          <a:p>
+            <a:pPr lvl="1"/>
+            <a:r>
+              <a:rPr lang="en-US" dirty="0">
+                <a:latin typeface="Arial" charset="0"/>
+              </a:rPr>
+              <a:t>When the battery gets </a:t>
+            </a:r>
+            <a:r>
+              <a:rPr lang="en-US" dirty="0" smtClean="0">
+                <a:latin typeface="Arial" charset="0"/>
+              </a:rPr>
+              <a:t>low</a:t>
+            </a:r>
+          </a:p>
+          <a:p>
+            <a:pPr lvl="1"/>
+            <a:r>
+              <a:rPr lang="en-US" dirty="0" smtClean="0">
+                <a:latin typeface="Arial" charset="0"/>
+              </a:rPr>
+              <a:t>To open a link to your own website</a:t>
+            </a:r>
+            <a:endParaRPr lang="en-US" dirty="0">
+              <a:latin typeface="Arial" charset="0"/>
             </a:endParaRPr>
           </a:p>
         </p:txBody>
@@ -11065,7 +11359,7 @@
       </p:grpSpPr>
       <p:sp>
         <p:nvSpPr>
-          <p:cNvPr id="6145" name="Title 1"/>
+          <p:cNvPr id="7169" name="Title 1"/>
           <p:cNvSpPr>
             <a:spLocks noGrp="1"/>
           </p:cNvSpPr>
@@ -11079,82 +11373,66 @@
           <a:lstStyle/>
           <a:p>
             <a:r>
-              <a:rPr lang="en-US" sz="4000">
+              <a:rPr lang="en-US">
                 <a:latin typeface="Arial" charset="0"/>
               </a:rPr>
-              <a:t>Today's intentions</a:t>
+              <a:t>Parts of an Intent</a:t>
             </a:r>
           </a:p>
         </p:txBody>
       </p:sp>
-      <p:sp>
-        <p:nvSpPr>
-          <p:cNvPr id="6146" name="Content Placeholder 2"/>
-          <p:cNvSpPr>
-            <a:spLocks noGrp="1"/>
-          </p:cNvSpPr>
-          <p:nvPr>
-            <p:ph idx="1"/>
-          </p:nvPr>
-        </p:nvSpPr>
-        <p:spPr/>
-        <p:txBody>
-          <a:bodyPr/>
-          <a:lstStyle/>
-          <a:p>
-            <a:pPr lvl="1">
-              <a:lnSpc>
-                <a:spcPct val="150000"/>
-              </a:lnSpc>
-            </a:pPr>
-            <a:r>
-              <a:rPr lang="en-US" sz="3000">
-                <a:latin typeface="Arial" charset="0"/>
-              </a:rPr>
-              <a:t>Parts of an intent</a:t>
-            </a:r>
-          </a:p>
-          <a:p>
-            <a:pPr lvl="1">
-              <a:lnSpc>
-                <a:spcPct val="150000"/>
-              </a:lnSpc>
-            </a:pPr>
-            <a:r>
-              <a:rPr lang="en-US" sz="3000">
-                <a:latin typeface="Arial" charset="0"/>
-              </a:rPr>
-              <a:t>Resolving intents</a:t>
-            </a:r>
-          </a:p>
-          <a:p>
-            <a:pPr lvl="1">
-              <a:lnSpc>
-                <a:spcPct val="150000"/>
-              </a:lnSpc>
-            </a:pPr>
-            <a:r>
-              <a:rPr lang="en-US" sz="3000">
-                <a:latin typeface="Arial" charset="0"/>
-              </a:rPr>
-              <a:t>Details of some intents</a:t>
-            </a:r>
-          </a:p>
-          <a:p>
-            <a:pPr lvl="1">
-              <a:lnSpc>
-                <a:spcPct val="150000"/>
-              </a:lnSpc>
-            </a:pPr>
-            <a:r>
-              <a:rPr lang="en-US" sz="3000">
-                <a:latin typeface="Arial" charset="0"/>
-              </a:rPr>
-              <a:t>How to find out more</a:t>
-            </a:r>
-          </a:p>
-        </p:txBody>
-      </p:sp>
+      <p:pic>
+        <p:nvPicPr>
+          <p:cNvPr id="2" name="Picture 1" descr="intentContents.png"/>
+          <p:cNvPicPr>
+            <a:picLocks noChangeAspect="1"/>
+          </p:cNvPicPr>
+          <p:nvPr/>
+        </p:nvPicPr>
+        <p:blipFill>
+          <a:blip r:embed="rId2">
+            <a:extLst>
+              <a:ext uri="{28A0092B-C50C-407E-A947-70E740481C1C}">
+                <a14:useLocalDpi xmlns:a14="http://schemas.microsoft.com/office/drawing/2010/main" val="0"/>
+              </a:ext>
+            </a:extLst>
+          </a:blip>
+          <a:stretch>
+            <a:fillRect/>
+          </a:stretch>
+        </p:blipFill>
+        <p:spPr>
+          <a:xfrm>
+            <a:off x="1066800" y="1464000"/>
+            <a:ext cx="7150100" cy="4594080"/>
+          </a:xfrm>
+          <a:prstGeom prst="ellipse">
+            <a:avLst/>
+          </a:prstGeom>
+          <a:ln w="63500" cap="rnd">
+            <a:noFill/>
+          </a:ln>
+          <a:effectLst>
+            <a:outerShdw blurRad="381000" dist="292100" dir="5400000" sx="-80000" sy="-18000" rotWithShape="0">
+              <a:srgbClr val="000000">
+                <a:alpha val="22000"/>
+              </a:srgbClr>
+            </a:outerShdw>
+          </a:effectLst>
+          <a:scene3d>
+            <a:camera prst="orthographicFront"/>
+            <a:lightRig rig="contrasting" dir="t">
+              <a:rot lat="0" lon="0" rev="3000000"/>
+            </a:lightRig>
+          </a:scene3d>
+          <a:sp3d contourW="7620">
+            <a:bevelT w="95250" h="31750"/>
+            <a:contourClr>
+              <a:srgbClr val="333333"/>
+            </a:contourClr>
+          </a:sp3d>
+        </p:spPr>
+      </p:pic>
     </p:spTree>
   </p:cSld>
   <p:clrMapOvr>
@@ -11192,7 +11470,7 @@
       </p:grpSpPr>
       <p:sp>
         <p:nvSpPr>
-          <p:cNvPr id="7169" name="Title 1"/>
+          <p:cNvPr id="2" name="Title 1"/>
           <p:cNvSpPr>
             <a:spLocks noGrp="1"/>
           </p:cNvSpPr>
@@ -11206,143 +11484,79 @@
           <a:lstStyle/>
           <a:p>
             <a:r>
-              <a:rPr lang="en-US">
-                <a:latin typeface="Arial" charset="0"/>
-              </a:rPr>
-              <a:t>Parts of an Intent</a:t>
-            </a:r>
+              <a:rPr lang="en-US" dirty="0" smtClean="0"/>
+              <a:t>Data</a:t>
+            </a:r>
+            <a:endParaRPr lang="en-US" dirty="0"/>
           </a:p>
         </p:txBody>
       </p:sp>
-      <p:pic>
-        <p:nvPicPr>
-          <p:cNvPr id="7172" name="Picture 4"/>
-          <p:cNvPicPr>
-            <a:picLocks noChangeAspect="1" noChangeArrowheads="1"/>
-          </p:cNvPicPr>
-          <p:nvPr/>
-        </p:nvPicPr>
-        <p:blipFill>
-          <a:blip r:embed="rId2">
-            <a:extLst>
-              <a:ext uri="{28A0092B-C50C-407E-A947-70E740481C1C}">
-                <a14:useLocalDpi xmlns:a14="http://schemas.microsoft.com/office/drawing/2010/main" val="0"/>
-              </a:ext>
-            </a:extLst>
-          </a:blip>
-          <a:srcRect/>
-          <a:stretch>
-            <a:fillRect/>
-          </a:stretch>
-        </p:blipFill>
-        <p:spPr bwMode="auto">
-          <a:xfrm>
-            <a:off x="1547813" y="1485900"/>
-            <a:ext cx="6048375" cy="3886200"/>
-          </a:xfrm>
-          <a:prstGeom prst="ellipse">
-            <a:avLst/>
-          </a:prstGeom>
-          <a:ln w="63500" cap="rnd">
-            <a:solidFill>
-              <a:srgbClr val="333333"/>
-            </a:solidFill>
-          </a:ln>
-          <a:effectLst>
-            <a:outerShdw blurRad="381000" dist="292100" dir="5400000" sx="-80000" sy="-18000" rotWithShape="0">
-              <a:srgbClr val="000000">
-                <a:alpha val="22000"/>
-              </a:srgbClr>
-            </a:outerShdw>
-          </a:effectLst>
-          <a:scene3d>
-            <a:camera prst="orthographicFront"/>
-            <a:lightRig rig="contrasting" dir="t">
-              <a:rot lat="0" lon="0" rev="3000000"/>
-            </a:lightRig>
-          </a:scene3d>
-          <a:sp3d contourW="7620">
-            <a:bevelT w="95250" h="31750"/>
-            <a:contourClr>
-              <a:srgbClr val="333333"/>
-            </a:contourClr>
-          </a:sp3d>
-          <a:extLst>
-            <a:ext uri="{909E8E84-426E-40dd-AFC4-6F175D3DCCD1}">
-              <a14:hiddenFill xmlns:a14="http://schemas.microsoft.com/office/drawing/2010/main">
-                <a:solidFill>
-                  <a:schemeClr val="accent1"/>
-                </a:solidFill>
-              </a14:hiddenFill>
-            </a:ext>
-          </a:extLst>
-        </p:spPr>
-      </p:pic>
-      <p:pic>
-        <p:nvPicPr>
-          <p:cNvPr id="7173" name="Picture 5"/>
-          <p:cNvPicPr>
-            <a:picLocks noChangeAspect="1" noChangeArrowheads="1"/>
-          </p:cNvPicPr>
-          <p:nvPr/>
-        </p:nvPicPr>
-        <p:blipFill>
-          <a:blip r:embed="rId3">
-            <a:extLst>
-              <a:ext uri="{28A0092B-C50C-407E-A947-70E740481C1C}">
-                <a14:useLocalDpi xmlns:a14="http://schemas.microsoft.com/office/drawing/2010/main" val="0"/>
-              </a:ext>
-            </a:extLst>
-          </a:blip>
-          <a:srcRect/>
-          <a:stretch>
-            <a:fillRect/>
-          </a:stretch>
-        </p:blipFill>
-        <p:spPr bwMode="auto">
-          <a:xfrm>
-            <a:off x="1138238" y="1247775"/>
-            <a:ext cx="6867525" cy="4362450"/>
-          </a:xfrm>
-          <a:prstGeom prst="ellipse">
-            <a:avLst/>
-          </a:prstGeom>
-          <a:ln w="63500" cap="rnd">
-            <a:solidFill>
-              <a:srgbClr val="333333"/>
-            </a:solidFill>
-          </a:ln>
-          <a:effectLst>
-            <a:outerShdw blurRad="381000" dist="292100" dir="5400000" sx="-80000" sy="-18000" rotWithShape="0">
-              <a:srgbClr val="000000">
-                <a:alpha val="22000"/>
-              </a:srgbClr>
-            </a:outerShdw>
-          </a:effectLst>
-          <a:scene3d>
-            <a:camera prst="orthographicFront"/>
-            <a:lightRig rig="contrasting" dir="t">
-              <a:rot lat="0" lon="0" rev="3000000"/>
-            </a:lightRig>
-          </a:scene3d>
-          <a:sp3d contourW="7620">
-            <a:bevelT w="95250" h="31750"/>
-            <a:contourClr>
-              <a:srgbClr val="333333"/>
-            </a:contourClr>
-          </a:sp3d>
-          <a:extLst>
-            <a:ext uri="{909E8E84-426E-40dd-AFC4-6F175D3DCCD1}">
-              <a14:hiddenFill xmlns:a14="http://schemas.microsoft.com/office/drawing/2010/main">
-                <a:solidFill>
-                  <a:schemeClr val="accent1"/>
-                </a:solidFill>
-              </a14:hiddenFill>
-            </a:ext>
-          </a:extLst>
-        </p:spPr>
-      </p:pic>
+      <p:sp>
+        <p:nvSpPr>
+          <p:cNvPr id="3" name="Content Placeholder 2"/>
+          <p:cNvSpPr>
+            <a:spLocks noGrp="1"/>
+          </p:cNvSpPr>
+          <p:nvPr>
+            <p:ph idx="1"/>
+          </p:nvPr>
+        </p:nvSpPr>
+        <p:spPr/>
+        <p:txBody>
+          <a:bodyPr/>
+          <a:lstStyle/>
+          <a:p>
+            <a:r>
+              <a:rPr lang="en-US" sz="3600" dirty="0" smtClean="0"/>
+              <a:t>Type</a:t>
+            </a:r>
+          </a:p>
+          <a:p>
+            <a:endParaRPr lang="en-US" sz="3600" dirty="0" smtClean="0"/>
+          </a:p>
+          <a:p>
+            <a:r>
+              <a:rPr lang="en-US" sz="3600" dirty="0" smtClean="0"/>
+              <a:t>Uri:</a:t>
+            </a:r>
+          </a:p>
+          <a:p>
+            <a:pPr lvl="1"/>
+            <a:r>
+              <a:rPr lang="en-US" sz="2800" dirty="0" smtClean="0"/>
+              <a:t>Scheme</a:t>
+            </a:r>
+          </a:p>
+          <a:p>
+            <a:pPr lvl="1"/>
+            <a:r>
+              <a:rPr lang="en-US" sz="2800" dirty="0" smtClean="0"/>
+              <a:t>Host</a:t>
+            </a:r>
+          </a:p>
+          <a:p>
+            <a:pPr lvl="1"/>
+            <a:r>
+              <a:rPr lang="en-US" sz="2800" dirty="0" smtClean="0"/>
+              <a:t>Port</a:t>
+            </a:r>
+          </a:p>
+          <a:p>
+            <a:pPr lvl="1"/>
+            <a:r>
+              <a:rPr lang="en-US" sz="2800" dirty="0" smtClean="0"/>
+              <a:t>Path or Path Pattern</a:t>
+            </a:r>
+            <a:endParaRPr lang="en-US" sz="2800" dirty="0"/>
+          </a:p>
+        </p:txBody>
+      </p:sp>
     </p:spTree>
+    <p:extLst>
+      <p:ext uri="{BB962C8B-B14F-4D97-AF65-F5344CB8AC3E}">
+        <p14:creationId xmlns:p14="http://schemas.microsoft.com/office/powerpoint/2010/main" val="348255597"/>
+      </p:ext>
+    </p:extLst>
   </p:cSld>
   <p:clrMapOvr>
     <a:masterClrMapping/>
@@ -11379,7 +11593,7 @@
       </p:grpSpPr>
       <p:sp>
         <p:nvSpPr>
-          <p:cNvPr id="2" name="Title 1"/>
+          <p:cNvPr id="8193" name="Title 1"/>
           <p:cNvSpPr>
             <a:spLocks noGrp="1"/>
           </p:cNvSpPr>
@@ -11393,79 +11607,261 @@
           <a:lstStyle/>
           <a:p>
             <a:r>
-              <a:rPr lang="en-US" dirty="0" smtClean="0"/>
-              <a:t>Data</a:t>
-            </a:r>
-            <a:endParaRPr lang="en-US" dirty="0"/>
+              <a:rPr lang="en-US">
+                <a:latin typeface="Arial" charset="0"/>
+              </a:rPr>
+              <a:t>Intent Filters</a:t>
+            </a:r>
           </a:p>
         </p:txBody>
       </p:sp>
       <p:sp>
         <p:nvSpPr>
-          <p:cNvPr id="3" name="Content Placeholder 2"/>
-          <p:cNvSpPr>
-            <a:spLocks noGrp="1"/>
-          </p:cNvSpPr>
-          <p:nvPr>
-            <p:ph idx="1"/>
-          </p:nvPr>
+          <p:cNvPr id="2" name="Manual Operation 1"/>
+          <p:cNvSpPr/>
+          <p:nvPr/>
         </p:nvSpPr>
-        <p:spPr/>
+        <p:spPr>
+          <a:xfrm>
+            <a:off x="1676400" y="1524000"/>
+            <a:ext cx="5486400" cy="612775"/>
+          </a:xfrm>
+          <a:prstGeom prst="flowChartManualOperation">
+            <a:avLst/>
+          </a:prstGeom>
+          <a:solidFill>
+            <a:srgbClr val="FFFFFF"/>
+          </a:solidFill>
+        </p:spPr>
+        <p:style>
+          <a:lnRef idx="1">
+            <a:schemeClr val="accent1"/>
+          </a:lnRef>
+          <a:fillRef idx="3">
+            <a:schemeClr val="accent1"/>
+          </a:fillRef>
+          <a:effectRef idx="2">
+            <a:schemeClr val="accent1"/>
+          </a:effectRef>
+          <a:fontRef idx="minor">
+            <a:schemeClr val="lt1"/>
+          </a:fontRef>
+        </p:style>
         <p:txBody>
-          <a:bodyPr/>
+          <a:bodyPr anchor="ctr"/>
           <a:lstStyle/>
           <a:p>
-            <a:r>
-              <a:rPr lang="en-US" dirty="0" smtClean="0"/>
-              <a:t>Type</a:t>
-            </a:r>
-          </a:p>
-          <a:p>
-            <a:endParaRPr lang="en-US" dirty="0" smtClean="0"/>
-          </a:p>
-          <a:p>
-            <a:r>
-              <a:rPr lang="en-US" dirty="0" smtClean="0"/>
-              <a:t>Uri:</a:t>
-            </a:r>
-          </a:p>
-          <a:p>
-            <a:pPr lvl="1"/>
-            <a:r>
-              <a:rPr lang="en-US" dirty="0" smtClean="0"/>
-              <a:t>Scheme</a:t>
-            </a:r>
-          </a:p>
-          <a:p>
-            <a:pPr lvl="1"/>
-            <a:r>
-              <a:rPr lang="en-US" dirty="0" smtClean="0"/>
-              <a:t>Host</a:t>
-            </a:r>
-          </a:p>
-          <a:p>
-            <a:pPr lvl="1"/>
-            <a:r>
-              <a:rPr lang="en-US" dirty="0" smtClean="0"/>
-              <a:t>Port</a:t>
-            </a:r>
-          </a:p>
-          <a:p>
-            <a:pPr lvl="1"/>
-            <a:r>
-              <a:rPr lang="en-US" dirty="0" smtClean="0"/>
-              <a:t>Path or Path Pattern</a:t>
-            </a:r>
-            <a:endParaRPr lang="en-US" dirty="0"/>
+            <a:pPr algn="ctr">
+              <a:defRPr/>
+            </a:pPr>
+            <a:r>
+              <a:rPr lang="en-US" dirty="0">
+                <a:solidFill>
+                  <a:srgbClr val="000000"/>
+                </a:solidFill>
+              </a:rPr>
+              <a:t>Target type</a:t>
+            </a:r>
+          </a:p>
+        </p:txBody>
+      </p:sp>
+      <p:sp>
+        <p:nvSpPr>
+          <p:cNvPr id="5" name="Manual Operation 4"/>
+          <p:cNvSpPr/>
+          <p:nvPr/>
+        </p:nvSpPr>
+        <p:spPr>
+          <a:xfrm>
+            <a:off x="2209800" y="2514600"/>
+            <a:ext cx="4191000" cy="612775"/>
+          </a:xfrm>
+          <a:prstGeom prst="flowChartManualOperation">
+            <a:avLst/>
+          </a:prstGeom>
+          <a:solidFill>
+            <a:srgbClr val="FFFFFF"/>
+          </a:solidFill>
+        </p:spPr>
+        <p:style>
+          <a:lnRef idx="1">
+            <a:schemeClr val="accent1"/>
+          </a:lnRef>
+          <a:fillRef idx="3">
+            <a:schemeClr val="accent1"/>
+          </a:fillRef>
+          <a:effectRef idx="2">
+            <a:schemeClr val="accent1"/>
+          </a:effectRef>
+          <a:fontRef idx="minor">
+            <a:schemeClr val="lt1"/>
+          </a:fontRef>
+        </p:style>
+        <p:txBody>
+          <a:bodyPr anchor="ctr"/>
+          <a:lstStyle/>
+          <a:p>
+            <a:pPr algn="ctr">
+              <a:defRPr/>
+            </a:pPr>
+            <a:r>
+              <a:rPr lang="en-US" dirty="0">
+                <a:solidFill>
+                  <a:srgbClr val="000000"/>
+                </a:solidFill>
+              </a:rPr>
+              <a:t>Action</a:t>
+            </a:r>
+          </a:p>
+        </p:txBody>
+      </p:sp>
+      <p:sp>
+        <p:nvSpPr>
+          <p:cNvPr id="6" name="Manual Operation 5"/>
+          <p:cNvSpPr/>
+          <p:nvPr/>
+        </p:nvSpPr>
+        <p:spPr>
+          <a:xfrm>
+            <a:off x="2590800" y="3429000"/>
+            <a:ext cx="3200400" cy="612775"/>
+          </a:xfrm>
+          <a:prstGeom prst="flowChartManualOperation">
+            <a:avLst/>
+          </a:prstGeom>
+          <a:solidFill>
+            <a:srgbClr val="FFFFFF"/>
+          </a:solidFill>
+        </p:spPr>
+        <p:style>
+          <a:lnRef idx="1">
+            <a:schemeClr val="accent1"/>
+          </a:lnRef>
+          <a:fillRef idx="3">
+            <a:schemeClr val="accent1"/>
+          </a:fillRef>
+          <a:effectRef idx="2">
+            <a:schemeClr val="accent1"/>
+          </a:effectRef>
+          <a:fontRef idx="minor">
+            <a:schemeClr val="lt1"/>
+          </a:fontRef>
+        </p:style>
+        <p:txBody>
+          <a:bodyPr anchor="ctr"/>
+          <a:lstStyle/>
+          <a:p>
+            <a:pPr algn="ctr">
+              <a:defRPr/>
+            </a:pPr>
+            <a:r>
+              <a:rPr lang="en-US" dirty="0">
+                <a:solidFill>
+                  <a:srgbClr val="000000"/>
+                </a:solidFill>
+              </a:rPr>
+              <a:t>Categories</a:t>
+            </a:r>
+          </a:p>
+        </p:txBody>
+      </p:sp>
+      <p:sp>
+        <p:nvSpPr>
+          <p:cNvPr id="7" name="Manual Operation 6"/>
+          <p:cNvSpPr/>
+          <p:nvPr/>
+        </p:nvSpPr>
+        <p:spPr>
+          <a:xfrm>
+            <a:off x="3429000" y="4419600"/>
+            <a:ext cx="1600200" cy="612775"/>
+          </a:xfrm>
+          <a:prstGeom prst="flowChartManualOperation">
+            <a:avLst/>
+          </a:prstGeom>
+          <a:solidFill>
+            <a:srgbClr val="FFFFFF"/>
+          </a:solidFill>
+        </p:spPr>
+        <p:style>
+          <a:lnRef idx="1">
+            <a:schemeClr val="accent1"/>
+          </a:lnRef>
+          <a:fillRef idx="3">
+            <a:schemeClr val="accent1"/>
+          </a:fillRef>
+          <a:effectRef idx="2">
+            <a:schemeClr val="accent1"/>
+          </a:effectRef>
+          <a:fontRef idx="minor">
+            <a:schemeClr val="lt1"/>
+          </a:fontRef>
+        </p:style>
+        <p:txBody>
+          <a:bodyPr anchor="ctr"/>
+          <a:lstStyle/>
+          <a:p>
+            <a:pPr algn="ctr">
+              <a:defRPr/>
+            </a:pPr>
+            <a:r>
+              <a:rPr lang="en-US" dirty="0">
+                <a:solidFill>
+                  <a:srgbClr val="000000"/>
+                </a:solidFill>
+              </a:rPr>
+              <a:t>Data</a:t>
+            </a:r>
+          </a:p>
+        </p:txBody>
+      </p:sp>
+      <p:sp>
+        <p:nvSpPr>
+          <p:cNvPr id="4" name="Cloud 3"/>
+          <p:cNvSpPr/>
+          <p:nvPr/>
+        </p:nvSpPr>
+        <p:spPr>
+          <a:xfrm>
+            <a:off x="2514600" y="5410200"/>
+            <a:ext cx="3276600" cy="381000"/>
+          </a:xfrm>
+          <a:prstGeom prst="cloud">
+            <a:avLst/>
+          </a:prstGeom>
+          <a:solidFill>
+            <a:schemeClr val="accent6">
+              <a:lumMod val="60000"/>
+              <a:lumOff val="40000"/>
+            </a:schemeClr>
+          </a:solidFill>
+        </p:spPr>
+        <p:style>
+          <a:lnRef idx="1">
+            <a:schemeClr val="accent1"/>
+          </a:lnRef>
+          <a:fillRef idx="3">
+            <a:schemeClr val="accent1"/>
+          </a:fillRef>
+          <a:effectRef idx="2">
+            <a:schemeClr val="accent1"/>
+          </a:effectRef>
+          <a:fontRef idx="minor">
+            <a:schemeClr val="lt1"/>
+          </a:fontRef>
+        </p:style>
+        <p:txBody>
+          <a:bodyPr anchor="ctr"/>
+          <a:lstStyle/>
+          <a:p>
+            <a:pPr algn="ctr">
+              <a:defRPr/>
+            </a:pPr>
+            <a:endParaRPr lang="en-US"/>
           </a:p>
         </p:txBody>
       </p:sp>
     </p:spTree>
-    <p:extLst>
-      <p:ext uri="{BB962C8B-B14F-4D97-AF65-F5344CB8AC3E}">
-        <p14:creationId xmlns:p14="http://schemas.microsoft.com/office/powerpoint/2010/main" val="348255597"/>
-      </p:ext>
-    </p:extLst>
   </p:cSld>
   <p:clrMapOvr>
     <a:masterClrMapping/>

</xml_diff>

<commit_message>
Scrolling to the right when on the newest picture resets the cursor to pick up newer pictures
</commit_message>
<xml_diff>
--- a/presentations/DevTeach-Intents.pptx
+++ b/presentations/DevTeach-Intents.pptx
@@ -5,7 +5,7 @@
     <p:sldMasterId id="2147483648" r:id="rId1"/>
   </p:sldMasterIdLst>
   <p:notesMasterIdLst>
-    <p:notesMasterId r:id="rId44"/>
+    <p:notesMasterId r:id="rId46"/>
   </p:notesMasterIdLst>
   <p:sldIdLst>
     <p:sldId id="256" r:id="rId2"/>
@@ -33,23 +33,25 @@
     <p:sldId id="286" r:id="rId24"/>
     <p:sldId id="292" r:id="rId25"/>
     <p:sldId id="297" r:id="rId26"/>
-    <p:sldId id="287" r:id="rId27"/>
-    <p:sldId id="273" r:id="rId28"/>
-    <p:sldId id="298" r:id="rId29"/>
-    <p:sldId id="299" r:id="rId30"/>
-    <p:sldId id="274" r:id="rId31"/>
-    <p:sldId id="300" r:id="rId32"/>
-    <p:sldId id="275" r:id="rId33"/>
-    <p:sldId id="301" r:id="rId34"/>
-    <p:sldId id="290" r:id="rId35"/>
-    <p:sldId id="288" r:id="rId36"/>
+    <p:sldId id="306" r:id="rId27"/>
+    <p:sldId id="307" r:id="rId28"/>
+    <p:sldId id="287" r:id="rId29"/>
+    <p:sldId id="273" r:id="rId30"/>
+    <p:sldId id="298" r:id="rId31"/>
+    <p:sldId id="299" r:id="rId32"/>
+    <p:sldId id="274" r:id="rId33"/>
+    <p:sldId id="300" r:id="rId34"/>
+    <p:sldId id="275" r:id="rId35"/>
+    <p:sldId id="301" r:id="rId36"/>
     <p:sldId id="276" r:id="rId37"/>
     <p:sldId id="277" r:id="rId38"/>
     <p:sldId id="279" r:id="rId39"/>
-    <p:sldId id="260" r:id="rId40"/>
-    <p:sldId id="262" r:id="rId41"/>
-    <p:sldId id="258" r:id="rId42"/>
-    <p:sldId id="266" r:id="rId43"/>
+    <p:sldId id="258" r:id="rId40"/>
+    <p:sldId id="260" r:id="rId41"/>
+    <p:sldId id="290" r:id="rId42"/>
+    <p:sldId id="288" r:id="rId43"/>
+    <p:sldId id="262" r:id="rId44"/>
+    <p:sldId id="266" r:id="rId45"/>
   </p:sldIdLst>
   <p:sldSz cx="9144000" cy="6858000" type="screen4x3"/>
   <p:notesSz cx="6858000" cy="9144000"/>
@@ -1760,7 +1762,7 @@
               <a:pPr>
                 <a:defRPr/>
               </a:pPr>
-              <a:t>26</a:t>
+              <a:t>28</a:t>
             </a:fld>
             <a:endParaRPr lang="en-US"/>
           </a:p>
@@ -1862,7 +1864,7 @@
               <a:pPr>
                 <a:defRPr/>
               </a:pPr>
-              <a:t>27</a:t>
+              <a:t>29</a:t>
             </a:fld>
             <a:endParaRPr lang="en-US"/>
           </a:p>
@@ -2004,7 +2006,7 @@
               <a:pPr>
                 <a:defRPr/>
               </a:pPr>
-              <a:t>39</a:t>
+              <a:t>40</a:t>
             </a:fld>
             <a:endParaRPr lang="en-US"/>
           </a:p>
@@ -4445,6 +4447,13 @@
   <p:transition xmlns:p14="http://schemas.microsoft.com/office/powerpoint/2010/main">
     <p:wipe/>
   </p:transition>
+  <p:timing>
+    <p:tnLst>
+      <p:par>
+        <p:cTn xmlns:p14="http://schemas.microsoft.com/office/powerpoint/2010/main" id="1" dur="indefinite" restart="never" nodeType="tmRoot"/>
+      </p:par>
+    </p:tnLst>
+  </p:timing>
 </p:sld>
 </file>
 
@@ -6030,6 +6039,13 @@
   <p:transition xmlns:p14="http://schemas.microsoft.com/office/powerpoint/2010/main">
     <p:wipe/>
   </p:transition>
+  <p:timing>
+    <p:tnLst>
+      <p:par>
+        <p:cTn xmlns:p14="http://schemas.microsoft.com/office/powerpoint/2010/main" id="1" dur="indefinite" restart="never" nodeType="tmRoot"/>
+      </p:par>
+    </p:tnLst>
+  </p:timing>
 </p:sld>
 </file>
 
@@ -8249,6 +8265,280 @@
           <a:p>
             <a:r>
               <a:rPr lang="en-US" dirty="0" smtClean="0"/>
+              <a:t>PICK_ACTIVITY result</a:t>
+            </a:r>
+            <a:endParaRPr lang="en-US" dirty="0"/>
+          </a:p>
+        </p:txBody>
+      </p:sp>
+      <p:pic>
+        <p:nvPicPr>
+          <p:cNvPr id="6" name="Picture 5" descr="Screen Shot 2012-05-31 at 9.50.34 AM.png"/>
+          <p:cNvPicPr>
+            <a:picLocks noChangeAspect="1"/>
+          </p:cNvPicPr>
+          <p:nvPr/>
+        </p:nvPicPr>
+        <p:blipFill>
+          <a:blip r:embed="rId2">
+            <a:extLst>
+              <a:ext uri="{28A0092B-C50C-407E-A947-70E740481C1C}">
+                <a14:useLocalDpi xmlns:a14="http://schemas.microsoft.com/office/drawing/2010/main" val="0"/>
+              </a:ext>
+            </a:extLst>
+          </a:blip>
+          <a:stretch>
+            <a:fillRect/>
+          </a:stretch>
+        </p:blipFill>
+        <p:spPr>
+          <a:xfrm>
+            <a:off x="0" y="3733800"/>
+            <a:ext cx="9144000" cy="812546"/>
+          </a:xfrm>
+          <a:prstGeom prst="rect">
+            <a:avLst/>
+          </a:prstGeom>
+        </p:spPr>
+      </p:pic>
+      <p:pic>
+        <p:nvPicPr>
+          <p:cNvPr id="9" name="Picture 8" descr="Screen Shot 2012-05-31 at 9.54.43 AM.png"/>
+          <p:cNvPicPr>
+            <a:picLocks noChangeAspect="1"/>
+          </p:cNvPicPr>
+          <p:nvPr/>
+        </p:nvPicPr>
+        <p:blipFill>
+          <a:blip r:embed="rId3">
+            <a:extLst>
+              <a:ext uri="{28A0092B-C50C-407E-A947-70E740481C1C}">
+                <a14:useLocalDpi xmlns:a14="http://schemas.microsoft.com/office/drawing/2010/main" val="0"/>
+              </a:ext>
+            </a:extLst>
+          </a:blip>
+          <a:stretch>
+            <a:fillRect/>
+          </a:stretch>
+        </p:blipFill>
+        <p:spPr>
+          <a:xfrm>
+            <a:off x="289658" y="1674935"/>
+            <a:ext cx="7099300" cy="1358900"/>
+          </a:xfrm>
+          <a:prstGeom prst="rect">
+            <a:avLst/>
+          </a:prstGeom>
+        </p:spPr>
+      </p:pic>
+    </p:spTree>
+    <p:extLst>
+      <p:ext uri="{BB962C8B-B14F-4D97-AF65-F5344CB8AC3E}">
+        <p14:creationId xmlns:p14="http://schemas.microsoft.com/office/powerpoint/2010/main" val="4077323456"/>
+      </p:ext>
+    </p:extLst>
+  </p:cSld>
+  <p:clrMapOvr>
+    <a:masterClrMapping/>
+  </p:clrMapOvr>
+  <p:transition xmlns:p14="http://schemas.microsoft.com/office/powerpoint/2010/main">
+    <p:wipe/>
+  </p:transition>
+  <p:timing>
+    <p:tnLst>
+      <p:par>
+        <p:cTn xmlns:p14="http://schemas.microsoft.com/office/powerpoint/2010/main" id="1" dur="indefinite" restart="never" nodeType="tmRoot"/>
+      </p:par>
+    </p:tnLst>
+  </p:timing>
+</p:sld>
+</file>
+
+<file path=ppt/slides/slide27.xml><?xml version="1.0" encoding="utf-8"?>
+<p:sld xmlns:a="http://schemas.openxmlformats.org/drawingml/2006/main" xmlns:r="http://schemas.openxmlformats.org/officeDocument/2006/relationships" xmlns:p="http://schemas.openxmlformats.org/presentationml/2006/main">
+  <p:cSld>
+    <p:spTree>
+      <p:nvGrpSpPr>
+        <p:cNvPr id="1" name=""/>
+        <p:cNvGrpSpPr/>
+        <p:nvPr/>
+      </p:nvGrpSpPr>
+      <p:grpSpPr>
+        <a:xfrm>
+          <a:off x="0" y="0"/>
+          <a:ext cx="0" cy="0"/>
+          <a:chOff x="0" y="0"/>
+          <a:chExt cx="0" cy="0"/>
+        </a:xfrm>
+      </p:grpSpPr>
+      <p:sp>
+        <p:nvSpPr>
+          <p:cNvPr id="2" name="Title 1"/>
+          <p:cNvSpPr>
+            <a:spLocks noGrp="1"/>
+          </p:cNvSpPr>
+          <p:nvPr>
+            <p:ph type="title"/>
+          </p:nvPr>
+        </p:nvSpPr>
+        <p:spPr/>
+        <p:txBody>
+          <a:bodyPr/>
+          <a:lstStyle/>
+          <a:p>
+            <a:r>
+              <a:rPr lang="en-US" dirty="0" smtClean="0"/>
+              <a:t>Launch explicit intent</a:t>
+            </a:r>
+            <a:endParaRPr lang="en-US" dirty="0"/>
+          </a:p>
+        </p:txBody>
+      </p:sp>
+      <p:pic>
+        <p:nvPicPr>
+          <p:cNvPr id="4" name="Picture 3" descr="Screen Shot 2012-05-31 at 9.51.04 AM.png"/>
+          <p:cNvPicPr>
+            <a:picLocks noChangeAspect="1"/>
+          </p:cNvPicPr>
+          <p:nvPr/>
+        </p:nvPicPr>
+        <p:blipFill>
+          <a:blip r:embed="rId2">
+            <a:extLst>
+              <a:ext uri="{28A0092B-C50C-407E-A947-70E740481C1C}">
+                <a14:useLocalDpi xmlns:a14="http://schemas.microsoft.com/office/drawing/2010/main" val="0"/>
+              </a:ext>
+            </a:extLst>
+          </a:blip>
+          <a:stretch>
+            <a:fillRect/>
+          </a:stretch>
+        </p:blipFill>
+        <p:spPr>
+          <a:xfrm>
+            <a:off x="1524000" y="2057400"/>
+            <a:ext cx="5346700" cy="1181100"/>
+          </a:xfrm>
+          <a:prstGeom prst="rect">
+            <a:avLst/>
+          </a:prstGeom>
+        </p:spPr>
+      </p:pic>
+      <p:sp>
+        <p:nvSpPr>
+          <p:cNvPr id="5" name="TextBox 4"/>
+          <p:cNvSpPr txBox="1"/>
+          <p:nvPr/>
+        </p:nvSpPr>
+        <p:spPr>
+          <a:xfrm>
+            <a:off x="990600" y="4038600"/>
+            <a:ext cx="6019800" cy="1200328"/>
+          </a:xfrm>
+          <a:prstGeom prst="rect">
+            <a:avLst/>
+          </a:prstGeom>
+          <a:noFill/>
+        </p:spPr>
+        <p:txBody>
+          <a:bodyPr wrap="square" rtlCol="0">
+            <a:spAutoFit/>
+          </a:bodyPr>
+          <a:lstStyle/>
+          <a:p>
+            <a:r>
+              <a:rPr lang="en-US" dirty="0" smtClean="0">
+                <a:latin typeface="+mj-lt"/>
+              </a:rPr>
+              <a:t>Component:</a:t>
+            </a:r>
+          </a:p>
+          <a:p>
+            <a:pPr marL="342900" indent="-342900">
+              <a:buFont typeface="Arial"/>
+              <a:buChar char="•"/>
+            </a:pPr>
+            <a:r>
+              <a:rPr lang="en-US" dirty="0" smtClean="0">
+                <a:latin typeface="+mj-lt"/>
+              </a:rPr>
+              <a:t>Package name of application</a:t>
+            </a:r>
+          </a:p>
+          <a:p>
+            <a:pPr marL="342900" indent="-342900">
+              <a:buFont typeface="Arial"/>
+              <a:buChar char="•"/>
+            </a:pPr>
+            <a:r>
+              <a:rPr lang="en-US" dirty="0" smtClean="0">
+                <a:latin typeface="+mj-lt"/>
+              </a:rPr>
+              <a:t>Fully qualified class name of activity</a:t>
+            </a:r>
+            <a:endParaRPr lang="en-US" dirty="0">
+              <a:latin typeface="+mj-lt"/>
+            </a:endParaRPr>
+          </a:p>
+        </p:txBody>
+      </p:sp>
+    </p:spTree>
+    <p:extLst>
+      <p:ext uri="{BB962C8B-B14F-4D97-AF65-F5344CB8AC3E}">
+        <p14:creationId xmlns:p14="http://schemas.microsoft.com/office/powerpoint/2010/main" val="3114989184"/>
+      </p:ext>
+    </p:extLst>
+  </p:cSld>
+  <p:clrMapOvr>
+    <a:masterClrMapping/>
+  </p:clrMapOvr>
+  <p:transition xmlns:p14="http://schemas.microsoft.com/office/powerpoint/2010/main">
+    <p:wipe/>
+  </p:transition>
+  <p:timing>
+    <p:tnLst>
+      <p:par>
+        <p:cTn xmlns:p14="http://schemas.microsoft.com/office/powerpoint/2010/main" id="1" dur="indefinite" restart="never" nodeType="tmRoot"/>
+      </p:par>
+    </p:tnLst>
+  </p:timing>
+</p:sld>
+</file>
+
+<file path=ppt/slides/slide28.xml><?xml version="1.0" encoding="utf-8"?>
+<p:sld xmlns:a="http://schemas.openxmlformats.org/drawingml/2006/main" xmlns:r="http://schemas.openxmlformats.org/officeDocument/2006/relationships" xmlns:p="http://schemas.openxmlformats.org/presentationml/2006/main">
+  <p:cSld>
+    <p:spTree>
+      <p:nvGrpSpPr>
+        <p:cNvPr id="1" name=""/>
+        <p:cNvGrpSpPr/>
+        <p:nvPr/>
+      </p:nvGrpSpPr>
+      <p:grpSpPr>
+        <a:xfrm>
+          <a:off x="0" y="0"/>
+          <a:ext cx="0" cy="0"/>
+          <a:chOff x="0" y="0"/>
+          <a:chExt cx="0" cy="0"/>
+        </a:xfrm>
+      </p:grpSpPr>
+      <p:sp>
+        <p:nvSpPr>
+          <p:cNvPr id="2" name="Title 1"/>
+          <p:cNvSpPr>
+            <a:spLocks noGrp="1"/>
+          </p:cNvSpPr>
+          <p:nvPr>
+            <p:ph type="title"/>
+          </p:nvPr>
+        </p:nvSpPr>
+        <p:spPr/>
+        <p:txBody>
+          <a:bodyPr/>
+          <a:lstStyle/>
+          <a:p>
+            <a:r>
+              <a:rPr lang="en-US" dirty="0" smtClean="0"/>
               <a:t>Three ways to let the user choose	</a:t>
             </a:r>
             <a:endParaRPr lang="en-US" dirty="0"/>
@@ -9406,7 +9696,7 @@
 </p:sld>
 </file>
 
-<file path=ppt/slides/slide27.xml><?xml version="1.0" encoding="utf-8"?>
+<file path=ppt/slides/slide29.xml><?xml version="1.0" encoding="utf-8"?>
 <p:sld xmlns:a="http://schemas.openxmlformats.org/drawingml/2006/main" xmlns:r="http://schemas.openxmlformats.org/officeDocument/2006/relationships" xmlns:p="http://schemas.openxmlformats.org/presentationml/2006/main">
   <p:cSld>
     <p:spTree>
@@ -9832,7 +10122,105 @@
 </p:sld>
 </file>
 
-<file path=ppt/slides/slide28.xml><?xml version="1.0" encoding="utf-8"?>
+<file path=ppt/slides/slide3.xml><?xml version="1.0" encoding="utf-8"?>
+<p:sld xmlns:a="http://schemas.openxmlformats.org/drawingml/2006/main" xmlns:r="http://schemas.openxmlformats.org/officeDocument/2006/relationships" xmlns:p="http://schemas.openxmlformats.org/presentationml/2006/main">
+  <p:cSld>
+    <p:spTree>
+      <p:nvGrpSpPr>
+        <p:cNvPr id="1" name=""/>
+        <p:cNvGrpSpPr/>
+        <p:nvPr/>
+      </p:nvGrpSpPr>
+      <p:grpSpPr>
+        <a:xfrm>
+          <a:off x="0" y="0"/>
+          <a:ext cx="0" cy="0"/>
+          <a:chOff x="0" y="0"/>
+          <a:chExt cx="0" cy="0"/>
+        </a:xfrm>
+      </p:grpSpPr>
+      <p:sp>
+        <p:nvSpPr>
+          <p:cNvPr id="3" name="Rectangle 2"/>
+          <p:cNvSpPr/>
+          <p:nvPr/>
+        </p:nvSpPr>
+        <p:spPr>
+          <a:xfrm>
+            <a:off x="1066800" y="2362200"/>
+            <a:ext cx="7239000" cy="584776"/>
+          </a:xfrm>
+          <a:prstGeom prst="rect">
+            <a:avLst/>
+          </a:prstGeom>
+        </p:spPr>
+        <p:txBody>
+          <a:bodyPr wrap="square">
+            <a:spAutoFit/>
+          </a:bodyPr>
+          <a:lstStyle/>
+          <a:p>
+            <a:r>
+              <a:rPr lang="en-US" sz="3200" dirty="0">
+                <a:latin typeface="+mj-lt"/>
+              </a:rPr>
+              <a:t>https://</a:t>
+            </a:r>
+            <a:r>
+              <a:rPr lang="en-US" sz="3200" dirty="0" err="1">
+                <a:latin typeface="+mj-lt"/>
+              </a:rPr>
+              <a:t>github.com</a:t>
+            </a:r>
+            <a:r>
+              <a:rPr lang="en-US" sz="3200" dirty="0">
+                <a:latin typeface="+mj-lt"/>
+              </a:rPr>
+              <a:t>/</a:t>
+            </a:r>
+            <a:r>
+              <a:rPr lang="en-US" sz="3200" dirty="0" err="1">
+                <a:latin typeface="+mj-lt"/>
+              </a:rPr>
+              <a:t>jessitron</a:t>
+            </a:r>
+            <a:r>
+              <a:rPr lang="en-US" sz="3200" dirty="0">
+                <a:latin typeface="+mj-lt"/>
+              </a:rPr>
+              <a:t>/</a:t>
+            </a:r>
+            <a:r>
+              <a:rPr lang="en-US" sz="3200" dirty="0" err="1">
+                <a:latin typeface="+mj-lt"/>
+              </a:rPr>
+              <a:t>Tronsmit</a:t>
+            </a:r>
+            <a:endParaRPr lang="en-US" sz="3200" dirty="0">
+              <a:latin typeface="+mj-lt"/>
+            </a:endParaRPr>
+          </a:p>
+        </p:txBody>
+      </p:sp>
+    </p:spTree>
+  </p:cSld>
+  <p:clrMapOvr>
+    <a:masterClrMapping/>
+  </p:clrMapOvr>
+  <p:transition xmlns:p14="http://schemas.microsoft.com/office/powerpoint/2010/main">
+    <p:wipe/>
+  </p:transition>
+  <p:timing>
+    <p:tnLst>
+      <p:par>
+        <p:cTn xmlns:p14="http://schemas.microsoft.com/office/powerpoint/2010/main" id="1" dur="indefinite" restart="never" nodeType="tmRoot"/>
+      </p:par>
+    </p:tnLst>
+  </p:timing>
+</p:sld>
+</file>
+
+<file path=ppt/slides/slide30.xml><?xml version="1.0" encoding="utf-8"?>
 <p:sld xmlns:a="http://schemas.openxmlformats.org/drawingml/2006/main" xmlns:r="http://schemas.openxmlformats.org/officeDocument/2006/relationships" xmlns:p="http://schemas.openxmlformats.org/presentationml/2006/main">
   <p:cSld>
     <p:spTree>
@@ -9934,7 +10322,7 @@
 </p:sld>
 </file>
 
-<file path=ppt/slides/slide29.xml><?xml version="1.0" encoding="utf-8"?>
+<file path=ppt/slides/slide31.xml><?xml version="1.0" encoding="utf-8"?>
 <p:sld xmlns:a="http://schemas.openxmlformats.org/drawingml/2006/main" xmlns:r="http://schemas.openxmlformats.org/officeDocument/2006/relationships" xmlns:p="http://schemas.openxmlformats.org/presentationml/2006/main">
   <p:cSld>
     <p:spTree>
@@ -10027,105 +10415,7 @@
 </p:sld>
 </file>
 
-<file path=ppt/slides/slide3.xml><?xml version="1.0" encoding="utf-8"?>
-<p:sld xmlns:a="http://schemas.openxmlformats.org/drawingml/2006/main" xmlns:r="http://schemas.openxmlformats.org/officeDocument/2006/relationships" xmlns:p="http://schemas.openxmlformats.org/presentationml/2006/main">
-  <p:cSld>
-    <p:spTree>
-      <p:nvGrpSpPr>
-        <p:cNvPr id="1" name=""/>
-        <p:cNvGrpSpPr/>
-        <p:nvPr/>
-      </p:nvGrpSpPr>
-      <p:grpSpPr>
-        <a:xfrm>
-          <a:off x="0" y="0"/>
-          <a:ext cx="0" cy="0"/>
-          <a:chOff x="0" y="0"/>
-          <a:chExt cx="0" cy="0"/>
-        </a:xfrm>
-      </p:grpSpPr>
-      <p:sp>
-        <p:nvSpPr>
-          <p:cNvPr id="3" name="Rectangle 2"/>
-          <p:cNvSpPr/>
-          <p:nvPr/>
-        </p:nvSpPr>
-        <p:spPr>
-          <a:xfrm>
-            <a:off x="1066800" y="2362200"/>
-            <a:ext cx="7239000" cy="584776"/>
-          </a:xfrm>
-          <a:prstGeom prst="rect">
-            <a:avLst/>
-          </a:prstGeom>
-        </p:spPr>
-        <p:txBody>
-          <a:bodyPr wrap="square">
-            <a:spAutoFit/>
-          </a:bodyPr>
-          <a:lstStyle/>
-          <a:p>
-            <a:r>
-              <a:rPr lang="en-US" sz="3200" dirty="0">
-                <a:latin typeface="+mj-lt"/>
-              </a:rPr>
-              <a:t>https://</a:t>
-            </a:r>
-            <a:r>
-              <a:rPr lang="en-US" sz="3200" dirty="0" err="1">
-                <a:latin typeface="+mj-lt"/>
-              </a:rPr>
-              <a:t>github.com</a:t>
-            </a:r>
-            <a:r>
-              <a:rPr lang="en-US" sz="3200" dirty="0">
-                <a:latin typeface="+mj-lt"/>
-              </a:rPr>
-              <a:t>/</a:t>
-            </a:r>
-            <a:r>
-              <a:rPr lang="en-US" sz="3200" dirty="0" err="1">
-                <a:latin typeface="+mj-lt"/>
-              </a:rPr>
-              <a:t>jessitron</a:t>
-            </a:r>
-            <a:r>
-              <a:rPr lang="en-US" sz="3200" dirty="0">
-                <a:latin typeface="+mj-lt"/>
-              </a:rPr>
-              <a:t>/</a:t>
-            </a:r>
-            <a:r>
-              <a:rPr lang="en-US" sz="3200" dirty="0" err="1">
-                <a:latin typeface="+mj-lt"/>
-              </a:rPr>
-              <a:t>Tronsmit</a:t>
-            </a:r>
-            <a:endParaRPr lang="en-US" sz="3200" dirty="0">
-              <a:latin typeface="+mj-lt"/>
-            </a:endParaRPr>
-          </a:p>
-        </p:txBody>
-      </p:sp>
-    </p:spTree>
-  </p:cSld>
-  <p:clrMapOvr>
-    <a:masterClrMapping/>
-  </p:clrMapOvr>
-  <p:transition xmlns:p14="http://schemas.microsoft.com/office/powerpoint/2010/main">
-    <p:wipe/>
-  </p:transition>
-  <p:timing>
-    <p:tnLst>
-      <p:par>
-        <p:cTn xmlns:p14="http://schemas.microsoft.com/office/powerpoint/2010/main" id="1" dur="indefinite" restart="never" nodeType="tmRoot"/>
-      </p:par>
-    </p:tnLst>
-  </p:timing>
-</p:sld>
-</file>
-
-<file path=ppt/slides/slide30.xml><?xml version="1.0" encoding="utf-8"?>
+<file path=ppt/slides/slide32.xml><?xml version="1.0" encoding="utf-8"?>
 <p:sld xmlns:a="http://schemas.openxmlformats.org/drawingml/2006/main" xmlns:r="http://schemas.openxmlformats.org/officeDocument/2006/relationships" xmlns:p="http://schemas.openxmlformats.org/presentationml/2006/main">
   <p:cSld>
     <p:spTree>
@@ -10376,7 +10666,7 @@
 </p:sld>
 </file>
 
-<file path=ppt/slides/slide31.xml><?xml version="1.0" encoding="utf-8"?>
+<file path=ppt/slides/slide33.xml><?xml version="1.0" encoding="utf-8"?>
 <p:sld xmlns:a="http://schemas.openxmlformats.org/drawingml/2006/main" xmlns:r="http://schemas.openxmlformats.org/officeDocument/2006/relationships" xmlns:p="http://schemas.openxmlformats.org/presentationml/2006/main">
   <p:cSld>
     <p:spTree>
@@ -10670,7 +10960,7 @@
 </p:sld>
 </file>
 
-<file path=ppt/slides/slide32.xml><?xml version="1.0" encoding="utf-8"?>
+<file path=ppt/slides/slide34.xml><?xml version="1.0" encoding="utf-8"?>
 <p:sld xmlns:a="http://schemas.openxmlformats.org/drawingml/2006/main" xmlns:r="http://schemas.openxmlformats.org/officeDocument/2006/relationships" xmlns:p="http://schemas.openxmlformats.org/presentationml/2006/main">
   <p:cSld>
     <p:spTree>
@@ -10773,11 +11063,25 @@
               <a:rPr lang="en-US" dirty="0" smtClean="0">
                 <a:latin typeface="Arial" charset="0"/>
               </a:rPr>
-              <a:t>Flash some lights</a:t>
-            </a:r>
-            <a:endParaRPr lang="en-US" dirty="0">
+              <a:t>Map</a:t>
+            </a:r>
+            <a:endParaRPr lang="en-US" dirty="0" smtClean="0">
               <a:latin typeface="Arial" charset="0"/>
             </a:endParaRPr>
+          </a:p>
+          <a:p>
+            <a:r>
+              <a:rPr lang="en-US" dirty="0" smtClean="0">
+                <a:latin typeface="Arial" charset="0"/>
+              </a:rPr>
+              <a:t>Flash some </a:t>
+            </a:r>
+            <a:r>
+              <a:rPr lang="en-US" dirty="0" smtClean="0">
+                <a:latin typeface="Arial" charset="0"/>
+              </a:rPr>
+              <a:t>lights</a:t>
+            </a:r>
           </a:p>
         </p:txBody>
       </p:sp>
@@ -10828,7 +11132,7 @@
 </p:sld>
 </file>
 
-<file path=ppt/slides/slide33.xml><?xml version="1.0" encoding="utf-8"?>
+<file path=ppt/slides/slide35.xml><?xml version="1.0" encoding="utf-8"?>
 <p:sld xmlns:a="http://schemas.openxmlformats.org/drawingml/2006/main" xmlns:r="http://schemas.openxmlformats.org/officeDocument/2006/relationships" xmlns:p="http://schemas.openxmlformats.org/presentationml/2006/main">
   <p:cSld>
     <p:spTree>
@@ -10902,564 +11206,6 @@
     <p:extLst>
       <p:ext uri="{BB962C8B-B14F-4D97-AF65-F5344CB8AC3E}">
         <p14:creationId xmlns:p14="http://schemas.microsoft.com/office/powerpoint/2010/main" val="487644910"/>
-      </p:ext>
-    </p:extLst>
-  </p:cSld>
-  <p:clrMapOvr>
-    <a:masterClrMapping/>
-  </p:clrMapOvr>
-  <p:transition xmlns:p14="http://schemas.microsoft.com/office/powerpoint/2010/main">
-    <p:wipe/>
-  </p:transition>
-</p:sld>
-</file>
-
-<file path=ppt/slides/slide34.xml><?xml version="1.0" encoding="utf-8"?>
-<p:sld xmlns:a="http://schemas.openxmlformats.org/drawingml/2006/main" xmlns:r="http://schemas.openxmlformats.org/officeDocument/2006/relationships" xmlns:p="http://schemas.openxmlformats.org/presentationml/2006/main">
-  <p:cSld>
-    <p:spTree>
-      <p:nvGrpSpPr>
-        <p:cNvPr id="1" name=""/>
-        <p:cNvGrpSpPr/>
-        <p:nvPr/>
-      </p:nvGrpSpPr>
-      <p:grpSpPr>
-        <a:xfrm>
-          <a:off x="0" y="0"/>
-          <a:ext cx="0" cy="0"/>
-          <a:chOff x="0" y="0"/>
-          <a:chExt cx="0" cy="0"/>
-        </a:xfrm>
-      </p:grpSpPr>
-      <p:sp>
-        <p:nvSpPr>
-          <p:cNvPr id="2" name="Title 1"/>
-          <p:cNvSpPr>
-            <a:spLocks noGrp="1"/>
-          </p:cNvSpPr>
-          <p:nvPr>
-            <p:ph type="title"/>
-          </p:nvPr>
-        </p:nvSpPr>
-        <p:spPr/>
-        <p:txBody>
-          <a:bodyPr/>
-          <a:lstStyle/>
-          <a:p>
-            <a:r>
-              <a:rPr lang="en-US" dirty="0"/>
-              <a:t>FLAG_ACTIVITY_NEW_TASK</a:t>
-            </a:r>
-          </a:p>
-        </p:txBody>
-      </p:sp>
-      <p:sp>
-        <p:nvSpPr>
-          <p:cNvPr id="4" name="Rounded Rectangle 3"/>
-          <p:cNvSpPr/>
-          <p:nvPr/>
-        </p:nvSpPr>
-        <p:spPr>
-          <a:xfrm>
-            <a:off x="2438400" y="1524000"/>
-            <a:ext cx="2895600" cy="2057400"/>
-          </a:xfrm>
-          <a:prstGeom prst="roundRect">
-            <a:avLst/>
-          </a:prstGeom>
-        </p:spPr>
-        <p:style>
-          <a:lnRef idx="3">
-            <a:schemeClr val="lt1"/>
-          </a:lnRef>
-          <a:fillRef idx="1">
-            <a:schemeClr val="accent6"/>
-          </a:fillRef>
-          <a:effectRef idx="1">
-            <a:schemeClr val="accent6"/>
-          </a:effectRef>
-          <a:fontRef idx="minor">
-            <a:schemeClr val="lt1"/>
-          </a:fontRef>
-        </p:style>
-        <p:txBody>
-          <a:bodyPr rtlCol="0" anchor="t"/>
-          <a:lstStyle/>
-          <a:p>
-            <a:r>
-              <a:rPr lang="en-US" dirty="0" err="1" smtClean="0"/>
-              <a:t>myapp</a:t>
-            </a:r>
-            <a:endParaRPr lang="en-US" dirty="0"/>
-          </a:p>
-        </p:txBody>
-      </p:sp>
-      <p:sp>
-        <p:nvSpPr>
-          <p:cNvPr id="5" name="Rectangle 4"/>
-          <p:cNvSpPr/>
-          <p:nvPr/>
-        </p:nvSpPr>
-        <p:spPr>
-          <a:xfrm>
-            <a:off x="2819400" y="2209800"/>
-            <a:ext cx="1066800" cy="762000"/>
-          </a:xfrm>
-          <a:prstGeom prst="rect">
-            <a:avLst/>
-          </a:prstGeom>
-        </p:spPr>
-        <p:style>
-          <a:lnRef idx="1">
-            <a:schemeClr val="accent2"/>
-          </a:lnRef>
-          <a:fillRef idx="2">
-            <a:schemeClr val="accent2"/>
-          </a:fillRef>
-          <a:effectRef idx="1">
-            <a:schemeClr val="accent2"/>
-          </a:effectRef>
-          <a:fontRef idx="minor">
-            <a:schemeClr val="dk1"/>
-          </a:fontRef>
-        </p:style>
-        <p:txBody>
-          <a:bodyPr rtlCol="0" anchor="ctr"/>
-          <a:lstStyle/>
-          <a:p>
-            <a:pPr algn="ctr"/>
-            <a:r>
-              <a:rPr lang="en-US" dirty="0" smtClean="0"/>
-              <a:t>MAIN</a:t>
-            </a:r>
-            <a:endParaRPr lang="en-US" dirty="0"/>
-          </a:p>
-        </p:txBody>
-      </p:sp>
-      <p:sp>
-        <p:nvSpPr>
-          <p:cNvPr id="6" name="Rectangle 5"/>
-          <p:cNvSpPr/>
-          <p:nvPr/>
-        </p:nvSpPr>
-        <p:spPr>
-          <a:xfrm>
-            <a:off x="4191000" y="2209800"/>
-            <a:ext cx="822960" cy="762000"/>
-          </a:xfrm>
-          <a:prstGeom prst="rect">
-            <a:avLst/>
-          </a:prstGeom>
-          <a:ln/>
-        </p:spPr>
-        <p:style>
-          <a:lnRef idx="1">
-            <a:schemeClr val="accent2"/>
-          </a:lnRef>
-          <a:fillRef idx="2">
-            <a:schemeClr val="accent2"/>
-          </a:fillRef>
-          <a:effectRef idx="1">
-            <a:schemeClr val="accent2"/>
-          </a:effectRef>
-          <a:fontRef idx="minor">
-            <a:schemeClr val="dk1"/>
-          </a:fontRef>
-        </p:style>
-        <p:txBody>
-          <a:bodyPr/>
-          <a:lstStyle/>
-          <a:p>
-            <a:endParaRPr lang="en-US"/>
-          </a:p>
-        </p:txBody>
-      </p:sp>
-      <p:sp>
-        <p:nvSpPr>
-          <p:cNvPr id="7" name="Rounded Rectangle 6"/>
-          <p:cNvSpPr/>
-          <p:nvPr/>
-        </p:nvSpPr>
-        <p:spPr>
-          <a:xfrm>
-            <a:off x="2514600" y="3886200"/>
-            <a:ext cx="1512724" cy="2057399"/>
-          </a:xfrm>
-          <a:prstGeom prst="roundRect">
-            <a:avLst/>
-          </a:prstGeom>
-          <a:ln/>
-        </p:spPr>
-        <p:style>
-          <a:lnRef idx="3">
-            <a:schemeClr val="lt1"/>
-          </a:lnRef>
-          <a:fillRef idx="1">
-            <a:schemeClr val="accent6"/>
-          </a:fillRef>
-          <a:effectRef idx="1">
-            <a:schemeClr val="accent6"/>
-          </a:effectRef>
-          <a:fontRef idx="minor">
-            <a:schemeClr val="lt1"/>
-          </a:fontRef>
-        </p:style>
-        <p:txBody>
-          <a:bodyPr/>
-          <a:lstStyle/>
-          <a:p>
-            <a:r>
-              <a:rPr lang="en-US" dirty="0" err="1" smtClean="0"/>
-              <a:t>gmail</a:t>
-            </a:r>
-            <a:endParaRPr lang="en-US" dirty="0"/>
-          </a:p>
-        </p:txBody>
-      </p:sp>
-      <p:sp>
-        <p:nvSpPr>
-          <p:cNvPr id="8" name="Rectangle 7"/>
-          <p:cNvSpPr/>
-          <p:nvPr/>
-        </p:nvSpPr>
-        <p:spPr>
-          <a:xfrm>
-            <a:off x="2743200" y="4724400"/>
-            <a:ext cx="822960" cy="822960"/>
-          </a:xfrm>
-          <a:prstGeom prst="rect">
-            <a:avLst/>
-          </a:prstGeom>
-          <a:ln/>
-        </p:spPr>
-        <p:style>
-          <a:lnRef idx="1">
-            <a:schemeClr val="accent2"/>
-          </a:lnRef>
-          <a:fillRef idx="2">
-            <a:schemeClr val="accent2"/>
-          </a:fillRef>
-          <a:effectRef idx="1">
-            <a:schemeClr val="accent2"/>
-          </a:effectRef>
-          <a:fontRef idx="minor">
-            <a:schemeClr val="dk1"/>
-          </a:fontRef>
-        </p:style>
-        <p:txBody>
-          <a:bodyPr/>
-          <a:lstStyle/>
-          <a:p>
-            <a:endParaRPr lang="en-US"/>
-          </a:p>
-        </p:txBody>
-      </p:sp>
-      <p:cxnSp>
-        <p:nvCxnSpPr>
-          <p:cNvPr id="10" name="Straight Arrow Connector 9"/>
-          <p:cNvCxnSpPr>
-            <a:endCxn id="6" idx="1"/>
-          </p:cNvCxnSpPr>
-          <p:nvPr/>
-        </p:nvCxnSpPr>
-        <p:spPr>
-          <a:xfrm>
-            <a:off x="3886200" y="2590800"/>
-            <a:ext cx="304800" cy="0"/>
-          </a:xfrm>
-          <a:prstGeom prst="straightConnector1">
-            <a:avLst/>
-          </a:prstGeom>
-          <a:ln>
-            <a:tailEnd type="arrow"/>
-          </a:ln>
-        </p:spPr>
-        <p:style>
-          <a:lnRef idx="3">
-            <a:schemeClr val="accent2"/>
-          </a:lnRef>
-          <a:fillRef idx="0">
-            <a:schemeClr val="accent2"/>
-          </a:fillRef>
-          <a:effectRef idx="2">
-            <a:schemeClr val="accent2"/>
-          </a:effectRef>
-          <a:fontRef idx="minor">
-            <a:schemeClr val="tx1"/>
-          </a:fontRef>
-        </p:style>
-      </p:cxnSp>
-      <p:cxnSp>
-        <p:nvCxnSpPr>
-          <p:cNvPr id="11" name="Straight Arrow Connector 10"/>
-          <p:cNvCxnSpPr>
-            <a:stCxn id="6" idx="3"/>
-            <a:endCxn id="8" idx="0"/>
-          </p:cNvCxnSpPr>
-          <p:nvPr/>
-        </p:nvCxnSpPr>
-        <p:spPr>
-          <a:xfrm flipH="1">
-            <a:off x="3154680" y="2590800"/>
-            <a:ext cx="1859280" cy="2133600"/>
-          </a:xfrm>
-          <a:prstGeom prst="straightConnector1">
-            <a:avLst/>
-          </a:prstGeom>
-          <a:ln>
-            <a:tailEnd type="arrow"/>
-          </a:ln>
-        </p:spPr>
-        <p:style>
-          <a:lnRef idx="3">
-            <a:schemeClr val="accent2"/>
-          </a:lnRef>
-          <a:fillRef idx="0">
-            <a:schemeClr val="accent2"/>
-          </a:fillRef>
-          <a:effectRef idx="2">
-            <a:schemeClr val="accent2"/>
-          </a:effectRef>
-          <a:fontRef idx="minor">
-            <a:schemeClr val="tx1"/>
-          </a:fontRef>
-        </p:style>
-      </p:cxnSp>
-      <p:sp>
-        <p:nvSpPr>
-          <p:cNvPr id="14" name="Pentagon 13"/>
-          <p:cNvSpPr/>
-          <p:nvPr/>
-        </p:nvSpPr>
-        <p:spPr>
-          <a:xfrm rot="5400000">
-            <a:off x="914400" y="3429000"/>
-            <a:ext cx="822960" cy="822960"/>
-          </a:xfrm>
-          <a:prstGeom prst="homePlate">
-            <a:avLst/>
-          </a:prstGeom>
-          <a:ln/>
-        </p:spPr>
-        <p:style>
-          <a:lnRef idx="1">
-            <a:schemeClr val="dk1"/>
-          </a:lnRef>
-          <a:fillRef idx="3">
-            <a:schemeClr val="dk1"/>
-          </a:fillRef>
-          <a:effectRef idx="2">
-            <a:schemeClr val="dk1"/>
-          </a:effectRef>
-          <a:fontRef idx="minor">
-            <a:schemeClr val="lt1"/>
-          </a:fontRef>
-        </p:style>
-        <p:txBody>
-          <a:bodyPr/>
-          <a:lstStyle/>
-          <a:p>
-            <a:endParaRPr lang="en-US" dirty="0"/>
-          </a:p>
-        </p:txBody>
-      </p:sp>
-      <p:cxnSp>
-        <p:nvCxnSpPr>
-          <p:cNvPr id="15" name="Straight Arrow Connector 14"/>
-          <p:cNvCxnSpPr>
-            <a:stCxn id="14" idx="0"/>
-            <a:endCxn id="5" idx="1"/>
-          </p:cNvCxnSpPr>
-          <p:nvPr/>
-        </p:nvCxnSpPr>
-        <p:spPr>
-          <a:xfrm flipV="1">
-            <a:off x="1737360" y="2590800"/>
-            <a:ext cx="1082040" cy="1043940"/>
-          </a:xfrm>
-          <a:prstGeom prst="straightConnector1">
-            <a:avLst/>
-          </a:prstGeom>
-          <a:ln>
-            <a:tailEnd type="arrow"/>
-          </a:ln>
-        </p:spPr>
-        <p:style>
-          <a:lnRef idx="3">
-            <a:schemeClr val="accent2"/>
-          </a:lnRef>
-          <a:fillRef idx="0">
-            <a:schemeClr val="accent2"/>
-          </a:fillRef>
-          <a:effectRef idx="2">
-            <a:schemeClr val="accent2"/>
-          </a:effectRef>
-          <a:fontRef idx="minor">
-            <a:schemeClr val="tx1"/>
-          </a:fontRef>
-        </p:style>
-      </p:cxnSp>
-    </p:spTree>
-    <p:extLst>
-      <p:ext uri="{BB962C8B-B14F-4D97-AF65-F5344CB8AC3E}">
-        <p14:creationId xmlns:p14="http://schemas.microsoft.com/office/powerpoint/2010/main" val="2532804178"/>
-      </p:ext>
-    </p:extLst>
-  </p:cSld>
-  <p:clrMapOvr>
-    <a:masterClrMapping/>
-  </p:clrMapOvr>
-  <p:transition xmlns:p14="http://schemas.microsoft.com/office/powerpoint/2010/main">
-    <p:wipe/>
-  </p:transition>
-  <p:timing>
-    <p:tnLst>
-      <p:par>
-        <p:cTn xmlns:p14="http://schemas.microsoft.com/office/powerpoint/2010/main" id="1" dur="indefinite" restart="never" nodeType="tmRoot"/>
-      </p:par>
-    </p:tnLst>
-  </p:timing>
-</p:sld>
-</file>
-
-<file path=ppt/slides/slide35.xml><?xml version="1.0" encoding="utf-8"?>
-<p:sld xmlns:a="http://schemas.openxmlformats.org/drawingml/2006/main" xmlns:r="http://schemas.openxmlformats.org/officeDocument/2006/relationships" xmlns:p="http://schemas.openxmlformats.org/presentationml/2006/main">
-  <p:cSld>
-    <p:spTree>
-      <p:nvGrpSpPr>
-        <p:cNvPr id="1" name=""/>
-        <p:cNvGrpSpPr/>
-        <p:nvPr/>
-      </p:nvGrpSpPr>
-      <p:grpSpPr>
-        <a:xfrm>
-          <a:off x="0" y="0"/>
-          <a:ext cx="0" cy="0"/>
-          <a:chOff x="0" y="0"/>
-          <a:chExt cx="0" cy="0"/>
-        </a:xfrm>
-      </p:grpSpPr>
-      <p:sp>
-        <p:nvSpPr>
-          <p:cNvPr id="2" name="Title 1"/>
-          <p:cNvSpPr>
-            <a:spLocks noGrp="1"/>
-          </p:cNvSpPr>
-          <p:nvPr>
-            <p:ph type="title"/>
-          </p:nvPr>
-        </p:nvSpPr>
-        <p:spPr/>
-        <p:txBody>
-          <a:bodyPr/>
-          <a:lstStyle/>
-          <a:p>
-            <a:r>
-              <a:rPr lang="en-US" dirty="0" smtClean="0"/>
-              <a:t>Activity Flags</a:t>
-            </a:r>
-            <a:endParaRPr lang="en-US" dirty="0"/>
-          </a:p>
-        </p:txBody>
-      </p:sp>
-      <p:sp>
-        <p:nvSpPr>
-          <p:cNvPr id="3" name="Content Placeholder 2"/>
-          <p:cNvSpPr>
-            <a:spLocks noGrp="1"/>
-          </p:cNvSpPr>
-          <p:nvPr>
-            <p:ph idx="1"/>
-          </p:nvPr>
-        </p:nvSpPr>
-        <p:spPr/>
-        <p:txBody>
-          <a:bodyPr/>
-          <a:lstStyle/>
-          <a:p>
-            <a:r>
-              <a:rPr lang="en-US" dirty="0" smtClean="0"/>
-              <a:t>FLAG_ACTIVITY_CLEAR_WHEN_TASK_RESET</a:t>
-            </a:r>
-          </a:p>
-          <a:p>
-            <a:pPr lvl="1"/>
-            <a:r>
-              <a:rPr lang="en-US" dirty="0" smtClean="0"/>
-              <a:t>Don’t hang around if the user leaves and comes back</a:t>
-            </a:r>
-          </a:p>
-          <a:p>
-            <a:r>
-              <a:rPr lang="en-US" dirty="0" smtClean="0"/>
-              <a:t>FLAG_ACTIVITY_REORDER_TO_FRONT</a:t>
-            </a:r>
-          </a:p>
-          <a:p>
-            <a:pPr lvl="1"/>
-            <a:r>
-              <a:rPr lang="en-US" dirty="0" smtClean="0"/>
-              <a:t>Don’t have duplicates of this activity in the stack</a:t>
-            </a:r>
-            <a:endParaRPr lang="en-US" dirty="0"/>
-          </a:p>
-          <a:p>
-            <a:r>
-              <a:rPr lang="en-US" dirty="0" smtClean="0"/>
-              <a:t>FLAG_ACTIVITY_CLEAR_TOP</a:t>
-            </a:r>
-          </a:p>
-          <a:p>
-            <a:pPr lvl="1"/>
-            <a:r>
-              <a:rPr lang="en-US" dirty="0" smtClean="0"/>
-              <a:t>Prevent circles in the back stack</a:t>
-            </a:r>
-          </a:p>
-          <a:p>
-            <a:r>
-              <a:rPr lang="en-US" dirty="0" smtClean="0"/>
-              <a:t>FLAG_ACTIVITY_NEW_TASK</a:t>
-            </a:r>
-          </a:p>
-          <a:p>
-            <a:pPr lvl="1"/>
-            <a:r>
-              <a:rPr lang="en-US" dirty="0" smtClean="0"/>
-              <a:t>Put this activity in the task of its own application</a:t>
-            </a:r>
-          </a:p>
-          <a:p>
-            <a:pPr lvl="1"/>
-            <a:r>
-              <a:rPr lang="en-US" dirty="0"/>
-              <a:t>With </a:t>
-            </a:r>
-            <a:r>
-              <a:rPr lang="en-US" dirty="0" smtClean="0"/>
-              <a:t>FLAG_ACTIVITY_MULTIPLE_TASK, will always start a new task</a:t>
-            </a:r>
-          </a:p>
-          <a:p>
-            <a:r>
-              <a:rPr lang="en-US" dirty="0" smtClean="0"/>
-              <a:t>FLAG_ACTIVITY_NO_ANIMATION, NO_HISTORY</a:t>
-            </a:r>
-          </a:p>
-          <a:p>
-            <a:pPr lvl="1"/>
-            <a:r>
-              <a:rPr lang="en-US" dirty="0" smtClean="0"/>
-              <a:t>Transparently forward to another activity</a:t>
-            </a:r>
-            <a:endParaRPr lang="en-US" dirty="0"/>
-          </a:p>
-        </p:txBody>
-      </p:sp>
-    </p:spTree>
-    <p:extLst>
-      <p:ext uri="{BB962C8B-B14F-4D97-AF65-F5344CB8AC3E}">
-        <p14:creationId xmlns:p14="http://schemas.microsoft.com/office/powerpoint/2010/main" val="3663758240"/>
       </p:ext>
     </p:extLst>
   </p:cSld>
@@ -11913,9 +11659,109 @@
       </p:grpSpPr>
       <p:sp>
         <p:nvSpPr>
-          <p:cNvPr id="24577" name="Title 1"/>
+          <p:cNvPr id="22529" name="Rectangle 2"/>
           <p:cNvSpPr>
-            <a:spLocks noGrp="1"/>
+            <a:spLocks noGrp="1" noChangeArrowheads="1"/>
+          </p:cNvSpPr>
+          <p:nvPr>
+            <p:ph type="body" idx="1"/>
+          </p:nvPr>
+        </p:nvSpPr>
+        <p:spPr/>
+        <p:txBody>
+          <a:bodyPr/>
+          <a:lstStyle/>
+          <a:p>
+            <a:pPr eaLnBrk="1" hangingPunct="1"/>
+            <a:r>
+              <a:rPr lang="en-CA" dirty="0" err="1" smtClean="0">
+                <a:latin typeface="Arial" charset="0"/>
+              </a:rPr>
+              <a:t>MediaPlayer</a:t>
+            </a:r>
+            <a:endParaRPr lang="en-CA" dirty="0" smtClean="0">
+              <a:latin typeface="Arial" charset="0"/>
+            </a:endParaRPr>
+          </a:p>
+          <a:p>
+            <a:pPr eaLnBrk="1" hangingPunct="1"/>
+            <a:r>
+              <a:rPr lang="en-CA" dirty="0" err="1" smtClean="0">
+                <a:latin typeface="Arial" charset="0"/>
+              </a:rPr>
+              <a:t>MediaRecorder</a:t>
+            </a:r>
+            <a:endParaRPr lang="en-CA" dirty="0">
+              <a:latin typeface="Arial" charset="0"/>
+            </a:endParaRPr>
+          </a:p>
+          <a:p>
+            <a:pPr eaLnBrk="1" hangingPunct="1"/>
+            <a:r>
+              <a:rPr lang="en-CA" dirty="0" err="1">
+                <a:latin typeface="Arial" charset="0"/>
+              </a:rPr>
+              <a:t>ContentProviders</a:t>
+            </a:r>
+            <a:endParaRPr lang="en-CA" dirty="0">
+              <a:latin typeface="Arial" charset="0"/>
+            </a:endParaRPr>
+          </a:p>
+          <a:p>
+            <a:pPr lvl="1" eaLnBrk="1" hangingPunct="1"/>
+            <a:r>
+              <a:rPr lang="en-CA" dirty="0" smtClean="0">
+                <a:latin typeface="Arial" charset="0"/>
+              </a:rPr>
+              <a:t>Photos and other media</a:t>
+            </a:r>
+            <a:endParaRPr lang="en-CA" dirty="0">
+              <a:latin typeface="Arial" charset="0"/>
+            </a:endParaRPr>
+          </a:p>
+          <a:p>
+            <a:pPr eaLnBrk="1" hangingPunct="1"/>
+            <a:r>
+              <a:rPr lang="en-CA" dirty="0" err="1">
+                <a:latin typeface="Arial" charset="0"/>
+              </a:rPr>
+              <a:t>SystemServices</a:t>
+            </a:r>
+            <a:endParaRPr lang="en-CA" dirty="0">
+              <a:latin typeface="Arial" charset="0"/>
+            </a:endParaRPr>
+          </a:p>
+          <a:p>
+            <a:pPr lvl="1" eaLnBrk="1" hangingPunct="1"/>
+            <a:r>
+              <a:rPr lang="en-CA" dirty="0" err="1">
+                <a:latin typeface="Arial" charset="0"/>
+              </a:rPr>
+              <a:t>LocationManager</a:t>
+            </a:r>
+            <a:endParaRPr lang="en-CA" dirty="0">
+              <a:latin typeface="Arial" charset="0"/>
+            </a:endParaRPr>
+          </a:p>
+          <a:p>
+            <a:pPr lvl="1" eaLnBrk="1" hangingPunct="1"/>
+            <a:r>
+              <a:rPr lang="en-CA" dirty="0" err="1">
+                <a:latin typeface="Arial" charset="0"/>
+              </a:rPr>
+              <a:t>SMSManager</a:t>
+            </a:r>
+            <a:endParaRPr lang="en-CA" dirty="0">
+              <a:latin typeface="Arial" charset="0"/>
+            </a:endParaRPr>
+          </a:p>
+        </p:txBody>
+      </p:sp>
+      <p:sp>
+        <p:nvSpPr>
+          <p:cNvPr id="22530" name="Rectangle 3"/>
+          <p:cNvSpPr>
+            <a:spLocks noGrp="1" noChangeArrowheads="1"/>
           </p:cNvSpPr>
           <p:nvPr>
             <p:ph type="title"/>
@@ -11926,179 +11772,70 @@
           <a:bodyPr/>
           <a:lstStyle/>
           <a:p>
-            <a:r>
-              <a:rPr lang="en-US" dirty="0" smtClean="0">
+            <a:pPr eaLnBrk="1" hangingPunct="1"/>
+            <a:r>
+              <a:rPr lang="en-CA">
                 <a:latin typeface="Arial" charset="0"/>
               </a:rPr>
-              <a:t>Where to go next</a:t>
-            </a:r>
-            <a:endParaRPr lang="en-US" dirty="0">
-              <a:latin typeface="Arial" charset="0"/>
-            </a:endParaRPr>
+              <a:t>Resources not accessed through intents</a:t>
+            </a:r>
           </a:p>
         </p:txBody>
       </p:sp>
       <p:sp>
         <p:nvSpPr>
-          <p:cNvPr id="24578" name="Content Placeholder 2"/>
+          <p:cNvPr id="22531" name="Rectangle 4"/>
           <p:cNvSpPr>
-            <a:spLocks noGrp="1"/>
+            <a:spLocks noChangeArrowheads="1"/>
           </p:cNvSpPr>
-          <p:nvPr>
-            <p:ph idx="1"/>
-          </p:nvPr>
-        </p:nvSpPr>
-        <p:spPr/>
-        <p:txBody>
-          <a:bodyPr/>
-          <a:lstStyle/>
-          <a:p>
-            <a:pPr>
-              <a:spcBef>
-                <a:spcPts val="1200"/>
-              </a:spcBef>
-              <a:spcAft>
-                <a:spcPts val="1200"/>
-              </a:spcAft>
-            </a:pPr>
-            <a:r>
-              <a:rPr lang="en-US" sz="3200" dirty="0" err="1" smtClean="0">
-                <a:latin typeface="Arial" charset="0"/>
-              </a:rPr>
-              <a:t>Tronsmit</a:t>
-            </a:r>
-            <a:r>
-              <a:rPr lang="en-US" sz="3200" dirty="0" smtClean="0">
-                <a:latin typeface="Arial" charset="0"/>
-              </a:rPr>
-              <a:t> </a:t>
-            </a:r>
-            <a:r>
-              <a:rPr lang="en-US" sz="3200" dirty="0" smtClean="0">
-                <a:latin typeface="Arial" charset="0"/>
-              </a:rPr>
-              <a:t>sample application:</a:t>
-            </a:r>
-          </a:p>
-          <a:p>
-            <a:pPr lvl="1">
-              <a:spcBef>
-                <a:spcPts val="1200"/>
-              </a:spcBef>
-              <a:spcAft>
-                <a:spcPts val="1200"/>
-              </a:spcAft>
-            </a:pPr>
-            <a:r>
-              <a:rPr lang="en-US" sz="2600" dirty="0" smtClean="0">
-                <a:latin typeface="Arial" charset="0"/>
-                <a:hlinkClick r:id="rId3"/>
-              </a:rPr>
-              <a:t>https://github.com/jessitron/</a:t>
-            </a:r>
-            <a:r>
-              <a:rPr lang="en-US" sz="2600" dirty="0" smtClean="0">
-                <a:latin typeface="Arial" charset="0"/>
-                <a:hlinkClick r:id="rId3"/>
-              </a:rPr>
-              <a:t>Tronsmit</a:t>
-            </a:r>
-            <a:endParaRPr lang="en-US" sz="2600" dirty="0" smtClean="0">
-              <a:latin typeface="Arial" charset="0"/>
-            </a:endParaRPr>
-          </a:p>
-          <a:p>
-            <a:pPr lvl="1">
-              <a:spcBef>
-                <a:spcPts val="1200"/>
-              </a:spcBef>
-              <a:spcAft>
-                <a:spcPts val="1200"/>
-              </a:spcAft>
-            </a:pPr>
-            <a:r>
-              <a:rPr lang="en-US" sz="2600" dirty="0" smtClean="0">
-                <a:latin typeface="Arial" charset="0"/>
-              </a:rPr>
-              <a:t>Download it, install it on your device</a:t>
-            </a:r>
-          </a:p>
-          <a:p>
-            <a:pPr lvl="1">
-              <a:spcBef>
-                <a:spcPts val="1200"/>
-              </a:spcBef>
-              <a:spcAft>
-                <a:spcPts val="1200"/>
-              </a:spcAft>
-            </a:pPr>
-            <a:r>
-              <a:rPr lang="en-US" sz="2600" dirty="0" smtClean="0">
-                <a:latin typeface="Arial" charset="0"/>
-              </a:rPr>
-              <a:t>Try to take </a:t>
-            </a:r>
-            <a:r>
-              <a:rPr lang="en-US" sz="2600" dirty="0" smtClean="0">
-                <a:latin typeface="Arial" charset="0"/>
-              </a:rPr>
-              <a:t>over the world</a:t>
-            </a:r>
-            <a:endParaRPr lang="en-US" sz="2600" dirty="0">
-              <a:latin typeface="Arial" charset="0"/>
-            </a:endParaRPr>
-          </a:p>
-          <a:p>
-            <a:pPr>
-              <a:buFontTx/>
-              <a:buNone/>
-            </a:pPr>
-            <a:endParaRPr lang="en-US" dirty="0">
-              <a:latin typeface="Arial" charset="0"/>
-            </a:endParaRPr>
-          </a:p>
-        </p:txBody>
-      </p:sp>
-      <p:sp>
-        <p:nvSpPr>
-          <p:cNvPr id="2" name="TextBox 1"/>
-          <p:cNvSpPr txBox="1"/>
           <p:nvPr/>
         </p:nvSpPr>
-        <p:spPr>
+        <p:spPr bwMode="auto">
           <a:xfrm>
-            <a:off x="5715000" y="4800600"/>
-            <a:ext cx="2895600" cy="646331"/>
+            <a:off x="1219200" y="228600"/>
+            <a:ext cx="7772400" cy="457200"/>
           </a:xfrm>
           <a:prstGeom prst="rect">
             <a:avLst/>
           </a:prstGeom>
           <a:noFill/>
+          <a:ln>
+            <a:noFill/>
+          </a:ln>
+          <a:extLst>
+            <a:ext uri="{909E8E84-426E-40dd-AFC4-6F175D3DCCD1}">
+              <a14:hiddenFill xmlns:a14="http://schemas.microsoft.com/office/drawing/2010/main">
+                <a:solidFill>
+                  <a:srgbClr val="FFFFFF"/>
+                </a:solidFill>
+              </a14:hiddenFill>
+            </a:ext>
+            <a:ext uri="{91240B29-F687-4f45-9708-019B960494DF}">
+              <a14:hiddenLine xmlns:a14="http://schemas.microsoft.com/office/drawing/2010/main" w="9525">
+                <a:solidFill>
+                  <a:srgbClr val="000000"/>
+                </a:solidFill>
+                <a:miter lim="800000"/>
+                <a:headEnd/>
+                <a:tailEnd/>
+              </a14:hiddenLine>
+            </a:ext>
+          </a:extLst>
         </p:spPr>
         <p:txBody>
-          <a:bodyPr wrap="square" rtlCol="0">
-            <a:spAutoFit/>
-          </a:bodyPr>
+          <a:bodyPr anchor="ctr"/>
           <a:lstStyle/>
           <a:p>
-            <a:r>
-              <a:rPr lang="en-US" sz="3600" dirty="0" smtClean="0">
-                <a:latin typeface="Calibri"/>
-                <a:cs typeface="Calibri"/>
+            <a:pPr algn="r"/>
+            <a:r>
+              <a:rPr lang="en-CA" sz="2000">
+                <a:solidFill>
+                  <a:srgbClr val="89A8B7"/>
+                </a:solidFill>
+                <a:latin typeface="Arial" charset="0"/>
               </a:rPr>
-              <a:t>@</a:t>
-            </a:r>
-            <a:r>
-              <a:rPr lang="en-US" sz="3600" dirty="0" err="1" smtClean="0">
-                <a:latin typeface="Calibri"/>
-                <a:cs typeface="Calibri"/>
-              </a:rPr>
-              <a:t>jessitron</a:t>
-            </a:r>
-            <a:endParaRPr lang="en-US" sz="3600" dirty="0">
-              <a:latin typeface="Calibri"/>
-              <a:cs typeface="Calibri"/>
-            </a:endParaRPr>
+              <a:t>Presentation title</a:t>
+            </a:r>
           </a:p>
         </p:txBody>
       </p:sp>
@@ -13622,7 +13359,7 @@
 </file>
 
 <file path=ppt/slides/slide40.xml><?xml version="1.0" encoding="utf-8"?>
-<p:sld xmlns:a="http://schemas.openxmlformats.org/drawingml/2006/main" xmlns:r="http://schemas.openxmlformats.org/officeDocument/2006/relationships" xmlns:p="http://schemas.openxmlformats.org/presentationml/2006/main" show="0">
+<p:sld xmlns:a="http://schemas.openxmlformats.org/drawingml/2006/main" xmlns:r="http://schemas.openxmlformats.org/officeDocument/2006/relationships" xmlns:p="http://schemas.openxmlformats.org/presentationml/2006/main">
   <p:cSld>
     <p:spTree>
       <p:nvGrpSpPr>
@@ -13640,7 +13377,7 @@
       </p:grpSpPr>
       <p:sp>
         <p:nvSpPr>
-          <p:cNvPr id="26625" name="Title 1"/>
+          <p:cNvPr id="24577" name="Title 1"/>
           <p:cNvSpPr>
             <a:spLocks noGrp="1"/>
           </p:cNvSpPr>
@@ -13654,17 +13391,20 @@
           <a:lstStyle/>
           <a:p>
             <a:r>
-              <a:rPr lang="en-US">
+              <a:rPr lang="en-US" dirty="0" smtClean="0">
                 <a:latin typeface="Arial" charset="0"/>
               </a:rPr>
-              <a:t>Don't forget</a:t>
-            </a:r>
+              <a:t>Where to go next</a:t>
+            </a:r>
+            <a:endParaRPr lang="en-US" dirty="0">
+              <a:latin typeface="Arial" charset="0"/>
+            </a:endParaRPr>
           </a:p>
         </p:txBody>
       </p:sp>
       <p:sp>
         <p:nvSpPr>
-          <p:cNvPr id="26626" name="Content Placeholder 2"/>
+          <p:cNvPr id="24578" name="Content Placeholder 2"/>
           <p:cNvSpPr>
             <a:spLocks noGrp="1"/>
           </p:cNvSpPr>
@@ -13677,49 +13417,151 @@
           <a:bodyPr/>
           <a:lstStyle/>
           <a:p>
-            <a:r>
-              <a:rPr lang="en-US" dirty="0">
+            <a:pPr>
+              <a:spcBef>
+                <a:spcPts val="1200"/>
+              </a:spcBef>
+              <a:spcAft>
+                <a:spcPts val="1200"/>
+              </a:spcAft>
+            </a:pPr>
+            <a:r>
+              <a:rPr lang="en-US" sz="3200" dirty="0" err="1" smtClean="0">
                 <a:latin typeface="Arial" charset="0"/>
               </a:rPr>
-              <a:t>Replace "presentation title" with my title wherever it </a:t>
-            </a:r>
-            <a:r>
-              <a:rPr lang="en-US" dirty="0" smtClean="0">
+              <a:t>Tronsmit</a:t>
+            </a:r>
+            <a:r>
+              <a:rPr lang="en-US" sz="3200" dirty="0" smtClean="0">
                 <a:latin typeface="Arial" charset="0"/>
               </a:rPr>
-              <a:t>appears</a:t>
-            </a:r>
-          </a:p>
-          <a:p>
-            <a:r>
-              <a:rPr lang="en-US" dirty="0" smtClean="0">
+              <a:t> </a:t>
+            </a:r>
+            <a:r>
+              <a:rPr lang="en-US" sz="3200" dirty="0" smtClean="0">
                 <a:latin typeface="Arial" charset="0"/>
               </a:rPr>
-              <a:t>App: try to duplicate crash when I hit “pick contact” but then exit, then try to go back.</a:t>
-            </a:r>
-          </a:p>
-          <a:p>
-            <a:r>
-              <a:rPr lang="en-US" dirty="0" smtClean="0">
+              <a:t>sample application:</a:t>
+            </a:r>
+          </a:p>
+          <a:p>
+            <a:pPr lvl="1">
+              <a:spcBef>
+                <a:spcPts val="1200"/>
+              </a:spcBef>
+              <a:spcAft>
+                <a:spcPts val="1200"/>
+              </a:spcAft>
+            </a:pPr>
+            <a:r>
+              <a:rPr lang="en-US" sz="2600" dirty="0" smtClean="0">
+                <a:latin typeface="Arial" charset="0"/>
+                <a:hlinkClick r:id="rId3"/>
+              </a:rPr>
+              <a:t>https://github.com/jessitron/</a:t>
+            </a:r>
+            <a:r>
+              <a:rPr lang="en-US" sz="2600" dirty="0" smtClean="0">
+                <a:latin typeface="Arial" charset="0"/>
+                <a:hlinkClick r:id="rId3"/>
+              </a:rPr>
+              <a:t>Tronsmit</a:t>
+            </a:r>
+            <a:endParaRPr lang="en-US" sz="2600" dirty="0" smtClean="0">
+              <a:latin typeface="Arial" charset="0"/>
+            </a:endParaRPr>
+          </a:p>
+          <a:p>
+            <a:pPr lvl="1">
+              <a:spcBef>
+                <a:spcPts val="1200"/>
+              </a:spcBef>
+              <a:spcAft>
+                <a:spcPts val="1200"/>
+              </a:spcAft>
+            </a:pPr>
+            <a:r>
+              <a:rPr lang="en-US" sz="2600" dirty="0" smtClean="0">
                 <a:latin typeface="Arial" charset="0"/>
               </a:rPr>
-              <a:t>What does it mean to set an app as a default? How does that stick, and what else does it affect?</a:t>
-            </a:r>
-          </a:p>
-          <a:p>
-            <a:r>
-              <a:rPr lang="en-US" dirty="0" smtClean="0">
+              <a:t>Download it, install it on your device</a:t>
+            </a:r>
+          </a:p>
+          <a:p>
+            <a:pPr lvl="1">
+              <a:spcBef>
+                <a:spcPts val="1200"/>
+              </a:spcBef>
+              <a:spcAft>
+                <a:spcPts val="1200"/>
+              </a:spcAft>
+            </a:pPr>
+            <a:r>
+              <a:rPr lang="en-US" sz="2600" dirty="0" smtClean="0">
                 <a:latin typeface="Arial" charset="0"/>
               </a:rPr>
-              <a:t>Use  ACTION_PICK_ACTIVITY to let them choose what the button will do</a:t>
-            </a:r>
+              <a:t>Try to take </a:t>
+            </a:r>
+            <a:r>
+              <a:rPr lang="en-US" sz="2600" dirty="0" smtClean="0">
+                <a:latin typeface="Arial" charset="0"/>
+              </a:rPr>
+              <a:t>over the world</a:t>
+            </a:r>
+            <a:endParaRPr lang="en-US" sz="2600" dirty="0">
+              <a:latin typeface="Arial" charset="0"/>
+            </a:endParaRPr>
+          </a:p>
+          <a:p>
+            <a:pPr>
+              <a:buFontTx/>
+              <a:buNone/>
+            </a:pPr>
             <a:endParaRPr lang="en-US" dirty="0">
               <a:latin typeface="Arial" charset="0"/>
             </a:endParaRPr>
           </a:p>
-          <a:p>
-            <a:endParaRPr lang="en-US" dirty="0">
-              <a:latin typeface="Arial" charset="0"/>
+        </p:txBody>
+      </p:sp>
+      <p:sp>
+        <p:nvSpPr>
+          <p:cNvPr id="2" name="TextBox 1"/>
+          <p:cNvSpPr txBox="1"/>
+          <p:nvPr/>
+        </p:nvSpPr>
+        <p:spPr>
+          <a:xfrm>
+            <a:off x="5715000" y="4800600"/>
+            <a:ext cx="2895600" cy="646331"/>
+          </a:xfrm>
+          <a:prstGeom prst="rect">
+            <a:avLst/>
+          </a:prstGeom>
+          <a:noFill/>
+        </p:spPr>
+        <p:txBody>
+          <a:bodyPr wrap="square" rtlCol="0">
+            <a:spAutoFit/>
+          </a:bodyPr>
+          <a:lstStyle/>
+          <a:p>
+            <a:r>
+              <a:rPr lang="en-US" sz="3600" dirty="0" smtClean="0">
+                <a:latin typeface="Calibri"/>
+                <a:cs typeface="Calibri"/>
+              </a:rPr>
+              <a:t>@</a:t>
+            </a:r>
+            <a:r>
+              <a:rPr lang="en-US" sz="3600" dirty="0" err="1" smtClean="0">
+                <a:latin typeface="Calibri"/>
+                <a:cs typeface="Calibri"/>
+              </a:rPr>
+              <a:t>jessitron</a:t>
+            </a:r>
+            <a:endParaRPr lang="en-US" sz="3600" dirty="0">
+              <a:latin typeface="Calibri"/>
+              <a:cs typeface="Calibri"/>
             </a:endParaRPr>
           </a:p>
         </p:txBody>
@@ -13761,109 +13603,9 @@
       </p:grpSpPr>
       <p:sp>
         <p:nvSpPr>
-          <p:cNvPr id="22529" name="Rectangle 2"/>
+          <p:cNvPr id="2" name="Title 1"/>
           <p:cNvSpPr>
-            <a:spLocks noGrp="1" noChangeArrowheads="1"/>
-          </p:cNvSpPr>
-          <p:nvPr>
-            <p:ph type="body" idx="1"/>
-          </p:nvPr>
-        </p:nvSpPr>
-        <p:spPr/>
-        <p:txBody>
-          <a:bodyPr/>
-          <a:lstStyle/>
-          <a:p>
-            <a:pPr eaLnBrk="1" hangingPunct="1"/>
-            <a:r>
-              <a:rPr lang="en-CA" dirty="0" err="1" smtClean="0">
-                <a:latin typeface="Arial" charset="0"/>
-              </a:rPr>
-              <a:t>MediaPlayer</a:t>
-            </a:r>
-            <a:endParaRPr lang="en-CA" dirty="0" smtClean="0">
-              <a:latin typeface="Arial" charset="0"/>
-            </a:endParaRPr>
-          </a:p>
-          <a:p>
-            <a:pPr eaLnBrk="1" hangingPunct="1"/>
-            <a:r>
-              <a:rPr lang="en-CA" dirty="0" err="1" smtClean="0">
-                <a:latin typeface="Arial" charset="0"/>
-              </a:rPr>
-              <a:t>MediaRecorder</a:t>
-            </a:r>
-            <a:endParaRPr lang="en-CA" dirty="0">
-              <a:latin typeface="Arial" charset="0"/>
-            </a:endParaRPr>
-          </a:p>
-          <a:p>
-            <a:pPr eaLnBrk="1" hangingPunct="1"/>
-            <a:r>
-              <a:rPr lang="en-CA" dirty="0" err="1">
-                <a:latin typeface="Arial" charset="0"/>
-              </a:rPr>
-              <a:t>ContentProviders</a:t>
-            </a:r>
-            <a:endParaRPr lang="en-CA" dirty="0">
-              <a:latin typeface="Arial" charset="0"/>
-            </a:endParaRPr>
-          </a:p>
-          <a:p>
-            <a:pPr lvl="1" eaLnBrk="1" hangingPunct="1"/>
-            <a:r>
-              <a:rPr lang="en-CA" dirty="0" smtClean="0">
-                <a:latin typeface="Arial" charset="0"/>
-              </a:rPr>
-              <a:t>Photos and other media</a:t>
-            </a:r>
-            <a:endParaRPr lang="en-CA" dirty="0">
-              <a:latin typeface="Arial" charset="0"/>
-            </a:endParaRPr>
-          </a:p>
-          <a:p>
-            <a:pPr eaLnBrk="1" hangingPunct="1"/>
-            <a:r>
-              <a:rPr lang="en-CA" dirty="0" err="1">
-                <a:latin typeface="Arial" charset="0"/>
-              </a:rPr>
-              <a:t>SystemServices</a:t>
-            </a:r>
-            <a:endParaRPr lang="en-CA" dirty="0">
-              <a:latin typeface="Arial" charset="0"/>
-            </a:endParaRPr>
-          </a:p>
-          <a:p>
-            <a:pPr lvl="1" eaLnBrk="1" hangingPunct="1"/>
-            <a:r>
-              <a:rPr lang="en-CA" dirty="0" err="1">
-                <a:latin typeface="Arial" charset="0"/>
-              </a:rPr>
-              <a:t>LocationManager</a:t>
-            </a:r>
-            <a:endParaRPr lang="en-CA" dirty="0">
-              <a:latin typeface="Arial" charset="0"/>
-            </a:endParaRPr>
-          </a:p>
-          <a:p>
-            <a:pPr lvl="1" eaLnBrk="1" hangingPunct="1"/>
-            <a:r>
-              <a:rPr lang="en-CA" dirty="0" err="1">
-                <a:latin typeface="Arial" charset="0"/>
-              </a:rPr>
-              <a:t>SMSManager</a:t>
-            </a:r>
-            <a:endParaRPr lang="en-CA" dirty="0">
-              <a:latin typeface="Arial" charset="0"/>
-            </a:endParaRPr>
-          </a:p>
-        </p:txBody>
-      </p:sp>
-      <p:sp>
-        <p:nvSpPr>
-          <p:cNvPr id="22530" name="Rectangle 3"/>
-          <p:cNvSpPr>
-            <a:spLocks noGrp="1" noChangeArrowheads="1"/>
+            <a:spLocks noGrp="1"/>
           </p:cNvSpPr>
           <p:nvPr>
             <p:ph type="title"/>
@@ -13874,70 +13616,639 @@
           <a:bodyPr/>
           <a:lstStyle/>
           <a:p>
-            <a:pPr eaLnBrk="1" hangingPunct="1"/>
-            <a:r>
-              <a:rPr lang="en-CA">
-                <a:latin typeface="Arial" charset="0"/>
-              </a:rPr>
-              <a:t>Resources not accessed through intents</a:t>
+            <a:r>
+              <a:rPr lang="en-US" dirty="0"/>
+              <a:t>FLAG_ACTIVITY_NEW_TASK</a:t>
             </a:r>
           </a:p>
         </p:txBody>
       </p:sp>
       <p:sp>
         <p:nvSpPr>
-          <p:cNvPr id="22531" name="Rectangle 4"/>
-          <p:cNvSpPr>
-            <a:spLocks noChangeArrowheads="1"/>
-          </p:cNvSpPr>
+          <p:cNvPr id="4" name="Rounded Rectangle 3"/>
+          <p:cNvSpPr/>
           <p:nvPr/>
         </p:nvSpPr>
-        <p:spPr bwMode="auto">
+        <p:spPr>
           <a:xfrm>
-            <a:off x="1219200" y="228600"/>
-            <a:ext cx="7772400" cy="457200"/>
+            <a:off x="2438400" y="1524000"/>
+            <a:ext cx="2895600" cy="2057400"/>
+          </a:xfrm>
+          <a:prstGeom prst="roundRect">
+            <a:avLst/>
+          </a:prstGeom>
+        </p:spPr>
+        <p:style>
+          <a:lnRef idx="3">
+            <a:schemeClr val="lt1"/>
+          </a:lnRef>
+          <a:fillRef idx="1">
+            <a:schemeClr val="accent6"/>
+          </a:fillRef>
+          <a:effectRef idx="1">
+            <a:schemeClr val="accent6"/>
+          </a:effectRef>
+          <a:fontRef idx="minor">
+            <a:schemeClr val="lt1"/>
+          </a:fontRef>
+        </p:style>
+        <p:txBody>
+          <a:bodyPr rtlCol="0" anchor="t"/>
+          <a:lstStyle/>
+          <a:p>
+            <a:r>
+              <a:rPr lang="en-US" dirty="0" err="1" smtClean="0"/>
+              <a:t>myapp</a:t>
+            </a:r>
+            <a:endParaRPr lang="en-US" dirty="0"/>
+          </a:p>
+        </p:txBody>
+      </p:sp>
+      <p:sp>
+        <p:nvSpPr>
+          <p:cNvPr id="5" name="Rectangle 4"/>
+          <p:cNvSpPr/>
+          <p:nvPr/>
+        </p:nvSpPr>
+        <p:spPr>
+          <a:xfrm>
+            <a:off x="2819400" y="2209800"/>
+            <a:ext cx="1066800" cy="762000"/>
           </a:xfrm>
           <a:prstGeom prst="rect">
             <a:avLst/>
           </a:prstGeom>
-          <a:noFill/>
+        </p:spPr>
+        <p:style>
+          <a:lnRef idx="1">
+            <a:schemeClr val="accent2"/>
+          </a:lnRef>
+          <a:fillRef idx="2">
+            <a:schemeClr val="accent2"/>
+          </a:fillRef>
+          <a:effectRef idx="1">
+            <a:schemeClr val="accent2"/>
+          </a:effectRef>
+          <a:fontRef idx="minor">
+            <a:schemeClr val="dk1"/>
+          </a:fontRef>
+        </p:style>
+        <p:txBody>
+          <a:bodyPr rtlCol="0" anchor="ctr"/>
+          <a:lstStyle/>
+          <a:p>
+            <a:pPr algn="ctr"/>
+            <a:r>
+              <a:rPr lang="en-US" dirty="0" smtClean="0"/>
+              <a:t>MAIN</a:t>
+            </a:r>
+            <a:endParaRPr lang="en-US" dirty="0"/>
+          </a:p>
+        </p:txBody>
+      </p:sp>
+      <p:sp>
+        <p:nvSpPr>
+          <p:cNvPr id="6" name="Rectangle 5"/>
+          <p:cNvSpPr/>
+          <p:nvPr/>
+        </p:nvSpPr>
+        <p:spPr>
+          <a:xfrm>
+            <a:off x="4191000" y="2209800"/>
+            <a:ext cx="822960" cy="762000"/>
+          </a:xfrm>
+          <a:prstGeom prst="rect">
+            <a:avLst/>
+          </a:prstGeom>
+          <a:ln/>
+        </p:spPr>
+        <p:style>
+          <a:lnRef idx="1">
+            <a:schemeClr val="accent2"/>
+          </a:lnRef>
+          <a:fillRef idx="2">
+            <a:schemeClr val="accent2"/>
+          </a:fillRef>
+          <a:effectRef idx="1">
+            <a:schemeClr val="accent2"/>
+          </a:effectRef>
+          <a:fontRef idx="minor">
+            <a:schemeClr val="dk1"/>
+          </a:fontRef>
+        </p:style>
+        <p:txBody>
+          <a:bodyPr/>
+          <a:lstStyle/>
+          <a:p>
+            <a:endParaRPr lang="en-US"/>
+          </a:p>
+        </p:txBody>
+      </p:sp>
+      <p:sp>
+        <p:nvSpPr>
+          <p:cNvPr id="7" name="Rounded Rectangle 6"/>
+          <p:cNvSpPr/>
+          <p:nvPr/>
+        </p:nvSpPr>
+        <p:spPr>
+          <a:xfrm>
+            <a:off x="2514600" y="3886200"/>
+            <a:ext cx="1512724" cy="2057399"/>
+          </a:xfrm>
+          <a:prstGeom prst="roundRect">
+            <a:avLst/>
+          </a:prstGeom>
+          <a:ln/>
+        </p:spPr>
+        <p:style>
+          <a:lnRef idx="3">
+            <a:schemeClr val="lt1"/>
+          </a:lnRef>
+          <a:fillRef idx="1">
+            <a:schemeClr val="accent6"/>
+          </a:fillRef>
+          <a:effectRef idx="1">
+            <a:schemeClr val="accent6"/>
+          </a:effectRef>
+          <a:fontRef idx="minor">
+            <a:schemeClr val="lt1"/>
+          </a:fontRef>
+        </p:style>
+        <p:txBody>
+          <a:bodyPr/>
+          <a:lstStyle/>
+          <a:p>
+            <a:r>
+              <a:rPr lang="en-US" dirty="0" err="1" smtClean="0"/>
+              <a:t>gmail</a:t>
+            </a:r>
+            <a:endParaRPr lang="en-US" dirty="0"/>
+          </a:p>
+        </p:txBody>
+      </p:sp>
+      <p:sp>
+        <p:nvSpPr>
+          <p:cNvPr id="8" name="Rectangle 7"/>
+          <p:cNvSpPr/>
+          <p:nvPr/>
+        </p:nvSpPr>
+        <p:spPr>
+          <a:xfrm>
+            <a:off x="2743200" y="4724400"/>
+            <a:ext cx="822960" cy="822960"/>
+          </a:xfrm>
+          <a:prstGeom prst="rect">
+            <a:avLst/>
+          </a:prstGeom>
+          <a:ln/>
+        </p:spPr>
+        <p:style>
+          <a:lnRef idx="1">
+            <a:schemeClr val="accent2"/>
+          </a:lnRef>
+          <a:fillRef idx="2">
+            <a:schemeClr val="accent2"/>
+          </a:fillRef>
+          <a:effectRef idx="1">
+            <a:schemeClr val="accent2"/>
+          </a:effectRef>
+          <a:fontRef idx="minor">
+            <a:schemeClr val="dk1"/>
+          </a:fontRef>
+        </p:style>
+        <p:txBody>
+          <a:bodyPr/>
+          <a:lstStyle/>
+          <a:p>
+            <a:endParaRPr lang="en-US"/>
+          </a:p>
+        </p:txBody>
+      </p:sp>
+      <p:cxnSp>
+        <p:nvCxnSpPr>
+          <p:cNvPr id="10" name="Straight Arrow Connector 9"/>
+          <p:cNvCxnSpPr>
+            <a:endCxn id="6" idx="1"/>
+          </p:cNvCxnSpPr>
+          <p:nvPr/>
+        </p:nvCxnSpPr>
+        <p:spPr>
+          <a:xfrm>
+            <a:off x="3886200" y="2590800"/>
+            <a:ext cx="304800" cy="0"/>
+          </a:xfrm>
+          <a:prstGeom prst="straightConnector1">
+            <a:avLst/>
+          </a:prstGeom>
           <a:ln>
-            <a:noFill/>
+            <a:tailEnd type="arrow"/>
           </a:ln>
-          <a:extLst>
-            <a:ext uri="{909E8E84-426E-40dd-AFC4-6F175D3DCCD1}">
-              <a14:hiddenFill xmlns:a14="http://schemas.microsoft.com/office/drawing/2010/main">
-                <a:solidFill>
-                  <a:srgbClr val="FFFFFF"/>
-                </a:solidFill>
-              </a14:hiddenFill>
-            </a:ext>
-            <a:ext uri="{91240B29-F687-4f45-9708-019B960494DF}">
-              <a14:hiddenLine xmlns:a14="http://schemas.microsoft.com/office/drawing/2010/main" w="9525">
-                <a:solidFill>
-                  <a:srgbClr val="000000"/>
-                </a:solidFill>
-                <a:miter lim="800000"/>
-                <a:headEnd/>
-                <a:tailEnd/>
-              </a14:hiddenLine>
-            </a:ext>
-          </a:extLst>
         </p:spPr>
+        <p:style>
+          <a:lnRef idx="3">
+            <a:schemeClr val="accent2"/>
+          </a:lnRef>
+          <a:fillRef idx="0">
+            <a:schemeClr val="accent2"/>
+          </a:fillRef>
+          <a:effectRef idx="2">
+            <a:schemeClr val="accent2"/>
+          </a:effectRef>
+          <a:fontRef idx="minor">
+            <a:schemeClr val="tx1"/>
+          </a:fontRef>
+        </p:style>
+      </p:cxnSp>
+      <p:cxnSp>
+        <p:nvCxnSpPr>
+          <p:cNvPr id="11" name="Straight Arrow Connector 10"/>
+          <p:cNvCxnSpPr>
+            <a:stCxn id="6" idx="3"/>
+            <a:endCxn id="8" idx="0"/>
+          </p:cNvCxnSpPr>
+          <p:nvPr/>
+        </p:nvCxnSpPr>
+        <p:spPr>
+          <a:xfrm flipH="1">
+            <a:off x="3154680" y="2590800"/>
+            <a:ext cx="1859280" cy="2133600"/>
+          </a:xfrm>
+          <a:prstGeom prst="straightConnector1">
+            <a:avLst/>
+          </a:prstGeom>
+          <a:ln>
+            <a:tailEnd type="arrow"/>
+          </a:ln>
+        </p:spPr>
+        <p:style>
+          <a:lnRef idx="3">
+            <a:schemeClr val="accent2"/>
+          </a:lnRef>
+          <a:fillRef idx="0">
+            <a:schemeClr val="accent2"/>
+          </a:fillRef>
+          <a:effectRef idx="2">
+            <a:schemeClr val="accent2"/>
+          </a:effectRef>
+          <a:fontRef idx="minor">
+            <a:schemeClr val="tx1"/>
+          </a:fontRef>
+        </p:style>
+      </p:cxnSp>
+      <p:sp>
+        <p:nvSpPr>
+          <p:cNvPr id="14" name="Pentagon 13"/>
+          <p:cNvSpPr/>
+          <p:nvPr/>
+        </p:nvSpPr>
+        <p:spPr>
+          <a:xfrm rot="5400000">
+            <a:off x="914400" y="3429000"/>
+            <a:ext cx="822960" cy="822960"/>
+          </a:xfrm>
+          <a:prstGeom prst="homePlate">
+            <a:avLst/>
+          </a:prstGeom>
+          <a:ln/>
+        </p:spPr>
+        <p:style>
+          <a:lnRef idx="1">
+            <a:schemeClr val="dk1"/>
+          </a:lnRef>
+          <a:fillRef idx="3">
+            <a:schemeClr val="dk1"/>
+          </a:fillRef>
+          <a:effectRef idx="2">
+            <a:schemeClr val="dk1"/>
+          </a:effectRef>
+          <a:fontRef idx="minor">
+            <a:schemeClr val="lt1"/>
+          </a:fontRef>
+        </p:style>
         <p:txBody>
-          <a:bodyPr anchor="ctr"/>
+          <a:bodyPr/>
           <a:lstStyle/>
           <a:p>
-            <a:pPr algn="r"/>
-            <a:r>
-              <a:rPr lang="en-CA" sz="2000">
-                <a:solidFill>
-                  <a:srgbClr val="89A8B7"/>
-                </a:solidFill>
+            <a:endParaRPr lang="en-US" dirty="0"/>
+          </a:p>
+        </p:txBody>
+      </p:sp>
+      <p:cxnSp>
+        <p:nvCxnSpPr>
+          <p:cNvPr id="15" name="Straight Arrow Connector 14"/>
+          <p:cNvCxnSpPr>
+            <a:stCxn id="14" idx="0"/>
+            <a:endCxn id="5" idx="1"/>
+          </p:cNvCxnSpPr>
+          <p:nvPr/>
+        </p:nvCxnSpPr>
+        <p:spPr>
+          <a:xfrm flipV="1">
+            <a:off x="1737360" y="2590800"/>
+            <a:ext cx="1082040" cy="1043940"/>
+          </a:xfrm>
+          <a:prstGeom prst="straightConnector1">
+            <a:avLst/>
+          </a:prstGeom>
+          <a:ln>
+            <a:tailEnd type="arrow"/>
+          </a:ln>
+        </p:spPr>
+        <p:style>
+          <a:lnRef idx="3">
+            <a:schemeClr val="accent2"/>
+          </a:lnRef>
+          <a:fillRef idx="0">
+            <a:schemeClr val="accent2"/>
+          </a:fillRef>
+          <a:effectRef idx="2">
+            <a:schemeClr val="accent2"/>
+          </a:effectRef>
+          <a:fontRef idx="minor">
+            <a:schemeClr val="tx1"/>
+          </a:fontRef>
+        </p:style>
+      </p:cxnSp>
+    </p:spTree>
+    <p:extLst>
+      <p:ext uri="{BB962C8B-B14F-4D97-AF65-F5344CB8AC3E}">
+        <p14:creationId xmlns:p14="http://schemas.microsoft.com/office/powerpoint/2010/main" val="2532804178"/>
+      </p:ext>
+    </p:extLst>
+  </p:cSld>
+  <p:clrMapOvr>
+    <a:masterClrMapping/>
+  </p:clrMapOvr>
+  <p:transition xmlns:p14="http://schemas.microsoft.com/office/powerpoint/2010/main">
+    <p:wipe/>
+  </p:transition>
+  <p:timing>
+    <p:tnLst>
+      <p:par>
+        <p:cTn xmlns:p14="http://schemas.microsoft.com/office/powerpoint/2010/main" id="1" dur="indefinite" restart="never" nodeType="tmRoot"/>
+      </p:par>
+    </p:tnLst>
+  </p:timing>
+</p:sld>
+</file>
+
+<file path=ppt/slides/slide42.xml><?xml version="1.0" encoding="utf-8"?>
+<p:sld xmlns:a="http://schemas.openxmlformats.org/drawingml/2006/main" xmlns:r="http://schemas.openxmlformats.org/officeDocument/2006/relationships" xmlns:p="http://schemas.openxmlformats.org/presentationml/2006/main">
+  <p:cSld>
+    <p:spTree>
+      <p:nvGrpSpPr>
+        <p:cNvPr id="1" name=""/>
+        <p:cNvGrpSpPr/>
+        <p:nvPr/>
+      </p:nvGrpSpPr>
+      <p:grpSpPr>
+        <a:xfrm>
+          <a:off x="0" y="0"/>
+          <a:ext cx="0" cy="0"/>
+          <a:chOff x="0" y="0"/>
+          <a:chExt cx="0" cy="0"/>
+        </a:xfrm>
+      </p:grpSpPr>
+      <p:sp>
+        <p:nvSpPr>
+          <p:cNvPr id="2" name="Title 1"/>
+          <p:cNvSpPr>
+            <a:spLocks noGrp="1"/>
+          </p:cNvSpPr>
+          <p:nvPr>
+            <p:ph type="title"/>
+          </p:nvPr>
+        </p:nvSpPr>
+        <p:spPr/>
+        <p:txBody>
+          <a:bodyPr/>
+          <a:lstStyle/>
+          <a:p>
+            <a:r>
+              <a:rPr lang="en-US" dirty="0" smtClean="0"/>
+              <a:t>Activity Flags</a:t>
+            </a:r>
+            <a:endParaRPr lang="en-US" dirty="0"/>
+          </a:p>
+        </p:txBody>
+      </p:sp>
+      <p:sp>
+        <p:nvSpPr>
+          <p:cNvPr id="3" name="Content Placeholder 2"/>
+          <p:cNvSpPr>
+            <a:spLocks noGrp="1"/>
+          </p:cNvSpPr>
+          <p:nvPr>
+            <p:ph idx="1"/>
+          </p:nvPr>
+        </p:nvSpPr>
+        <p:spPr/>
+        <p:txBody>
+          <a:bodyPr/>
+          <a:lstStyle/>
+          <a:p>
+            <a:r>
+              <a:rPr lang="en-US" dirty="0" smtClean="0"/>
+              <a:t>FLAG_ACTIVITY_CLEAR_WHEN_TASK_RESET</a:t>
+            </a:r>
+          </a:p>
+          <a:p>
+            <a:pPr lvl="1"/>
+            <a:r>
+              <a:rPr lang="en-US" dirty="0" smtClean="0"/>
+              <a:t>Don’t hang around if the user leaves and comes back</a:t>
+            </a:r>
+          </a:p>
+          <a:p>
+            <a:r>
+              <a:rPr lang="en-US" dirty="0" smtClean="0"/>
+              <a:t>FLAG_ACTIVITY_REORDER_TO_FRONT</a:t>
+            </a:r>
+          </a:p>
+          <a:p>
+            <a:pPr lvl="1"/>
+            <a:r>
+              <a:rPr lang="en-US" dirty="0" smtClean="0"/>
+              <a:t>Don’t have duplicates of this activity in the stack</a:t>
+            </a:r>
+            <a:endParaRPr lang="en-US" dirty="0"/>
+          </a:p>
+          <a:p>
+            <a:r>
+              <a:rPr lang="en-US" dirty="0" smtClean="0"/>
+              <a:t>FLAG_ACTIVITY_CLEAR_TOP</a:t>
+            </a:r>
+          </a:p>
+          <a:p>
+            <a:pPr lvl="1"/>
+            <a:r>
+              <a:rPr lang="en-US" dirty="0" smtClean="0"/>
+              <a:t>Prevent circles in the back stack</a:t>
+            </a:r>
+          </a:p>
+          <a:p>
+            <a:r>
+              <a:rPr lang="en-US" dirty="0" smtClean="0"/>
+              <a:t>FLAG_ACTIVITY_NEW_TASK</a:t>
+            </a:r>
+          </a:p>
+          <a:p>
+            <a:pPr lvl="1"/>
+            <a:r>
+              <a:rPr lang="en-US" dirty="0" smtClean="0"/>
+              <a:t>Put this activity in the task of its own application</a:t>
+            </a:r>
+          </a:p>
+          <a:p>
+            <a:pPr lvl="1"/>
+            <a:r>
+              <a:rPr lang="en-US" dirty="0"/>
+              <a:t>With </a:t>
+            </a:r>
+            <a:r>
+              <a:rPr lang="en-US" dirty="0" smtClean="0"/>
+              <a:t>FLAG_ACTIVITY_MULTIPLE_TASK, will always start a new task</a:t>
+            </a:r>
+          </a:p>
+          <a:p>
+            <a:r>
+              <a:rPr lang="en-US" dirty="0" smtClean="0"/>
+              <a:t>FLAG_ACTIVITY_NO_ANIMATION, NO_HISTORY</a:t>
+            </a:r>
+          </a:p>
+          <a:p>
+            <a:pPr lvl="1"/>
+            <a:r>
+              <a:rPr lang="en-US" dirty="0" smtClean="0"/>
+              <a:t>Transparently forward to another activity</a:t>
+            </a:r>
+            <a:endParaRPr lang="en-US" dirty="0"/>
+          </a:p>
+        </p:txBody>
+      </p:sp>
+    </p:spTree>
+    <p:extLst>
+      <p:ext uri="{BB962C8B-B14F-4D97-AF65-F5344CB8AC3E}">
+        <p14:creationId xmlns:p14="http://schemas.microsoft.com/office/powerpoint/2010/main" val="3663758240"/>
+      </p:ext>
+    </p:extLst>
+  </p:cSld>
+  <p:clrMapOvr>
+    <a:masterClrMapping/>
+  </p:clrMapOvr>
+  <p:transition xmlns:p14="http://schemas.microsoft.com/office/powerpoint/2010/main">
+    <p:wipe/>
+  </p:transition>
+  <p:timing>
+    <p:tnLst>
+      <p:par>
+        <p:cTn xmlns:p14="http://schemas.microsoft.com/office/powerpoint/2010/main" id="1" dur="indefinite" restart="never" nodeType="tmRoot"/>
+      </p:par>
+    </p:tnLst>
+  </p:timing>
+</p:sld>
+</file>
+
+<file path=ppt/slides/slide43.xml><?xml version="1.0" encoding="utf-8"?>
+<p:sld xmlns:a="http://schemas.openxmlformats.org/drawingml/2006/main" xmlns:r="http://schemas.openxmlformats.org/officeDocument/2006/relationships" xmlns:p="http://schemas.openxmlformats.org/presentationml/2006/main" show="0">
+  <p:cSld>
+    <p:spTree>
+      <p:nvGrpSpPr>
+        <p:cNvPr id="1" name=""/>
+        <p:cNvGrpSpPr/>
+        <p:nvPr/>
+      </p:nvGrpSpPr>
+      <p:grpSpPr>
+        <a:xfrm>
+          <a:off x="0" y="0"/>
+          <a:ext cx="0" cy="0"/>
+          <a:chOff x="0" y="0"/>
+          <a:chExt cx="0" cy="0"/>
+        </a:xfrm>
+      </p:grpSpPr>
+      <p:sp>
+        <p:nvSpPr>
+          <p:cNvPr id="26625" name="Title 1"/>
+          <p:cNvSpPr>
+            <a:spLocks noGrp="1"/>
+          </p:cNvSpPr>
+          <p:nvPr>
+            <p:ph type="title"/>
+          </p:nvPr>
+        </p:nvSpPr>
+        <p:spPr/>
+        <p:txBody>
+          <a:bodyPr/>
+          <a:lstStyle/>
+          <a:p>
+            <a:r>
+              <a:rPr lang="en-US">
                 <a:latin typeface="Arial" charset="0"/>
               </a:rPr>
-              <a:t>Presentation title</a:t>
-            </a:r>
+              <a:t>Don't forget</a:t>
+            </a:r>
+          </a:p>
+        </p:txBody>
+      </p:sp>
+      <p:sp>
+        <p:nvSpPr>
+          <p:cNvPr id="26626" name="Content Placeholder 2"/>
+          <p:cNvSpPr>
+            <a:spLocks noGrp="1"/>
+          </p:cNvSpPr>
+          <p:nvPr>
+            <p:ph idx="1"/>
+          </p:nvPr>
+        </p:nvSpPr>
+        <p:spPr/>
+        <p:txBody>
+          <a:bodyPr/>
+          <a:lstStyle/>
+          <a:p>
+            <a:r>
+              <a:rPr lang="en-US" dirty="0">
+                <a:latin typeface="Arial" charset="0"/>
+              </a:rPr>
+              <a:t>Replace "presentation title" with my title wherever it </a:t>
+            </a:r>
+            <a:r>
+              <a:rPr lang="en-US" dirty="0" smtClean="0">
+                <a:latin typeface="Arial" charset="0"/>
+              </a:rPr>
+              <a:t>appears</a:t>
+            </a:r>
+          </a:p>
+          <a:p>
+            <a:r>
+              <a:rPr lang="en-US" dirty="0" smtClean="0">
+                <a:latin typeface="Arial" charset="0"/>
+              </a:rPr>
+              <a:t>App: try to duplicate crash when I hit “pick contact” but then exit, then try to go back.</a:t>
+            </a:r>
+          </a:p>
+          <a:p>
+            <a:r>
+              <a:rPr lang="en-US" dirty="0" smtClean="0">
+                <a:latin typeface="Arial" charset="0"/>
+              </a:rPr>
+              <a:t>What does it mean to set an app as a default? How does that stick, and what else does it affect?</a:t>
+            </a:r>
+          </a:p>
+          <a:p>
+            <a:r>
+              <a:rPr lang="en-US" dirty="0" smtClean="0">
+                <a:latin typeface="Arial" charset="0"/>
+              </a:rPr>
+              <a:t>Use  ACTION_PICK_ACTIVITY to let them choose what the button will do</a:t>
+            </a:r>
+            <a:endParaRPr lang="en-US" dirty="0">
+              <a:latin typeface="Arial" charset="0"/>
+            </a:endParaRPr>
+          </a:p>
+          <a:p>
+            <a:endParaRPr lang="en-US" dirty="0">
+              <a:latin typeface="Arial" charset="0"/>
+            </a:endParaRPr>
           </a:p>
         </p:txBody>
       </p:sp>
@@ -13959,7 +14270,7 @@
 </p:sld>
 </file>
 
-<file path=ppt/slides/slide42.xml><?xml version="1.0" encoding="utf-8"?>
+<file path=ppt/slides/slide44.xml><?xml version="1.0" encoding="utf-8"?>
 <p:sld xmlns:a="http://schemas.openxmlformats.org/drawingml/2006/main" xmlns:r="http://schemas.openxmlformats.org/officeDocument/2006/relationships" xmlns:p="http://schemas.openxmlformats.org/presentationml/2006/main">
   <p:cSld>
     <p:spTree>
@@ -14762,6 +15073,13 @@
   <p:transition xmlns:p14="http://schemas.microsoft.com/office/powerpoint/2010/main">
     <p:wipe/>
   </p:transition>
+  <p:timing>
+    <p:tnLst>
+      <p:par>
+        <p:cTn xmlns:p14="http://schemas.microsoft.com/office/powerpoint/2010/main" id="1" dur="indefinite" restart="never" nodeType="tmRoot"/>
+      </p:par>
+    </p:tnLst>
+  </p:timing>
 </p:sld>
 </file>
 

</xml_diff>